<commit_message>
[db] add logical query op
</commit_message>
<xml_diff>
--- a/db/mongodb/2017/materials/MongoDB_CH2(2)_Query.pptx
+++ b/db/mongodb/2017/materials/MongoDB_CH2(2)_Query.pptx
@@ -8,7 +8,7 @@
     <p:sldMasterId id="2147483652" r:id="rId7"/>
   </p:sldMasterIdLst>
   <p:notesMasterIdLst>
-    <p:notesMasterId r:id="rId21"/>
+    <p:notesMasterId r:id="rId26"/>
   </p:notesMasterIdLst>
   <p:sldIdLst>
     <p:sldId id="281" r:id="rId8"/>
@@ -22,8 +22,13 @@
     <p:sldId id="438" r:id="rId16"/>
     <p:sldId id="439" r:id="rId17"/>
     <p:sldId id="440" r:id="rId18"/>
-    <p:sldId id="264" r:id="rId19"/>
-    <p:sldId id="265" r:id="rId20"/>
+    <p:sldId id="441" r:id="rId19"/>
+    <p:sldId id="442" r:id="rId20"/>
+    <p:sldId id="443" r:id="rId21"/>
+    <p:sldId id="444" r:id="rId22"/>
+    <p:sldId id="445" r:id="rId23"/>
+    <p:sldId id="264" r:id="rId24"/>
+    <p:sldId id="265" r:id="rId25"/>
   </p:sldIdLst>
   <p:sldSz cx="9144000" cy="6858000" type="screen4x3"/>
   <p:notesSz cx="6858000" cy="9144000"/>
@@ -224,7 +229,7 @@
             <a:fld id="{97373330-0875-4F54-B846-34A9C5D83194}" type="datetimeFigureOut">
               <a:rPr lang="en-US" smtClean="0"/>
               <a:pPr/>
-              <a:t>7/26/2017</a:t>
+              <a:t>7/27/2017</a:t>
             </a:fld>
             <a:endParaRPr lang="en-US"/>
           </a:p>
@@ -7351,6 +7356,3187 @@
           <a:chExt cx="0" cy="0"/>
         </a:xfrm>
       </p:grpSpPr>
+      <p:sp>
+        <p:nvSpPr>
+          <p:cNvPr id="2" name="Text Placeholder 1"/>
+          <p:cNvSpPr>
+            <a:spLocks noGrp="1"/>
+          </p:cNvSpPr>
+          <p:nvPr>
+            <p:ph type="body" sz="quarter" idx="14"/>
+          </p:nvPr>
+        </p:nvSpPr>
+        <p:spPr>
+          <a:xfrm>
+            <a:off x="1031080" y="1712742"/>
+            <a:ext cx="7122319" cy="646331"/>
+          </a:xfrm>
+        </p:spPr>
+        <p:txBody>
+          <a:bodyPr/>
+          <a:lstStyle/>
+          <a:p>
+            <a:r>
+              <a:rPr lang="en-US" dirty="0"/>
+              <a:t>Query  Operators: Logical</a:t>
+            </a:r>
+          </a:p>
+        </p:txBody>
+      </p:sp>
+      <p:sp>
+        <p:nvSpPr>
+          <p:cNvPr id="3" name="Text Placeholder 2"/>
+          <p:cNvSpPr>
+            <a:spLocks noGrp="1"/>
+          </p:cNvSpPr>
+          <p:nvPr>
+            <p:ph type="body" sz="quarter" idx="11"/>
+          </p:nvPr>
+        </p:nvSpPr>
+        <p:spPr/>
+        <p:txBody>
+          <a:bodyPr/>
+          <a:lstStyle/>
+          <a:p>
+            <a:r>
+              <a:rPr lang="en-US" dirty="0"/>
+              <a:t>3</a:t>
+            </a:r>
+          </a:p>
+        </p:txBody>
+      </p:sp>
+    </p:spTree>
+    <p:extLst>
+      <p:ext uri="{BB962C8B-B14F-4D97-AF65-F5344CB8AC3E}">
+        <p14:creationId xmlns:p14="http://schemas.microsoft.com/office/powerpoint/2010/main" val="1196818255"/>
+      </p:ext>
+    </p:extLst>
+  </p:cSld>
+  <p:clrMapOvr>
+    <a:masterClrMapping/>
+  </p:clrMapOvr>
+</p:sld>
+</file>
+
+<file path=ppt/slides/slide13.xml><?xml version="1.0" encoding="utf-8"?>
+<p:sld xmlns:a="http://schemas.openxmlformats.org/drawingml/2006/main" xmlns:r="http://schemas.openxmlformats.org/officeDocument/2006/relationships" xmlns:p="http://schemas.openxmlformats.org/presentationml/2006/main">
+  <p:cSld>
+    <p:spTree>
+      <p:nvGrpSpPr>
+        <p:cNvPr id="1" name=""/>
+        <p:cNvGrpSpPr/>
+        <p:nvPr/>
+      </p:nvGrpSpPr>
+      <p:grpSpPr>
+        <a:xfrm>
+          <a:off x="0" y="0"/>
+          <a:ext cx="0" cy="0"/>
+          <a:chOff x="0" y="0"/>
+          <a:chExt cx="0" cy="0"/>
+        </a:xfrm>
+      </p:grpSpPr>
+      <p:sp>
+        <p:nvSpPr>
+          <p:cNvPr id="2" name="Text Placeholder 1"/>
+          <p:cNvSpPr>
+            <a:spLocks noGrp="1"/>
+          </p:cNvSpPr>
+          <p:nvPr>
+            <p:ph type="body" sz="quarter" idx="13"/>
+          </p:nvPr>
+        </p:nvSpPr>
+        <p:spPr/>
+        <p:txBody>
+          <a:bodyPr/>
+          <a:lstStyle/>
+          <a:p>
+            <a:r>
+              <a:rPr lang="en-US" dirty="0"/>
+              <a:t>3</a:t>
+            </a:r>
+          </a:p>
+        </p:txBody>
+      </p:sp>
+      <p:sp>
+        <p:nvSpPr>
+          <p:cNvPr id="3" name="Text Placeholder 2"/>
+          <p:cNvSpPr>
+            <a:spLocks noGrp="1"/>
+          </p:cNvSpPr>
+          <p:nvPr>
+            <p:ph type="body" sz="quarter" idx="14"/>
+          </p:nvPr>
+        </p:nvSpPr>
+        <p:spPr/>
+        <p:txBody>
+          <a:bodyPr/>
+          <a:lstStyle/>
+          <a:p>
+            <a:r>
+              <a:rPr lang="en-US" dirty="0"/>
+              <a:t>Query  Operators: Logical</a:t>
+            </a:r>
+            <a:endParaRPr lang="en-US" altLang="zh-CN" dirty="0"/>
+          </a:p>
+          <a:p>
+            <a:endParaRPr lang="en-US" dirty="0"/>
+          </a:p>
+          <a:p>
+            <a:endParaRPr lang="en-US" dirty="0"/>
+          </a:p>
+        </p:txBody>
+      </p:sp>
+      <p:graphicFrame>
+        <p:nvGraphicFramePr>
+          <p:cNvPr id="5" name="Table 4"/>
+          <p:cNvGraphicFramePr>
+            <a:graphicFrameLocks noGrp="1"/>
+          </p:cNvGraphicFramePr>
+          <p:nvPr>
+            <p:extLst>
+              <p:ext uri="{D42A27DB-BD31-4B8C-83A1-F6EECF244321}">
+                <p14:modId xmlns:p14="http://schemas.microsoft.com/office/powerpoint/2010/main" val="2073454956"/>
+              </p:ext>
+            </p:extLst>
+          </p:nvPr>
+        </p:nvGraphicFramePr>
+        <p:xfrm>
+          <a:off x="27633" y="990600"/>
+          <a:ext cx="8964488" cy="5913120"/>
+        </p:xfrm>
+        <a:graphic>
+          <a:graphicData uri="http://schemas.openxmlformats.org/drawingml/2006/table">
+            <a:tbl>
+              <a:tblPr firstRow="1" bandRow="1">
+                <a:tableStyleId>{8799B23B-EC83-4686-B30A-512413B5E67A}</a:tableStyleId>
+              </a:tblPr>
+              <a:tblGrid>
+                <a:gridCol w="1368152">
+                  <a:extLst>
+                    <a:ext uri="{9D8B030D-6E8A-4147-A177-3AD203B41FA5}">
+                      <a16:colId xmlns:a16="http://schemas.microsoft.com/office/drawing/2014/main" val="20000"/>
+                    </a:ext>
+                  </a:extLst>
+                </a:gridCol>
+                <a:gridCol w="2880320">
+                  <a:extLst>
+                    <a:ext uri="{9D8B030D-6E8A-4147-A177-3AD203B41FA5}">
+                      <a16:colId xmlns:a16="http://schemas.microsoft.com/office/drawing/2014/main" val="20001"/>
+                    </a:ext>
+                  </a:extLst>
+                </a:gridCol>
+                <a:gridCol w="4716016">
+                  <a:extLst>
+                    <a:ext uri="{9D8B030D-6E8A-4147-A177-3AD203B41FA5}">
+                      <a16:colId xmlns:a16="http://schemas.microsoft.com/office/drawing/2014/main" val="20002"/>
+                    </a:ext>
+                  </a:extLst>
+                </a:gridCol>
+              </a:tblGrid>
+              <a:tr h="1290294">
+                <a:tc>
+                  <a:txBody>
+                    <a:bodyPr/>
+                    <a:lstStyle/>
+                    <a:p>
+                      <a:pPr algn="ctr"/>
+                      <a:r>
+                        <a:rPr lang="en-US" sz="2800" b="0" kern="1200" dirty="0">
+                          <a:solidFill>
+                            <a:schemeClr val="tx1"/>
+                          </a:solidFill>
+                          <a:latin typeface="+mn-lt"/>
+                          <a:ea typeface="+mn-ea"/>
+                          <a:cs typeface="+mn-cs"/>
+                        </a:rPr>
+                        <a:t>$or</a:t>
+                      </a:r>
+                    </a:p>
+                  </a:txBody>
+                  <a:tcPr/>
+                </a:tc>
+                <a:tc>
+                  <a:txBody>
+                    <a:bodyPr/>
+                    <a:lstStyle/>
+                    <a:p>
+                      <a:r>
+                        <a:rPr lang="en-US" sz="2800" b="0" kern="1200" dirty="0">
+                          <a:solidFill>
+                            <a:schemeClr val="tx1"/>
+                          </a:solidFill>
+                          <a:latin typeface="+mn-lt"/>
+                          <a:ea typeface="+mn-ea"/>
+                          <a:cs typeface="+mn-cs"/>
+                        </a:rPr>
+                        <a:t>WHERE</a:t>
+                      </a:r>
+                      <a:r>
+                        <a:rPr lang="en-US" sz="2800" b="0" kern="1200" baseline="0" dirty="0">
+                          <a:solidFill>
+                            <a:schemeClr val="tx1"/>
+                          </a:solidFill>
+                          <a:latin typeface="+mn-lt"/>
+                          <a:ea typeface="+mn-ea"/>
+                          <a:cs typeface="+mn-cs"/>
+                        </a:rPr>
+                        <a:t> </a:t>
+                      </a:r>
+                    </a:p>
+                    <a:p>
+                      <a:pPr marL="0" marR="0" indent="0" algn="l" defTabSz="914400" rtl="0" eaLnBrk="1" fontAlgn="auto" latinLnBrk="0" hangingPunct="1">
+                        <a:lnSpc>
+                          <a:spcPct val="100000"/>
+                        </a:lnSpc>
+                        <a:spcBef>
+                          <a:spcPts val="0"/>
+                        </a:spcBef>
+                        <a:spcAft>
+                          <a:spcPts val="0"/>
+                        </a:spcAft>
+                        <a:buClrTx/>
+                        <a:buSzTx/>
+                        <a:buFontTx/>
+                        <a:buNone/>
+                        <a:tabLst/>
+                        <a:defRPr/>
+                      </a:pPr>
+                      <a:r>
+                        <a:rPr lang="en-US" sz="2800" b="0" kern="1200" baseline="0" dirty="0">
+                          <a:solidFill>
+                            <a:schemeClr val="tx1"/>
+                          </a:solidFill>
+                          <a:latin typeface="+mn-lt"/>
+                          <a:ea typeface="+mn-ea"/>
+                          <a:cs typeface="+mn-cs"/>
+                        </a:rPr>
+                        <a:t>name=</a:t>
+                      </a:r>
+                      <a:r>
+                        <a:rPr lang="en-US" altLang="zh-CN" sz="2800" dirty="0">
+                          <a:solidFill>
+                            <a:schemeClr val="tx1"/>
+                          </a:solidFill>
+                          <a:latin typeface="Arial Unicode MS" pitchFamily="34" charset="-128"/>
+                        </a:rPr>
+                        <a:t>'</a:t>
+                      </a:r>
+                      <a:r>
+                        <a:rPr lang="en-US" sz="2800" b="0" kern="1200" baseline="0" dirty="0">
+                          <a:solidFill>
+                            <a:schemeClr val="tx1"/>
+                          </a:solidFill>
+                          <a:latin typeface="+mn-lt"/>
+                          <a:ea typeface="+mn-ea"/>
+                          <a:cs typeface="+mn-cs"/>
+                        </a:rPr>
+                        <a:t>Andy</a:t>
+                      </a:r>
+                      <a:r>
+                        <a:rPr lang="en-US" altLang="zh-CN" sz="2800" dirty="0">
+                          <a:solidFill>
+                            <a:schemeClr val="tx1"/>
+                          </a:solidFill>
+                          <a:latin typeface="Arial Unicode MS" pitchFamily="34" charset="-128"/>
+                        </a:rPr>
+                        <a:t>'</a:t>
+                      </a:r>
+                      <a:endParaRPr lang="en-US" sz="2800" b="0" kern="1200" dirty="0">
+                        <a:solidFill>
+                          <a:schemeClr val="tx1"/>
+                        </a:solidFill>
+                        <a:latin typeface="+mn-lt"/>
+                        <a:ea typeface="+mn-ea"/>
+                        <a:cs typeface="+mn-cs"/>
+                      </a:endParaRPr>
+                    </a:p>
+                    <a:p>
+                      <a:r>
+                        <a:rPr lang="en-US" sz="2800" b="1" kern="1200" dirty="0">
+                          <a:solidFill>
+                            <a:srgbClr val="2D75BC"/>
+                          </a:solidFill>
+                          <a:latin typeface="+mn-lt"/>
+                          <a:ea typeface="+mn-ea"/>
+                          <a:cs typeface="+mn-cs"/>
+                        </a:rPr>
+                        <a:t>OR</a:t>
+                      </a:r>
+                      <a:r>
+                        <a:rPr lang="en-US" sz="2800" b="0" kern="1200" dirty="0">
+                          <a:solidFill>
+                            <a:schemeClr val="tx1"/>
+                          </a:solidFill>
+                          <a:latin typeface="+mn-lt"/>
+                          <a:ea typeface="+mn-ea"/>
+                          <a:cs typeface="+mn-cs"/>
+                        </a:rPr>
+                        <a:t>  age=18 </a:t>
+                      </a:r>
+                    </a:p>
+                  </a:txBody>
+                  <a:tcPr/>
+                </a:tc>
+                <a:tc>
+                  <a:txBody>
+                    <a:bodyPr/>
+                    <a:lstStyle/>
+                    <a:p>
+                      <a:pPr marL="0" marR="0" indent="0" algn="l" defTabSz="914400" rtl="0" eaLnBrk="1" fontAlgn="auto" latinLnBrk="0" hangingPunct="1">
+                        <a:lnSpc>
+                          <a:spcPct val="100000"/>
+                        </a:lnSpc>
+                        <a:spcBef>
+                          <a:spcPts val="0"/>
+                        </a:spcBef>
+                        <a:spcAft>
+                          <a:spcPts val="0"/>
+                        </a:spcAft>
+                        <a:buClrTx/>
+                        <a:buSzTx/>
+                        <a:buFontTx/>
+                        <a:buNone/>
+                        <a:tabLst/>
+                        <a:defRPr/>
+                      </a:pPr>
+                      <a:r>
+                        <a:rPr lang="en-US" sz="2800" b="0" dirty="0">
+                          <a:solidFill>
+                            <a:schemeClr val="tx1"/>
+                          </a:solidFill>
+                        </a:rPr>
+                        <a:t>{ </a:t>
+                      </a:r>
+                      <a:r>
+                        <a:rPr lang="en-US" sz="2800" b="1" i="0" kern="1200" dirty="0">
+                          <a:solidFill>
+                            <a:srgbClr val="2D75BC"/>
+                          </a:solidFill>
+                          <a:latin typeface="+mn-lt"/>
+                          <a:ea typeface="+mn-ea"/>
+                          <a:cs typeface="+mn-cs"/>
+                        </a:rPr>
+                        <a:t>$or</a:t>
+                      </a:r>
+                      <a:r>
+                        <a:rPr lang="en-US" sz="2800" b="0" i="0" kern="1200" dirty="0">
+                          <a:solidFill>
+                            <a:schemeClr val="tx1"/>
+                          </a:solidFill>
+                          <a:latin typeface="+mn-lt"/>
+                          <a:ea typeface="+mn-ea"/>
+                          <a:cs typeface="+mn-cs"/>
+                        </a:rPr>
+                        <a:t>:[ </a:t>
+                      </a:r>
+                    </a:p>
+                    <a:p>
+                      <a:pPr marL="0" marR="0" indent="0" algn="ctr" defTabSz="914400" rtl="0" eaLnBrk="1" fontAlgn="auto" latinLnBrk="0" hangingPunct="1">
+                        <a:lnSpc>
+                          <a:spcPct val="100000"/>
+                        </a:lnSpc>
+                        <a:spcBef>
+                          <a:spcPts val="0"/>
+                        </a:spcBef>
+                        <a:spcAft>
+                          <a:spcPts val="0"/>
+                        </a:spcAft>
+                        <a:buClrTx/>
+                        <a:buSzTx/>
+                        <a:buFontTx/>
+                        <a:buNone/>
+                        <a:tabLst/>
+                        <a:defRPr/>
+                      </a:pPr>
+                      <a:r>
+                        <a:rPr lang="en-US" sz="2800" b="0" i="0" kern="1200" dirty="0">
+                          <a:solidFill>
+                            <a:schemeClr val="tx1"/>
+                          </a:solidFill>
+                          <a:latin typeface="+mn-lt"/>
+                          <a:ea typeface="+mn-ea"/>
+                          <a:cs typeface="+mn-cs"/>
+                        </a:rPr>
+                        <a:t>      </a:t>
+                      </a:r>
+                      <a:r>
+                        <a:rPr lang="en-US" sz="2800" b="0" dirty="0">
+                          <a:solidFill>
+                            <a:schemeClr val="tx1"/>
+                          </a:solidFill>
+                        </a:rPr>
+                        <a:t>{</a:t>
+                      </a:r>
+                      <a:r>
+                        <a:rPr lang="en-US" sz="2800" b="0" dirty="0" err="1">
+                          <a:solidFill>
+                            <a:schemeClr val="tx1"/>
+                          </a:solidFill>
+                        </a:rPr>
+                        <a:t>name:</a:t>
+                      </a:r>
+                      <a:r>
+                        <a:rPr lang="en-US" altLang="zh-CN" sz="2800" dirty="0" err="1">
+                          <a:solidFill>
+                            <a:schemeClr val="tx1"/>
+                          </a:solidFill>
+                          <a:latin typeface="Arial Unicode MS" pitchFamily="34" charset="-128"/>
+                        </a:rPr>
+                        <a:t>'</a:t>
+                      </a:r>
+                      <a:r>
+                        <a:rPr lang="en-US" sz="2800" b="0" dirty="0" err="1">
+                          <a:solidFill>
+                            <a:schemeClr val="tx1"/>
+                          </a:solidFill>
+                        </a:rPr>
+                        <a:t>Andy</a:t>
+                      </a:r>
+                      <a:r>
+                        <a:rPr lang="en-US" altLang="zh-CN" sz="2800" dirty="0">
+                          <a:solidFill>
+                            <a:schemeClr val="tx1"/>
+                          </a:solidFill>
+                          <a:latin typeface="Arial Unicode MS" pitchFamily="34" charset="-128"/>
+                        </a:rPr>
+                        <a:t>'</a:t>
+                      </a:r>
+                      <a:r>
+                        <a:rPr lang="en-US" sz="2800" b="0" dirty="0">
+                          <a:solidFill>
+                            <a:schemeClr val="tx1"/>
+                          </a:solidFill>
+                        </a:rPr>
+                        <a:t>},  {age:22}</a:t>
+                      </a:r>
+                    </a:p>
+                    <a:p>
+                      <a:pPr marL="0" marR="0" indent="0" algn="l" defTabSz="914400" rtl="0" eaLnBrk="1" fontAlgn="auto" latinLnBrk="0" hangingPunct="1">
+                        <a:lnSpc>
+                          <a:spcPct val="100000"/>
+                        </a:lnSpc>
+                        <a:spcBef>
+                          <a:spcPts val="0"/>
+                        </a:spcBef>
+                        <a:spcAft>
+                          <a:spcPts val="0"/>
+                        </a:spcAft>
+                        <a:buClrTx/>
+                        <a:buSzTx/>
+                        <a:buFontTx/>
+                        <a:buNone/>
+                        <a:tabLst/>
+                        <a:defRPr/>
+                      </a:pPr>
+                      <a:r>
+                        <a:rPr lang="en-US" sz="2800" b="0" dirty="0">
+                          <a:solidFill>
+                            <a:schemeClr val="tx1"/>
+                          </a:solidFill>
+                        </a:rPr>
+                        <a:t>] }</a:t>
+                      </a:r>
+                      <a:endParaRPr lang="en-US" sz="2800" b="0" kern="1200" dirty="0">
+                        <a:solidFill>
+                          <a:schemeClr val="tx1"/>
+                        </a:solidFill>
+                        <a:latin typeface="+mn-lt"/>
+                        <a:ea typeface="+mn-ea"/>
+                        <a:cs typeface="+mn-cs"/>
+                      </a:endParaRPr>
+                    </a:p>
+                  </a:txBody>
+                  <a:tcPr/>
+                </a:tc>
+                <a:extLst>
+                  <a:ext uri="{0D108BD9-81ED-4DB2-BD59-A6C34878D82A}">
+                    <a16:rowId xmlns:a16="http://schemas.microsoft.com/office/drawing/2014/main" val="10000"/>
+                  </a:ext>
+                </a:extLst>
+              </a:tr>
+              <a:tr h="1691718">
+                <a:tc>
+                  <a:txBody>
+                    <a:bodyPr/>
+                    <a:lstStyle/>
+                    <a:p>
+                      <a:pPr marL="0" marR="0" indent="0" algn="ctr" defTabSz="914400" rtl="0" eaLnBrk="1" fontAlgn="auto" latinLnBrk="0" hangingPunct="1">
+                        <a:lnSpc>
+                          <a:spcPct val="100000"/>
+                        </a:lnSpc>
+                        <a:spcBef>
+                          <a:spcPts val="0"/>
+                        </a:spcBef>
+                        <a:spcAft>
+                          <a:spcPts val="0"/>
+                        </a:spcAft>
+                        <a:buClrTx/>
+                        <a:buSzTx/>
+                        <a:buFontTx/>
+                        <a:buNone/>
+                        <a:tabLst/>
+                        <a:defRPr/>
+                      </a:pPr>
+                      <a:r>
+                        <a:rPr lang="en-US" sz="2800" b="0" kern="1200" dirty="0">
+                          <a:solidFill>
+                            <a:schemeClr val="tx1"/>
+                          </a:solidFill>
+                          <a:latin typeface="+mn-lt"/>
+                          <a:ea typeface="+mn-ea"/>
+                          <a:cs typeface="+mn-cs"/>
+                        </a:rPr>
+                        <a:t>$and</a:t>
+                      </a:r>
+                    </a:p>
+                  </a:txBody>
+                  <a:tcPr/>
+                </a:tc>
+                <a:tc>
+                  <a:txBody>
+                    <a:bodyPr/>
+                    <a:lstStyle/>
+                    <a:p>
+                      <a:r>
+                        <a:rPr lang="en-US" sz="2800" b="0" kern="1200" dirty="0">
+                          <a:solidFill>
+                            <a:schemeClr val="tx1"/>
+                          </a:solidFill>
+                          <a:latin typeface="+mn-lt"/>
+                          <a:ea typeface="+mn-ea"/>
+                          <a:cs typeface="+mn-cs"/>
+                        </a:rPr>
+                        <a:t>WHERE</a:t>
+                      </a:r>
+                    </a:p>
+                    <a:p>
+                      <a:r>
+                        <a:rPr lang="en-US" sz="2800" b="0" kern="1200" baseline="0" dirty="0">
+                          <a:solidFill>
+                            <a:schemeClr val="tx1"/>
+                          </a:solidFill>
+                          <a:latin typeface="+mn-lt"/>
+                          <a:ea typeface="+mn-ea"/>
+                          <a:cs typeface="+mn-cs"/>
+                        </a:rPr>
+                        <a:t>name=</a:t>
+                      </a:r>
+                      <a:r>
+                        <a:rPr lang="en-US" altLang="zh-CN" sz="2800" dirty="0">
+                          <a:solidFill>
+                            <a:schemeClr val="tx1"/>
+                          </a:solidFill>
+                          <a:latin typeface="Arial Unicode MS" pitchFamily="34" charset="-128"/>
+                        </a:rPr>
+                        <a:t>'</a:t>
+                      </a:r>
+                      <a:r>
+                        <a:rPr lang="en-US" sz="2800" b="0" kern="1200" baseline="0" dirty="0">
+                          <a:solidFill>
+                            <a:schemeClr val="tx1"/>
+                          </a:solidFill>
+                          <a:latin typeface="+mn-lt"/>
+                          <a:ea typeface="+mn-ea"/>
+                          <a:cs typeface="+mn-cs"/>
+                        </a:rPr>
+                        <a:t>Andy</a:t>
+                      </a:r>
+                      <a:r>
+                        <a:rPr lang="en-US" altLang="zh-CN" sz="2800" dirty="0">
+                          <a:solidFill>
+                            <a:schemeClr val="tx1"/>
+                          </a:solidFill>
+                          <a:latin typeface="Arial Unicode MS" pitchFamily="34" charset="-128"/>
+                        </a:rPr>
+                        <a:t>'</a:t>
+                      </a:r>
+                      <a:endParaRPr lang="en-US" sz="2800" b="0" kern="1200" dirty="0">
+                        <a:solidFill>
+                          <a:schemeClr val="tx1"/>
+                        </a:solidFill>
+                        <a:latin typeface="+mn-lt"/>
+                        <a:ea typeface="+mn-ea"/>
+                        <a:cs typeface="+mn-cs"/>
+                      </a:endParaRPr>
+                    </a:p>
+                    <a:p>
+                      <a:r>
+                        <a:rPr lang="en-US" sz="2800" b="1" kern="1200" dirty="0">
+                          <a:solidFill>
+                            <a:srgbClr val="2D75BC"/>
+                          </a:solidFill>
+                          <a:latin typeface="+mn-lt"/>
+                          <a:ea typeface="+mn-ea"/>
+                          <a:cs typeface="+mn-cs"/>
+                        </a:rPr>
+                        <a:t>AND</a:t>
+                      </a:r>
+                    </a:p>
+                    <a:p>
+                      <a:r>
+                        <a:rPr lang="en-US" sz="2800" b="0" kern="1200" dirty="0">
+                          <a:solidFill>
+                            <a:schemeClr val="tx1"/>
+                          </a:solidFill>
+                          <a:latin typeface="+mn-lt"/>
+                          <a:ea typeface="+mn-ea"/>
+                          <a:cs typeface="+mn-cs"/>
+                        </a:rPr>
+                        <a:t>age=18</a:t>
+                      </a:r>
+                    </a:p>
+                  </a:txBody>
+                  <a:tcPr/>
+                </a:tc>
+                <a:tc>
+                  <a:txBody>
+                    <a:bodyPr/>
+                    <a:lstStyle/>
+                    <a:p>
+                      <a:pPr marL="0" marR="0" indent="0" algn="l" defTabSz="914400" rtl="0" eaLnBrk="1" fontAlgn="auto" latinLnBrk="0" hangingPunct="1">
+                        <a:lnSpc>
+                          <a:spcPct val="100000"/>
+                        </a:lnSpc>
+                        <a:spcBef>
+                          <a:spcPts val="0"/>
+                        </a:spcBef>
+                        <a:spcAft>
+                          <a:spcPts val="0"/>
+                        </a:spcAft>
+                        <a:buClrTx/>
+                        <a:buSzTx/>
+                        <a:buFontTx/>
+                        <a:buNone/>
+                        <a:tabLst/>
+                        <a:defRPr/>
+                      </a:pPr>
+                      <a:r>
+                        <a:rPr lang="en-US" sz="2800" b="0" dirty="0">
+                          <a:solidFill>
+                            <a:schemeClr val="tx1"/>
+                          </a:solidFill>
+                        </a:rPr>
+                        <a:t>{ </a:t>
+                      </a:r>
+                      <a:r>
+                        <a:rPr lang="en-US" sz="2800" b="1" i="0" kern="1200" dirty="0">
+                          <a:solidFill>
+                            <a:srgbClr val="2D75BC"/>
+                          </a:solidFill>
+                          <a:latin typeface="+mn-lt"/>
+                          <a:ea typeface="+mn-ea"/>
+                          <a:cs typeface="+mn-cs"/>
+                        </a:rPr>
+                        <a:t>$and</a:t>
+                      </a:r>
+                      <a:r>
+                        <a:rPr lang="en-US" sz="2800" b="0" i="0" kern="1200" dirty="0">
+                          <a:solidFill>
+                            <a:schemeClr val="tx1"/>
+                          </a:solidFill>
+                          <a:latin typeface="+mn-lt"/>
+                          <a:ea typeface="+mn-ea"/>
+                          <a:cs typeface="+mn-cs"/>
+                        </a:rPr>
+                        <a:t>:[ </a:t>
+                      </a:r>
+                    </a:p>
+                    <a:p>
+                      <a:pPr marL="0" marR="0" indent="0" algn="ctr" defTabSz="914400" rtl="0" eaLnBrk="1" fontAlgn="auto" latinLnBrk="0" hangingPunct="1">
+                        <a:lnSpc>
+                          <a:spcPct val="100000"/>
+                        </a:lnSpc>
+                        <a:spcBef>
+                          <a:spcPts val="0"/>
+                        </a:spcBef>
+                        <a:spcAft>
+                          <a:spcPts val="0"/>
+                        </a:spcAft>
+                        <a:buClrTx/>
+                        <a:buSzTx/>
+                        <a:buFontTx/>
+                        <a:buNone/>
+                        <a:tabLst/>
+                        <a:defRPr/>
+                      </a:pPr>
+                      <a:r>
+                        <a:rPr lang="en-US" sz="2800" b="0" dirty="0">
+                          <a:solidFill>
+                            <a:schemeClr val="tx1"/>
+                          </a:solidFill>
+                        </a:rPr>
+                        <a:t>{</a:t>
+                      </a:r>
+                      <a:r>
+                        <a:rPr lang="en-US" sz="2800" b="0" dirty="0" err="1">
+                          <a:solidFill>
+                            <a:schemeClr val="tx1"/>
+                          </a:solidFill>
+                        </a:rPr>
+                        <a:t>name:</a:t>
+                      </a:r>
+                      <a:r>
+                        <a:rPr lang="en-US" altLang="zh-CN" sz="2800" dirty="0" err="1">
+                          <a:solidFill>
+                            <a:schemeClr val="tx1"/>
+                          </a:solidFill>
+                          <a:latin typeface="Arial Unicode MS" pitchFamily="34" charset="-128"/>
+                        </a:rPr>
+                        <a:t>'</a:t>
+                      </a:r>
+                      <a:r>
+                        <a:rPr lang="en-US" sz="2800" b="0" dirty="0" err="1">
+                          <a:solidFill>
+                            <a:schemeClr val="tx1"/>
+                          </a:solidFill>
+                        </a:rPr>
+                        <a:t>Andy</a:t>
+                      </a:r>
+                      <a:r>
+                        <a:rPr lang="en-US" altLang="zh-CN" sz="2800" dirty="0">
+                          <a:solidFill>
+                            <a:schemeClr val="tx1"/>
+                          </a:solidFill>
+                          <a:latin typeface="Arial Unicode MS" pitchFamily="34" charset="-128"/>
+                        </a:rPr>
+                        <a:t>'</a:t>
+                      </a:r>
+                      <a:r>
+                        <a:rPr lang="en-US" sz="2800" b="0" dirty="0">
+                          <a:solidFill>
+                            <a:schemeClr val="tx1"/>
+                          </a:solidFill>
+                        </a:rPr>
+                        <a:t>}, {age:22}</a:t>
+                      </a:r>
+                    </a:p>
+                    <a:p>
+                      <a:pPr marL="0" marR="0" indent="0" algn="l" defTabSz="914400" rtl="0" eaLnBrk="1" fontAlgn="auto" latinLnBrk="0" hangingPunct="1">
+                        <a:lnSpc>
+                          <a:spcPct val="100000"/>
+                        </a:lnSpc>
+                        <a:spcBef>
+                          <a:spcPts val="0"/>
+                        </a:spcBef>
+                        <a:spcAft>
+                          <a:spcPts val="0"/>
+                        </a:spcAft>
+                        <a:buClrTx/>
+                        <a:buSzTx/>
+                        <a:buFontTx/>
+                        <a:buNone/>
+                        <a:tabLst/>
+                        <a:defRPr/>
+                      </a:pPr>
+                      <a:r>
+                        <a:rPr lang="en-US" sz="2800" b="0" dirty="0">
+                          <a:solidFill>
+                            <a:schemeClr val="tx1"/>
+                          </a:solidFill>
+                        </a:rPr>
+                        <a:t> ] }</a:t>
+                      </a:r>
+                    </a:p>
+                    <a:p>
+                      <a:pPr marL="0" marR="0" indent="0" algn="l" defTabSz="914400" rtl="0" eaLnBrk="1" fontAlgn="auto" latinLnBrk="0" hangingPunct="1">
+                        <a:lnSpc>
+                          <a:spcPct val="100000"/>
+                        </a:lnSpc>
+                        <a:spcBef>
+                          <a:spcPts val="0"/>
+                        </a:spcBef>
+                        <a:spcAft>
+                          <a:spcPts val="0"/>
+                        </a:spcAft>
+                        <a:buClrTx/>
+                        <a:buSzTx/>
+                        <a:buFontTx/>
+                        <a:buNone/>
+                        <a:tabLst/>
+                        <a:defRPr/>
+                      </a:pPr>
+                      <a:r>
+                        <a:rPr lang="en-US" sz="2800" b="1" kern="1200" dirty="0">
+                          <a:solidFill>
+                            <a:schemeClr val="tx1"/>
+                          </a:solidFill>
+                          <a:latin typeface="+mn-lt"/>
+                          <a:ea typeface="+mn-ea"/>
+                          <a:cs typeface="+mn-cs"/>
+                        </a:rPr>
+                        <a:t>{age:22, </a:t>
+                      </a:r>
+                      <a:r>
+                        <a:rPr lang="en-US" sz="2800" b="1" kern="1200" dirty="0" err="1">
+                          <a:solidFill>
+                            <a:schemeClr val="tx1"/>
+                          </a:solidFill>
+                          <a:latin typeface="+mn-lt"/>
+                          <a:ea typeface="+mn-ea"/>
+                          <a:cs typeface="+mn-cs"/>
+                        </a:rPr>
+                        <a:t>name:</a:t>
+                      </a:r>
+                      <a:r>
+                        <a:rPr lang="en-US" altLang="zh-CN" sz="2800" b="1" dirty="0" err="1">
+                          <a:solidFill>
+                            <a:schemeClr val="tx1"/>
+                          </a:solidFill>
+                          <a:latin typeface="Arial Unicode MS" pitchFamily="34" charset="-128"/>
+                        </a:rPr>
+                        <a:t>'</a:t>
+                      </a:r>
+                      <a:r>
+                        <a:rPr lang="en-US" sz="2800" b="1" dirty="0" err="1">
+                          <a:solidFill>
+                            <a:schemeClr val="tx1"/>
+                          </a:solidFill>
+                        </a:rPr>
+                        <a:t>Andy</a:t>
+                      </a:r>
+                      <a:r>
+                        <a:rPr lang="en-US" altLang="zh-CN" sz="2800" b="1" dirty="0">
+                          <a:solidFill>
+                            <a:schemeClr val="tx1"/>
+                          </a:solidFill>
+                          <a:latin typeface="Arial Unicode MS" pitchFamily="34" charset="-128"/>
+                        </a:rPr>
+                        <a:t>'}</a:t>
+                      </a:r>
+                      <a:endParaRPr lang="en-US" sz="2800" b="1" kern="1200" dirty="0">
+                        <a:solidFill>
+                          <a:schemeClr val="tx1"/>
+                        </a:solidFill>
+                        <a:latin typeface="+mn-lt"/>
+                        <a:ea typeface="+mn-ea"/>
+                        <a:cs typeface="+mn-cs"/>
+                      </a:endParaRPr>
+                    </a:p>
+                  </a:txBody>
+                  <a:tcPr/>
+                </a:tc>
+                <a:extLst>
+                  <a:ext uri="{0D108BD9-81ED-4DB2-BD59-A6C34878D82A}">
+                    <a16:rowId xmlns:a16="http://schemas.microsoft.com/office/drawing/2014/main" val="10001"/>
+                  </a:ext>
+                </a:extLst>
+              </a:tr>
+              <a:tr h="1290294">
+                <a:tc>
+                  <a:txBody>
+                    <a:bodyPr/>
+                    <a:lstStyle/>
+                    <a:p>
+                      <a:pPr algn="ctr"/>
+                      <a:r>
+                        <a:rPr lang="en-US" sz="2800" b="0" kern="1200" dirty="0">
+                          <a:solidFill>
+                            <a:schemeClr val="tx1"/>
+                          </a:solidFill>
+                          <a:latin typeface="+mn-lt"/>
+                          <a:ea typeface="+mn-ea"/>
+                          <a:cs typeface="+mn-cs"/>
+                        </a:rPr>
+                        <a:t>$not</a:t>
+                      </a:r>
+                    </a:p>
+                  </a:txBody>
+                  <a:tcPr/>
+                </a:tc>
+                <a:tc>
+                  <a:txBody>
+                    <a:bodyPr/>
+                    <a:lstStyle/>
+                    <a:p>
+                      <a:r>
+                        <a:rPr lang="en-US" sz="2800" b="0" kern="1200" dirty="0">
+                          <a:solidFill>
+                            <a:schemeClr val="tx1"/>
+                          </a:solidFill>
+                          <a:latin typeface="+mn-lt"/>
+                          <a:ea typeface="+mn-ea"/>
+                          <a:cs typeface="+mn-cs"/>
+                        </a:rPr>
+                        <a:t>WHERE</a:t>
+                      </a:r>
+                      <a:r>
+                        <a:rPr lang="en-US" sz="2800" b="0" kern="1200" baseline="0" dirty="0">
+                          <a:solidFill>
+                            <a:schemeClr val="tx1"/>
+                          </a:solidFill>
+                          <a:latin typeface="+mn-lt"/>
+                          <a:ea typeface="+mn-ea"/>
+                          <a:cs typeface="+mn-cs"/>
+                        </a:rPr>
+                        <a:t> name</a:t>
+                      </a:r>
+                      <a:r>
+                        <a:rPr lang="en-US" sz="2800" b="1" kern="1200" baseline="0" dirty="0">
+                          <a:solidFill>
+                            <a:srgbClr val="2D75BC"/>
+                          </a:solidFill>
+                          <a:latin typeface="+mn-lt"/>
+                          <a:ea typeface="+mn-ea"/>
+                          <a:cs typeface="+mn-cs"/>
+                        </a:rPr>
+                        <a:t>&lt;&gt;</a:t>
+                      </a:r>
+                      <a:r>
+                        <a:rPr lang="en-US" altLang="zh-CN" sz="2800" dirty="0">
+                          <a:solidFill>
+                            <a:schemeClr val="tx1"/>
+                          </a:solidFill>
+                          <a:latin typeface="Arial Unicode MS" pitchFamily="34" charset="-128"/>
+                        </a:rPr>
+                        <a:t>'</a:t>
+                      </a:r>
+                      <a:r>
+                        <a:rPr lang="en-US" sz="2800" b="0" kern="1200" baseline="0" dirty="0">
+                          <a:solidFill>
+                            <a:schemeClr val="tx1"/>
+                          </a:solidFill>
+                          <a:latin typeface="+mn-lt"/>
+                          <a:ea typeface="+mn-ea"/>
+                          <a:cs typeface="+mn-cs"/>
+                        </a:rPr>
+                        <a:t>Andy</a:t>
+                      </a:r>
+                      <a:r>
+                        <a:rPr lang="en-US" altLang="zh-CN" sz="2800" dirty="0">
+                          <a:solidFill>
+                            <a:schemeClr val="tx1"/>
+                          </a:solidFill>
+                          <a:latin typeface="Arial Unicode MS" pitchFamily="34" charset="-128"/>
+                        </a:rPr>
+                        <a:t>'</a:t>
+                      </a:r>
+                      <a:endParaRPr lang="en-US" sz="2800" b="0" kern="1200" dirty="0">
+                        <a:solidFill>
+                          <a:schemeClr val="tx1"/>
+                        </a:solidFill>
+                        <a:latin typeface="+mn-lt"/>
+                        <a:ea typeface="+mn-ea"/>
+                        <a:cs typeface="+mn-cs"/>
+                      </a:endParaRPr>
+                    </a:p>
+                  </a:txBody>
+                  <a:tcPr/>
+                </a:tc>
+                <a:tc>
+                  <a:txBody>
+                    <a:bodyPr/>
+                    <a:lstStyle/>
+                    <a:p>
+                      <a:pPr algn="l"/>
+                      <a:r>
+                        <a:rPr lang="en-US" sz="2800" b="0" kern="1200" dirty="0">
+                          <a:solidFill>
+                            <a:schemeClr val="tx1"/>
+                          </a:solidFill>
+                          <a:latin typeface="+mn-lt"/>
+                          <a:ea typeface="+mn-ea"/>
+                          <a:cs typeface="+mn-cs"/>
+                        </a:rPr>
+                        <a:t>{</a:t>
+                      </a:r>
+                      <a:r>
+                        <a:rPr lang="en-US" sz="2800" b="0" kern="1200" baseline="0" dirty="0">
+                          <a:solidFill>
+                            <a:schemeClr val="tx1"/>
+                          </a:solidFill>
+                          <a:latin typeface="+mn-lt"/>
+                          <a:ea typeface="+mn-ea"/>
+                          <a:cs typeface="+mn-cs"/>
+                        </a:rPr>
+                        <a:t>name</a:t>
+                      </a:r>
+                      <a:r>
+                        <a:rPr lang="en-US" sz="2800" b="0" kern="1200" dirty="0">
+                          <a:solidFill>
+                            <a:schemeClr val="tx1"/>
+                          </a:solidFill>
+                          <a:latin typeface="+mn-lt"/>
+                          <a:ea typeface="+mn-ea"/>
+                          <a:cs typeface="+mn-cs"/>
+                        </a:rPr>
+                        <a:t>: </a:t>
+                      </a:r>
+                    </a:p>
+                    <a:p>
+                      <a:pPr algn="l"/>
+                      <a:r>
+                        <a:rPr lang="en-US" sz="2800" b="0" kern="1200" dirty="0">
+                          <a:solidFill>
+                            <a:schemeClr val="tx1"/>
+                          </a:solidFill>
+                          <a:latin typeface="+mn-lt"/>
+                          <a:ea typeface="+mn-ea"/>
+                          <a:cs typeface="+mn-cs"/>
+                        </a:rPr>
+                        <a:t>        {</a:t>
+                      </a:r>
+                      <a:r>
+                        <a:rPr lang="en-US" sz="2800" b="1" kern="1200" dirty="0">
+                          <a:solidFill>
+                            <a:srgbClr val="2D75BC"/>
+                          </a:solidFill>
+                          <a:latin typeface="+mn-lt"/>
+                          <a:ea typeface="+mn-ea"/>
+                          <a:cs typeface="+mn-cs"/>
+                        </a:rPr>
+                        <a:t>$not</a:t>
+                      </a:r>
+                      <a:r>
+                        <a:rPr lang="en-US" sz="2800" b="0" kern="1200" dirty="0">
+                          <a:solidFill>
+                            <a:schemeClr val="tx1"/>
+                          </a:solidFill>
+                          <a:latin typeface="+mn-lt"/>
+                          <a:ea typeface="+mn-ea"/>
+                          <a:cs typeface="+mn-cs"/>
+                        </a:rPr>
+                        <a:t>: {</a:t>
+                      </a:r>
+                      <a:r>
+                        <a:rPr lang="en-US" sz="2800" b="1" kern="1200" dirty="0">
+                          <a:solidFill>
+                            <a:srgbClr val="2D75BC"/>
+                          </a:solidFill>
+                          <a:latin typeface="+mn-lt"/>
+                          <a:ea typeface="+mn-ea"/>
+                          <a:cs typeface="+mn-cs"/>
+                        </a:rPr>
+                        <a:t>$</a:t>
+                      </a:r>
+                      <a:r>
+                        <a:rPr lang="en-US" sz="2800" b="1" kern="1200" dirty="0" err="1">
+                          <a:solidFill>
+                            <a:srgbClr val="2D75BC"/>
+                          </a:solidFill>
+                          <a:latin typeface="+mn-lt"/>
+                          <a:ea typeface="+mn-ea"/>
+                          <a:cs typeface="+mn-cs"/>
+                        </a:rPr>
+                        <a:t>eq</a:t>
+                      </a:r>
+                      <a:r>
+                        <a:rPr lang="en-US" sz="2800" b="0" kern="1200" dirty="0">
+                          <a:solidFill>
+                            <a:schemeClr val="tx1"/>
+                          </a:solidFill>
+                          <a:latin typeface="+mn-lt"/>
+                          <a:ea typeface="+mn-ea"/>
+                          <a:cs typeface="+mn-cs"/>
+                        </a:rPr>
+                        <a:t>: "</a:t>
+                      </a:r>
+                      <a:r>
+                        <a:rPr lang="en-US" sz="2800" b="0" kern="1200" baseline="0" dirty="0">
+                          <a:solidFill>
+                            <a:schemeClr val="tx1"/>
+                          </a:solidFill>
+                          <a:latin typeface="+mn-lt"/>
+                          <a:ea typeface="+mn-ea"/>
+                          <a:cs typeface="+mn-cs"/>
+                        </a:rPr>
+                        <a:t>Andy</a:t>
+                      </a:r>
+                      <a:r>
+                        <a:rPr lang="en-US" sz="2800" b="0" kern="1200" dirty="0">
+                          <a:solidFill>
+                            <a:schemeClr val="tx1"/>
+                          </a:solidFill>
+                          <a:latin typeface="+mn-lt"/>
+                          <a:ea typeface="+mn-ea"/>
+                          <a:cs typeface="+mn-cs"/>
+                        </a:rPr>
+                        <a:t>"}</a:t>
+                      </a:r>
+                    </a:p>
+                    <a:p>
+                      <a:pPr algn="l"/>
+                      <a:r>
+                        <a:rPr lang="en-US" sz="2800" b="0" kern="1200" dirty="0">
+                          <a:solidFill>
+                            <a:schemeClr val="tx1"/>
+                          </a:solidFill>
+                          <a:latin typeface="+mn-lt"/>
+                          <a:ea typeface="+mn-ea"/>
+                          <a:cs typeface="+mn-cs"/>
+                        </a:rPr>
+                        <a:t>}</a:t>
+                      </a:r>
+                    </a:p>
+                  </a:txBody>
+                  <a:tcPr/>
+                </a:tc>
+                <a:extLst>
+                  <a:ext uri="{0D108BD9-81ED-4DB2-BD59-A6C34878D82A}">
+                    <a16:rowId xmlns:a16="http://schemas.microsoft.com/office/drawing/2014/main" val="10002"/>
+                  </a:ext>
+                </a:extLst>
+              </a:tr>
+              <a:tr h="1290294">
+                <a:tc>
+                  <a:txBody>
+                    <a:bodyPr/>
+                    <a:lstStyle/>
+                    <a:p>
+                      <a:pPr marL="0" marR="0" indent="0" algn="ctr" defTabSz="914400" rtl="0" eaLnBrk="1" fontAlgn="auto" latinLnBrk="0" hangingPunct="1">
+                        <a:lnSpc>
+                          <a:spcPct val="100000"/>
+                        </a:lnSpc>
+                        <a:spcBef>
+                          <a:spcPts val="0"/>
+                        </a:spcBef>
+                        <a:spcAft>
+                          <a:spcPts val="0"/>
+                        </a:spcAft>
+                        <a:buClrTx/>
+                        <a:buSzTx/>
+                        <a:buFontTx/>
+                        <a:buNone/>
+                        <a:tabLst/>
+                        <a:defRPr/>
+                      </a:pPr>
+                      <a:r>
+                        <a:rPr lang="en-US" sz="2800" b="0" kern="1200" dirty="0">
+                          <a:solidFill>
+                            <a:schemeClr val="tx1"/>
+                          </a:solidFill>
+                          <a:latin typeface="+mn-lt"/>
+                          <a:ea typeface="+mn-ea"/>
+                          <a:cs typeface="+mn-cs"/>
+                        </a:rPr>
+                        <a:t>$nor</a:t>
+                      </a:r>
+                    </a:p>
+                  </a:txBody>
+                  <a:tcPr/>
+                </a:tc>
+                <a:tc>
+                  <a:txBody>
+                    <a:bodyPr/>
+                    <a:lstStyle/>
+                    <a:p>
+                      <a:r>
+                        <a:rPr lang="en-US" sz="2800" b="0" kern="1200" dirty="0">
+                          <a:solidFill>
+                            <a:schemeClr val="tx1"/>
+                          </a:solidFill>
+                          <a:latin typeface="+mn-lt"/>
+                          <a:ea typeface="+mn-ea"/>
+                          <a:cs typeface="+mn-cs"/>
+                        </a:rPr>
+                        <a:t>WHERE</a:t>
+                      </a:r>
+                      <a:r>
+                        <a:rPr lang="en-US" sz="2800" b="0" kern="1200" baseline="0" dirty="0">
+                          <a:solidFill>
+                            <a:schemeClr val="tx1"/>
+                          </a:solidFill>
+                          <a:latin typeface="+mn-lt"/>
+                          <a:ea typeface="+mn-ea"/>
+                          <a:cs typeface="+mn-cs"/>
+                        </a:rPr>
+                        <a:t> </a:t>
+                      </a:r>
+                    </a:p>
+                    <a:p>
+                      <a:pPr marL="0" marR="0" indent="0" algn="l" defTabSz="914400" rtl="0" eaLnBrk="1" fontAlgn="auto" latinLnBrk="0" hangingPunct="1">
+                        <a:lnSpc>
+                          <a:spcPct val="100000"/>
+                        </a:lnSpc>
+                        <a:spcBef>
+                          <a:spcPts val="0"/>
+                        </a:spcBef>
+                        <a:spcAft>
+                          <a:spcPts val="0"/>
+                        </a:spcAft>
+                        <a:buClrTx/>
+                        <a:buSzTx/>
+                        <a:buFontTx/>
+                        <a:buNone/>
+                        <a:tabLst/>
+                        <a:defRPr/>
+                      </a:pPr>
+                      <a:r>
+                        <a:rPr lang="en-US" sz="2800" b="0" kern="1200" baseline="0" dirty="0">
+                          <a:solidFill>
+                            <a:schemeClr val="tx1"/>
+                          </a:solidFill>
+                          <a:latin typeface="+mn-lt"/>
+                          <a:ea typeface="+mn-ea"/>
+                          <a:cs typeface="+mn-cs"/>
+                        </a:rPr>
+                        <a:t>name</a:t>
+                      </a:r>
+                      <a:r>
+                        <a:rPr lang="en-US" sz="2800" b="1" kern="1200" baseline="0" dirty="0">
+                          <a:solidFill>
+                            <a:srgbClr val="2D75BC"/>
+                          </a:solidFill>
+                          <a:latin typeface="+mn-lt"/>
+                          <a:ea typeface="+mn-ea"/>
+                          <a:cs typeface="+mn-cs"/>
+                        </a:rPr>
+                        <a:t>&lt;&gt;</a:t>
+                      </a:r>
+                      <a:r>
+                        <a:rPr lang="en-US" altLang="zh-CN" sz="2800" dirty="0">
+                          <a:solidFill>
+                            <a:schemeClr val="tx1"/>
+                          </a:solidFill>
+                          <a:latin typeface="Arial Unicode MS" pitchFamily="34" charset="-128"/>
+                        </a:rPr>
+                        <a:t>'</a:t>
+                      </a:r>
+                      <a:r>
+                        <a:rPr lang="en-US" sz="2800" b="0" kern="1200" baseline="0" dirty="0">
+                          <a:solidFill>
+                            <a:schemeClr val="tx1"/>
+                          </a:solidFill>
+                          <a:latin typeface="+mn-lt"/>
+                          <a:ea typeface="+mn-ea"/>
+                          <a:cs typeface="+mn-cs"/>
+                        </a:rPr>
+                        <a:t>Andy</a:t>
+                      </a:r>
+                      <a:r>
+                        <a:rPr lang="en-US" altLang="zh-CN" sz="2800" dirty="0">
+                          <a:solidFill>
+                            <a:schemeClr val="tx1"/>
+                          </a:solidFill>
+                          <a:latin typeface="Arial Unicode MS" pitchFamily="34" charset="-128"/>
+                        </a:rPr>
+                        <a:t>'</a:t>
+                      </a:r>
+                      <a:endParaRPr lang="en-US" sz="2800" b="0" kern="1200" dirty="0">
+                        <a:solidFill>
+                          <a:schemeClr val="tx1"/>
+                        </a:solidFill>
+                        <a:latin typeface="+mn-lt"/>
+                        <a:ea typeface="+mn-ea"/>
+                        <a:cs typeface="+mn-cs"/>
+                      </a:endParaRPr>
+                    </a:p>
+                    <a:p>
+                      <a:pPr marL="0" marR="0" indent="0" algn="l" defTabSz="914400" rtl="0" eaLnBrk="1" fontAlgn="auto" latinLnBrk="0" hangingPunct="1">
+                        <a:lnSpc>
+                          <a:spcPct val="100000"/>
+                        </a:lnSpc>
+                        <a:spcBef>
+                          <a:spcPts val="0"/>
+                        </a:spcBef>
+                        <a:spcAft>
+                          <a:spcPts val="0"/>
+                        </a:spcAft>
+                        <a:buClrTx/>
+                        <a:buSzTx/>
+                        <a:buFontTx/>
+                        <a:buNone/>
+                        <a:tabLst/>
+                        <a:defRPr/>
+                      </a:pPr>
+                      <a:r>
+                        <a:rPr lang="en-US" sz="2800" b="1" kern="1200" baseline="0" dirty="0">
+                          <a:solidFill>
+                            <a:srgbClr val="2D75BC"/>
+                          </a:solidFill>
+                          <a:latin typeface="+mn-lt"/>
+                          <a:ea typeface="+mn-ea"/>
+                          <a:cs typeface="+mn-cs"/>
+                        </a:rPr>
+                        <a:t>AND</a:t>
+                      </a:r>
+                      <a:r>
+                        <a:rPr lang="en-US" sz="2800" b="0" kern="1200" dirty="0">
+                          <a:solidFill>
+                            <a:schemeClr val="tx1"/>
+                          </a:solidFill>
+                          <a:latin typeface="+mn-lt"/>
+                          <a:ea typeface="+mn-ea"/>
+                          <a:cs typeface="+mn-cs"/>
+                        </a:rPr>
+                        <a:t> age</a:t>
+                      </a:r>
+                      <a:r>
+                        <a:rPr lang="en-US" sz="2800" b="1" kern="1200" baseline="0" dirty="0">
+                          <a:solidFill>
+                            <a:srgbClr val="2D75BC"/>
+                          </a:solidFill>
+                          <a:latin typeface="+mn-lt"/>
+                          <a:ea typeface="+mn-ea"/>
+                          <a:cs typeface="+mn-cs"/>
+                        </a:rPr>
+                        <a:t>&lt;&gt;</a:t>
+                      </a:r>
+                      <a:r>
+                        <a:rPr lang="en-US" sz="2800" b="0" kern="1200" dirty="0">
+                          <a:solidFill>
+                            <a:schemeClr val="tx1"/>
+                          </a:solidFill>
+                          <a:latin typeface="+mn-lt"/>
+                          <a:ea typeface="+mn-ea"/>
+                          <a:cs typeface="+mn-cs"/>
+                        </a:rPr>
+                        <a:t>18 </a:t>
+                      </a:r>
+                    </a:p>
+                  </a:txBody>
+                  <a:tcPr/>
+                </a:tc>
+                <a:tc>
+                  <a:txBody>
+                    <a:bodyPr/>
+                    <a:lstStyle/>
+                    <a:p>
+                      <a:pPr marL="0" marR="0" indent="0" algn="l" defTabSz="914400" rtl="0" eaLnBrk="1" fontAlgn="auto" latinLnBrk="0" hangingPunct="1">
+                        <a:lnSpc>
+                          <a:spcPct val="100000"/>
+                        </a:lnSpc>
+                        <a:spcBef>
+                          <a:spcPts val="0"/>
+                        </a:spcBef>
+                        <a:spcAft>
+                          <a:spcPts val="0"/>
+                        </a:spcAft>
+                        <a:buClrTx/>
+                        <a:buSzTx/>
+                        <a:buFontTx/>
+                        <a:buNone/>
+                        <a:tabLst/>
+                        <a:defRPr/>
+                      </a:pPr>
+                      <a:r>
+                        <a:rPr lang="en-US" sz="2800" b="0" dirty="0">
+                          <a:solidFill>
+                            <a:schemeClr val="tx1"/>
+                          </a:solidFill>
+                        </a:rPr>
+                        <a:t>{ </a:t>
+                      </a:r>
+                      <a:r>
+                        <a:rPr lang="en-US" sz="2800" b="1" i="0" kern="1200" dirty="0">
+                          <a:solidFill>
+                            <a:srgbClr val="2D75BC"/>
+                          </a:solidFill>
+                          <a:latin typeface="+mn-lt"/>
+                          <a:ea typeface="+mn-ea"/>
+                          <a:cs typeface="+mn-cs"/>
+                        </a:rPr>
+                        <a:t>$nor</a:t>
+                      </a:r>
+                      <a:r>
+                        <a:rPr lang="en-US" sz="2800" b="0" i="0" kern="1200" dirty="0">
+                          <a:solidFill>
+                            <a:schemeClr val="tx1"/>
+                          </a:solidFill>
+                          <a:latin typeface="+mn-lt"/>
+                          <a:ea typeface="+mn-ea"/>
+                          <a:cs typeface="+mn-cs"/>
+                        </a:rPr>
+                        <a:t>:[ </a:t>
+                      </a:r>
+                    </a:p>
+                    <a:p>
+                      <a:pPr marL="0" marR="0" indent="0" algn="l" defTabSz="914400" rtl="0" eaLnBrk="1" fontAlgn="auto" latinLnBrk="0" hangingPunct="1">
+                        <a:lnSpc>
+                          <a:spcPct val="100000"/>
+                        </a:lnSpc>
+                        <a:spcBef>
+                          <a:spcPts val="0"/>
+                        </a:spcBef>
+                        <a:spcAft>
+                          <a:spcPts val="0"/>
+                        </a:spcAft>
+                        <a:buClrTx/>
+                        <a:buSzTx/>
+                        <a:buFontTx/>
+                        <a:buNone/>
+                        <a:tabLst/>
+                        <a:defRPr/>
+                      </a:pPr>
+                      <a:r>
+                        <a:rPr lang="en-US" sz="2800" b="0" dirty="0">
+                          <a:solidFill>
+                            <a:schemeClr val="tx1"/>
+                          </a:solidFill>
+                        </a:rPr>
+                        <a:t>        {</a:t>
+                      </a:r>
+                      <a:r>
+                        <a:rPr lang="en-US" sz="2800" b="0" dirty="0" err="1">
+                          <a:solidFill>
+                            <a:schemeClr val="tx1"/>
+                          </a:solidFill>
+                        </a:rPr>
+                        <a:t>name:</a:t>
+                      </a:r>
+                      <a:r>
+                        <a:rPr lang="en-US" altLang="zh-CN" sz="2800" dirty="0" err="1">
+                          <a:solidFill>
+                            <a:schemeClr val="tx1"/>
+                          </a:solidFill>
+                          <a:latin typeface="Arial Unicode MS" pitchFamily="34" charset="-128"/>
+                        </a:rPr>
+                        <a:t>'</a:t>
+                      </a:r>
+                      <a:r>
+                        <a:rPr lang="en-US" sz="2800" b="0" dirty="0" err="1">
+                          <a:solidFill>
+                            <a:schemeClr val="tx1"/>
+                          </a:solidFill>
+                        </a:rPr>
+                        <a:t>Andy</a:t>
+                      </a:r>
+                      <a:r>
+                        <a:rPr lang="en-US" altLang="zh-CN" sz="2800" dirty="0">
+                          <a:solidFill>
+                            <a:schemeClr val="tx1"/>
+                          </a:solidFill>
+                          <a:latin typeface="Arial Unicode MS" pitchFamily="34" charset="-128"/>
+                        </a:rPr>
+                        <a:t>'</a:t>
+                      </a:r>
+                      <a:r>
+                        <a:rPr lang="en-US" sz="2800" b="0" dirty="0">
+                          <a:solidFill>
+                            <a:schemeClr val="tx1"/>
+                          </a:solidFill>
+                        </a:rPr>
+                        <a:t>}, {age:22}</a:t>
+                      </a:r>
+                    </a:p>
+                    <a:p>
+                      <a:pPr marL="0" marR="0" indent="0" algn="l" defTabSz="914400" rtl="0" eaLnBrk="1" fontAlgn="auto" latinLnBrk="0" hangingPunct="1">
+                        <a:lnSpc>
+                          <a:spcPct val="100000"/>
+                        </a:lnSpc>
+                        <a:spcBef>
+                          <a:spcPts val="0"/>
+                        </a:spcBef>
+                        <a:spcAft>
+                          <a:spcPts val="0"/>
+                        </a:spcAft>
+                        <a:buClrTx/>
+                        <a:buSzTx/>
+                        <a:buFontTx/>
+                        <a:buNone/>
+                        <a:tabLst/>
+                        <a:defRPr/>
+                      </a:pPr>
+                      <a:r>
+                        <a:rPr lang="en-US" sz="2800" b="0" dirty="0">
+                          <a:solidFill>
+                            <a:schemeClr val="tx1"/>
+                          </a:solidFill>
+                        </a:rPr>
+                        <a:t> ]}</a:t>
+                      </a:r>
+                    </a:p>
+                  </a:txBody>
+                  <a:tcPr/>
+                </a:tc>
+                <a:extLst>
+                  <a:ext uri="{0D108BD9-81ED-4DB2-BD59-A6C34878D82A}">
+                    <a16:rowId xmlns:a16="http://schemas.microsoft.com/office/drawing/2014/main" val="10003"/>
+                  </a:ext>
+                </a:extLst>
+              </a:tr>
+            </a:tbl>
+          </a:graphicData>
+        </a:graphic>
+      </p:graphicFrame>
+    </p:spTree>
+    <p:extLst>
+      <p:ext uri="{BB962C8B-B14F-4D97-AF65-F5344CB8AC3E}">
+        <p14:creationId xmlns:p14="http://schemas.microsoft.com/office/powerpoint/2010/main" val="3889532954"/>
+      </p:ext>
+    </p:extLst>
+  </p:cSld>
+  <p:clrMapOvr>
+    <a:masterClrMapping/>
+  </p:clrMapOvr>
+</p:sld>
+</file>
+
+<file path=ppt/slides/slide14.xml><?xml version="1.0" encoding="utf-8"?>
+<p:sld xmlns:a="http://schemas.openxmlformats.org/drawingml/2006/main" xmlns:r="http://schemas.openxmlformats.org/officeDocument/2006/relationships" xmlns:p="http://schemas.openxmlformats.org/presentationml/2006/main">
+  <p:cSld>
+    <p:spTree>
+      <p:nvGrpSpPr>
+        <p:cNvPr id="1" name=""/>
+        <p:cNvGrpSpPr/>
+        <p:nvPr/>
+      </p:nvGrpSpPr>
+      <p:grpSpPr>
+        <a:xfrm>
+          <a:off x="0" y="0"/>
+          <a:ext cx="0" cy="0"/>
+          <a:chOff x="0" y="0"/>
+          <a:chExt cx="0" cy="0"/>
+        </a:xfrm>
+      </p:grpSpPr>
+      <p:sp>
+        <p:nvSpPr>
+          <p:cNvPr id="2" name="Text Placeholder 1"/>
+          <p:cNvSpPr>
+            <a:spLocks noGrp="1"/>
+          </p:cNvSpPr>
+          <p:nvPr>
+            <p:ph type="body" sz="quarter" idx="13"/>
+          </p:nvPr>
+        </p:nvSpPr>
+        <p:spPr/>
+        <p:txBody>
+          <a:bodyPr/>
+          <a:lstStyle/>
+          <a:p>
+            <a:r>
+              <a:rPr lang="en-US" dirty="0"/>
+              <a:t>3</a:t>
+            </a:r>
+          </a:p>
+        </p:txBody>
+      </p:sp>
+      <p:sp>
+        <p:nvSpPr>
+          <p:cNvPr id="3" name="Text Placeholder 2"/>
+          <p:cNvSpPr>
+            <a:spLocks noGrp="1"/>
+          </p:cNvSpPr>
+          <p:nvPr>
+            <p:ph type="body" sz="quarter" idx="14"/>
+          </p:nvPr>
+        </p:nvSpPr>
+        <p:spPr/>
+        <p:txBody>
+          <a:bodyPr/>
+          <a:lstStyle/>
+          <a:p>
+            <a:r>
+              <a:rPr lang="en-US" dirty="0"/>
+              <a:t>Query  Operators: Logical</a:t>
+            </a:r>
+            <a:endParaRPr lang="en-US" altLang="zh-CN" dirty="0"/>
+          </a:p>
+          <a:p>
+            <a:endParaRPr lang="en-US" altLang="zh-CN" dirty="0"/>
+          </a:p>
+          <a:p>
+            <a:endParaRPr lang="en-US" dirty="0"/>
+          </a:p>
+          <a:p>
+            <a:endParaRPr lang="en-US" dirty="0"/>
+          </a:p>
+        </p:txBody>
+      </p:sp>
+      <p:sp>
+        <p:nvSpPr>
+          <p:cNvPr id="7" name="TextBox 2"/>
+          <p:cNvSpPr txBox="1">
+            <a:spLocks noChangeArrowheads="1"/>
+          </p:cNvSpPr>
+          <p:nvPr/>
+        </p:nvSpPr>
+        <p:spPr bwMode="auto">
+          <a:xfrm>
+            <a:off x="152400" y="3326249"/>
+            <a:ext cx="8824913" cy="954107"/>
+          </a:xfrm>
+          <a:prstGeom prst="rect">
+            <a:avLst/>
+          </a:prstGeom>
+          <a:noFill/>
+          <a:ln w="9525">
+            <a:noFill/>
+            <a:miter lim="800000"/>
+            <a:headEnd/>
+            <a:tailEnd/>
+          </a:ln>
+        </p:spPr>
+        <p:txBody>
+          <a:bodyPr>
+            <a:spAutoFit/>
+          </a:bodyPr>
+          <a:lstStyle>
+            <a:lvl1pPr eaLnBrk="0" hangingPunct="0">
+              <a:defRPr>
+                <a:solidFill>
+                  <a:schemeClr val="tx1"/>
+                </a:solidFill>
+                <a:latin typeface="Arial" charset="0"/>
+                <a:ea typeface="宋体" pitchFamily="2" charset="-122"/>
+              </a:defRPr>
+            </a:lvl1pPr>
+            <a:lvl2pPr marL="742950" indent="-285750" eaLnBrk="0" hangingPunct="0">
+              <a:defRPr>
+                <a:solidFill>
+                  <a:schemeClr val="tx1"/>
+                </a:solidFill>
+                <a:latin typeface="Arial" charset="0"/>
+                <a:ea typeface="宋体" pitchFamily="2" charset="-122"/>
+              </a:defRPr>
+            </a:lvl2pPr>
+            <a:lvl3pPr marL="1143000" indent="-228600" eaLnBrk="0" hangingPunct="0">
+              <a:defRPr>
+                <a:solidFill>
+                  <a:schemeClr val="tx1"/>
+                </a:solidFill>
+                <a:latin typeface="Arial" charset="0"/>
+                <a:ea typeface="宋体" pitchFamily="2" charset="-122"/>
+              </a:defRPr>
+            </a:lvl3pPr>
+            <a:lvl4pPr marL="1600200" indent="-228600" eaLnBrk="0" hangingPunct="0">
+              <a:defRPr>
+                <a:solidFill>
+                  <a:schemeClr val="tx1"/>
+                </a:solidFill>
+                <a:latin typeface="Arial" charset="0"/>
+                <a:ea typeface="宋体" pitchFamily="2" charset="-122"/>
+              </a:defRPr>
+            </a:lvl4pPr>
+            <a:lvl5pPr marL="2057400" indent="-228600" eaLnBrk="0" hangingPunct="0">
+              <a:defRPr>
+                <a:solidFill>
+                  <a:schemeClr val="tx1"/>
+                </a:solidFill>
+                <a:latin typeface="Arial" charset="0"/>
+                <a:ea typeface="宋体" pitchFamily="2" charset="-122"/>
+              </a:defRPr>
+            </a:lvl5pPr>
+            <a:lvl6pPr marL="2514600" indent="-228600" eaLnBrk="0" fontAlgn="base" hangingPunct="0">
+              <a:spcBef>
+                <a:spcPct val="0"/>
+              </a:spcBef>
+              <a:spcAft>
+                <a:spcPct val="0"/>
+              </a:spcAft>
+              <a:defRPr>
+                <a:solidFill>
+                  <a:schemeClr val="tx1"/>
+                </a:solidFill>
+                <a:latin typeface="Arial" charset="0"/>
+                <a:ea typeface="宋体" pitchFamily="2" charset="-122"/>
+              </a:defRPr>
+            </a:lvl6pPr>
+            <a:lvl7pPr marL="2971800" indent="-228600" eaLnBrk="0" fontAlgn="base" hangingPunct="0">
+              <a:spcBef>
+                <a:spcPct val="0"/>
+              </a:spcBef>
+              <a:spcAft>
+                <a:spcPct val="0"/>
+              </a:spcAft>
+              <a:defRPr>
+                <a:solidFill>
+                  <a:schemeClr val="tx1"/>
+                </a:solidFill>
+                <a:latin typeface="Arial" charset="0"/>
+                <a:ea typeface="宋体" pitchFamily="2" charset="-122"/>
+              </a:defRPr>
+            </a:lvl7pPr>
+            <a:lvl8pPr marL="3429000" indent="-228600" eaLnBrk="0" fontAlgn="base" hangingPunct="0">
+              <a:spcBef>
+                <a:spcPct val="0"/>
+              </a:spcBef>
+              <a:spcAft>
+                <a:spcPct val="0"/>
+              </a:spcAft>
+              <a:defRPr>
+                <a:solidFill>
+                  <a:schemeClr val="tx1"/>
+                </a:solidFill>
+                <a:latin typeface="Arial" charset="0"/>
+                <a:ea typeface="宋体" pitchFamily="2" charset="-122"/>
+              </a:defRPr>
+            </a:lvl8pPr>
+            <a:lvl9pPr marL="3886200" indent="-228600" eaLnBrk="0" fontAlgn="base" hangingPunct="0">
+              <a:spcBef>
+                <a:spcPct val="0"/>
+              </a:spcBef>
+              <a:spcAft>
+                <a:spcPct val="0"/>
+              </a:spcAft>
+              <a:defRPr>
+                <a:solidFill>
+                  <a:schemeClr val="tx1"/>
+                </a:solidFill>
+                <a:latin typeface="Arial" charset="0"/>
+                <a:ea typeface="宋体" pitchFamily="2" charset="-122"/>
+              </a:defRPr>
+            </a:lvl9pPr>
+          </a:lstStyle>
+          <a:p>
+            <a:pPr eaLnBrk="1" hangingPunct="1"/>
+            <a:r>
+              <a:rPr lang="en-US" altLang="zh-CN" sz="2800" dirty="0">
+                <a:latin typeface="微软雅黑" panose="020B0503020204020204" pitchFamily="34" charset="-122"/>
+                <a:ea typeface="微软雅黑" panose="020B0503020204020204" pitchFamily="34" charset="-122"/>
+              </a:rPr>
+              <a:t>Query:</a:t>
+            </a:r>
+          </a:p>
+          <a:p>
+            <a:pPr eaLnBrk="1" hangingPunct="1"/>
+            <a:endParaRPr lang="en-US" altLang="zh-CN" sz="2800" dirty="0">
+              <a:solidFill>
+                <a:schemeClr val="bg1"/>
+              </a:solidFill>
+              <a:latin typeface="微软雅黑" pitchFamily="34" charset="-122"/>
+              <a:ea typeface="微软雅黑" pitchFamily="34" charset="-122"/>
+            </a:endParaRPr>
+          </a:p>
+        </p:txBody>
+      </p:sp>
+      <p:sp>
+        <p:nvSpPr>
+          <p:cNvPr id="14" name="TextBox 2"/>
+          <p:cNvSpPr txBox="1">
+            <a:spLocks noChangeArrowheads="1"/>
+          </p:cNvSpPr>
+          <p:nvPr/>
+        </p:nvSpPr>
+        <p:spPr bwMode="auto">
+          <a:xfrm>
+            <a:off x="152399" y="4842845"/>
+            <a:ext cx="8824913" cy="954107"/>
+          </a:xfrm>
+          <a:prstGeom prst="rect">
+            <a:avLst/>
+          </a:prstGeom>
+          <a:noFill/>
+          <a:ln w="9525">
+            <a:noFill/>
+            <a:miter lim="800000"/>
+            <a:headEnd/>
+            <a:tailEnd/>
+          </a:ln>
+        </p:spPr>
+        <p:txBody>
+          <a:bodyPr>
+            <a:spAutoFit/>
+          </a:bodyPr>
+          <a:lstStyle>
+            <a:lvl1pPr eaLnBrk="0" hangingPunct="0">
+              <a:defRPr>
+                <a:solidFill>
+                  <a:schemeClr val="tx1"/>
+                </a:solidFill>
+                <a:latin typeface="Arial" charset="0"/>
+                <a:ea typeface="宋体" pitchFamily="2" charset="-122"/>
+              </a:defRPr>
+            </a:lvl1pPr>
+            <a:lvl2pPr marL="742950" indent="-285750" eaLnBrk="0" hangingPunct="0">
+              <a:defRPr>
+                <a:solidFill>
+                  <a:schemeClr val="tx1"/>
+                </a:solidFill>
+                <a:latin typeface="Arial" charset="0"/>
+                <a:ea typeface="宋体" pitchFamily="2" charset="-122"/>
+              </a:defRPr>
+            </a:lvl2pPr>
+            <a:lvl3pPr marL="1143000" indent="-228600" eaLnBrk="0" hangingPunct="0">
+              <a:defRPr>
+                <a:solidFill>
+                  <a:schemeClr val="tx1"/>
+                </a:solidFill>
+                <a:latin typeface="Arial" charset="0"/>
+                <a:ea typeface="宋体" pitchFamily="2" charset="-122"/>
+              </a:defRPr>
+            </a:lvl3pPr>
+            <a:lvl4pPr marL="1600200" indent="-228600" eaLnBrk="0" hangingPunct="0">
+              <a:defRPr>
+                <a:solidFill>
+                  <a:schemeClr val="tx1"/>
+                </a:solidFill>
+                <a:latin typeface="Arial" charset="0"/>
+                <a:ea typeface="宋体" pitchFamily="2" charset="-122"/>
+              </a:defRPr>
+            </a:lvl4pPr>
+            <a:lvl5pPr marL="2057400" indent="-228600" eaLnBrk="0" hangingPunct="0">
+              <a:defRPr>
+                <a:solidFill>
+                  <a:schemeClr val="tx1"/>
+                </a:solidFill>
+                <a:latin typeface="Arial" charset="0"/>
+                <a:ea typeface="宋体" pitchFamily="2" charset="-122"/>
+              </a:defRPr>
+            </a:lvl5pPr>
+            <a:lvl6pPr marL="2514600" indent="-228600" eaLnBrk="0" fontAlgn="base" hangingPunct="0">
+              <a:spcBef>
+                <a:spcPct val="0"/>
+              </a:spcBef>
+              <a:spcAft>
+                <a:spcPct val="0"/>
+              </a:spcAft>
+              <a:defRPr>
+                <a:solidFill>
+                  <a:schemeClr val="tx1"/>
+                </a:solidFill>
+                <a:latin typeface="Arial" charset="0"/>
+                <a:ea typeface="宋体" pitchFamily="2" charset="-122"/>
+              </a:defRPr>
+            </a:lvl6pPr>
+            <a:lvl7pPr marL="2971800" indent="-228600" eaLnBrk="0" fontAlgn="base" hangingPunct="0">
+              <a:spcBef>
+                <a:spcPct val="0"/>
+              </a:spcBef>
+              <a:spcAft>
+                <a:spcPct val="0"/>
+              </a:spcAft>
+              <a:defRPr>
+                <a:solidFill>
+                  <a:schemeClr val="tx1"/>
+                </a:solidFill>
+                <a:latin typeface="Arial" charset="0"/>
+                <a:ea typeface="宋体" pitchFamily="2" charset="-122"/>
+              </a:defRPr>
+            </a:lvl7pPr>
+            <a:lvl8pPr marL="3429000" indent="-228600" eaLnBrk="0" fontAlgn="base" hangingPunct="0">
+              <a:spcBef>
+                <a:spcPct val="0"/>
+              </a:spcBef>
+              <a:spcAft>
+                <a:spcPct val="0"/>
+              </a:spcAft>
+              <a:defRPr>
+                <a:solidFill>
+                  <a:schemeClr val="tx1"/>
+                </a:solidFill>
+                <a:latin typeface="Arial" charset="0"/>
+                <a:ea typeface="宋体" pitchFamily="2" charset="-122"/>
+              </a:defRPr>
+            </a:lvl8pPr>
+            <a:lvl9pPr marL="3886200" indent="-228600" eaLnBrk="0" fontAlgn="base" hangingPunct="0">
+              <a:spcBef>
+                <a:spcPct val="0"/>
+              </a:spcBef>
+              <a:spcAft>
+                <a:spcPct val="0"/>
+              </a:spcAft>
+              <a:defRPr>
+                <a:solidFill>
+                  <a:schemeClr val="tx1"/>
+                </a:solidFill>
+                <a:latin typeface="Arial" charset="0"/>
+                <a:ea typeface="宋体" pitchFamily="2" charset="-122"/>
+              </a:defRPr>
+            </a:lvl9pPr>
+          </a:lstStyle>
+          <a:p>
+            <a:pPr eaLnBrk="1" hangingPunct="1"/>
+            <a:r>
+              <a:rPr lang="en-US" altLang="zh-CN" sz="2800" dirty="0">
+                <a:latin typeface="微软雅黑" panose="020B0503020204020204" pitchFamily="34" charset="-122"/>
+                <a:ea typeface="微软雅黑" panose="020B0503020204020204" pitchFamily="34" charset="-122"/>
+              </a:rPr>
+              <a:t>MongoDB returns:</a:t>
+            </a:r>
+          </a:p>
+          <a:p>
+            <a:pPr eaLnBrk="1" hangingPunct="1"/>
+            <a:endParaRPr lang="en-US" altLang="zh-CN" sz="2800" dirty="0">
+              <a:solidFill>
+                <a:schemeClr val="bg1"/>
+              </a:solidFill>
+              <a:latin typeface="微软雅黑" pitchFamily="34" charset="-122"/>
+              <a:ea typeface="微软雅黑" pitchFamily="34" charset="-122"/>
+            </a:endParaRPr>
+          </a:p>
+        </p:txBody>
+      </p:sp>
+      <p:pic>
+        <p:nvPicPr>
+          <p:cNvPr id="5" name="Picture 4"/>
+          <p:cNvPicPr>
+            <a:picLocks noChangeAspect="1"/>
+          </p:cNvPicPr>
+          <p:nvPr/>
+        </p:nvPicPr>
+        <p:blipFill>
+          <a:blip r:embed="rId2"/>
+          <a:stretch>
+            <a:fillRect/>
+          </a:stretch>
+        </p:blipFill>
+        <p:spPr>
+          <a:xfrm>
+            <a:off x="152399" y="926610"/>
+            <a:ext cx="6096000" cy="2438400"/>
+          </a:xfrm>
+          <a:prstGeom prst="rect">
+            <a:avLst/>
+          </a:prstGeom>
+        </p:spPr>
+      </p:pic>
+      <p:pic>
+        <p:nvPicPr>
+          <p:cNvPr id="6" name="Picture 5"/>
+          <p:cNvPicPr>
+            <a:picLocks noChangeAspect="1"/>
+          </p:cNvPicPr>
+          <p:nvPr/>
+        </p:nvPicPr>
+        <p:blipFill>
+          <a:blip r:embed="rId3"/>
+          <a:stretch>
+            <a:fillRect/>
+          </a:stretch>
+        </p:blipFill>
+        <p:spPr>
+          <a:xfrm>
+            <a:off x="167472" y="3814462"/>
+            <a:ext cx="6614328" cy="1066827"/>
+          </a:xfrm>
+          <a:prstGeom prst="rect">
+            <a:avLst/>
+          </a:prstGeom>
+        </p:spPr>
+      </p:pic>
+      <p:pic>
+        <p:nvPicPr>
+          <p:cNvPr id="9" name="Picture 8"/>
+          <p:cNvPicPr>
+            <a:picLocks noChangeAspect="1"/>
+          </p:cNvPicPr>
+          <p:nvPr/>
+        </p:nvPicPr>
+        <p:blipFill>
+          <a:blip r:embed="rId4"/>
+          <a:stretch>
+            <a:fillRect/>
+          </a:stretch>
+        </p:blipFill>
+        <p:spPr>
+          <a:xfrm>
+            <a:off x="152398" y="5319898"/>
+            <a:ext cx="6248401" cy="1368114"/>
+          </a:xfrm>
+          <a:prstGeom prst="rect">
+            <a:avLst/>
+          </a:prstGeom>
+        </p:spPr>
+      </p:pic>
+    </p:spTree>
+    <p:extLst>
+      <p:ext uri="{BB962C8B-B14F-4D97-AF65-F5344CB8AC3E}">
+        <p14:creationId xmlns:p14="http://schemas.microsoft.com/office/powerpoint/2010/main" val="734898586"/>
+      </p:ext>
+    </p:extLst>
+  </p:cSld>
+  <p:clrMapOvr>
+    <a:masterClrMapping/>
+  </p:clrMapOvr>
+  <p:timing>
+    <p:tnLst>
+      <p:par>
+        <p:cTn id="1" dur="indefinite" restart="never" nodeType="tmRoot">
+          <p:childTnLst>
+            <p:seq concurrent="1" nextAc="seek">
+              <p:cTn id="2" dur="indefinite" nodeType="mainSeq">
+                <p:childTnLst>
+                  <p:par>
+                    <p:cTn id="3" fill="hold">
+                      <p:stCondLst>
+                        <p:cond delay="indefinite"/>
+                      </p:stCondLst>
+                      <p:childTnLst>
+                        <p:par>
+                          <p:cTn id="4" fill="hold">
+                            <p:stCondLst>
+                              <p:cond delay="0"/>
+                            </p:stCondLst>
+                            <p:childTnLst>
+                              <p:par>
+                                <p:cTn id="5" presetID="10" presetClass="entr" presetSubtype="0" fill="hold" nodeType="clickEffect">
+                                  <p:stCondLst>
+                                    <p:cond delay="0"/>
+                                  </p:stCondLst>
+                                  <p:childTnLst>
+                                    <p:set>
+                                      <p:cBhvr>
+                                        <p:cTn id="6" dur="1" fill="hold">
+                                          <p:stCondLst>
+                                            <p:cond delay="0"/>
+                                          </p:stCondLst>
+                                        </p:cTn>
+                                        <p:tgtEl>
+                                          <p:spTgt spid="9"/>
+                                        </p:tgtEl>
+                                        <p:attrNameLst>
+                                          <p:attrName>style.visibility</p:attrName>
+                                        </p:attrNameLst>
+                                      </p:cBhvr>
+                                      <p:to>
+                                        <p:strVal val="visible"/>
+                                      </p:to>
+                                    </p:set>
+                                    <p:animEffect transition="in" filter="fade">
+                                      <p:cBhvr>
+                                        <p:cTn id="7" dur="500"/>
+                                        <p:tgtEl>
+                                          <p:spTgt spid="9"/>
+                                        </p:tgtEl>
+                                      </p:cBhvr>
+                                    </p:animEffect>
+                                  </p:childTnLst>
+                                </p:cTn>
+                              </p:par>
+                            </p:childTnLst>
+                          </p:cTn>
+                        </p:par>
+                      </p:childTnLst>
+                    </p:cTn>
+                  </p:par>
+                </p:childTnLst>
+              </p:cTn>
+              <p:prevCondLst>
+                <p:cond evt="onPrev" delay="0">
+                  <p:tgtEl>
+                    <p:sldTgt/>
+                  </p:tgtEl>
+                </p:cond>
+              </p:prevCondLst>
+              <p:nextCondLst>
+                <p:cond evt="onNext" delay="0">
+                  <p:tgtEl>
+                    <p:sldTgt/>
+                  </p:tgtEl>
+                </p:cond>
+              </p:nextCondLst>
+            </p:seq>
+          </p:childTnLst>
+        </p:cTn>
+      </p:par>
+    </p:tnLst>
+  </p:timing>
+</p:sld>
+</file>
+
+<file path=ppt/slides/slide15.xml><?xml version="1.0" encoding="utf-8"?>
+<p:sld xmlns:a="http://schemas.openxmlformats.org/drawingml/2006/main" xmlns:r="http://schemas.openxmlformats.org/officeDocument/2006/relationships" xmlns:p="http://schemas.openxmlformats.org/presentationml/2006/main">
+  <p:cSld>
+    <p:spTree>
+      <p:nvGrpSpPr>
+        <p:cNvPr id="1" name=""/>
+        <p:cNvGrpSpPr/>
+        <p:nvPr/>
+      </p:nvGrpSpPr>
+      <p:grpSpPr>
+        <a:xfrm>
+          <a:off x="0" y="0"/>
+          <a:ext cx="0" cy="0"/>
+          <a:chOff x="0" y="0"/>
+          <a:chExt cx="0" cy="0"/>
+        </a:xfrm>
+      </p:grpSpPr>
+      <p:sp>
+        <p:nvSpPr>
+          <p:cNvPr id="2" name="Text Placeholder 1"/>
+          <p:cNvSpPr>
+            <a:spLocks noGrp="1"/>
+          </p:cNvSpPr>
+          <p:nvPr>
+            <p:ph type="body" sz="quarter" idx="13"/>
+          </p:nvPr>
+        </p:nvSpPr>
+        <p:spPr/>
+        <p:txBody>
+          <a:bodyPr/>
+          <a:lstStyle/>
+          <a:p>
+            <a:r>
+              <a:rPr lang="en-US" dirty="0"/>
+              <a:t>3</a:t>
+            </a:r>
+          </a:p>
+        </p:txBody>
+      </p:sp>
+      <p:sp>
+        <p:nvSpPr>
+          <p:cNvPr id="3" name="Text Placeholder 2"/>
+          <p:cNvSpPr>
+            <a:spLocks noGrp="1"/>
+          </p:cNvSpPr>
+          <p:nvPr>
+            <p:ph type="body" sz="quarter" idx="14"/>
+          </p:nvPr>
+        </p:nvSpPr>
+        <p:spPr/>
+        <p:txBody>
+          <a:bodyPr/>
+          <a:lstStyle/>
+          <a:p>
+            <a:r>
+              <a:rPr lang="en-US" dirty="0"/>
+              <a:t>Query  Operators: Logical</a:t>
+            </a:r>
+            <a:endParaRPr lang="en-US" altLang="zh-CN" dirty="0"/>
+          </a:p>
+          <a:p>
+            <a:endParaRPr lang="en-US" altLang="zh-CN" dirty="0"/>
+          </a:p>
+          <a:p>
+            <a:endParaRPr lang="en-US" dirty="0"/>
+          </a:p>
+          <a:p>
+            <a:endParaRPr lang="en-US" dirty="0"/>
+          </a:p>
+        </p:txBody>
+      </p:sp>
+      <p:sp>
+        <p:nvSpPr>
+          <p:cNvPr id="7" name="TextBox 2"/>
+          <p:cNvSpPr txBox="1">
+            <a:spLocks noChangeArrowheads="1"/>
+          </p:cNvSpPr>
+          <p:nvPr/>
+        </p:nvSpPr>
+        <p:spPr bwMode="auto">
+          <a:xfrm>
+            <a:off x="152400" y="3326249"/>
+            <a:ext cx="8824913" cy="954107"/>
+          </a:xfrm>
+          <a:prstGeom prst="rect">
+            <a:avLst/>
+          </a:prstGeom>
+          <a:noFill/>
+          <a:ln w="9525">
+            <a:noFill/>
+            <a:miter lim="800000"/>
+            <a:headEnd/>
+            <a:tailEnd/>
+          </a:ln>
+        </p:spPr>
+        <p:txBody>
+          <a:bodyPr>
+            <a:spAutoFit/>
+          </a:bodyPr>
+          <a:lstStyle>
+            <a:lvl1pPr eaLnBrk="0" hangingPunct="0">
+              <a:defRPr>
+                <a:solidFill>
+                  <a:schemeClr val="tx1"/>
+                </a:solidFill>
+                <a:latin typeface="Arial" charset="0"/>
+                <a:ea typeface="宋体" pitchFamily="2" charset="-122"/>
+              </a:defRPr>
+            </a:lvl1pPr>
+            <a:lvl2pPr marL="742950" indent="-285750" eaLnBrk="0" hangingPunct="0">
+              <a:defRPr>
+                <a:solidFill>
+                  <a:schemeClr val="tx1"/>
+                </a:solidFill>
+                <a:latin typeface="Arial" charset="0"/>
+                <a:ea typeface="宋体" pitchFamily="2" charset="-122"/>
+              </a:defRPr>
+            </a:lvl2pPr>
+            <a:lvl3pPr marL="1143000" indent="-228600" eaLnBrk="0" hangingPunct="0">
+              <a:defRPr>
+                <a:solidFill>
+                  <a:schemeClr val="tx1"/>
+                </a:solidFill>
+                <a:latin typeface="Arial" charset="0"/>
+                <a:ea typeface="宋体" pitchFamily="2" charset="-122"/>
+              </a:defRPr>
+            </a:lvl3pPr>
+            <a:lvl4pPr marL="1600200" indent="-228600" eaLnBrk="0" hangingPunct="0">
+              <a:defRPr>
+                <a:solidFill>
+                  <a:schemeClr val="tx1"/>
+                </a:solidFill>
+                <a:latin typeface="Arial" charset="0"/>
+                <a:ea typeface="宋体" pitchFamily="2" charset="-122"/>
+              </a:defRPr>
+            </a:lvl4pPr>
+            <a:lvl5pPr marL="2057400" indent="-228600" eaLnBrk="0" hangingPunct="0">
+              <a:defRPr>
+                <a:solidFill>
+                  <a:schemeClr val="tx1"/>
+                </a:solidFill>
+                <a:latin typeface="Arial" charset="0"/>
+                <a:ea typeface="宋体" pitchFamily="2" charset="-122"/>
+              </a:defRPr>
+            </a:lvl5pPr>
+            <a:lvl6pPr marL="2514600" indent="-228600" eaLnBrk="0" fontAlgn="base" hangingPunct="0">
+              <a:spcBef>
+                <a:spcPct val="0"/>
+              </a:spcBef>
+              <a:spcAft>
+                <a:spcPct val="0"/>
+              </a:spcAft>
+              <a:defRPr>
+                <a:solidFill>
+                  <a:schemeClr val="tx1"/>
+                </a:solidFill>
+                <a:latin typeface="Arial" charset="0"/>
+                <a:ea typeface="宋体" pitchFamily="2" charset="-122"/>
+              </a:defRPr>
+            </a:lvl6pPr>
+            <a:lvl7pPr marL="2971800" indent="-228600" eaLnBrk="0" fontAlgn="base" hangingPunct="0">
+              <a:spcBef>
+                <a:spcPct val="0"/>
+              </a:spcBef>
+              <a:spcAft>
+                <a:spcPct val="0"/>
+              </a:spcAft>
+              <a:defRPr>
+                <a:solidFill>
+                  <a:schemeClr val="tx1"/>
+                </a:solidFill>
+                <a:latin typeface="Arial" charset="0"/>
+                <a:ea typeface="宋体" pitchFamily="2" charset="-122"/>
+              </a:defRPr>
+            </a:lvl7pPr>
+            <a:lvl8pPr marL="3429000" indent="-228600" eaLnBrk="0" fontAlgn="base" hangingPunct="0">
+              <a:spcBef>
+                <a:spcPct val="0"/>
+              </a:spcBef>
+              <a:spcAft>
+                <a:spcPct val="0"/>
+              </a:spcAft>
+              <a:defRPr>
+                <a:solidFill>
+                  <a:schemeClr val="tx1"/>
+                </a:solidFill>
+                <a:latin typeface="Arial" charset="0"/>
+                <a:ea typeface="宋体" pitchFamily="2" charset="-122"/>
+              </a:defRPr>
+            </a:lvl8pPr>
+            <a:lvl9pPr marL="3886200" indent="-228600" eaLnBrk="0" fontAlgn="base" hangingPunct="0">
+              <a:spcBef>
+                <a:spcPct val="0"/>
+              </a:spcBef>
+              <a:spcAft>
+                <a:spcPct val="0"/>
+              </a:spcAft>
+              <a:defRPr>
+                <a:solidFill>
+                  <a:schemeClr val="tx1"/>
+                </a:solidFill>
+                <a:latin typeface="Arial" charset="0"/>
+                <a:ea typeface="宋体" pitchFamily="2" charset="-122"/>
+              </a:defRPr>
+            </a:lvl9pPr>
+          </a:lstStyle>
+          <a:p>
+            <a:pPr eaLnBrk="1" hangingPunct="1"/>
+            <a:r>
+              <a:rPr lang="en-US" altLang="zh-CN" sz="2800" dirty="0">
+                <a:latin typeface="微软雅黑" panose="020B0503020204020204" pitchFamily="34" charset="-122"/>
+                <a:ea typeface="微软雅黑" panose="020B0503020204020204" pitchFamily="34" charset="-122"/>
+              </a:rPr>
+              <a:t>Query:</a:t>
+            </a:r>
+          </a:p>
+          <a:p>
+            <a:pPr eaLnBrk="1" hangingPunct="1"/>
+            <a:endParaRPr lang="en-US" altLang="zh-CN" sz="2800" dirty="0">
+              <a:solidFill>
+                <a:schemeClr val="bg1"/>
+              </a:solidFill>
+              <a:latin typeface="微软雅黑" pitchFamily="34" charset="-122"/>
+              <a:ea typeface="微软雅黑" pitchFamily="34" charset="-122"/>
+            </a:endParaRPr>
+          </a:p>
+        </p:txBody>
+      </p:sp>
+      <p:sp>
+        <p:nvSpPr>
+          <p:cNvPr id="14" name="TextBox 2"/>
+          <p:cNvSpPr txBox="1">
+            <a:spLocks noChangeArrowheads="1"/>
+          </p:cNvSpPr>
+          <p:nvPr/>
+        </p:nvSpPr>
+        <p:spPr bwMode="auto">
+          <a:xfrm>
+            <a:off x="152399" y="4842845"/>
+            <a:ext cx="8824913" cy="954107"/>
+          </a:xfrm>
+          <a:prstGeom prst="rect">
+            <a:avLst/>
+          </a:prstGeom>
+          <a:noFill/>
+          <a:ln w="9525">
+            <a:noFill/>
+            <a:miter lim="800000"/>
+            <a:headEnd/>
+            <a:tailEnd/>
+          </a:ln>
+        </p:spPr>
+        <p:txBody>
+          <a:bodyPr>
+            <a:spAutoFit/>
+          </a:bodyPr>
+          <a:lstStyle>
+            <a:lvl1pPr eaLnBrk="0" hangingPunct="0">
+              <a:defRPr>
+                <a:solidFill>
+                  <a:schemeClr val="tx1"/>
+                </a:solidFill>
+                <a:latin typeface="Arial" charset="0"/>
+                <a:ea typeface="宋体" pitchFamily="2" charset="-122"/>
+              </a:defRPr>
+            </a:lvl1pPr>
+            <a:lvl2pPr marL="742950" indent="-285750" eaLnBrk="0" hangingPunct="0">
+              <a:defRPr>
+                <a:solidFill>
+                  <a:schemeClr val="tx1"/>
+                </a:solidFill>
+                <a:latin typeface="Arial" charset="0"/>
+                <a:ea typeface="宋体" pitchFamily="2" charset="-122"/>
+              </a:defRPr>
+            </a:lvl2pPr>
+            <a:lvl3pPr marL="1143000" indent="-228600" eaLnBrk="0" hangingPunct="0">
+              <a:defRPr>
+                <a:solidFill>
+                  <a:schemeClr val="tx1"/>
+                </a:solidFill>
+                <a:latin typeface="Arial" charset="0"/>
+                <a:ea typeface="宋体" pitchFamily="2" charset="-122"/>
+              </a:defRPr>
+            </a:lvl3pPr>
+            <a:lvl4pPr marL="1600200" indent="-228600" eaLnBrk="0" hangingPunct="0">
+              <a:defRPr>
+                <a:solidFill>
+                  <a:schemeClr val="tx1"/>
+                </a:solidFill>
+                <a:latin typeface="Arial" charset="0"/>
+                <a:ea typeface="宋体" pitchFamily="2" charset="-122"/>
+              </a:defRPr>
+            </a:lvl4pPr>
+            <a:lvl5pPr marL="2057400" indent="-228600" eaLnBrk="0" hangingPunct="0">
+              <a:defRPr>
+                <a:solidFill>
+                  <a:schemeClr val="tx1"/>
+                </a:solidFill>
+                <a:latin typeface="Arial" charset="0"/>
+                <a:ea typeface="宋体" pitchFamily="2" charset="-122"/>
+              </a:defRPr>
+            </a:lvl5pPr>
+            <a:lvl6pPr marL="2514600" indent="-228600" eaLnBrk="0" fontAlgn="base" hangingPunct="0">
+              <a:spcBef>
+                <a:spcPct val="0"/>
+              </a:spcBef>
+              <a:spcAft>
+                <a:spcPct val="0"/>
+              </a:spcAft>
+              <a:defRPr>
+                <a:solidFill>
+                  <a:schemeClr val="tx1"/>
+                </a:solidFill>
+                <a:latin typeface="Arial" charset="0"/>
+                <a:ea typeface="宋体" pitchFamily="2" charset="-122"/>
+              </a:defRPr>
+            </a:lvl6pPr>
+            <a:lvl7pPr marL="2971800" indent="-228600" eaLnBrk="0" fontAlgn="base" hangingPunct="0">
+              <a:spcBef>
+                <a:spcPct val="0"/>
+              </a:spcBef>
+              <a:spcAft>
+                <a:spcPct val="0"/>
+              </a:spcAft>
+              <a:defRPr>
+                <a:solidFill>
+                  <a:schemeClr val="tx1"/>
+                </a:solidFill>
+                <a:latin typeface="Arial" charset="0"/>
+                <a:ea typeface="宋体" pitchFamily="2" charset="-122"/>
+              </a:defRPr>
+            </a:lvl7pPr>
+            <a:lvl8pPr marL="3429000" indent="-228600" eaLnBrk="0" fontAlgn="base" hangingPunct="0">
+              <a:spcBef>
+                <a:spcPct val="0"/>
+              </a:spcBef>
+              <a:spcAft>
+                <a:spcPct val="0"/>
+              </a:spcAft>
+              <a:defRPr>
+                <a:solidFill>
+                  <a:schemeClr val="tx1"/>
+                </a:solidFill>
+                <a:latin typeface="Arial" charset="0"/>
+                <a:ea typeface="宋体" pitchFamily="2" charset="-122"/>
+              </a:defRPr>
+            </a:lvl8pPr>
+            <a:lvl9pPr marL="3886200" indent="-228600" eaLnBrk="0" fontAlgn="base" hangingPunct="0">
+              <a:spcBef>
+                <a:spcPct val="0"/>
+              </a:spcBef>
+              <a:spcAft>
+                <a:spcPct val="0"/>
+              </a:spcAft>
+              <a:defRPr>
+                <a:solidFill>
+                  <a:schemeClr val="tx1"/>
+                </a:solidFill>
+                <a:latin typeface="Arial" charset="0"/>
+                <a:ea typeface="宋体" pitchFamily="2" charset="-122"/>
+              </a:defRPr>
+            </a:lvl9pPr>
+          </a:lstStyle>
+          <a:p>
+            <a:pPr eaLnBrk="1" hangingPunct="1"/>
+            <a:r>
+              <a:rPr lang="en-US" altLang="zh-CN" sz="2800" dirty="0">
+                <a:latin typeface="微软雅黑" panose="020B0503020204020204" pitchFamily="34" charset="-122"/>
+                <a:ea typeface="微软雅黑" panose="020B0503020204020204" pitchFamily="34" charset="-122"/>
+              </a:rPr>
+              <a:t>MongoDB returns:</a:t>
+            </a:r>
+          </a:p>
+          <a:p>
+            <a:pPr eaLnBrk="1" hangingPunct="1"/>
+            <a:endParaRPr lang="en-US" altLang="zh-CN" sz="2800" dirty="0">
+              <a:solidFill>
+                <a:schemeClr val="bg1"/>
+              </a:solidFill>
+              <a:latin typeface="微软雅黑" pitchFamily="34" charset="-122"/>
+              <a:ea typeface="微软雅黑" pitchFamily="34" charset="-122"/>
+            </a:endParaRPr>
+          </a:p>
+        </p:txBody>
+      </p:sp>
+      <p:pic>
+        <p:nvPicPr>
+          <p:cNvPr id="5" name="Picture 4"/>
+          <p:cNvPicPr>
+            <a:picLocks noChangeAspect="1"/>
+          </p:cNvPicPr>
+          <p:nvPr/>
+        </p:nvPicPr>
+        <p:blipFill>
+          <a:blip r:embed="rId2"/>
+          <a:stretch>
+            <a:fillRect/>
+          </a:stretch>
+        </p:blipFill>
+        <p:spPr>
+          <a:xfrm>
+            <a:off x="152399" y="926610"/>
+            <a:ext cx="6096000" cy="2438400"/>
+          </a:xfrm>
+          <a:prstGeom prst="rect">
+            <a:avLst/>
+          </a:prstGeom>
+        </p:spPr>
+      </p:pic>
+      <p:pic>
+        <p:nvPicPr>
+          <p:cNvPr id="4" name="Picture 3"/>
+          <p:cNvPicPr>
+            <a:picLocks noChangeAspect="1"/>
+          </p:cNvPicPr>
+          <p:nvPr/>
+        </p:nvPicPr>
+        <p:blipFill>
+          <a:blip r:embed="rId3"/>
+          <a:stretch>
+            <a:fillRect/>
+          </a:stretch>
+        </p:blipFill>
+        <p:spPr>
+          <a:xfrm>
+            <a:off x="152399" y="3821724"/>
+            <a:ext cx="6924780" cy="1131276"/>
+          </a:xfrm>
+          <a:prstGeom prst="rect">
+            <a:avLst/>
+          </a:prstGeom>
+        </p:spPr>
+      </p:pic>
+      <p:pic>
+        <p:nvPicPr>
+          <p:cNvPr id="8" name="Picture 7"/>
+          <p:cNvPicPr>
+            <a:picLocks noChangeAspect="1"/>
+          </p:cNvPicPr>
+          <p:nvPr/>
+        </p:nvPicPr>
+        <p:blipFill>
+          <a:blip r:embed="rId4"/>
+          <a:stretch>
+            <a:fillRect/>
+          </a:stretch>
+        </p:blipFill>
+        <p:spPr>
+          <a:xfrm>
+            <a:off x="120579" y="5301264"/>
+            <a:ext cx="6585021" cy="1391787"/>
+          </a:xfrm>
+          <a:prstGeom prst="rect">
+            <a:avLst/>
+          </a:prstGeom>
+        </p:spPr>
+      </p:pic>
+    </p:spTree>
+    <p:extLst>
+      <p:ext uri="{BB962C8B-B14F-4D97-AF65-F5344CB8AC3E}">
+        <p14:creationId xmlns:p14="http://schemas.microsoft.com/office/powerpoint/2010/main" val="3032552004"/>
+      </p:ext>
+    </p:extLst>
+  </p:cSld>
+  <p:clrMapOvr>
+    <a:masterClrMapping/>
+  </p:clrMapOvr>
+  <p:timing>
+    <p:tnLst>
+      <p:par>
+        <p:cTn id="1" dur="indefinite" restart="never" nodeType="tmRoot">
+          <p:childTnLst>
+            <p:seq concurrent="1" nextAc="seek">
+              <p:cTn id="2" dur="indefinite" nodeType="mainSeq">
+                <p:childTnLst>
+                  <p:par>
+                    <p:cTn id="3" fill="hold">
+                      <p:stCondLst>
+                        <p:cond delay="indefinite"/>
+                      </p:stCondLst>
+                      <p:childTnLst>
+                        <p:par>
+                          <p:cTn id="4" fill="hold">
+                            <p:stCondLst>
+                              <p:cond delay="0"/>
+                            </p:stCondLst>
+                            <p:childTnLst>
+                              <p:par>
+                                <p:cTn id="5" presetID="10" presetClass="entr" presetSubtype="0" fill="hold" nodeType="clickEffect">
+                                  <p:stCondLst>
+                                    <p:cond delay="0"/>
+                                  </p:stCondLst>
+                                  <p:childTnLst>
+                                    <p:set>
+                                      <p:cBhvr>
+                                        <p:cTn id="6" dur="1" fill="hold">
+                                          <p:stCondLst>
+                                            <p:cond delay="0"/>
+                                          </p:stCondLst>
+                                        </p:cTn>
+                                        <p:tgtEl>
+                                          <p:spTgt spid="8"/>
+                                        </p:tgtEl>
+                                        <p:attrNameLst>
+                                          <p:attrName>style.visibility</p:attrName>
+                                        </p:attrNameLst>
+                                      </p:cBhvr>
+                                      <p:to>
+                                        <p:strVal val="visible"/>
+                                      </p:to>
+                                    </p:set>
+                                    <p:animEffect transition="in" filter="fade">
+                                      <p:cBhvr>
+                                        <p:cTn id="7" dur="500"/>
+                                        <p:tgtEl>
+                                          <p:spTgt spid="8"/>
+                                        </p:tgtEl>
+                                      </p:cBhvr>
+                                    </p:animEffect>
+                                  </p:childTnLst>
+                                </p:cTn>
+                              </p:par>
+                            </p:childTnLst>
+                          </p:cTn>
+                        </p:par>
+                      </p:childTnLst>
+                    </p:cTn>
+                  </p:par>
+                </p:childTnLst>
+              </p:cTn>
+              <p:prevCondLst>
+                <p:cond evt="onPrev" delay="0">
+                  <p:tgtEl>
+                    <p:sldTgt/>
+                  </p:tgtEl>
+                </p:cond>
+              </p:prevCondLst>
+              <p:nextCondLst>
+                <p:cond evt="onNext" delay="0">
+                  <p:tgtEl>
+                    <p:sldTgt/>
+                  </p:tgtEl>
+                </p:cond>
+              </p:nextCondLst>
+            </p:seq>
+          </p:childTnLst>
+        </p:cTn>
+      </p:par>
+    </p:tnLst>
+  </p:timing>
+</p:sld>
+</file>
+
+<file path=ppt/slides/slide16.xml><?xml version="1.0" encoding="utf-8"?>
+<p:sld xmlns:a="http://schemas.openxmlformats.org/drawingml/2006/main" xmlns:r="http://schemas.openxmlformats.org/officeDocument/2006/relationships" xmlns:p="http://schemas.openxmlformats.org/presentationml/2006/main">
+  <p:cSld>
+    <p:spTree>
+      <p:nvGrpSpPr>
+        <p:cNvPr id="1" name=""/>
+        <p:cNvGrpSpPr/>
+        <p:nvPr/>
+      </p:nvGrpSpPr>
+      <p:grpSpPr>
+        <a:xfrm>
+          <a:off x="0" y="0"/>
+          <a:ext cx="0" cy="0"/>
+          <a:chOff x="0" y="0"/>
+          <a:chExt cx="0" cy="0"/>
+        </a:xfrm>
+      </p:grpSpPr>
+      <p:sp>
+        <p:nvSpPr>
+          <p:cNvPr id="2" name="Text Placeholder 1"/>
+          <p:cNvSpPr>
+            <a:spLocks noGrp="1"/>
+          </p:cNvSpPr>
+          <p:nvPr>
+            <p:ph type="body" sz="quarter" idx="13"/>
+          </p:nvPr>
+        </p:nvSpPr>
+        <p:spPr/>
+        <p:txBody>
+          <a:bodyPr/>
+          <a:lstStyle/>
+          <a:p>
+            <a:r>
+              <a:rPr lang="en-US" dirty="0"/>
+              <a:t>3</a:t>
+            </a:r>
+          </a:p>
+        </p:txBody>
+      </p:sp>
+      <p:sp>
+        <p:nvSpPr>
+          <p:cNvPr id="3" name="Text Placeholder 2"/>
+          <p:cNvSpPr>
+            <a:spLocks noGrp="1"/>
+          </p:cNvSpPr>
+          <p:nvPr>
+            <p:ph type="body" sz="quarter" idx="14"/>
+          </p:nvPr>
+        </p:nvSpPr>
+        <p:spPr/>
+        <p:txBody>
+          <a:bodyPr/>
+          <a:lstStyle/>
+          <a:p>
+            <a:r>
+              <a:rPr lang="en-US" dirty="0"/>
+              <a:t>Query  Operators: Logical</a:t>
+            </a:r>
+            <a:endParaRPr lang="en-US" altLang="zh-CN" dirty="0"/>
+          </a:p>
+          <a:p>
+            <a:endParaRPr lang="en-US" altLang="zh-CN" dirty="0"/>
+          </a:p>
+          <a:p>
+            <a:endParaRPr lang="en-US" dirty="0"/>
+          </a:p>
+          <a:p>
+            <a:endParaRPr lang="en-US" dirty="0"/>
+          </a:p>
+        </p:txBody>
+      </p:sp>
+      <p:sp>
+        <p:nvSpPr>
+          <p:cNvPr id="7" name="TextBox 2"/>
+          <p:cNvSpPr txBox="1">
+            <a:spLocks noChangeArrowheads="1"/>
+          </p:cNvSpPr>
+          <p:nvPr/>
+        </p:nvSpPr>
+        <p:spPr bwMode="auto">
+          <a:xfrm>
+            <a:off x="35169" y="3164576"/>
+            <a:ext cx="8824913" cy="954107"/>
+          </a:xfrm>
+          <a:prstGeom prst="rect">
+            <a:avLst/>
+          </a:prstGeom>
+          <a:noFill/>
+          <a:ln w="9525">
+            <a:noFill/>
+            <a:miter lim="800000"/>
+            <a:headEnd/>
+            <a:tailEnd/>
+          </a:ln>
+        </p:spPr>
+        <p:txBody>
+          <a:bodyPr>
+            <a:spAutoFit/>
+          </a:bodyPr>
+          <a:lstStyle>
+            <a:lvl1pPr eaLnBrk="0" hangingPunct="0">
+              <a:defRPr>
+                <a:solidFill>
+                  <a:schemeClr val="tx1"/>
+                </a:solidFill>
+                <a:latin typeface="Arial" charset="0"/>
+                <a:ea typeface="宋体" pitchFamily="2" charset="-122"/>
+              </a:defRPr>
+            </a:lvl1pPr>
+            <a:lvl2pPr marL="742950" indent="-285750" eaLnBrk="0" hangingPunct="0">
+              <a:defRPr>
+                <a:solidFill>
+                  <a:schemeClr val="tx1"/>
+                </a:solidFill>
+                <a:latin typeface="Arial" charset="0"/>
+                <a:ea typeface="宋体" pitchFamily="2" charset="-122"/>
+              </a:defRPr>
+            </a:lvl2pPr>
+            <a:lvl3pPr marL="1143000" indent="-228600" eaLnBrk="0" hangingPunct="0">
+              <a:defRPr>
+                <a:solidFill>
+                  <a:schemeClr val="tx1"/>
+                </a:solidFill>
+                <a:latin typeface="Arial" charset="0"/>
+                <a:ea typeface="宋体" pitchFamily="2" charset="-122"/>
+              </a:defRPr>
+            </a:lvl3pPr>
+            <a:lvl4pPr marL="1600200" indent="-228600" eaLnBrk="0" hangingPunct="0">
+              <a:defRPr>
+                <a:solidFill>
+                  <a:schemeClr val="tx1"/>
+                </a:solidFill>
+                <a:latin typeface="Arial" charset="0"/>
+                <a:ea typeface="宋体" pitchFamily="2" charset="-122"/>
+              </a:defRPr>
+            </a:lvl4pPr>
+            <a:lvl5pPr marL="2057400" indent="-228600" eaLnBrk="0" hangingPunct="0">
+              <a:defRPr>
+                <a:solidFill>
+                  <a:schemeClr val="tx1"/>
+                </a:solidFill>
+                <a:latin typeface="Arial" charset="0"/>
+                <a:ea typeface="宋体" pitchFamily="2" charset="-122"/>
+              </a:defRPr>
+            </a:lvl5pPr>
+            <a:lvl6pPr marL="2514600" indent="-228600" eaLnBrk="0" fontAlgn="base" hangingPunct="0">
+              <a:spcBef>
+                <a:spcPct val="0"/>
+              </a:spcBef>
+              <a:spcAft>
+                <a:spcPct val="0"/>
+              </a:spcAft>
+              <a:defRPr>
+                <a:solidFill>
+                  <a:schemeClr val="tx1"/>
+                </a:solidFill>
+                <a:latin typeface="Arial" charset="0"/>
+                <a:ea typeface="宋体" pitchFamily="2" charset="-122"/>
+              </a:defRPr>
+            </a:lvl6pPr>
+            <a:lvl7pPr marL="2971800" indent="-228600" eaLnBrk="0" fontAlgn="base" hangingPunct="0">
+              <a:spcBef>
+                <a:spcPct val="0"/>
+              </a:spcBef>
+              <a:spcAft>
+                <a:spcPct val="0"/>
+              </a:spcAft>
+              <a:defRPr>
+                <a:solidFill>
+                  <a:schemeClr val="tx1"/>
+                </a:solidFill>
+                <a:latin typeface="Arial" charset="0"/>
+                <a:ea typeface="宋体" pitchFamily="2" charset="-122"/>
+              </a:defRPr>
+            </a:lvl7pPr>
+            <a:lvl8pPr marL="3429000" indent="-228600" eaLnBrk="0" fontAlgn="base" hangingPunct="0">
+              <a:spcBef>
+                <a:spcPct val="0"/>
+              </a:spcBef>
+              <a:spcAft>
+                <a:spcPct val="0"/>
+              </a:spcAft>
+              <a:defRPr>
+                <a:solidFill>
+                  <a:schemeClr val="tx1"/>
+                </a:solidFill>
+                <a:latin typeface="Arial" charset="0"/>
+                <a:ea typeface="宋体" pitchFamily="2" charset="-122"/>
+              </a:defRPr>
+            </a:lvl8pPr>
+            <a:lvl9pPr marL="3886200" indent="-228600" eaLnBrk="0" fontAlgn="base" hangingPunct="0">
+              <a:spcBef>
+                <a:spcPct val="0"/>
+              </a:spcBef>
+              <a:spcAft>
+                <a:spcPct val="0"/>
+              </a:spcAft>
+              <a:defRPr>
+                <a:solidFill>
+                  <a:schemeClr val="tx1"/>
+                </a:solidFill>
+                <a:latin typeface="Arial" charset="0"/>
+                <a:ea typeface="宋体" pitchFamily="2" charset="-122"/>
+              </a:defRPr>
+            </a:lvl9pPr>
+          </a:lstStyle>
+          <a:p>
+            <a:pPr eaLnBrk="1" hangingPunct="1"/>
+            <a:r>
+              <a:rPr lang="en-US" altLang="zh-CN" sz="2800" dirty="0">
+                <a:latin typeface="微软雅黑" panose="020B0503020204020204" pitchFamily="34" charset="-122"/>
+                <a:ea typeface="微软雅黑" panose="020B0503020204020204" pitchFamily="34" charset="-122"/>
+              </a:rPr>
+              <a:t>Query:</a:t>
+            </a:r>
+          </a:p>
+          <a:p>
+            <a:pPr eaLnBrk="1" hangingPunct="1"/>
+            <a:endParaRPr lang="en-US" altLang="zh-CN" sz="2800" dirty="0">
+              <a:solidFill>
+                <a:schemeClr val="bg1"/>
+              </a:solidFill>
+              <a:latin typeface="微软雅黑" pitchFamily="34" charset="-122"/>
+              <a:ea typeface="微软雅黑" pitchFamily="34" charset="-122"/>
+            </a:endParaRPr>
+          </a:p>
+        </p:txBody>
+      </p:sp>
+      <p:sp>
+        <p:nvSpPr>
+          <p:cNvPr id="14" name="TextBox 2"/>
+          <p:cNvSpPr txBox="1">
+            <a:spLocks noChangeArrowheads="1"/>
+          </p:cNvSpPr>
+          <p:nvPr/>
+        </p:nvSpPr>
+        <p:spPr bwMode="auto">
+          <a:xfrm>
+            <a:off x="35169" y="4701739"/>
+            <a:ext cx="8824913" cy="954107"/>
+          </a:xfrm>
+          <a:prstGeom prst="rect">
+            <a:avLst/>
+          </a:prstGeom>
+          <a:noFill/>
+          <a:ln w="9525">
+            <a:noFill/>
+            <a:miter lim="800000"/>
+            <a:headEnd/>
+            <a:tailEnd/>
+          </a:ln>
+        </p:spPr>
+        <p:txBody>
+          <a:bodyPr>
+            <a:spAutoFit/>
+          </a:bodyPr>
+          <a:lstStyle>
+            <a:lvl1pPr eaLnBrk="0" hangingPunct="0">
+              <a:defRPr>
+                <a:solidFill>
+                  <a:schemeClr val="tx1"/>
+                </a:solidFill>
+                <a:latin typeface="Arial" charset="0"/>
+                <a:ea typeface="宋体" pitchFamily="2" charset="-122"/>
+              </a:defRPr>
+            </a:lvl1pPr>
+            <a:lvl2pPr marL="742950" indent="-285750" eaLnBrk="0" hangingPunct="0">
+              <a:defRPr>
+                <a:solidFill>
+                  <a:schemeClr val="tx1"/>
+                </a:solidFill>
+                <a:latin typeface="Arial" charset="0"/>
+                <a:ea typeface="宋体" pitchFamily="2" charset="-122"/>
+              </a:defRPr>
+            </a:lvl2pPr>
+            <a:lvl3pPr marL="1143000" indent="-228600" eaLnBrk="0" hangingPunct="0">
+              <a:defRPr>
+                <a:solidFill>
+                  <a:schemeClr val="tx1"/>
+                </a:solidFill>
+                <a:latin typeface="Arial" charset="0"/>
+                <a:ea typeface="宋体" pitchFamily="2" charset="-122"/>
+              </a:defRPr>
+            </a:lvl3pPr>
+            <a:lvl4pPr marL="1600200" indent="-228600" eaLnBrk="0" hangingPunct="0">
+              <a:defRPr>
+                <a:solidFill>
+                  <a:schemeClr val="tx1"/>
+                </a:solidFill>
+                <a:latin typeface="Arial" charset="0"/>
+                <a:ea typeface="宋体" pitchFamily="2" charset="-122"/>
+              </a:defRPr>
+            </a:lvl4pPr>
+            <a:lvl5pPr marL="2057400" indent="-228600" eaLnBrk="0" hangingPunct="0">
+              <a:defRPr>
+                <a:solidFill>
+                  <a:schemeClr val="tx1"/>
+                </a:solidFill>
+                <a:latin typeface="Arial" charset="0"/>
+                <a:ea typeface="宋体" pitchFamily="2" charset="-122"/>
+              </a:defRPr>
+            </a:lvl5pPr>
+            <a:lvl6pPr marL="2514600" indent="-228600" eaLnBrk="0" fontAlgn="base" hangingPunct="0">
+              <a:spcBef>
+                <a:spcPct val="0"/>
+              </a:spcBef>
+              <a:spcAft>
+                <a:spcPct val="0"/>
+              </a:spcAft>
+              <a:defRPr>
+                <a:solidFill>
+                  <a:schemeClr val="tx1"/>
+                </a:solidFill>
+                <a:latin typeface="Arial" charset="0"/>
+                <a:ea typeface="宋体" pitchFamily="2" charset="-122"/>
+              </a:defRPr>
+            </a:lvl6pPr>
+            <a:lvl7pPr marL="2971800" indent="-228600" eaLnBrk="0" fontAlgn="base" hangingPunct="0">
+              <a:spcBef>
+                <a:spcPct val="0"/>
+              </a:spcBef>
+              <a:spcAft>
+                <a:spcPct val="0"/>
+              </a:spcAft>
+              <a:defRPr>
+                <a:solidFill>
+                  <a:schemeClr val="tx1"/>
+                </a:solidFill>
+                <a:latin typeface="Arial" charset="0"/>
+                <a:ea typeface="宋体" pitchFamily="2" charset="-122"/>
+              </a:defRPr>
+            </a:lvl7pPr>
+            <a:lvl8pPr marL="3429000" indent="-228600" eaLnBrk="0" fontAlgn="base" hangingPunct="0">
+              <a:spcBef>
+                <a:spcPct val="0"/>
+              </a:spcBef>
+              <a:spcAft>
+                <a:spcPct val="0"/>
+              </a:spcAft>
+              <a:defRPr>
+                <a:solidFill>
+                  <a:schemeClr val="tx1"/>
+                </a:solidFill>
+                <a:latin typeface="Arial" charset="0"/>
+                <a:ea typeface="宋体" pitchFamily="2" charset="-122"/>
+              </a:defRPr>
+            </a:lvl8pPr>
+            <a:lvl9pPr marL="3886200" indent="-228600" eaLnBrk="0" fontAlgn="base" hangingPunct="0">
+              <a:spcBef>
+                <a:spcPct val="0"/>
+              </a:spcBef>
+              <a:spcAft>
+                <a:spcPct val="0"/>
+              </a:spcAft>
+              <a:defRPr>
+                <a:solidFill>
+                  <a:schemeClr val="tx1"/>
+                </a:solidFill>
+                <a:latin typeface="Arial" charset="0"/>
+                <a:ea typeface="宋体" pitchFamily="2" charset="-122"/>
+              </a:defRPr>
+            </a:lvl9pPr>
+          </a:lstStyle>
+          <a:p>
+            <a:pPr eaLnBrk="1" hangingPunct="1"/>
+            <a:r>
+              <a:rPr lang="en-US" altLang="zh-CN" sz="2800" dirty="0">
+                <a:latin typeface="微软雅黑" panose="020B0503020204020204" pitchFamily="34" charset="-122"/>
+                <a:ea typeface="微软雅黑" panose="020B0503020204020204" pitchFamily="34" charset="-122"/>
+              </a:rPr>
+              <a:t>MongoDB returns:</a:t>
+            </a:r>
+          </a:p>
+          <a:p>
+            <a:pPr eaLnBrk="1" hangingPunct="1"/>
+            <a:endParaRPr lang="en-US" altLang="zh-CN" sz="2800" dirty="0">
+              <a:solidFill>
+                <a:schemeClr val="bg1"/>
+              </a:solidFill>
+              <a:latin typeface="微软雅黑" pitchFamily="34" charset="-122"/>
+              <a:ea typeface="微软雅黑" pitchFamily="34" charset="-122"/>
+            </a:endParaRPr>
+          </a:p>
+        </p:txBody>
+      </p:sp>
+      <p:pic>
+        <p:nvPicPr>
+          <p:cNvPr id="5" name="Picture 4"/>
+          <p:cNvPicPr>
+            <a:picLocks noChangeAspect="1"/>
+          </p:cNvPicPr>
+          <p:nvPr/>
+        </p:nvPicPr>
+        <p:blipFill>
+          <a:blip r:embed="rId2"/>
+          <a:stretch>
+            <a:fillRect/>
+          </a:stretch>
+        </p:blipFill>
+        <p:spPr>
+          <a:xfrm>
+            <a:off x="152399" y="926610"/>
+            <a:ext cx="5791201" cy="2316480"/>
+          </a:xfrm>
+          <a:prstGeom prst="rect">
+            <a:avLst/>
+          </a:prstGeom>
+        </p:spPr>
+      </p:pic>
+      <p:pic>
+        <p:nvPicPr>
+          <p:cNvPr id="4" name="Picture 3"/>
+          <p:cNvPicPr>
+            <a:picLocks noChangeAspect="1"/>
+          </p:cNvPicPr>
+          <p:nvPr/>
+        </p:nvPicPr>
+        <p:blipFill>
+          <a:blip r:embed="rId3"/>
+          <a:stretch>
+            <a:fillRect/>
+          </a:stretch>
+        </p:blipFill>
+        <p:spPr>
+          <a:xfrm>
+            <a:off x="128115" y="3641629"/>
+            <a:ext cx="4556928" cy="1118057"/>
+          </a:xfrm>
+          <a:prstGeom prst="rect">
+            <a:avLst/>
+          </a:prstGeom>
+        </p:spPr>
+      </p:pic>
+      <p:pic>
+        <p:nvPicPr>
+          <p:cNvPr id="8" name="Picture 7"/>
+          <p:cNvPicPr>
+            <a:picLocks noChangeAspect="1"/>
+          </p:cNvPicPr>
+          <p:nvPr/>
+        </p:nvPicPr>
+        <p:blipFill>
+          <a:blip r:embed="rId4"/>
+          <a:stretch>
+            <a:fillRect/>
+          </a:stretch>
+        </p:blipFill>
+        <p:spPr>
+          <a:xfrm>
+            <a:off x="147374" y="5154875"/>
+            <a:ext cx="5643826" cy="1568731"/>
+          </a:xfrm>
+          <a:prstGeom prst="rect">
+            <a:avLst/>
+          </a:prstGeom>
+        </p:spPr>
+      </p:pic>
+    </p:spTree>
+    <p:extLst>
+      <p:ext uri="{BB962C8B-B14F-4D97-AF65-F5344CB8AC3E}">
+        <p14:creationId xmlns:p14="http://schemas.microsoft.com/office/powerpoint/2010/main" val="2714722120"/>
+      </p:ext>
+    </p:extLst>
+  </p:cSld>
+  <p:clrMapOvr>
+    <a:masterClrMapping/>
+  </p:clrMapOvr>
+  <p:timing>
+    <p:tnLst>
+      <p:par>
+        <p:cTn id="1" dur="indefinite" restart="never" nodeType="tmRoot">
+          <p:childTnLst>
+            <p:seq concurrent="1" nextAc="seek">
+              <p:cTn id="2" dur="indefinite" nodeType="mainSeq">
+                <p:childTnLst>
+                  <p:par>
+                    <p:cTn id="3" fill="hold">
+                      <p:stCondLst>
+                        <p:cond delay="indefinite"/>
+                      </p:stCondLst>
+                      <p:childTnLst>
+                        <p:par>
+                          <p:cTn id="4" fill="hold">
+                            <p:stCondLst>
+                              <p:cond delay="0"/>
+                            </p:stCondLst>
+                            <p:childTnLst>
+                              <p:par>
+                                <p:cTn id="5" presetID="10" presetClass="entr" presetSubtype="0" fill="hold" nodeType="clickEffect">
+                                  <p:stCondLst>
+                                    <p:cond delay="0"/>
+                                  </p:stCondLst>
+                                  <p:childTnLst>
+                                    <p:set>
+                                      <p:cBhvr>
+                                        <p:cTn id="6" dur="1" fill="hold">
+                                          <p:stCondLst>
+                                            <p:cond delay="0"/>
+                                          </p:stCondLst>
+                                        </p:cTn>
+                                        <p:tgtEl>
+                                          <p:spTgt spid="8"/>
+                                        </p:tgtEl>
+                                        <p:attrNameLst>
+                                          <p:attrName>style.visibility</p:attrName>
+                                        </p:attrNameLst>
+                                      </p:cBhvr>
+                                      <p:to>
+                                        <p:strVal val="visible"/>
+                                      </p:to>
+                                    </p:set>
+                                    <p:animEffect transition="in" filter="fade">
+                                      <p:cBhvr>
+                                        <p:cTn id="7" dur="500"/>
+                                        <p:tgtEl>
+                                          <p:spTgt spid="8"/>
+                                        </p:tgtEl>
+                                      </p:cBhvr>
+                                    </p:animEffect>
+                                  </p:childTnLst>
+                                </p:cTn>
+                              </p:par>
+                            </p:childTnLst>
+                          </p:cTn>
+                        </p:par>
+                      </p:childTnLst>
+                    </p:cTn>
+                  </p:par>
+                </p:childTnLst>
+              </p:cTn>
+              <p:prevCondLst>
+                <p:cond evt="onPrev" delay="0">
+                  <p:tgtEl>
+                    <p:sldTgt/>
+                  </p:tgtEl>
+                </p:cond>
+              </p:prevCondLst>
+              <p:nextCondLst>
+                <p:cond evt="onNext" delay="0">
+                  <p:tgtEl>
+                    <p:sldTgt/>
+                  </p:tgtEl>
+                </p:cond>
+              </p:nextCondLst>
+            </p:seq>
+          </p:childTnLst>
+        </p:cTn>
+      </p:par>
+    </p:tnLst>
+  </p:timing>
+</p:sld>
+</file>
+
+<file path=ppt/slides/slide17.xml><?xml version="1.0" encoding="utf-8"?>
+<p:sld xmlns:a="http://schemas.openxmlformats.org/drawingml/2006/main" xmlns:r="http://schemas.openxmlformats.org/officeDocument/2006/relationships" xmlns:p="http://schemas.openxmlformats.org/presentationml/2006/main">
+  <p:cSld>
+    <p:spTree>
+      <p:nvGrpSpPr>
+        <p:cNvPr id="1" name=""/>
+        <p:cNvGrpSpPr/>
+        <p:nvPr/>
+      </p:nvGrpSpPr>
+      <p:grpSpPr>
+        <a:xfrm>
+          <a:off x="0" y="0"/>
+          <a:ext cx="0" cy="0"/>
+          <a:chOff x="0" y="0"/>
+          <a:chExt cx="0" cy="0"/>
+        </a:xfrm>
+      </p:grpSpPr>
     </p:spTree>
   </p:cSld>
   <p:clrMapOvr>
@@ -7359,7 +10545,7 @@
 </p:sld>
 </file>
 
-<file path=ppt/slides/slide13.xml><?xml version="1.0" encoding="utf-8"?>
+<file path=ppt/slides/slide18.xml><?xml version="1.0" encoding="utf-8"?>
 <p:sld xmlns:a="http://schemas.openxmlformats.org/drawingml/2006/main" xmlns:r="http://schemas.openxmlformats.org/officeDocument/2006/relationships" xmlns:p="http://schemas.openxmlformats.org/presentationml/2006/main">
   <p:cSld>
     <p:spTree>
@@ -12205,21 +15391,6 @@
 </file>
 
 <file path=customXml/item1.xml><?xml version="1.0" encoding="utf-8"?>
-<?mso-contentType ?>
-<FormTemplates xmlns="http://schemas.microsoft.com/sharepoint/v3/contenttype/forms">
-  <Display>DocumentLibraryForm</Display>
-  <Edit>DocumentLibraryForm</Edit>
-  <New>DocumentLibraryForm</New>
-</FormTemplates>
-</file>
-
-<file path=customXml/item2.xml><?xml version="1.0" encoding="utf-8"?>
-<p:properties xmlns:p="http://schemas.microsoft.com/office/2006/metadata/properties" xmlns:xsi="http://www.w3.org/2001/XMLSchema-instance">
-  <documentManagement/>
-</p:properties>
-</file>
-
-<file path=customXml/item3.xml><?xml version="1.0" encoding="utf-8"?>
 <ct:contentTypeSchema xmlns:ct="http://schemas.microsoft.com/office/2006/metadata/contentType" xmlns:ma="http://schemas.microsoft.com/office/2006/metadata/properties/metaAttributes" ct:_="" ma:_="" ma:contentTypeName="Document" ma:contentTypeID="0x010100EF3E94E2ACCF6D4EAE5CDD73AD546E17" ma:contentTypeVersion="0" ma:contentTypeDescription="Create a new document." ma:contentTypeScope="" ma:versionID="bb1449a0cfc4203701bc69f953314dcb">
   <xsd:schema xmlns:xsd="http://www.w3.org/2001/XMLSchema" xmlns:p="http://schemas.microsoft.com/office/2006/metadata/properties" targetNamespace="http://schemas.microsoft.com/office/2006/metadata/properties" ma:root="true" ma:fieldsID="4aeb20c0e3442673af7ee10786458764">
     <xsd:element name="properties">
@@ -12268,10 +15439,32 @@
 </ct:contentTypeSchema>
 </file>
 
+<file path=customXml/item2.xml><?xml version="1.0" encoding="utf-8"?>
+<p:properties xmlns:p="http://schemas.microsoft.com/office/2006/metadata/properties" xmlns:xsi="http://www.w3.org/2001/XMLSchema-instance">
+  <documentManagement/>
+</p:properties>
+</file>
+
+<file path=customXml/item3.xml><?xml version="1.0" encoding="utf-8"?>
+<?mso-contentType ?>
+<FormTemplates xmlns="http://schemas.microsoft.com/sharepoint/v3/contenttype/forms">
+  <Display>DocumentLibraryForm</Display>
+  <Edit>DocumentLibraryForm</Edit>
+  <New>DocumentLibraryForm</New>
+</FormTemplates>
+</file>
+
 <file path=customXml/itemProps1.xml><?xml version="1.0" encoding="utf-8"?>
-<ds:datastoreItem xmlns:ds="http://schemas.openxmlformats.org/officeDocument/2006/customXml" ds:itemID="{AF2462E9-E3C6-4B9B-800D-1AA92DB6FEE6}">
+<ds:datastoreItem xmlns:ds="http://schemas.openxmlformats.org/officeDocument/2006/customXml" ds:itemID="{1FBAA56A-8348-4CD3-A624-434B0E404A2E}">
   <ds:schemaRefs>
-    <ds:schemaRef ds:uri="http://schemas.microsoft.com/sharepoint/v3/contenttype/forms"/>
+    <ds:schemaRef ds:uri="http://schemas.microsoft.com/office/2006/metadata/contentType"/>
+    <ds:schemaRef ds:uri="http://schemas.microsoft.com/office/2006/metadata/properties/metaAttributes"/>
+    <ds:schemaRef ds:uri="http://www.w3.org/2001/XMLSchema"/>
+    <ds:schemaRef ds:uri="http://schemas.microsoft.com/office/2006/metadata/properties"/>
+    <ds:schemaRef ds:uri="http://schemas.openxmlformats.org/package/2006/metadata/core-properties"/>
+    <ds:schemaRef ds:uri="http://purl.org/dc/elements/1.1/"/>
+    <ds:schemaRef ds:uri="http://purl.org/dc/terms/"/>
+    <ds:schemaRef ds:uri="http://schemas.microsoft.com/office/internal/2005/internalDocumentation"/>
   </ds:schemaRefs>
 </ds:datastoreItem>
 </file>
@@ -12291,16 +15484,9 @@
 </file>
 
 <file path=customXml/itemProps3.xml><?xml version="1.0" encoding="utf-8"?>
-<ds:datastoreItem xmlns:ds="http://schemas.openxmlformats.org/officeDocument/2006/customXml" ds:itemID="{1FBAA56A-8348-4CD3-A624-434B0E404A2E}">
+<ds:datastoreItem xmlns:ds="http://schemas.openxmlformats.org/officeDocument/2006/customXml" ds:itemID="{AF2462E9-E3C6-4B9B-800D-1AA92DB6FEE6}">
   <ds:schemaRefs>
-    <ds:schemaRef ds:uri="http://schemas.microsoft.com/office/2006/metadata/contentType"/>
-    <ds:schemaRef ds:uri="http://schemas.microsoft.com/office/2006/metadata/properties/metaAttributes"/>
-    <ds:schemaRef ds:uri="http://www.w3.org/2001/XMLSchema"/>
-    <ds:schemaRef ds:uri="http://schemas.microsoft.com/office/2006/metadata/properties"/>
-    <ds:schemaRef ds:uri="http://schemas.openxmlformats.org/package/2006/metadata/core-properties"/>
-    <ds:schemaRef ds:uri="http://purl.org/dc/elements/1.1/"/>
-    <ds:schemaRef ds:uri="http://purl.org/dc/terms/"/>
-    <ds:schemaRef ds:uri="http://schemas.microsoft.com/office/internal/2005/internalDocumentation"/>
+    <ds:schemaRef ds:uri="http://schemas.microsoft.com/sharepoint/v3/contenttype/forms"/>
   </ds:schemaRefs>
 </ds:datastoreItem>
 </file>
</xml_diff>

<commit_message>
[db] add embedded query op
</commit_message>
<xml_diff>
--- a/db/mongodb/2017/materials/MongoDB_CH2(2)_Query.pptx
+++ b/db/mongodb/2017/materials/MongoDB_CH2(2)_Query.pptx
@@ -8,7 +8,7 @@
     <p:sldMasterId id="2147483652" r:id="rId7"/>
   </p:sldMasterIdLst>
   <p:notesMasterIdLst>
-    <p:notesMasterId r:id="rId26"/>
+    <p:notesMasterId r:id="rId31"/>
   </p:notesMasterIdLst>
   <p:sldIdLst>
     <p:sldId id="281" r:id="rId8"/>
@@ -27,8 +27,13 @@
     <p:sldId id="443" r:id="rId21"/>
     <p:sldId id="444" r:id="rId22"/>
     <p:sldId id="445" r:id="rId23"/>
-    <p:sldId id="264" r:id="rId24"/>
-    <p:sldId id="265" r:id="rId25"/>
+    <p:sldId id="446" r:id="rId24"/>
+    <p:sldId id="447" r:id="rId25"/>
+    <p:sldId id="448" r:id="rId26"/>
+    <p:sldId id="449" r:id="rId27"/>
+    <p:sldId id="450" r:id="rId28"/>
+    <p:sldId id="264" r:id="rId29"/>
+    <p:sldId id="265" r:id="rId30"/>
   </p:sldIdLst>
   <p:sldSz cx="9144000" cy="6858000" type="screen4x3"/>
   <p:notesSz cx="6858000" cy="9144000"/>
@@ -10537,7 +10542,61 @@
           <a:chExt cx="0" cy="0"/>
         </a:xfrm>
       </p:grpSpPr>
+      <p:sp>
+        <p:nvSpPr>
+          <p:cNvPr id="2" name="Text Placeholder 1"/>
+          <p:cNvSpPr>
+            <a:spLocks noGrp="1"/>
+          </p:cNvSpPr>
+          <p:nvPr>
+            <p:ph type="body" sz="quarter" idx="14"/>
+          </p:nvPr>
+        </p:nvSpPr>
+        <p:spPr>
+          <a:xfrm>
+            <a:off x="1031080" y="1712742"/>
+            <a:ext cx="7122319" cy="1200329"/>
+          </a:xfrm>
+        </p:spPr>
+        <p:txBody>
+          <a:bodyPr/>
+          <a:lstStyle/>
+          <a:p>
+            <a:r>
+              <a:rPr lang="en-US" dirty="0"/>
+              <a:t>Query  Operators: Embedded Document</a:t>
+            </a:r>
+          </a:p>
+        </p:txBody>
+      </p:sp>
+      <p:sp>
+        <p:nvSpPr>
+          <p:cNvPr id="3" name="Text Placeholder 2"/>
+          <p:cNvSpPr>
+            <a:spLocks noGrp="1"/>
+          </p:cNvSpPr>
+          <p:nvPr>
+            <p:ph type="body" sz="quarter" idx="11"/>
+          </p:nvPr>
+        </p:nvSpPr>
+        <p:spPr/>
+        <p:txBody>
+          <a:bodyPr/>
+          <a:lstStyle/>
+          <a:p>
+            <a:r>
+              <a:rPr lang="en-US" dirty="0"/>
+              <a:t>4</a:t>
+            </a:r>
+          </a:p>
+        </p:txBody>
+      </p:sp>
     </p:spTree>
+    <p:extLst>
+      <p:ext uri="{BB962C8B-B14F-4D97-AF65-F5344CB8AC3E}">
+        <p14:creationId xmlns:p14="http://schemas.microsoft.com/office/powerpoint/2010/main" val="4138688211"/>
+      </p:ext>
+    </p:extLst>
   </p:cSld>
   <p:clrMapOvr>
     <a:masterClrMapping/>
@@ -10562,11 +10621,853 @@
           <a:chExt cx="0" cy="0"/>
         </a:xfrm>
       </p:grpSpPr>
+      <p:sp>
+        <p:nvSpPr>
+          <p:cNvPr id="2" name="Text Placeholder 1"/>
+          <p:cNvSpPr>
+            <a:spLocks noGrp="1"/>
+          </p:cNvSpPr>
+          <p:nvPr>
+            <p:ph type="body" sz="quarter" idx="13"/>
+          </p:nvPr>
+        </p:nvSpPr>
+        <p:spPr/>
+        <p:txBody>
+          <a:bodyPr/>
+          <a:lstStyle/>
+          <a:p>
+            <a:r>
+              <a:rPr lang="en-US" dirty="0"/>
+              <a:t>4</a:t>
+            </a:r>
+          </a:p>
+        </p:txBody>
+      </p:sp>
+      <p:sp>
+        <p:nvSpPr>
+          <p:cNvPr id="3" name="Text Placeholder 2"/>
+          <p:cNvSpPr>
+            <a:spLocks noGrp="1"/>
+          </p:cNvSpPr>
+          <p:nvPr>
+            <p:ph type="body" sz="quarter" idx="14"/>
+          </p:nvPr>
+        </p:nvSpPr>
+        <p:spPr/>
+        <p:txBody>
+          <a:bodyPr/>
+          <a:lstStyle/>
+          <a:p>
+            <a:r>
+              <a:rPr lang="en-US" dirty="0"/>
+              <a:t>Query  Operators: Embedded Document</a:t>
+            </a:r>
+            <a:endParaRPr lang="en-US" altLang="zh-CN" dirty="0"/>
+          </a:p>
+          <a:p>
+            <a:endParaRPr lang="en-US" altLang="zh-CN" dirty="0"/>
+          </a:p>
+          <a:p>
+            <a:endParaRPr lang="en-US" dirty="0"/>
+          </a:p>
+          <a:p>
+            <a:endParaRPr lang="en-US" dirty="0"/>
+          </a:p>
+        </p:txBody>
+      </p:sp>
+      <p:sp>
+        <p:nvSpPr>
+          <p:cNvPr id="9" name="Rectangle 1"/>
+          <p:cNvSpPr>
+            <a:spLocks noChangeArrowheads="1"/>
+          </p:cNvSpPr>
+          <p:nvPr/>
+        </p:nvSpPr>
+        <p:spPr bwMode="auto">
+          <a:xfrm>
+            <a:off x="344129" y="1828800"/>
+            <a:ext cx="8568952" cy="2954655"/>
+          </a:xfrm>
+          <a:prstGeom prst="rect">
+            <a:avLst/>
+          </a:prstGeom>
+          <a:noFill/>
+          <a:ln w="9525" cmpd="sng">
+            <a:noFill/>
+            <a:miter lim="800000"/>
+            <a:headEnd/>
+            <a:tailEnd/>
+          </a:ln>
+          <a:effectLst/>
+        </p:spPr>
+        <p:txBody>
+          <a:bodyPr vert="horz" wrap="square" lIns="166635" tIns="0" rIns="0" bIns="0" numCol="1" anchor="ctr" anchorCtr="0" compatLnSpc="1">
+            <a:prstTxWarp prst="textNoShape">
+              <a:avLst/>
+            </a:prstTxWarp>
+            <a:spAutoFit/>
+          </a:bodyPr>
+          <a:lstStyle/>
+          <a:p>
+            <a:pPr eaLnBrk="0" hangingPunct="0"/>
+            <a:r>
+              <a:rPr kumimoji="0" lang="en-US" altLang="zh-CN" sz="3200" b="0" i="0" u="none" strike="noStrike" cap="none" normalizeH="0" baseline="0" dirty="0">
+                <a:ln>
+                  <a:noFill/>
+                </a:ln>
+                <a:effectLst/>
+                <a:latin typeface="微软雅黑" pitchFamily="34" charset="-122"/>
+                <a:ea typeface="宋体" pitchFamily="2" charset="-122"/>
+              </a:rPr>
+              <a:t>1.</a:t>
+            </a:r>
+            <a:r>
+              <a:rPr lang="en-US" sz="3200" b="1" dirty="0"/>
+              <a:t> </a:t>
+            </a:r>
+            <a:r>
+              <a:rPr lang="en-US" sz="3200" b="1" dirty="0">
+                <a:solidFill>
+                  <a:srgbClr val="2D75BC"/>
+                </a:solidFill>
+              </a:rPr>
+              <a:t>Exact Match </a:t>
+            </a:r>
+            <a:r>
+              <a:rPr lang="en-US" sz="3200" b="1" dirty="0"/>
+              <a:t>on the Embedded Document</a:t>
+            </a:r>
+            <a:endParaRPr kumimoji="0" lang="en-US" altLang="zh-CN" sz="3200" b="0" i="0" u="none" strike="noStrike" cap="none" normalizeH="0" baseline="0" dirty="0">
+              <a:ln>
+                <a:noFill/>
+              </a:ln>
+              <a:effectLst/>
+              <a:latin typeface="Arial Unicode MS" pitchFamily="34" charset="-128"/>
+              <a:ea typeface="宋体" pitchFamily="2" charset="-122"/>
+            </a:endParaRPr>
+          </a:p>
+          <a:p>
+            <a:pPr lvl="0" eaLnBrk="0" hangingPunct="0"/>
+            <a:r>
+              <a:rPr lang="en-US" sz="3200" dirty="0"/>
+              <a:t>{</a:t>
+            </a:r>
+            <a:r>
+              <a:rPr lang="en-US" altLang="zh-CN" sz="3200" dirty="0" err="1">
+                <a:latin typeface="Arial Unicode MS" pitchFamily="34" charset="-128"/>
+              </a:rPr>
+              <a:t>addr</a:t>
+            </a:r>
+            <a:r>
+              <a:rPr lang="en-US" altLang="zh-CN" sz="3200" dirty="0">
+                <a:latin typeface="Arial Unicode MS" pitchFamily="34" charset="-128"/>
+              </a:rPr>
+              <a:t> </a:t>
+            </a:r>
+            <a:r>
+              <a:rPr lang="en-US" sz="3200" dirty="0"/>
+              <a:t>: { </a:t>
+            </a:r>
+            <a:r>
+              <a:rPr lang="en-US" altLang="zh-CN" sz="3200" dirty="0">
+                <a:latin typeface="Arial Unicode MS" pitchFamily="34" charset="-128"/>
+              </a:rPr>
+              <a:t>code</a:t>
+            </a:r>
+            <a:r>
+              <a:rPr lang="en-US" sz="3200" dirty="0"/>
+              <a:t>: 5 , city: ‘</a:t>
+            </a:r>
+            <a:r>
+              <a:rPr lang="en-US" sz="3200" dirty="0">
+                <a:latin typeface="Arial Unicode MS" pitchFamily="34" charset="-128"/>
+              </a:rPr>
+              <a:t>GZ</a:t>
+            </a:r>
+            <a:r>
+              <a:rPr lang="en-US" sz="3200" dirty="0"/>
+              <a:t>'} }</a:t>
+            </a:r>
+            <a:endParaRPr kumimoji="0" lang="en-US" altLang="zh-CN" sz="3200" b="0" i="0" u="none" strike="noStrike" cap="none" normalizeH="0" baseline="0" dirty="0">
+              <a:ln>
+                <a:noFill/>
+              </a:ln>
+              <a:effectLst/>
+              <a:latin typeface="Arial Unicode MS" pitchFamily="34" charset="-128"/>
+              <a:ea typeface="宋体" pitchFamily="2" charset="-122"/>
+            </a:endParaRPr>
+          </a:p>
+          <a:p>
+            <a:pPr marL="0" marR="0" lvl="0" indent="0" algn="l" defTabSz="914400" rtl="0" eaLnBrk="0" fontAlgn="base" latinLnBrk="0" hangingPunct="0">
+              <a:lnSpc>
+                <a:spcPct val="100000"/>
+              </a:lnSpc>
+              <a:spcBef>
+                <a:spcPct val="0"/>
+              </a:spcBef>
+              <a:spcAft>
+                <a:spcPct val="0"/>
+              </a:spcAft>
+              <a:buClrTx/>
+              <a:buSzTx/>
+              <a:tabLst/>
+            </a:pPr>
+            <a:endParaRPr kumimoji="0" lang="en-US" altLang="zh-CN" sz="3200" b="0" i="0" u="none" strike="noStrike" cap="none" normalizeH="0" baseline="0" dirty="0">
+              <a:ln>
+                <a:noFill/>
+              </a:ln>
+              <a:effectLst/>
+              <a:latin typeface="Arial Unicode MS" pitchFamily="34" charset="-128"/>
+              <a:ea typeface="宋体" pitchFamily="2" charset="-122"/>
+            </a:endParaRPr>
+          </a:p>
+          <a:p>
+            <a:pPr eaLnBrk="0" hangingPunct="0"/>
+            <a:r>
+              <a:rPr kumimoji="0" lang="en-US" altLang="zh-CN" sz="3200" b="0" i="0" u="none" strike="noStrike" cap="none" normalizeH="0" baseline="0" dirty="0">
+                <a:ln>
+                  <a:noFill/>
+                </a:ln>
+                <a:effectLst/>
+                <a:latin typeface="微软雅黑" pitchFamily="34" charset="-122"/>
+                <a:ea typeface="宋体" pitchFamily="2" charset="-122"/>
+              </a:rPr>
+              <a:t>2.</a:t>
+            </a:r>
+            <a:r>
+              <a:rPr lang="en-US" sz="3200" b="1" dirty="0"/>
+              <a:t> </a:t>
+            </a:r>
+            <a:r>
+              <a:rPr lang="en-US" sz="3200" b="1" dirty="0">
+                <a:solidFill>
+                  <a:srgbClr val="2D75BC"/>
+                </a:solidFill>
+              </a:rPr>
+              <a:t>Equality Match on Fields within </a:t>
+            </a:r>
+            <a:r>
+              <a:rPr lang="en-US" sz="3200" b="1" dirty="0"/>
+              <a:t>an Embedded Document</a:t>
+            </a:r>
+            <a:endParaRPr kumimoji="0" lang="zh-CN" sz="3200" b="0" i="0" u="none" strike="noStrike" cap="none" normalizeH="0" baseline="0" dirty="0">
+              <a:ln>
+                <a:noFill/>
+              </a:ln>
+              <a:effectLst/>
+              <a:latin typeface="Arial" pitchFamily="34" charset="0"/>
+              <a:ea typeface="宋体" pitchFamily="2" charset="-122"/>
+            </a:endParaRPr>
+          </a:p>
+          <a:p>
+            <a:pPr lvl="0" eaLnBrk="0" hangingPunct="0"/>
+            <a:r>
+              <a:rPr lang="en-US" altLang="zh-CN" sz="3200" dirty="0">
+                <a:latin typeface="Arial Unicode MS" pitchFamily="34" charset="-128"/>
+              </a:rPr>
+              <a:t>{'</a:t>
+            </a:r>
+            <a:r>
+              <a:rPr lang="en-US" altLang="zh-CN" sz="3200" dirty="0" err="1">
+                <a:latin typeface="Arial Unicode MS" pitchFamily="34" charset="-128"/>
+              </a:rPr>
+              <a:t>addr.code</a:t>
+            </a:r>
+            <a:r>
+              <a:rPr lang="en-US" altLang="zh-CN" sz="3200" dirty="0">
+                <a:latin typeface="Arial Unicode MS" pitchFamily="34" charset="-128"/>
+              </a:rPr>
+              <a:t>' : 5 , '</a:t>
+            </a:r>
+            <a:r>
+              <a:rPr lang="en-US" altLang="zh-CN" sz="3200" dirty="0" err="1">
+                <a:latin typeface="Arial Unicode MS" pitchFamily="34" charset="-128"/>
+              </a:rPr>
+              <a:t>addr.city</a:t>
+            </a:r>
+            <a:r>
+              <a:rPr lang="en-US" altLang="zh-CN" sz="3200" dirty="0">
+                <a:latin typeface="Arial Unicode MS" pitchFamily="34" charset="-128"/>
+              </a:rPr>
+              <a:t>' : ‘GZ' }</a:t>
+            </a:r>
+            <a:endParaRPr kumimoji="0" lang="en-US" altLang="zh-CN" sz="3200" b="0" i="0" u="none" strike="noStrike" cap="none" normalizeH="0" baseline="0" dirty="0">
+              <a:ln>
+                <a:noFill/>
+              </a:ln>
+              <a:effectLst/>
+              <a:latin typeface="Arial" pitchFamily="34" charset="0"/>
+              <a:ea typeface="宋体" pitchFamily="2" charset="-122"/>
+            </a:endParaRPr>
+          </a:p>
+        </p:txBody>
+      </p:sp>
     </p:spTree>
+    <p:extLst>
+      <p:ext uri="{BB962C8B-B14F-4D97-AF65-F5344CB8AC3E}">
+        <p14:creationId xmlns:p14="http://schemas.microsoft.com/office/powerpoint/2010/main" val="2087391143"/>
+      </p:ext>
+    </p:extLst>
   </p:cSld>
   <p:clrMapOvr>
     <a:masterClrMapping/>
   </p:clrMapOvr>
+</p:sld>
+</file>
+
+<file path=ppt/slides/slide19.xml><?xml version="1.0" encoding="utf-8"?>
+<p:sld xmlns:a="http://schemas.openxmlformats.org/drawingml/2006/main" xmlns:r="http://schemas.openxmlformats.org/officeDocument/2006/relationships" xmlns:p="http://schemas.openxmlformats.org/presentationml/2006/main">
+  <p:cSld>
+    <p:spTree>
+      <p:nvGrpSpPr>
+        <p:cNvPr id="1" name=""/>
+        <p:cNvGrpSpPr/>
+        <p:nvPr/>
+      </p:nvGrpSpPr>
+      <p:grpSpPr>
+        <a:xfrm>
+          <a:off x="0" y="0"/>
+          <a:ext cx="0" cy="0"/>
+          <a:chOff x="0" y="0"/>
+          <a:chExt cx="0" cy="0"/>
+        </a:xfrm>
+      </p:grpSpPr>
+      <p:sp>
+        <p:nvSpPr>
+          <p:cNvPr id="2" name="Text Placeholder 1"/>
+          <p:cNvSpPr>
+            <a:spLocks noGrp="1"/>
+          </p:cNvSpPr>
+          <p:nvPr>
+            <p:ph type="body" sz="quarter" idx="13"/>
+          </p:nvPr>
+        </p:nvSpPr>
+        <p:spPr/>
+        <p:txBody>
+          <a:bodyPr/>
+          <a:lstStyle/>
+          <a:p>
+            <a:r>
+              <a:rPr lang="en-US" dirty="0"/>
+              <a:t>4</a:t>
+            </a:r>
+          </a:p>
+        </p:txBody>
+      </p:sp>
+      <p:sp>
+        <p:nvSpPr>
+          <p:cNvPr id="3" name="Text Placeholder 2"/>
+          <p:cNvSpPr>
+            <a:spLocks noGrp="1"/>
+          </p:cNvSpPr>
+          <p:nvPr>
+            <p:ph type="body" sz="quarter" idx="14"/>
+          </p:nvPr>
+        </p:nvSpPr>
+        <p:spPr/>
+        <p:txBody>
+          <a:bodyPr/>
+          <a:lstStyle/>
+          <a:p>
+            <a:r>
+              <a:rPr lang="en-US" dirty="0"/>
+              <a:t>Query  Operators: Embedded Document</a:t>
+            </a:r>
+            <a:endParaRPr lang="en-US" altLang="zh-CN" dirty="0"/>
+          </a:p>
+          <a:p>
+            <a:endParaRPr lang="en-US" altLang="zh-CN" dirty="0"/>
+          </a:p>
+          <a:p>
+            <a:endParaRPr lang="en-US" altLang="zh-CN" dirty="0"/>
+          </a:p>
+          <a:p>
+            <a:endParaRPr lang="en-US" dirty="0"/>
+          </a:p>
+          <a:p>
+            <a:endParaRPr lang="en-US" dirty="0"/>
+          </a:p>
+        </p:txBody>
+      </p:sp>
+      <p:sp>
+        <p:nvSpPr>
+          <p:cNvPr id="7" name="TextBox 2"/>
+          <p:cNvSpPr txBox="1">
+            <a:spLocks noChangeArrowheads="1"/>
+          </p:cNvSpPr>
+          <p:nvPr/>
+        </p:nvSpPr>
+        <p:spPr bwMode="auto">
+          <a:xfrm>
+            <a:off x="0" y="2824316"/>
+            <a:ext cx="8824913" cy="954107"/>
+          </a:xfrm>
+          <a:prstGeom prst="rect">
+            <a:avLst/>
+          </a:prstGeom>
+          <a:noFill/>
+          <a:ln w="9525">
+            <a:noFill/>
+            <a:miter lim="800000"/>
+            <a:headEnd/>
+            <a:tailEnd/>
+          </a:ln>
+        </p:spPr>
+        <p:txBody>
+          <a:bodyPr>
+            <a:spAutoFit/>
+          </a:bodyPr>
+          <a:lstStyle>
+            <a:lvl1pPr eaLnBrk="0" hangingPunct="0">
+              <a:defRPr>
+                <a:solidFill>
+                  <a:schemeClr val="tx1"/>
+                </a:solidFill>
+                <a:latin typeface="Arial" charset="0"/>
+                <a:ea typeface="宋体" pitchFamily="2" charset="-122"/>
+              </a:defRPr>
+            </a:lvl1pPr>
+            <a:lvl2pPr marL="742950" indent="-285750" eaLnBrk="0" hangingPunct="0">
+              <a:defRPr>
+                <a:solidFill>
+                  <a:schemeClr val="tx1"/>
+                </a:solidFill>
+                <a:latin typeface="Arial" charset="0"/>
+                <a:ea typeface="宋体" pitchFamily="2" charset="-122"/>
+              </a:defRPr>
+            </a:lvl2pPr>
+            <a:lvl3pPr marL="1143000" indent="-228600" eaLnBrk="0" hangingPunct="0">
+              <a:defRPr>
+                <a:solidFill>
+                  <a:schemeClr val="tx1"/>
+                </a:solidFill>
+                <a:latin typeface="Arial" charset="0"/>
+                <a:ea typeface="宋体" pitchFamily="2" charset="-122"/>
+              </a:defRPr>
+            </a:lvl3pPr>
+            <a:lvl4pPr marL="1600200" indent="-228600" eaLnBrk="0" hangingPunct="0">
+              <a:defRPr>
+                <a:solidFill>
+                  <a:schemeClr val="tx1"/>
+                </a:solidFill>
+                <a:latin typeface="Arial" charset="0"/>
+                <a:ea typeface="宋体" pitchFamily="2" charset="-122"/>
+              </a:defRPr>
+            </a:lvl4pPr>
+            <a:lvl5pPr marL="2057400" indent="-228600" eaLnBrk="0" hangingPunct="0">
+              <a:defRPr>
+                <a:solidFill>
+                  <a:schemeClr val="tx1"/>
+                </a:solidFill>
+                <a:latin typeface="Arial" charset="0"/>
+                <a:ea typeface="宋体" pitchFamily="2" charset="-122"/>
+              </a:defRPr>
+            </a:lvl5pPr>
+            <a:lvl6pPr marL="2514600" indent="-228600" eaLnBrk="0" fontAlgn="base" hangingPunct="0">
+              <a:spcBef>
+                <a:spcPct val="0"/>
+              </a:spcBef>
+              <a:spcAft>
+                <a:spcPct val="0"/>
+              </a:spcAft>
+              <a:defRPr>
+                <a:solidFill>
+                  <a:schemeClr val="tx1"/>
+                </a:solidFill>
+                <a:latin typeface="Arial" charset="0"/>
+                <a:ea typeface="宋体" pitchFamily="2" charset="-122"/>
+              </a:defRPr>
+            </a:lvl6pPr>
+            <a:lvl7pPr marL="2971800" indent="-228600" eaLnBrk="0" fontAlgn="base" hangingPunct="0">
+              <a:spcBef>
+                <a:spcPct val="0"/>
+              </a:spcBef>
+              <a:spcAft>
+                <a:spcPct val="0"/>
+              </a:spcAft>
+              <a:defRPr>
+                <a:solidFill>
+                  <a:schemeClr val="tx1"/>
+                </a:solidFill>
+                <a:latin typeface="Arial" charset="0"/>
+                <a:ea typeface="宋体" pitchFamily="2" charset="-122"/>
+              </a:defRPr>
+            </a:lvl7pPr>
+            <a:lvl8pPr marL="3429000" indent="-228600" eaLnBrk="0" fontAlgn="base" hangingPunct="0">
+              <a:spcBef>
+                <a:spcPct val="0"/>
+              </a:spcBef>
+              <a:spcAft>
+                <a:spcPct val="0"/>
+              </a:spcAft>
+              <a:defRPr>
+                <a:solidFill>
+                  <a:schemeClr val="tx1"/>
+                </a:solidFill>
+                <a:latin typeface="Arial" charset="0"/>
+                <a:ea typeface="宋体" pitchFamily="2" charset="-122"/>
+              </a:defRPr>
+            </a:lvl8pPr>
+            <a:lvl9pPr marL="3886200" indent="-228600" eaLnBrk="0" fontAlgn="base" hangingPunct="0">
+              <a:spcBef>
+                <a:spcPct val="0"/>
+              </a:spcBef>
+              <a:spcAft>
+                <a:spcPct val="0"/>
+              </a:spcAft>
+              <a:defRPr>
+                <a:solidFill>
+                  <a:schemeClr val="tx1"/>
+                </a:solidFill>
+                <a:latin typeface="Arial" charset="0"/>
+                <a:ea typeface="宋体" pitchFamily="2" charset="-122"/>
+              </a:defRPr>
+            </a:lvl9pPr>
+          </a:lstStyle>
+          <a:p>
+            <a:pPr eaLnBrk="1" hangingPunct="1"/>
+            <a:r>
+              <a:rPr lang="en-US" altLang="zh-CN" sz="2800" dirty="0">
+                <a:latin typeface="微软雅黑" panose="020B0503020204020204" pitchFamily="34" charset="-122"/>
+                <a:ea typeface="微软雅黑" panose="020B0503020204020204" pitchFamily="34" charset="-122"/>
+              </a:rPr>
+              <a:t>Query:</a:t>
+            </a:r>
+          </a:p>
+          <a:p>
+            <a:pPr eaLnBrk="1" hangingPunct="1"/>
+            <a:endParaRPr lang="en-US" altLang="zh-CN" sz="2800" dirty="0">
+              <a:solidFill>
+                <a:schemeClr val="bg1"/>
+              </a:solidFill>
+              <a:latin typeface="微软雅黑" pitchFamily="34" charset="-122"/>
+              <a:ea typeface="微软雅黑" pitchFamily="34" charset="-122"/>
+            </a:endParaRPr>
+          </a:p>
+        </p:txBody>
+      </p:sp>
+      <p:sp>
+        <p:nvSpPr>
+          <p:cNvPr id="14" name="TextBox 2"/>
+          <p:cNvSpPr txBox="1">
+            <a:spLocks noChangeArrowheads="1"/>
+          </p:cNvSpPr>
+          <p:nvPr/>
+        </p:nvSpPr>
+        <p:spPr bwMode="auto">
+          <a:xfrm>
+            <a:off x="-76200" y="4385718"/>
+            <a:ext cx="8824913" cy="954107"/>
+          </a:xfrm>
+          <a:prstGeom prst="rect">
+            <a:avLst/>
+          </a:prstGeom>
+          <a:noFill/>
+          <a:ln w="9525">
+            <a:noFill/>
+            <a:miter lim="800000"/>
+            <a:headEnd/>
+            <a:tailEnd/>
+          </a:ln>
+        </p:spPr>
+        <p:txBody>
+          <a:bodyPr>
+            <a:spAutoFit/>
+          </a:bodyPr>
+          <a:lstStyle>
+            <a:lvl1pPr eaLnBrk="0" hangingPunct="0">
+              <a:defRPr>
+                <a:solidFill>
+                  <a:schemeClr val="tx1"/>
+                </a:solidFill>
+                <a:latin typeface="Arial" charset="0"/>
+                <a:ea typeface="宋体" pitchFamily="2" charset="-122"/>
+              </a:defRPr>
+            </a:lvl1pPr>
+            <a:lvl2pPr marL="742950" indent="-285750" eaLnBrk="0" hangingPunct="0">
+              <a:defRPr>
+                <a:solidFill>
+                  <a:schemeClr val="tx1"/>
+                </a:solidFill>
+                <a:latin typeface="Arial" charset="0"/>
+                <a:ea typeface="宋体" pitchFamily="2" charset="-122"/>
+              </a:defRPr>
+            </a:lvl2pPr>
+            <a:lvl3pPr marL="1143000" indent="-228600" eaLnBrk="0" hangingPunct="0">
+              <a:defRPr>
+                <a:solidFill>
+                  <a:schemeClr val="tx1"/>
+                </a:solidFill>
+                <a:latin typeface="Arial" charset="0"/>
+                <a:ea typeface="宋体" pitchFamily="2" charset="-122"/>
+              </a:defRPr>
+            </a:lvl3pPr>
+            <a:lvl4pPr marL="1600200" indent="-228600" eaLnBrk="0" hangingPunct="0">
+              <a:defRPr>
+                <a:solidFill>
+                  <a:schemeClr val="tx1"/>
+                </a:solidFill>
+                <a:latin typeface="Arial" charset="0"/>
+                <a:ea typeface="宋体" pitchFamily="2" charset="-122"/>
+              </a:defRPr>
+            </a:lvl4pPr>
+            <a:lvl5pPr marL="2057400" indent="-228600" eaLnBrk="0" hangingPunct="0">
+              <a:defRPr>
+                <a:solidFill>
+                  <a:schemeClr val="tx1"/>
+                </a:solidFill>
+                <a:latin typeface="Arial" charset="0"/>
+                <a:ea typeface="宋体" pitchFamily="2" charset="-122"/>
+              </a:defRPr>
+            </a:lvl5pPr>
+            <a:lvl6pPr marL="2514600" indent="-228600" eaLnBrk="0" fontAlgn="base" hangingPunct="0">
+              <a:spcBef>
+                <a:spcPct val="0"/>
+              </a:spcBef>
+              <a:spcAft>
+                <a:spcPct val="0"/>
+              </a:spcAft>
+              <a:defRPr>
+                <a:solidFill>
+                  <a:schemeClr val="tx1"/>
+                </a:solidFill>
+                <a:latin typeface="Arial" charset="0"/>
+                <a:ea typeface="宋体" pitchFamily="2" charset="-122"/>
+              </a:defRPr>
+            </a:lvl6pPr>
+            <a:lvl7pPr marL="2971800" indent="-228600" eaLnBrk="0" fontAlgn="base" hangingPunct="0">
+              <a:spcBef>
+                <a:spcPct val="0"/>
+              </a:spcBef>
+              <a:spcAft>
+                <a:spcPct val="0"/>
+              </a:spcAft>
+              <a:defRPr>
+                <a:solidFill>
+                  <a:schemeClr val="tx1"/>
+                </a:solidFill>
+                <a:latin typeface="Arial" charset="0"/>
+                <a:ea typeface="宋体" pitchFamily="2" charset="-122"/>
+              </a:defRPr>
+            </a:lvl7pPr>
+            <a:lvl8pPr marL="3429000" indent="-228600" eaLnBrk="0" fontAlgn="base" hangingPunct="0">
+              <a:spcBef>
+                <a:spcPct val="0"/>
+              </a:spcBef>
+              <a:spcAft>
+                <a:spcPct val="0"/>
+              </a:spcAft>
+              <a:defRPr>
+                <a:solidFill>
+                  <a:schemeClr val="tx1"/>
+                </a:solidFill>
+                <a:latin typeface="Arial" charset="0"/>
+                <a:ea typeface="宋体" pitchFamily="2" charset="-122"/>
+              </a:defRPr>
+            </a:lvl8pPr>
+            <a:lvl9pPr marL="3886200" indent="-228600" eaLnBrk="0" fontAlgn="base" hangingPunct="0">
+              <a:spcBef>
+                <a:spcPct val="0"/>
+              </a:spcBef>
+              <a:spcAft>
+                <a:spcPct val="0"/>
+              </a:spcAft>
+              <a:defRPr>
+                <a:solidFill>
+                  <a:schemeClr val="tx1"/>
+                </a:solidFill>
+                <a:latin typeface="Arial" charset="0"/>
+                <a:ea typeface="宋体" pitchFamily="2" charset="-122"/>
+              </a:defRPr>
+            </a:lvl9pPr>
+          </a:lstStyle>
+          <a:p>
+            <a:pPr eaLnBrk="1" hangingPunct="1"/>
+            <a:r>
+              <a:rPr lang="en-US" altLang="zh-CN" sz="2800" dirty="0">
+                <a:latin typeface="微软雅黑" panose="020B0503020204020204" pitchFamily="34" charset="-122"/>
+                <a:ea typeface="微软雅黑" panose="020B0503020204020204" pitchFamily="34" charset="-122"/>
+              </a:rPr>
+              <a:t>MongoDB returns:</a:t>
+            </a:r>
+          </a:p>
+          <a:p>
+            <a:pPr eaLnBrk="1" hangingPunct="1"/>
+            <a:endParaRPr lang="en-US" altLang="zh-CN" sz="2800" dirty="0">
+              <a:solidFill>
+                <a:schemeClr val="bg1"/>
+              </a:solidFill>
+              <a:latin typeface="微软雅黑" pitchFamily="34" charset="-122"/>
+              <a:ea typeface="微软雅黑" pitchFamily="34" charset="-122"/>
+            </a:endParaRPr>
+          </a:p>
+        </p:txBody>
+      </p:sp>
+      <p:pic>
+        <p:nvPicPr>
+          <p:cNvPr id="6" name="Picture 5"/>
+          <p:cNvPicPr>
+            <a:picLocks noChangeAspect="1"/>
+          </p:cNvPicPr>
+          <p:nvPr/>
+        </p:nvPicPr>
+        <p:blipFill>
+          <a:blip r:embed="rId2"/>
+          <a:stretch>
+            <a:fillRect/>
+          </a:stretch>
+        </p:blipFill>
+        <p:spPr>
+          <a:xfrm>
+            <a:off x="17963" y="1143000"/>
+            <a:ext cx="9116423" cy="1676400"/>
+          </a:xfrm>
+          <a:prstGeom prst="rect">
+            <a:avLst/>
+          </a:prstGeom>
+        </p:spPr>
+      </p:pic>
+      <p:pic>
+        <p:nvPicPr>
+          <p:cNvPr id="9" name="Picture 8"/>
+          <p:cNvPicPr>
+            <a:picLocks noChangeAspect="1"/>
+          </p:cNvPicPr>
+          <p:nvPr/>
+        </p:nvPicPr>
+        <p:blipFill>
+          <a:blip r:embed="rId3"/>
+          <a:stretch>
+            <a:fillRect/>
+          </a:stretch>
+        </p:blipFill>
+        <p:spPr>
+          <a:xfrm>
+            <a:off x="0" y="3431611"/>
+            <a:ext cx="9134386" cy="584930"/>
+          </a:xfrm>
+          <a:prstGeom prst="rect">
+            <a:avLst/>
+          </a:prstGeom>
+        </p:spPr>
+      </p:pic>
+      <p:pic>
+        <p:nvPicPr>
+          <p:cNvPr id="10" name="Picture 9"/>
+          <p:cNvPicPr>
+            <a:picLocks noChangeAspect="1"/>
+          </p:cNvPicPr>
+          <p:nvPr/>
+        </p:nvPicPr>
+        <p:blipFill>
+          <a:blip r:embed="rId4"/>
+          <a:stretch>
+            <a:fillRect/>
+          </a:stretch>
+        </p:blipFill>
+        <p:spPr>
+          <a:xfrm>
+            <a:off x="17963" y="4862771"/>
+            <a:ext cx="9202238" cy="623629"/>
+          </a:xfrm>
+          <a:prstGeom prst="rect">
+            <a:avLst/>
+          </a:prstGeom>
+        </p:spPr>
+      </p:pic>
+    </p:spTree>
+    <p:extLst>
+      <p:ext uri="{BB962C8B-B14F-4D97-AF65-F5344CB8AC3E}">
+        <p14:creationId xmlns:p14="http://schemas.microsoft.com/office/powerpoint/2010/main" val="3491788848"/>
+      </p:ext>
+    </p:extLst>
+  </p:cSld>
+  <p:clrMapOvr>
+    <a:masterClrMapping/>
+  </p:clrMapOvr>
+  <p:timing>
+    <p:tnLst>
+      <p:par>
+        <p:cTn id="1" dur="indefinite" restart="never" nodeType="tmRoot">
+          <p:childTnLst>
+            <p:seq concurrent="1" nextAc="seek">
+              <p:cTn id="2" dur="indefinite" nodeType="mainSeq">
+                <p:childTnLst>
+                  <p:par>
+                    <p:cTn id="3" fill="hold">
+                      <p:stCondLst>
+                        <p:cond delay="indefinite"/>
+                      </p:stCondLst>
+                      <p:childTnLst>
+                        <p:par>
+                          <p:cTn id="4" fill="hold">
+                            <p:stCondLst>
+                              <p:cond delay="0"/>
+                            </p:stCondLst>
+                            <p:childTnLst>
+                              <p:par>
+                                <p:cTn id="5" presetID="10" presetClass="entr" presetSubtype="0" fill="hold" nodeType="clickEffect">
+                                  <p:stCondLst>
+                                    <p:cond delay="0"/>
+                                  </p:stCondLst>
+                                  <p:childTnLst>
+                                    <p:set>
+                                      <p:cBhvr>
+                                        <p:cTn id="6" dur="1" fill="hold">
+                                          <p:stCondLst>
+                                            <p:cond delay="0"/>
+                                          </p:stCondLst>
+                                        </p:cTn>
+                                        <p:tgtEl>
+                                          <p:spTgt spid="10"/>
+                                        </p:tgtEl>
+                                        <p:attrNameLst>
+                                          <p:attrName>style.visibility</p:attrName>
+                                        </p:attrNameLst>
+                                      </p:cBhvr>
+                                      <p:to>
+                                        <p:strVal val="visible"/>
+                                      </p:to>
+                                    </p:set>
+                                    <p:animEffect transition="in" filter="fade">
+                                      <p:cBhvr>
+                                        <p:cTn id="7" dur="500"/>
+                                        <p:tgtEl>
+                                          <p:spTgt spid="10"/>
+                                        </p:tgtEl>
+                                      </p:cBhvr>
+                                    </p:animEffect>
+                                  </p:childTnLst>
+                                </p:cTn>
+                              </p:par>
+                            </p:childTnLst>
+                          </p:cTn>
+                        </p:par>
+                      </p:childTnLst>
+                    </p:cTn>
+                  </p:par>
+                </p:childTnLst>
+              </p:cTn>
+              <p:prevCondLst>
+                <p:cond evt="onPrev" delay="0">
+                  <p:tgtEl>
+                    <p:sldTgt/>
+                  </p:tgtEl>
+                </p:cond>
+              </p:prevCondLst>
+              <p:nextCondLst>
+                <p:cond evt="onNext" delay="0">
+                  <p:tgtEl>
+                    <p:sldTgt/>
+                  </p:tgtEl>
+                </p:cond>
+              </p:nextCondLst>
+            </p:seq>
+          </p:childTnLst>
+        </p:cTn>
+      </p:par>
+    </p:tnLst>
+  </p:timing>
 </p:sld>
 </file>
 
@@ -11076,6 +11977,1168 @@
       <p:bldP spid="27" grpId="0" animBg="1"/>
     </p:bldLst>
   </p:timing>
+</p:sld>
+</file>
+
+<file path=ppt/slides/slide20.xml><?xml version="1.0" encoding="utf-8"?>
+<p:sld xmlns:a="http://schemas.openxmlformats.org/drawingml/2006/main" xmlns:r="http://schemas.openxmlformats.org/officeDocument/2006/relationships" xmlns:p="http://schemas.openxmlformats.org/presentationml/2006/main">
+  <p:cSld>
+    <p:spTree>
+      <p:nvGrpSpPr>
+        <p:cNvPr id="1" name=""/>
+        <p:cNvGrpSpPr/>
+        <p:nvPr/>
+      </p:nvGrpSpPr>
+      <p:grpSpPr>
+        <a:xfrm>
+          <a:off x="0" y="0"/>
+          <a:ext cx="0" cy="0"/>
+          <a:chOff x="0" y="0"/>
+          <a:chExt cx="0" cy="0"/>
+        </a:xfrm>
+      </p:grpSpPr>
+      <p:sp>
+        <p:nvSpPr>
+          <p:cNvPr id="2" name="Text Placeholder 1"/>
+          <p:cNvSpPr>
+            <a:spLocks noGrp="1"/>
+          </p:cNvSpPr>
+          <p:nvPr>
+            <p:ph type="body" sz="quarter" idx="13"/>
+          </p:nvPr>
+        </p:nvSpPr>
+        <p:spPr/>
+        <p:txBody>
+          <a:bodyPr/>
+          <a:lstStyle/>
+          <a:p>
+            <a:r>
+              <a:rPr lang="en-US" dirty="0"/>
+              <a:t>4</a:t>
+            </a:r>
+          </a:p>
+        </p:txBody>
+      </p:sp>
+      <p:sp>
+        <p:nvSpPr>
+          <p:cNvPr id="3" name="Text Placeholder 2"/>
+          <p:cNvSpPr>
+            <a:spLocks noGrp="1"/>
+          </p:cNvSpPr>
+          <p:nvPr>
+            <p:ph type="body" sz="quarter" idx="14"/>
+          </p:nvPr>
+        </p:nvSpPr>
+        <p:spPr/>
+        <p:txBody>
+          <a:bodyPr/>
+          <a:lstStyle/>
+          <a:p>
+            <a:r>
+              <a:rPr lang="en-US" dirty="0"/>
+              <a:t>Query  Operators: Embedded Document</a:t>
+            </a:r>
+            <a:endParaRPr lang="en-US" altLang="zh-CN" dirty="0"/>
+          </a:p>
+          <a:p>
+            <a:endParaRPr lang="en-US" altLang="zh-CN" dirty="0"/>
+          </a:p>
+          <a:p>
+            <a:endParaRPr lang="en-US" altLang="zh-CN" dirty="0"/>
+          </a:p>
+          <a:p>
+            <a:endParaRPr lang="en-US" dirty="0"/>
+          </a:p>
+          <a:p>
+            <a:endParaRPr lang="en-US" dirty="0"/>
+          </a:p>
+        </p:txBody>
+      </p:sp>
+      <p:sp>
+        <p:nvSpPr>
+          <p:cNvPr id="7" name="TextBox 2"/>
+          <p:cNvSpPr txBox="1">
+            <a:spLocks noChangeArrowheads="1"/>
+          </p:cNvSpPr>
+          <p:nvPr/>
+        </p:nvSpPr>
+        <p:spPr bwMode="auto">
+          <a:xfrm>
+            <a:off x="0" y="2824316"/>
+            <a:ext cx="8824913" cy="954107"/>
+          </a:xfrm>
+          <a:prstGeom prst="rect">
+            <a:avLst/>
+          </a:prstGeom>
+          <a:noFill/>
+          <a:ln w="9525">
+            <a:noFill/>
+            <a:miter lim="800000"/>
+            <a:headEnd/>
+            <a:tailEnd/>
+          </a:ln>
+        </p:spPr>
+        <p:txBody>
+          <a:bodyPr>
+            <a:spAutoFit/>
+          </a:bodyPr>
+          <a:lstStyle>
+            <a:lvl1pPr eaLnBrk="0" hangingPunct="0">
+              <a:defRPr>
+                <a:solidFill>
+                  <a:schemeClr val="tx1"/>
+                </a:solidFill>
+                <a:latin typeface="Arial" charset="0"/>
+                <a:ea typeface="宋体" pitchFamily="2" charset="-122"/>
+              </a:defRPr>
+            </a:lvl1pPr>
+            <a:lvl2pPr marL="742950" indent="-285750" eaLnBrk="0" hangingPunct="0">
+              <a:defRPr>
+                <a:solidFill>
+                  <a:schemeClr val="tx1"/>
+                </a:solidFill>
+                <a:latin typeface="Arial" charset="0"/>
+                <a:ea typeface="宋体" pitchFamily="2" charset="-122"/>
+              </a:defRPr>
+            </a:lvl2pPr>
+            <a:lvl3pPr marL="1143000" indent="-228600" eaLnBrk="0" hangingPunct="0">
+              <a:defRPr>
+                <a:solidFill>
+                  <a:schemeClr val="tx1"/>
+                </a:solidFill>
+                <a:latin typeface="Arial" charset="0"/>
+                <a:ea typeface="宋体" pitchFamily="2" charset="-122"/>
+              </a:defRPr>
+            </a:lvl3pPr>
+            <a:lvl4pPr marL="1600200" indent="-228600" eaLnBrk="0" hangingPunct="0">
+              <a:defRPr>
+                <a:solidFill>
+                  <a:schemeClr val="tx1"/>
+                </a:solidFill>
+                <a:latin typeface="Arial" charset="0"/>
+                <a:ea typeface="宋体" pitchFamily="2" charset="-122"/>
+              </a:defRPr>
+            </a:lvl4pPr>
+            <a:lvl5pPr marL="2057400" indent="-228600" eaLnBrk="0" hangingPunct="0">
+              <a:defRPr>
+                <a:solidFill>
+                  <a:schemeClr val="tx1"/>
+                </a:solidFill>
+                <a:latin typeface="Arial" charset="0"/>
+                <a:ea typeface="宋体" pitchFamily="2" charset="-122"/>
+              </a:defRPr>
+            </a:lvl5pPr>
+            <a:lvl6pPr marL="2514600" indent="-228600" eaLnBrk="0" fontAlgn="base" hangingPunct="0">
+              <a:spcBef>
+                <a:spcPct val="0"/>
+              </a:spcBef>
+              <a:spcAft>
+                <a:spcPct val="0"/>
+              </a:spcAft>
+              <a:defRPr>
+                <a:solidFill>
+                  <a:schemeClr val="tx1"/>
+                </a:solidFill>
+                <a:latin typeface="Arial" charset="0"/>
+                <a:ea typeface="宋体" pitchFamily="2" charset="-122"/>
+              </a:defRPr>
+            </a:lvl6pPr>
+            <a:lvl7pPr marL="2971800" indent="-228600" eaLnBrk="0" fontAlgn="base" hangingPunct="0">
+              <a:spcBef>
+                <a:spcPct val="0"/>
+              </a:spcBef>
+              <a:spcAft>
+                <a:spcPct val="0"/>
+              </a:spcAft>
+              <a:defRPr>
+                <a:solidFill>
+                  <a:schemeClr val="tx1"/>
+                </a:solidFill>
+                <a:latin typeface="Arial" charset="0"/>
+                <a:ea typeface="宋体" pitchFamily="2" charset="-122"/>
+              </a:defRPr>
+            </a:lvl7pPr>
+            <a:lvl8pPr marL="3429000" indent="-228600" eaLnBrk="0" fontAlgn="base" hangingPunct="0">
+              <a:spcBef>
+                <a:spcPct val="0"/>
+              </a:spcBef>
+              <a:spcAft>
+                <a:spcPct val="0"/>
+              </a:spcAft>
+              <a:defRPr>
+                <a:solidFill>
+                  <a:schemeClr val="tx1"/>
+                </a:solidFill>
+                <a:latin typeface="Arial" charset="0"/>
+                <a:ea typeface="宋体" pitchFamily="2" charset="-122"/>
+              </a:defRPr>
+            </a:lvl8pPr>
+            <a:lvl9pPr marL="3886200" indent="-228600" eaLnBrk="0" fontAlgn="base" hangingPunct="0">
+              <a:spcBef>
+                <a:spcPct val="0"/>
+              </a:spcBef>
+              <a:spcAft>
+                <a:spcPct val="0"/>
+              </a:spcAft>
+              <a:defRPr>
+                <a:solidFill>
+                  <a:schemeClr val="tx1"/>
+                </a:solidFill>
+                <a:latin typeface="Arial" charset="0"/>
+                <a:ea typeface="宋体" pitchFamily="2" charset="-122"/>
+              </a:defRPr>
+            </a:lvl9pPr>
+          </a:lstStyle>
+          <a:p>
+            <a:pPr eaLnBrk="1" hangingPunct="1"/>
+            <a:r>
+              <a:rPr lang="en-US" altLang="zh-CN" sz="2800" dirty="0">
+                <a:latin typeface="微软雅黑" panose="020B0503020204020204" pitchFamily="34" charset="-122"/>
+                <a:ea typeface="微软雅黑" panose="020B0503020204020204" pitchFamily="34" charset="-122"/>
+              </a:rPr>
+              <a:t>Query:</a:t>
+            </a:r>
+          </a:p>
+          <a:p>
+            <a:pPr eaLnBrk="1" hangingPunct="1"/>
+            <a:endParaRPr lang="en-US" altLang="zh-CN" sz="2800" dirty="0">
+              <a:solidFill>
+                <a:schemeClr val="bg1"/>
+              </a:solidFill>
+              <a:latin typeface="微软雅黑" pitchFamily="34" charset="-122"/>
+              <a:ea typeface="微软雅黑" pitchFamily="34" charset="-122"/>
+            </a:endParaRPr>
+          </a:p>
+        </p:txBody>
+      </p:sp>
+      <p:sp>
+        <p:nvSpPr>
+          <p:cNvPr id="14" name="TextBox 2"/>
+          <p:cNvSpPr txBox="1">
+            <a:spLocks noChangeArrowheads="1"/>
+          </p:cNvSpPr>
+          <p:nvPr/>
+        </p:nvSpPr>
+        <p:spPr bwMode="auto">
+          <a:xfrm>
+            <a:off x="-76200" y="4038600"/>
+            <a:ext cx="8824913" cy="954107"/>
+          </a:xfrm>
+          <a:prstGeom prst="rect">
+            <a:avLst/>
+          </a:prstGeom>
+          <a:noFill/>
+          <a:ln w="9525">
+            <a:noFill/>
+            <a:miter lim="800000"/>
+            <a:headEnd/>
+            <a:tailEnd/>
+          </a:ln>
+        </p:spPr>
+        <p:txBody>
+          <a:bodyPr>
+            <a:spAutoFit/>
+          </a:bodyPr>
+          <a:lstStyle>
+            <a:lvl1pPr eaLnBrk="0" hangingPunct="0">
+              <a:defRPr>
+                <a:solidFill>
+                  <a:schemeClr val="tx1"/>
+                </a:solidFill>
+                <a:latin typeface="Arial" charset="0"/>
+                <a:ea typeface="宋体" pitchFamily="2" charset="-122"/>
+              </a:defRPr>
+            </a:lvl1pPr>
+            <a:lvl2pPr marL="742950" indent="-285750" eaLnBrk="0" hangingPunct="0">
+              <a:defRPr>
+                <a:solidFill>
+                  <a:schemeClr val="tx1"/>
+                </a:solidFill>
+                <a:latin typeface="Arial" charset="0"/>
+                <a:ea typeface="宋体" pitchFamily="2" charset="-122"/>
+              </a:defRPr>
+            </a:lvl2pPr>
+            <a:lvl3pPr marL="1143000" indent="-228600" eaLnBrk="0" hangingPunct="0">
+              <a:defRPr>
+                <a:solidFill>
+                  <a:schemeClr val="tx1"/>
+                </a:solidFill>
+                <a:latin typeface="Arial" charset="0"/>
+                <a:ea typeface="宋体" pitchFamily="2" charset="-122"/>
+              </a:defRPr>
+            </a:lvl3pPr>
+            <a:lvl4pPr marL="1600200" indent="-228600" eaLnBrk="0" hangingPunct="0">
+              <a:defRPr>
+                <a:solidFill>
+                  <a:schemeClr val="tx1"/>
+                </a:solidFill>
+                <a:latin typeface="Arial" charset="0"/>
+                <a:ea typeface="宋体" pitchFamily="2" charset="-122"/>
+              </a:defRPr>
+            </a:lvl4pPr>
+            <a:lvl5pPr marL="2057400" indent="-228600" eaLnBrk="0" hangingPunct="0">
+              <a:defRPr>
+                <a:solidFill>
+                  <a:schemeClr val="tx1"/>
+                </a:solidFill>
+                <a:latin typeface="Arial" charset="0"/>
+                <a:ea typeface="宋体" pitchFamily="2" charset="-122"/>
+              </a:defRPr>
+            </a:lvl5pPr>
+            <a:lvl6pPr marL="2514600" indent="-228600" eaLnBrk="0" fontAlgn="base" hangingPunct="0">
+              <a:spcBef>
+                <a:spcPct val="0"/>
+              </a:spcBef>
+              <a:spcAft>
+                <a:spcPct val="0"/>
+              </a:spcAft>
+              <a:defRPr>
+                <a:solidFill>
+                  <a:schemeClr val="tx1"/>
+                </a:solidFill>
+                <a:latin typeface="Arial" charset="0"/>
+                <a:ea typeface="宋体" pitchFamily="2" charset="-122"/>
+              </a:defRPr>
+            </a:lvl6pPr>
+            <a:lvl7pPr marL="2971800" indent="-228600" eaLnBrk="0" fontAlgn="base" hangingPunct="0">
+              <a:spcBef>
+                <a:spcPct val="0"/>
+              </a:spcBef>
+              <a:spcAft>
+                <a:spcPct val="0"/>
+              </a:spcAft>
+              <a:defRPr>
+                <a:solidFill>
+                  <a:schemeClr val="tx1"/>
+                </a:solidFill>
+                <a:latin typeface="Arial" charset="0"/>
+                <a:ea typeface="宋体" pitchFamily="2" charset="-122"/>
+              </a:defRPr>
+            </a:lvl7pPr>
+            <a:lvl8pPr marL="3429000" indent="-228600" eaLnBrk="0" fontAlgn="base" hangingPunct="0">
+              <a:spcBef>
+                <a:spcPct val="0"/>
+              </a:spcBef>
+              <a:spcAft>
+                <a:spcPct val="0"/>
+              </a:spcAft>
+              <a:defRPr>
+                <a:solidFill>
+                  <a:schemeClr val="tx1"/>
+                </a:solidFill>
+                <a:latin typeface="Arial" charset="0"/>
+                <a:ea typeface="宋体" pitchFamily="2" charset="-122"/>
+              </a:defRPr>
+            </a:lvl8pPr>
+            <a:lvl9pPr marL="3886200" indent="-228600" eaLnBrk="0" fontAlgn="base" hangingPunct="0">
+              <a:spcBef>
+                <a:spcPct val="0"/>
+              </a:spcBef>
+              <a:spcAft>
+                <a:spcPct val="0"/>
+              </a:spcAft>
+              <a:defRPr>
+                <a:solidFill>
+                  <a:schemeClr val="tx1"/>
+                </a:solidFill>
+                <a:latin typeface="Arial" charset="0"/>
+                <a:ea typeface="宋体" pitchFamily="2" charset="-122"/>
+              </a:defRPr>
+            </a:lvl9pPr>
+          </a:lstStyle>
+          <a:p>
+            <a:pPr eaLnBrk="1" hangingPunct="1"/>
+            <a:r>
+              <a:rPr lang="en-US" altLang="zh-CN" sz="2800" dirty="0">
+                <a:latin typeface="微软雅黑" panose="020B0503020204020204" pitchFamily="34" charset="-122"/>
+                <a:ea typeface="微软雅黑" panose="020B0503020204020204" pitchFamily="34" charset="-122"/>
+              </a:rPr>
+              <a:t>MongoDB returns:</a:t>
+            </a:r>
+          </a:p>
+          <a:p>
+            <a:pPr eaLnBrk="1" hangingPunct="1"/>
+            <a:endParaRPr lang="en-US" altLang="zh-CN" sz="2800" dirty="0">
+              <a:solidFill>
+                <a:schemeClr val="bg1"/>
+              </a:solidFill>
+              <a:latin typeface="微软雅黑" pitchFamily="34" charset="-122"/>
+              <a:ea typeface="微软雅黑" pitchFamily="34" charset="-122"/>
+            </a:endParaRPr>
+          </a:p>
+        </p:txBody>
+      </p:sp>
+      <p:pic>
+        <p:nvPicPr>
+          <p:cNvPr id="6" name="Picture 5"/>
+          <p:cNvPicPr>
+            <a:picLocks noChangeAspect="1"/>
+          </p:cNvPicPr>
+          <p:nvPr/>
+        </p:nvPicPr>
+        <p:blipFill>
+          <a:blip r:embed="rId2"/>
+          <a:stretch>
+            <a:fillRect/>
+          </a:stretch>
+        </p:blipFill>
+        <p:spPr>
+          <a:xfrm>
+            <a:off x="17963" y="1143000"/>
+            <a:ext cx="9116423" cy="1676400"/>
+          </a:xfrm>
+          <a:prstGeom prst="rect">
+            <a:avLst/>
+          </a:prstGeom>
+        </p:spPr>
+      </p:pic>
+      <p:pic>
+        <p:nvPicPr>
+          <p:cNvPr id="4" name="Picture 3"/>
+          <p:cNvPicPr>
+            <a:picLocks noChangeAspect="1"/>
+          </p:cNvPicPr>
+          <p:nvPr/>
+        </p:nvPicPr>
+        <p:blipFill>
+          <a:blip r:embed="rId3"/>
+          <a:stretch>
+            <a:fillRect/>
+          </a:stretch>
+        </p:blipFill>
+        <p:spPr>
+          <a:xfrm>
+            <a:off x="-11533" y="3316269"/>
+            <a:ext cx="9155534" cy="462153"/>
+          </a:xfrm>
+          <a:prstGeom prst="rect">
+            <a:avLst/>
+          </a:prstGeom>
+        </p:spPr>
+      </p:pic>
+      <p:pic>
+        <p:nvPicPr>
+          <p:cNvPr id="5" name="Picture 4"/>
+          <p:cNvPicPr>
+            <a:picLocks noChangeAspect="1"/>
+          </p:cNvPicPr>
+          <p:nvPr/>
+        </p:nvPicPr>
+        <p:blipFill>
+          <a:blip r:embed="rId4"/>
+          <a:stretch>
+            <a:fillRect/>
+          </a:stretch>
+        </p:blipFill>
+        <p:spPr>
+          <a:xfrm>
+            <a:off x="38100" y="4515653"/>
+            <a:ext cx="8007704" cy="1885147"/>
+          </a:xfrm>
+          <a:prstGeom prst="rect">
+            <a:avLst/>
+          </a:prstGeom>
+        </p:spPr>
+      </p:pic>
+    </p:spTree>
+    <p:extLst>
+      <p:ext uri="{BB962C8B-B14F-4D97-AF65-F5344CB8AC3E}">
+        <p14:creationId xmlns:p14="http://schemas.microsoft.com/office/powerpoint/2010/main" val="739326915"/>
+      </p:ext>
+    </p:extLst>
+  </p:cSld>
+  <p:clrMapOvr>
+    <a:masterClrMapping/>
+  </p:clrMapOvr>
+  <p:timing>
+    <p:tnLst>
+      <p:par>
+        <p:cTn id="1" dur="indefinite" restart="never" nodeType="tmRoot">
+          <p:childTnLst>
+            <p:seq concurrent="1" nextAc="seek">
+              <p:cTn id="2" dur="indefinite" nodeType="mainSeq">
+                <p:childTnLst>
+                  <p:par>
+                    <p:cTn id="3" fill="hold">
+                      <p:stCondLst>
+                        <p:cond delay="indefinite"/>
+                      </p:stCondLst>
+                      <p:childTnLst>
+                        <p:par>
+                          <p:cTn id="4" fill="hold">
+                            <p:stCondLst>
+                              <p:cond delay="0"/>
+                            </p:stCondLst>
+                            <p:childTnLst>
+                              <p:par>
+                                <p:cTn id="5" presetID="10" presetClass="entr" presetSubtype="0" fill="hold" nodeType="clickEffect">
+                                  <p:stCondLst>
+                                    <p:cond delay="0"/>
+                                  </p:stCondLst>
+                                  <p:childTnLst>
+                                    <p:set>
+                                      <p:cBhvr>
+                                        <p:cTn id="6" dur="1" fill="hold">
+                                          <p:stCondLst>
+                                            <p:cond delay="0"/>
+                                          </p:stCondLst>
+                                        </p:cTn>
+                                        <p:tgtEl>
+                                          <p:spTgt spid="5"/>
+                                        </p:tgtEl>
+                                        <p:attrNameLst>
+                                          <p:attrName>style.visibility</p:attrName>
+                                        </p:attrNameLst>
+                                      </p:cBhvr>
+                                      <p:to>
+                                        <p:strVal val="visible"/>
+                                      </p:to>
+                                    </p:set>
+                                    <p:animEffect transition="in" filter="fade">
+                                      <p:cBhvr>
+                                        <p:cTn id="7" dur="500"/>
+                                        <p:tgtEl>
+                                          <p:spTgt spid="5"/>
+                                        </p:tgtEl>
+                                      </p:cBhvr>
+                                    </p:animEffect>
+                                  </p:childTnLst>
+                                </p:cTn>
+                              </p:par>
+                            </p:childTnLst>
+                          </p:cTn>
+                        </p:par>
+                      </p:childTnLst>
+                    </p:cTn>
+                  </p:par>
+                </p:childTnLst>
+              </p:cTn>
+              <p:prevCondLst>
+                <p:cond evt="onPrev" delay="0">
+                  <p:tgtEl>
+                    <p:sldTgt/>
+                  </p:tgtEl>
+                </p:cond>
+              </p:prevCondLst>
+              <p:nextCondLst>
+                <p:cond evt="onNext" delay="0">
+                  <p:tgtEl>
+                    <p:sldTgt/>
+                  </p:tgtEl>
+                </p:cond>
+              </p:nextCondLst>
+            </p:seq>
+          </p:childTnLst>
+        </p:cTn>
+      </p:par>
+    </p:tnLst>
+  </p:timing>
+</p:sld>
+</file>
+
+<file path=ppt/slides/slide21.xml><?xml version="1.0" encoding="utf-8"?>
+<p:sld xmlns:a="http://schemas.openxmlformats.org/drawingml/2006/main" xmlns:r="http://schemas.openxmlformats.org/officeDocument/2006/relationships" xmlns:p="http://schemas.openxmlformats.org/presentationml/2006/main">
+  <p:cSld>
+    <p:spTree>
+      <p:nvGrpSpPr>
+        <p:cNvPr id="1" name=""/>
+        <p:cNvGrpSpPr/>
+        <p:nvPr/>
+      </p:nvGrpSpPr>
+      <p:grpSpPr>
+        <a:xfrm>
+          <a:off x="0" y="0"/>
+          <a:ext cx="0" cy="0"/>
+          <a:chOff x="0" y="0"/>
+          <a:chExt cx="0" cy="0"/>
+        </a:xfrm>
+      </p:grpSpPr>
+      <p:sp>
+        <p:nvSpPr>
+          <p:cNvPr id="2" name="Text Placeholder 1"/>
+          <p:cNvSpPr>
+            <a:spLocks noGrp="1"/>
+          </p:cNvSpPr>
+          <p:nvPr>
+            <p:ph type="body" sz="quarter" idx="13"/>
+          </p:nvPr>
+        </p:nvSpPr>
+        <p:spPr/>
+        <p:txBody>
+          <a:bodyPr/>
+          <a:lstStyle/>
+          <a:p>
+            <a:r>
+              <a:rPr lang="en-US" dirty="0"/>
+              <a:t>4</a:t>
+            </a:r>
+          </a:p>
+        </p:txBody>
+      </p:sp>
+      <p:sp>
+        <p:nvSpPr>
+          <p:cNvPr id="3" name="Text Placeholder 2"/>
+          <p:cNvSpPr>
+            <a:spLocks noGrp="1"/>
+          </p:cNvSpPr>
+          <p:nvPr>
+            <p:ph type="body" sz="quarter" idx="14"/>
+          </p:nvPr>
+        </p:nvSpPr>
+        <p:spPr/>
+        <p:txBody>
+          <a:bodyPr/>
+          <a:lstStyle/>
+          <a:p>
+            <a:r>
+              <a:rPr lang="en-US" dirty="0"/>
+              <a:t>Query  Operators: Embedded Document</a:t>
+            </a:r>
+            <a:endParaRPr lang="en-US" altLang="zh-CN" dirty="0"/>
+          </a:p>
+          <a:p>
+            <a:endParaRPr lang="en-US" altLang="zh-CN" dirty="0"/>
+          </a:p>
+          <a:p>
+            <a:endParaRPr lang="en-US" altLang="zh-CN" dirty="0"/>
+          </a:p>
+          <a:p>
+            <a:endParaRPr lang="en-US" dirty="0"/>
+          </a:p>
+          <a:p>
+            <a:endParaRPr lang="en-US" dirty="0"/>
+          </a:p>
+        </p:txBody>
+      </p:sp>
+      <p:sp>
+        <p:nvSpPr>
+          <p:cNvPr id="7" name="TextBox 2"/>
+          <p:cNvSpPr txBox="1">
+            <a:spLocks noChangeArrowheads="1"/>
+          </p:cNvSpPr>
+          <p:nvPr/>
+        </p:nvSpPr>
+        <p:spPr bwMode="auto">
+          <a:xfrm>
+            <a:off x="0" y="2824316"/>
+            <a:ext cx="8824913" cy="954107"/>
+          </a:xfrm>
+          <a:prstGeom prst="rect">
+            <a:avLst/>
+          </a:prstGeom>
+          <a:noFill/>
+          <a:ln w="9525">
+            <a:noFill/>
+            <a:miter lim="800000"/>
+            <a:headEnd/>
+            <a:tailEnd/>
+          </a:ln>
+        </p:spPr>
+        <p:txBody>
+          <a:bodyPr>
+            <a:spAutoFit/>
+          </a:bodyPr>
+          <a:lstStyle>
+            <a:lvl1pPr eaLnBrk="0" hangingPunct="0">
+              <a:defRPr>
+                <a:solidFill>
+                  <a:schemeClr val="tx1"/>
+                </a:solidFill>
+                <a:latin typeface="Arial" charset="0"/>
+                <a:ea typeface="宋体" pitchFamily="2" charset="-122"/>
+              </a:defRPr>
+            </a:lvl1pPr>
+            <a:lvl2pPr marL="742950" indent="-285750" eaLnBrk="0" hangingPunct="0">
+              <a:defRPr>
+                <a:solidFill>
+                  <a:schemeClr val="tx1"/>
+                </a:solidFill>
+                <a:latin typeface="Arial" charset="0"/>
+                <a:ea typeface="宋体" pitchFamily="2" charset="-122"/>
+              </a:defRPr>
+            </a:lvl2pPr>
+            <a:lvl3pPr marL="1143000" indent="-228600" eaLnBrk="0" hangingPunct="0">
+              <a:defRPr>
+                <a:solidFill>
+                  <a:schemeClr val="tx1"/>
+                </a:solidFill>
+                <a:latin typeface="Arial" charset="0"/>
+                <a:ea typeface="宋体" pitchFamily="2" charset="-122"/>
+              </a:defRPr>
+            </a:lvl3pPr>
+            <a:lvl4pPr marL="1600200" indent="-228600" eaLnBrk="0" hangingPunct="0">
+              <a:defRPr>
+                <a:solidFill>
+                  <a:schemeClr val="tx1"/>
+                </a:solidFill>
+                <a:latin typeface="Arial" charset="0"/>
+                <a:ea typeface="宋体" pitchFamily="2" charset="-122"/>
+              </a:defRPr>
+            </a:lvl4pPr>
+            <a:lvl5pPr marL="2057400" indent="-228600" eaLnBrk="0" hangingPunct="0">
+              <a:defRPr>
+                <a:solidFill>
+                  <a:schemeClr val="tx1"/>
+                </a:solidFill>
+                <a:latin typeface="Arial" charset="0"/>
+                <a:ea typeface="宋体" pitchFamily="2" charset="-122"/>
+              </a:defRPr>
+            </a:lvl5pPr>
+            <a:lvl6pPr marL="2514600" indent="-228600" eaLnBrk="0" fontAlgn="base" hangingPunct="0">
+              <a:spcBef>
+                <a:spcPct val="0"/>
+              </a:spcBef>
+              <a:spcAft>
+                <a:spcPct val="0"/>
+              </a:spcAft>
+              <a:defRPr>
+                <a:solidFill>
+                  <a:schemeClr val="tx1"/>
+                </a:solidFill>
+                <a:latin typeface="Arial" charset="0"/>
+                <a:ea typeface="宋体" pitchFamily="2" charset="-122"/>
+              </a:defRPr>
+            </a:lvl6pPr>
+            <a:lvl7pPr marL="2971800" indent="-228600" eaLnBrk="0" fontAlgn="base" hangingPunct="0">
+              <a:spcBef>
+                <a:spcPct val="0"/>
+              </a:spcBef>
+              <a:spcAft>
+                <a:spcPct val="0"/>
+              </a:spcAft>
+              <a:defRPr>
+                <a:solidFill>
+                  <a:schemeClr val="tx1"/>
+                </a:solidFill>
+                <a:latin typeface="Arial" charset="0"/>
+                <a:ea typeface="宋体" pitchFamily="2" charset="-122"/>
+              </a:defRPr>
+            </a:lvl7pPr>
+            <a:lvl8pPr marL="3429000" indent="-228600" eaLnBrk="0" fontAlgn="base" hangingPunct="0">
+              <a:spcBef>
+                <a:spcPct val="0"/>
+              </a:spcBef>
+              <a:spcAft>
+                <a:spcPct val="0"/>
+              </a:spcAft>
+              <a:defRPr>
+                <a:solidFill>
+                  <a:schemeClr val="tx1"/>
+                </a:solidFill>
+                <a:latin typeface="Arial" charset="0"/>
+                <a:ea typeface="宋体" pitchFamily="2" charset="-122"/>
+              </a:defRPr>
+            </a:lvl8pPr>
+            <a:lvl9pPr marL="3886200" indent="-228600" eaLnBrk="0" fontAlgn="base" hangingPunct="0">
+              <a:spcBef>
+                <a:spcPct val="0"/>
+              </a:spcBef>
+              <a:spcAft>
+                <a:spcPct val="0"/>
+              </a:spcAft>
+              <a:defRPr>
+                <a:solidFill>
+                  <a:schemeClr val="tx1"/>
+                </a:solidFill>
+                <a:latin typeface="Arial" charset="0"/>
+                <a:ea typeface="宋体" pitchFamily="2" charset="-122"/>
+              </a:defRPr>
+            </a:lvl9pPr>
+          </a:lstStyle>
+          <a:p>
+            <a:pPr eaLnBrk="1" hangingPunct="1"/>
+            <a:r>
+              <a:rPr lang="en-US" altLang="zh-CN" sz="2800" dirty="0">
+                <a:latin typeface="微软雅黑" panose="020B0503020204020204" pitchFamily="34" charset="-122"/>
+                <a:ea typeface="微软雅黑" panose="020B0503020204020204" pitchFamily="34" charset="-122"/>
+              </a:rPr>
+              <a:t>Query:</a:t>
+            </a:r>
+          </a:p>
+          <a:p>
+            <a:pPr eaLnBrk="1" hangingPunct="1"/>
+            <a:endParaRPr lang="en-US" altLang="zh-CN" sz="2800" dirty="0">
+              <a:solidFill>
+                <a:schemeClr val="bg1"/>
+              </a:solidFill>
+              <a:latin typeface="微软雅黑" pitchFamily="34" charset="-122"/>
+              <a:ea typeface="微软雅黑" pitchFamily="34" charset="-122"/>
+            </a:endParaRPr>
+          </a:p>
+        </p:txBody>
+      </p:sp>
+      <p:sp>
+        <p:nvSpPr>
+          <p:cNvPr id="14" name="TextBox 2"/>
+          <p:cNvSpPr txBox="1">
+            <a:spLocks noChangeArrowheads="1"/>
+          </p:cNvSpPr>
+          <p:nvPr/>
+        </p:nvSpPr>
+        <p:spPr bwMode="auto">
+          <a:xfrm>
+            <a:off x="-58994" y="4038600"/>
+            <a:ext cx="8824913" cy="954107"/>
+          </a:xfrm>
+          <a:prstGeom prst="rect">
+            <a:avLst/>
+          </a:prstGeom>
+          <a:noFill/>
+          <a:ln w="9525">
+            <a:noFill/>
+            <a:miter lim="800000"/>
+            <a:headEnd/>
+            <a:tailEnd/>
+          </a:ln>
+        </p:spPr>
+        <p:txBody>
+          <a:bodyPr>
+            <a:spAutoFit/>
+          </a:bodyPr>
+          <a:lstStyle>
+            <a:lvl1pPr eaLnBrk="0" hangingPunct="0">
+              <a:defRPr>
+                <a:solidFill>
+                  <a:schemeClr val="tx1"/>
+                </a:solidFill>
+                <a:latin typeface="Arial" charset="0"/>
+                <a:ea typeface="宋体" pitchFamily="2" charset="-122"/>
+              </a:defRPr>
+            </a:lvl1pPr>
+            <a:lvl2pPr marL="742950" indent="-285750" eaLnBrk="0" hangingPunct="0">
+              <a:defRPr>
+                <a:solidFill>
+                  <a:schemeClr val="tx1"/>
+                </a:solidFill>
+                <a:latin typeface="Arial" charset="0"/>
+                <a:ea typeface="宋体" pitchFamily="2" charset="-122"/>
+              </a:defRPr>
+            </a:lvl2pPr>
+            <a:lvl3pPr marL="1143000" indent="-228600" eaLnBrk="0" hangingPunct="0">
+              <a:defRPr>
+                <a:solidFill>
+                  <a:schemeClr val="tx1"/>
+                </a:solidFill>
+                <a:latin typeface="Arial" charset="0"/>
+                <a:ea typeface="宋体" pitchFamily="2" charset="-122"/>
+              </a:defRPr>
+            </a:lvl3pPr>
+            <a:lvl4pPr marL="1600200" indent="-228600" eaLnBrk="0" hangingPunct="0">
+              <a:defRPr>
+                <a:solidFill>
+                  <a:schemeClr val="tx1"/>
+                </a:solidFill>
+                <a:latin typeface="Arial" charset="0"/>
+                <a:ea typeface="宋体" pitchFamily="2" charset="-122"/>
+              </a:defRPr>
+            </a:lvl4pPr>
+            <a:lvl5pPr marL="2057400" indent="-228600" eaLnBrk="0" hangingPunct="0">
+              <a:defRPr>
+                <a:solidFill>
+                  <a:schemeClr val="tx1"/>
+                </a:solidFill>
+                <a:latin typeface="Arial" charset="0"/>
+                <a:ea typeface="宋体" pitchFamily="2" charset="-122"/>
+              </a:defRPr>
+            </a:lvl5pPr>
+            <a:lvl6pPr marL="2514600" indent="-228600" eaLnBrk="0" fontAlgn="base" hangingPunct="0">
+              <a:spcBef>
+                <a:spcPct val="0"/>
+              </a:spcBef>
+              <a:spcAft>
+                <a:spcPct val="0"/>
+              </a:spcAft>
+              <a:defRPr>
+                <a:solidFill>
+                  <a:schemeClr val="tx1"/>
+                </a:solidFill>
+                <a:latin typeface="Arial" charset="0"/>
+                <a:ea typeface="宋体" pitchFamily="2" charset="-122"/>
+              </a:defRPr>
+            </a:lvl6pPr>
+            <a:lvl7pPr marL="2971800" indent="-228600" eaLnBrk="0" fontAlgn="base" hangingPunct="0">
+              <a:spcBef>
+                <a:spcPct val="0"/>
+              </a:spcBef>
+              <a:spcAft>
+                <a:spcPct val="0"/>
+              </a:spcAft>
+              <a:defRPr>
+                <a:solidFill>
+                  <a:schemeClr val="tx1"/>
+                </a:solidFill>
+                <a:latin typeface="Arial" charset="0"/>
+                <a:ea typeface="宋体" pitchFamily="2" charset="-122"/>
+              </a:defRPr>
+            </a:lvl7pPr>
+            <a:lvl8pPr marL="3429000" indent="-228600" eaLnBrk="0" fontAlgn="base" hangingPunct="0">
+              <a:spcBef>
+                <a:spcPct val="0"/>
+              </a:spcBef>
+              <a:spcAft>
+                <a:spcPct val="0"/>
+              </a:spcAft>
+              <a:defRPr>
+                <a:solidFill>
+                  <a:schemeClr val="tx1"/>
+                </a:solidFill>
+                <a:latin typeface="Arial" charset="0"/>
+                <a:ea typeface="宋体" pitchFamily="2" charset="-122"/>
+              </a:defRPr>
+            </a:lvl8pPr>
+            <a:lvl9pPr marL="3886200" indent="-228600" eaLnBrk="0" fontAlgn="base" hangingPunct="0">
+              <a:spcBef>
+                <a:spcPct val="0"/>
+              </a:spcBef>
+              <a:spcAft>
+                <a:spcPct val="0"/>
+              </a:spcAft>
+              <a:defRPr>
+                <a:solidFill>
+                  <a:schemeClr val="tx1"/>
+                </a:solidFill>
+                <a:latin typeface="Arial" charset="0"/>
+                <a:ea typeface="宋体" pitchFamily="2" charset="-122"/>
+              </a:defRPr>
+            </a:lvl9pPr>
+          </a:lstStyle>
+          <a:p>
+            <a:pPr eaLnBrk="1" hangingPunct="1"/>
+            <a:r>
+              <a:rPr lang="en-US" altLang="zh-CN" sz="2800" dirty="0">
+                <a:latin typeface="微软雅黑" panose="020B0503020204020204" pitchFamily="34" charset="-122"/>
+                <a:ea typeface="微软雅黑" panose="020B0503020204020204" pitchFamily="34" charset="-122"/>
+              </a:rPr>
+              <a:t>MongoDB returns:</a:t>
+            </a:r>
+          </a:p>
+          <a:p>
+            <a:pPr eaLnBrk="1" hangingPunct="1"/>
+            <a:endParaRPr lang="en-US" altLang="zh-CN" sz="2800" dirty="0">
+              <a:solidFill>
+                <a:schemeClr val="bg1"/>
+              </a:solidFill>
+              <a:latin typeface="微软雅黑" pitchFamily="34" charset="-122"/>
+              <a:ea typeface="微软雅黑" pitchFamily="34" charset="-122"/>
+            </a:endParaRPr>
+          </a:p>
+        </p:txBody>
+      </p:sp>
+      <p:pic>
+        <p:nvPicPr>
+          <p:cNvPr id="6" name="Picture 5"/>
+          <p:cNvPicPr>
+            <a:picLocks noChangeAspect="1"/>
+          </p:cNvPicPr>
+          <p:nvPr/>
+        </p:nvPicPr>
+        <p:blipFill>
+          <a:blip r:embed="rId2"/>
+          <a:stretch>
+            <a:fillRect/>
+          </a:stretch>
+        </p:blipFill>
+        <p:spPr>
+          <a:xfrm>
+            <a:off x="17963" y="1143000"/>
+            <a:ext cx="9116423" cy="1676400"/>
+          </a:xfrm>
+          <a:prstGeom prst="rect">
+            <a:avLst/>
+          </a:prstGeom>
+        </p:spPr>
+      </p:pic>
+      <p:pic>
+        <p:nvPicPr>
+          <p:cNvPr id="4" name="Picture 3"/>
+          <p:cNvPicPr>
+            <a:picLocks noChangeAspect="1"/>
+          </p:cNvPicPr>
+          <p:nvPr/>
+        </p:nvPicPr>
+        <p:blipFill>
+          <a:blip r:embed="rId3"/>
+          <a:stretch>
+            <a:fillRect/>
+          </a:stretch>
+        </p:blipFill>
+        <p:spPr>
+          <a:xfrm>
+            <a:off x="-24581" y="3317157"/>
+            <a:ext cx="9168582" cy="461266"/>
+          </a:xfrm>
+          <a:prstGeom prst="rect">
+            <a:avLst/>
+          </a:prstGeom>
+        </p:spPr>
+      </p:pic>
+      <p:pic>
+        <p:nvPicPr>
+          <p:cNvPr id="5" name="Picture 4"/>
+          <p:cNvPicPr>
+            <a:picLocks noChangeAspect="1"/>
+          </p:cNvPicPr>
+          <p:nvPr/>
+        </p:nvPicPr>
+        <p:blipFill>
+          <a:blip r:embed="rId4"/>
+          <a:stretch>
+            <a:fillRect/>
+          </a:stretch>
+        </p:blipFill>
+        <p:spPr>
+          <a:xfrm>
+            <a:off x="2458" y="4569920"/>
+            <a:ext cx="9073450" cy="764080"/>
+          </a:xfrm>
+          <a:prstGeom prst="rect">
+            <a:avLst/>
+          </a:prstGeom>
+        </p:spPr>
+      </p:pic>
+    </p:spTree>
+    <p:extLst>
+      <p:ext uri="{BB962C8B-B14F-4D97-AF65-F5344CB8AC3E}">
+        <p14:creationId xmlns:p14="http://schemas.microsoft.com/office/powerpoint/2010/main" val="4217063451"/>
+      </p:ext>
+    </p:extLst>
+  </p:cSld>
+  <p:clrMapOvr>
+    <a:masterClrMapping/>
+  </p:clrMapOvr>
+  <p:timing>
+    <p:tnLst>
+      <p:par>
+        <p:cTn id="1" dur="indefinite" restart="never" nodeType="tmRoot">
+          <p:childTnLst>
+            <p:seq concurrent="1" nextAc="seek">
+              <p:cTn id="2" dur="indefinite" nodeType="mainSeq">
+                <p:childTnLst>
+                  <p:par>
+                    <p:cTn id="3" fill="hold">
+                      <p:stCondLst>
+                        <p:cond delay="indefinite"/>
+                      </p:stCondLst>
+                      <p:childTnLst>
+                        <p:par>
+                          <p:cTn id="4" fill="hold">
+                            <p:stCondLst>
+                              <p:cond delay="0"/>
+                            </p:stCondLst>
+                            <p:childTnLst>
+                              <p:par>
+                                <p:cTn id="5" presetID="10" presetClass="entr" presetSubtype="0" fill="hold" nodeType="clickEffect">
+                                  <p:stCondLst>
+                                    <p:cond delay="0"/>
+                                  </p:stCondLst>
+                                  <p:childTnLst>
+                                    <p:set>
+                                      <p:cBhvr>
+                                        <p:cTn id="6" dur="1" fill="hold">
+                                          <p:stCondLst>
+                                            <p:cond delay="0"/>
+                                          </p:stCondLst>
+                                        </p:cTn>
+                                        <p:tgtEl>
+                                          <p:spTgt spid="5"/>
+                                        </p:tgtEl>
+                                        <p:attrNameLst>
+                                          <p:attrName>style.visibility</p:attrName>
+                                        </p:attrNameLst>
+                                      </p:cBhvr>
+                                      <p:to>
+                                        <p:strVal val="visible"/>
+                                      </p:to>
+                                    </p:set>
+                                    <p:animEffect transition="in" filter="fade">
+                                      <p:cBhvr>
+                                        <p:cTn id="7" dur="500"/>
+                                        <p:tgtEl>
+                                          <p:spTgt spid="5"/>
+                                        </p:tgtEl>
+                                      </p:cBhvr>
+                                    </p:animEffect>
+                                  </p:childTnLst>
+                                </p:cTn>
+                              </p:par>
+                            </p:childTnLst>
+                          </p:cTn>
+                        </p:par>
+                      </p:childTnLst>
+                    </p:cTn>
+                  </p:par>
+                </p:childTnLst>
+              </p:cTn>
+              <p:prevCondLst>
+                <p:cond evt="onPrev" delay="0">
+                  <p:tgtEl>
+                    <p:sldTgt/>
+                  </p:tgtEl>
+                </p:cond>
+              </p:prevCondLst>
+              <p:nextCondLst>
+                <p:cond evt="onNext" delay="0">
+                  <p:tgtEl>
+                    <p:sldTgt/>
+                  </p:tgtEl>
+                </p:cond>
+              </p:nextCondLst>
+            </p:seq>
+          </p:childTnLst>
+        </p:cTn>
+      </p:par>
+    </p:tnLst>
+  </p:timing>
+</p:sld>
+</file>
+
+<file path=ppt/slides/slide22.xml><?xml version="1.0" encoding="utf-8"?>
+<p:sld xmlns:a="http://schemas.openxmlformats.org/drawingml/2006/main" xmlns:r="http://schemas.openxmlformats.org/officeDocument/2006/relationships" xmlns:p="http://schemas.openxmlformats.org/presentationml/2006/main">
+  <p:cSld>
+    <p:spTree>
+      <p:nvGrpSpPr>
+        <p:cNvPr id="1" name=""/>
+        <p:cNvGrpSpPr/>
+        <p:nvPr/>
+      </p:nvGrpSpPr>
+      <p:grpSpPr>
+        <a:xfrm>
+          <a:off x="0" y="0"/>
+          <a:ext cx="0" cy="0"/>
+          <a:chOff x="0" y="0"/>
+          <a:chExt cx="0" cy="0"/>
+        </a:xfrm>
+      </p:grpSpPr>
+    </p:spTree>
+  </p:cSld>
+  <p:clrMapOvr>
+    <a:masterClrMapping/>
+  </p:clrMapOvr>
+</p:sld>
+</file>
+
+<file path=ppt/slides/slide23.xml><?xml version="1.0" encoding="utf-8"?>
+<p:sld xmlns:a="http://schemas.openxmlformats.org/drawingml/2006/main" xmlns:r="http://schemas.openxmlformats.org/officeDocument/2006/relationships" xmlns:p="http://schemas.openxmlformats.org/presentationml/2006/main">
+  <p:cSld>
+    <p:spTree>
+      <p:nvGrpSpPr>
+        <p:cNvPr id="1" name=""/>
+        <p:cNvGrpSpPr/>
+        <p:nvPr/>
+      </p:nvGrpSpPr>
+      <p:grpSpPr>
+        <a:xfrm>
+          <a:off x="0" y="0"/>
+          <a:ext cx="0" cy="0"/>
+          <a:chOff x="0" y="0"/>
+          <a:chExt cx="0" cy="0"/>
+        </a:xfrm>
+      </p:grpSpPr>
+    </p:spTree>
+  </p:cSld>
+  <p:clrMapOvr>
+    <a:masterClrMapping/>
+  </p:clrMapOvr>
 </p:sld>
 </file>
 
@@ -15391,6 +17454,12 @@
 </file>
 
 <file path=customXml/item1.xml><?xml version="1.0" encoding="utf-8"?>
+<p:properties xmlns:p="http://schemas.microsoft.com/office/2006/metadata/properties" xmlns:xsi="http://www.w3.org/2001/XMLSchema-instance">
+  <documentManagement/>
+</p:properties>
+</file>
+
+<file path=customXml/item2.xml><?xml version="1.0" encoding="utf-8"?>
 <ct:contentTypeSchema xmlns:ct="http://schemas.microsoft.com/office/2006/metadata/contentType" xmlns:ma="http://schemas.microsoft.com/office/2006/metadata/properties/metaAttributes" ct:_="" ma:_="" ma:contentTypeName="Document" ma:contentTypeID="0x010100EF3E94E2ACCF6D4EAE5CDD73AD546E17" ma:contentTypeVersion="0" ma:contentTypeDescription="Create a new document." ma:contentTypeScope="" ma:versionID="bb1449a0cfc4203701bc69f953314dcb">
   <xsd:schema xmlns:xsd="http://www.w3.org/2001/XMLSchema" xmlns:p="http://schemas.microsoft.com/office/2006/metadata/properties" targetNamespace="http://schemas.microsoft.com/office/2006/metadata/properties" ma:root="true" ma:fieldsID="4aeb20c0e3442673af7ee10786458764">
     <xsd:element name="properties">
@@ -15439,12 +17508,6 @@
 </ct:contentTypeSchema>
 </file>
 
-<file path=customXml/item2.xml><?xml version="1.0" encoding="utf-8"?>
-<p:properties xmlns:p="http://schemas.microsoft.com/office/2006/metadata/properties" xmlns:xsi="http://www.w3.org/2001/XMLSchema-instance">
-  <documentManagement/>
-</p:properties>
-</file>
-
 <file path=customXml/item3.xml><?xml version="1.0" encoding="utf-8"?>
 <?mso-contentType ?>
 <FormTemplates xmlns="http://schemas.microsoft.com/sharepoint/v3/contenttype/forms">
@@ -15455,6 +17518,20 @@
 </file>
 
 <file path=customXml/itemProps1.xml><?xml version="1.0" encoding="utf-8"?>
+<ds:datastoreItem xmlns:ds="http://schemas.openxmlformats.org/officeDocument/2006/customXml" ds:itemID="{BC974159-165D-43A7-BAC0-2BE7E1872CAD}">
+  <ds:schemaRefs>
+    <ds:schemaRef ds:uri="http://purl.org/dc/elements/1.1/"/>
+    <ds:schemaRef ds:uri="http://www.w3.org/XML/1998/namespace"/>
+    <ds:schemaRef ds:uri="http://schemas.microsoft.com/office/2006/documentManagement/types"/>
+    <ds:schemaRef ds:uri="http://purl.org/dc/dcmitype/"/>
+    <ds:schemaRef ds:uri="http://schemas.openxmlformats.org/package/2006/metadata/core-properties"/>
+    <ds:schemaRef ds:uri="http://schemas.microsoft.com/office/2006/metadata/properties"/>
+    <ds:schemaRef ds:uri="http://purl.org/dc/terms/"/>
+  </ds:schemaRefs>
+</ds:datastoreItem>
+</file>
+
+<file path=customXml/itemProps2.xml><?xml version="1.0" encoding="utf-8"?>
 <ds:datastoreItem xmlns:ds="http://schemas.openxmlformats.org/officeDocument/2006/customXml" ds:itemID="{1FBAA56A-8348-4CD3-A624-434B0E404A2E}">
   <ds:schemaRefs>
     <ds:schemaRef ds:uri="http://schemas.microsoft.com/office/2006/metadata/contentType"/>
@@ -15469,20 +17546,6 @@
 </ds:datastoreItem>
 </file>
 
-<file path=customXml/itemProps2.xml><?xml version="1.0" encoding="utf-8"?>
-<ds:datastoreItem xmlns:ds="http://schemas.openxmlformats.org/officeDocument/2006/customXml" ds:itemID="{BC974159-165D-43A7-BAC0-2BE7E1872CAD}">
-  <ds:schemaRefs>
-    <ds:schemaRef ds:uri="http://purl.org/dc/elements/1.1/"/>
-    <ds:schemaRef ds:uri="http://www.w3.org/XML/1998/namespace"/>
-    <ds:schemaRef ds:uri="http://schemas.microsoft.com/office/2006/documentManagement/types"/>
-    <ds:schemaRef ds:uri="http://purl.org/dc/dcmitype/"/>
-    <ds:schemaRef ds:uri="http://schemas.openxmlformats.org/package/2006/metadata/core-properties"/>
-    <ds:schemaRef ds:uri="http://schemas.microsoft.com/office/2006/metadata/properties"/>
-    <ds:schemaRef ds:uri="http://purl.org/dc/terms/"/>
-  </ds:schemaRefs>
-</ds:datastoreItem>
-</file>
-
 <file path=customXml/itemProps3.xml><?xml version="1.0" encoding="utf-8"?>
 <ds:datastoreItem xmlns:ds="http://schemas.openxmlformats.org/officeDocument/2006/customXml" ds:itemID="{AF2462E9-E3C6-4B9B-800D-1AA92DB6FEE6}">
   <ds:schemaRefs>

</xml_diff>

<commit_message>
[db] add array query op
</commit_message>
<xml_diff>
--- a/db/mongodb/2017/materials/MongoDB_CH2(2)_Query.pptx
+++ b/db/mongodb/2017/materials/MongoDB_CH2(2)_Query.pptx
@@ -8,7 +8,7 @@
     <p:sldMasterId id="2147483652" r:id="rId7"/>
   </p:sldMasterIdLst>
   <p:notesMasterIdLst>
-    <p:notesMasterId r:id="rId31"/>
+    <p:notesMasterId r:id="rId37"/>
   </p:notesMasterIdLst>
   <p:sldIdLst>
     <p:sldId id="281" r:id="rId8"/>
@@ -32,8 +32,14 @@
     <p:sldId id="448" r:id="rId26"/>
     <p:sldId id="449" r:id="rId27"/>
     <p:sldId id="450" r:id="rId28"/>
-    <p:sldId id="264" r:id="rId29"/>
-    <p:sldId id="265" r:id="rId30"/>
+    <p:sldId id="451" r:id="rId29"/>
+    <p:sldId id="452" r:id="rId30"/>
+    <p:sldId id="453" r:id="rId31"/>
+    <p:sldId id="454" r:id="rId32"/>
+    <p:sldId id="455" r:id="rId33"/>
+    <p:sldId id="456" r:id="rId34"/>
+    <p:sldId id="264" r:id="rId35"/>
+    <p:sldId id="265" r:id="rId36"/>
   </p:sldIdLst>
   <p:sldSz cx="9144000" cy="6858000" type="screen4x3"/>
   <p:notesSz cx="6858000" cy="9144000"/>
@@ -13109,6 +13115,3090 @@
           <a:chExt cx="0" cy="0"/>
         </a:xfrm>
       </p:grpSpPr>
+      <p:sp>
+        <p:nvSpPr>
+          <p:cNvPr id="2" name="Text Placeholder 1"/>
+          <p:cNvSpPr>
+            <a:spLocks noGrp="1"/>
+          </p:cNvSpPr>
+          <p:nvPr>
+            <p:ph type="body" sz="quarter" idx="14"/>
+          </p:nvPr>
+        </p:nvSpPr>
+        <p:spPr>
+          <a:xfrm>
+            <a:off x="1031080" y="1712742"/>
+            <a:ext cx="7122319" cy="646331"/>
+          </a:xfrm>
+        </p:spPr>
+        <p:txBody>
+          <a:bodyPr/>
+          <a:lstStyle/>
+          <a:p>
+            <a:r>
+              <a:rPr lang="en-US" dirty="0"/>
+              <a:t>Query  Operators: Array</a:t>
+            </a:r>
+          </a:p>
+        </p:txBody>
+      </p:sp>
+      <p:sp>
+        <p:nvSpPr>
+          <p:cNvPr id="3" name="Text Placeholder 2"/>
+          <p:cNvSpPr>
+            <a:spLocks noGrp="1"/>
+          </p:cNvSpPr>
+          <p:nvPr>
+            <p:ph type="body" sz="quarter" idx="11"/>
+          </p:nvPr>
+        </p:nvSpPr>
+        <p:spPr/>
+        <p:txBody>
+          <a:bodyPr/>
+          <a:lstStyle/>
+          <a:p>
+            <a:r>
+              <a:rPr lang="en-US" dirty="0"/>
+              <a:t>5</a:t>
+            </a:r>
+          </a:p>
+        </p:txBody>
+      </p:sp>
+    </p:spTree>
+    <p:extLst>
+      <p:ext uri="{BB962C8B-B14F-4D97-AF65-F5344CB8AC3E}">
+        <p14:creationId xmlns:p14="http://schemas.microsoft.com/office/powerpoint/2010/main" val="2403503940"/>
+      </p:ext>
+    </p:extLst>
+  </p:cSld>
+  <p:clrMapOvr>
+    <a:masterClrMapping/>
+  </p:clrMapOvr>
+</p:sld>
+</file>
+
+<file path=ppt/slides/slide23.xml><?xml version="1.0" encoding="utf-8"?>
+<p:sld xmlns:a="http://schemas.openxmlformats.org/drawingml/2006/main" xmlns:r="http://schemas.openxmlformats.org/officeDocument/2006/relationships" xmlns:p="http://schemas.openxmlformats.org/presentationml/2006/main">
+  <p:cSld>
+    <p:spTree>
+      <p:nvGrpSpPr>
+        <p:cNvPr id="1" name=""/>
+        <p:cNvGrpSpPr/>
+        <p:nvPr/>
+      </p:nvGrpSpPr>
+      <p:grpSpPr>
+        <a:xfrm>
+          <a:off x="0" y="0"/>
+          <a:ext cx="0" cy="0"/>
+          <a:chOff x="0" y="0"/>
+          <a:chExt cx="0" cy="0"/>
+        </a:xfrm>
+      </p:grpSpPr>
+      <p:sp>
+        <p:nvSpPr>
+          <p:cNvPr id="2" name="Text Placeholder 1"/>
+          <p:cNvSpPr>
+            <a:spLocks noGrp="1"/>
+          </p:cNvSpPr>
+          <p:nvPr>
+            <p:ph type="body" sz="quarter" idx="13"/>
+          </p:nvPr>
+        </p:nvSpPr>
+        <p:spPr/>
+        <p:txBody>
+          <a:bodyPr/>
+          <a:lstStyle/>
+          <a:p>
+            <a:r>
+              <a:rPr lang="en-US" dirty="0"/>
+              <a:t>5</a:t>
+            </a:r>
+          </a:p>
+        </p:txBody>
+      </p:sp>
+      <p:sp>
+        <p:nvSpPr>
+          <p:cNvPr id="3" name="Text Placeholder 2"/>
+          <p:cNvSpPr>
+            <a:spLocks noGrp="1"/>
+          </p:cNvSpPr>
+          <p:nvPr>
+            <p:ph type="body" sz="quarter" idx="14"/>
+          </p:nvPr>
+        </p:nvSpPr>
+        <p:spPr/>
+        <p:txBody>
+          <a:bodyPr/>
+          <a:lstStyle/>
+          <a:p>
+            <a:r>
+              <a:rPr lang="en-US" dirty="0"/>
+              <a:t>Query  Operators: Array</a:t>
+            </a:r>
+            <a:endParaRPr lang="en-US" altLang="zh-CN" dirty="0"/>
+          </a:p>
+          <a:p>
+            <a:endParaRPr lang="en-US" altLang="zh-CN" dirty="0"/>
+          </a:p>
+          <a:p>
+            <a:endParaRPr lang="en-US" dirty="0"/>
+          </a:p>
+          <a:p>
+            <a:endParaRPr lang="en-US" dirty="0"/>
+          </a:p>
+        </p:txBody>
+      </p:sp>
+      <p:graphicFrame>
+        <p:nvGraphicFramePr>
+          <p:cNvPr id="5" name="Table 4"/>
+          <p:cNvGraphicFramePr>
+            <a:graphicFrameLocks noGrp="1"/>
+          </p:cNvGraphicFramePr>
+          <p:nvPr>
+            <p:extLst>
+              <p:ext uri="{D42A27DB-BD31-4B8C-83A1-F6EECF244321}">
+                <p14:modId xmlns:p14="http://schemas.microsoft.com/office/powerpoint/2010/main" val="2950910445"/>
+              </p:ext>
+            </p:extLst>
+          </p:nvPr>
+        </p:nvGraphicFramePr>
+        <p:xfrm>
+          <a:off x="329680" y="1447800"/>
+          <a:ext cx="8280920" cy="4216030"/>
+        </p:xfrm>
+        <a:graphic>
+          <a:graphicData uri="http://schemas.openxmlformats.org/drawingml/2006/table">
+            <a:tbl>
+              <a:tblPr firstRow="1" bandRow="1">
+                <a:tableStyleId>{8799B23B-EC83-4686-B30A-512413B5E67A}</a:tableStyleId>
+              </a:tblPr>
+              <a:tblGrid>
+                <a:gridCol w="2609057">
+                  <a:extLst>
+                    <a:ext uri="{9D8B030D-6E8A-4147-A177-3AD203B41FA5}">
+                      <a16:colId xmlns:a16="http://schemas.microsoft.com/office/drawing/2014/main" val="20000"/>
+                    </a:ext>
+                  </a:extLst>
+                </a:gridCol>
+                <a:gridCol w="5671863">
+                  <a:extLst>
+                    <a:ext uri="{9D8B030D-6E8A-4147-A177-3AD203B41FA5}">
+                      <a16:colId xmlns:a16="http://schemas.microsoft.com/office/drawing/2014/main" val="20001"/>
+                    </a:ext>
+                  </a:extLst>
+                </a:gridCol>
+              </a:tblGrid>
+              <a:tr h="1066800">
+                <a:tc>
+                  <a:txBody>
+                    <a:bodyPr/>
+                    <a:lstStyle/>
+                    <a:p>
+                      <a:pPr marL="0" marR="0" indent="0" algn="ctr" defTabSz="914400" rtl="0" eaLnBrk="1" fontAlgn="auto" latinLnBrk="0" hangingPunct="1">
+                        <a:lnSpc>
+                          <a:spcPct val="100000"/>
+                        </a:lnSpc>
+                        <a:spcBef>
+                          <a:spcPts val="0"/>
+                        </a:spcBef>
+                        <a:spcAft>
+                          <a:spcPts val="0"/>
+                        </a:spcAft>
+                        <a:buClrTx/>
+                        <a:buSzTx/>
+                        <a:buFontTx/>
+                        <a:buNone/>
+                        <a:tabLst/>
+                        <a:defRPr/>
+                      </a:pPr>
+                      <a:r>
+                        <a:rPr lang="en-US" sz="2800" b="1" kern="1200" dirty="0">
+                          <a:solidFill>
+                            <a:schemeClr val="tx1"/>
+                          </a:solidFill>
+                          <a:latin typeface="+mn-lt"/>
+                          <a:ea typeface="+mn-ea"/>
+                          <a:cs typeface="+mn-cs"/>
+                        </a:rPr>
+                        <a:t>$in</a:t>
+                      </a:r>
+                    </a:p>
+                  </a:txBody>
+                  <a:tcPr/>
+                </a:tc>
+                <a:tc>
+                  <a:txBody>
+                    <a:bodyPr/>
+                    <a:lstStyle/>
+                    <a:p>
+                      <a:pPr marL="0" marR="0" indent="0" algn="l" defTabSz="914400" rtl="0" eaLnBrk="1" fontAlgn="auto" latinLnBrk="0" hangingPunct="1">
+                        <a:lnSpc>
+                          <a:spcPct val="100000"/>
+                        </a:lnSpc>
+                        <a:spcBef>
+                          <a:spcPts val="0"/>
+                        </a:spcBef>
+                        <a:spcAft>
+                          <a:spcPts val="0"/>
+                        </a:spcAft>
+                        <a:buClrTx/>
+                        <a:buSzTx/>
+                        <a:buFontTx/>
+                        <a:buNone/>
+                        <a:tabLst/>
+                        <a:defRPr/>
+                      </a:pPr>
+                      <a:r>
+                        <a:rPr lang="en-US" sz="2800" b="0" i="0" kern="1200" dirty="0">
+                          <a:solidFill>
+                            <a:schemeClr val="tx1"/>
+                          </a:solidFill>
+                          <a:latin typeface="+mn-lt"/>
+                          <a:ea typeface="+mn-ea"/>
+                          <a:cs typeface="+mn-cs"/>
+                        </a:rPr>
+                        <a:t>{ </a:t>
+                      </a:r>
+                      <a:r>
+                        <a:rPr lang="en-US" sz="2800" b="0" i="0" kern="1200" dirty="0" err="1">
+                          <a:solidFill>
+                            <a:schemeClr val="tx1"/>
+                          </a:solidFill>
+                          <a:latin typeface="+mn-lt"/>
+                          <a:ea typeface="+mn-ea"/>
+                          <a:cs typeface="+mn-cs"/>
+                        </a:rPr>
+                        <a:t>lucky_no</a:t>
+                      </a:r>
+                      <a:r>
+                        <a:rPr lang="en-US" sz="2800" b="0" i="0" kern="1200" dirty="0">
+                          <a:solidFill>
+                            <a:schemeClr val="tx1"/>
+                          </a:solidFill>
+                          <a:latin typeface="+mn-lt"/>
+                          <a:ea typeface="+mn-ea"/>
+                          <a:cs typeface="+mn-cs"/>
+                        </a:rPr>
+                        <a:t>: { </a:t>
+                      </a:r>
+                      <a:r>
+                        <a:rPr lang="en-US" sz="2800" b="1" i="0" kern="1200" dirty="0">
+                          <a:solidFill>
+                            <a:srgbClr val="2D75BC"/>
+                          </a:solidFill>
+                          <a:latin typeface="+mn-lt"/>
+                          <a:ea typeface="+mn-ea"/>
+                          <a:cs typeface="+mn-cs"/>
+                        </a:rPr>
+                        <a:t>$in</a:t>
+                      </a:r>
+                      <a:r>
+                        <a:rPr lang="en-US" sz="2800" b="0" i="0" kern="1200" dirty="0">
+                          <a:solidFill>
+                            <a:schemeClr val="tx1"/>
+                          </a:solidFill>
+                          <a:latin typeface="+mn-lt"/>
+                          <a:ea typeface="+mn-ea"/>
+                          <a:cs typeface="+mn-cs"/>
+                        </a:rPr>
+                        <a:t>: [ 1,2,3] } }</a:t>
+                      </a:r>
+                      <a:endParaRPr lang="en-US" sz="2800" b="1" kern="1200" dirty="0">
+                        <a:solidFill>
+                          <a:schemeClr val="tx1"/>
+                        </a:solidFill>
+                        <a:latin typeface="+mn-lt"/>
+                        <a:ea typeface="+mn-ea"/>
+                        <a:cs typeface="+mn-cs"/>
+                      </a:endParaRPr>
+                    </a:p>
+                  </a:txBody>
+                  <a:tcPr/>
+                </a:tc>
+                <a:extLst>
+                  <a:ext uri="{0D108BD9-81ED-4DB2-BD59-A6C34878D82A}">
+                    <a16:rowId xmlns:a16="http://schemas.microsoft.com/office/drawing/2014/main" val="1210319110"/>
+                  </a:ext>
+                </a:extLst>
+              </a:tr>
+              <a:tr h="893710">
+                <a:tc>
+                  <a:txBody>
+                    <a:bodyPr/>
+                    <a:lstStyle/>
+                    <a:p>
+                      <a:pPr algn="ctr"/>
+                      <a:r>
+                        <a:rPr lang="en-US" sz="2800" b="1" kern="1200" dirty="0">
+                          <a:solidFill>
+                            <a:schemeClr val="tx1"/>
+                          </a:solidFill>
+                          <a:latin typeface="+mn-lt"/>
+                          <a:ea typeface="+mn-ea"/>
+                          <a:cs typeface="+mn-cs"/>
+                        </a:rPr>
+                        <a:t>$all</a:t>
+                      </a:r>
+                    </a:p>
+                  </a:txBody>
+                  <a:tcPr/>
+                </a:tc>
+                <a:tc>
+                  <a:txBody>
+                    <a:bodyPr/>
+                    <a:lstStyle/>
+                    <a:p>
+                      <a:pPr algn="l"/>
+                      <a:r>
+                        <a:rPr lang="en-US" sz="2800" b="0" i="0" kern="1200" dirty="0">
+                          <a:solidFill>
+                            <a:schemeClr val="tx1"/>
+                          </a:solidFill>
+                          <a:latin typeface="+mn-lt"/>
+                          <a:ea typeface="+mn-ea"/>
+                          <a:cs typeface="+mn-cs"/>
+                        </a:rPr>
+                        <a:t>{ </a:t>
+                      </a:r>
+                      <a:r>
+                        <a:rPr lang="en-US" sz="2800" b="0" i="0" kern="1200" dirty="0" err="1">
+                          <a:solidFill>
+                            <a:schemeClr val="tx1"/>
+                          </a:solidFill>
+                          <a:latin typeface="+mn-lt"/>
+                          <a:ea typeface="+mn-ea"/>
+                          <a:cs typeface="+mn-cs"/>
+                        </a:rPr>
+                        <a:t>lucky_no</a:t>
+                      </a:r>
+                      <a:r>
+                        <a:rPr lang="en-US" sz="2800" b="0" i="0" kern="1200" dirty="0">
+                          <a:solidFill>
+                            <a:schemeClr val="tx1"/>
+                          </a:solidFill>
+                          <a:latin typeface="+mn-lt"/>
+                          <a:ea typeface="+mn-ea"/>
+                          <a:cs typeface="+mn-cs"/>
+                        </a:rPr>
+                        <a:t>: { </a:t>
+                      </a:r>
+                      <a:r>
+                        <a:rPr lang="en-US" sz="2800" b="1" i="0" kern="1200" dirty="0">
+                          <a:solidFill>
+                            <a:srgbClr val="2D75BC"/>
+                          </a:solidFill>
+                          <a:latin typeface="+mn-lt"/>
+                          <a:ea typeface="+mn-ea"/>
+                          <a:cs typeface="+mn-cs"/>
+                        </a:rPr>
+                        <a:t>$all</a:t>
+                      </a:r>
+                      <a:r>
+                        <a:rPr lang="en-US" sz="2800" b="0" i="0" kern="1200" dirty="0">
+                          <a:solidFill>
+                            <a:schemeClr val="tx1"/>
+                          </a:solidFill>
+                          <a:latin typeface="+mn-lt"/>
+                          <a:ea typeface="+mn-ea"/>
+                          <a:cs typeface="+mn-cs"/>
+                        </a:rPr>
+                        <a:t>: [ 1,2,3] } }</a:t>
+                      </a:r>
+                      <a:endParaRPr lang="en-US" sz="7200" b="1" kern="1200" dirty="0">
+                        <a:solidFill>
+                          <a:schemeClr val="tx1"/>
+                        </a:solidFill>
+                        <a:latin typeface="+mn-lt"/>
+                        <a:ea typeface="+mn-ea"/>
+                        <a:cs typeface="+mn-cs"/>
+                      </a:endParaRPr>
+                    </a:p>
+                  </a:txBody>
+                  <a:tcPr/>
+                </a:tc>
+                <a:extLst>
+                  <a:ext uri="{0D108BD9-81ED-4DB2-BD59-A6C34878D82A}">
+                    <a16:rowId xmlns:a16="http://schemas.microsoft.com/office/drawing/2014/main" val="10000"/>
+                  </a:ext>
+                </a:extLst>
+              </a:tr>
+              <a:tr h="762474">
+                <a:tc>
+                  <a:txBody>
+                    <a:bodyPr/>
+                    <a:lstStyle/>
+                    <a:p>
+                      <a:pPr marL="0" marR="0" indent="0" algn="ctr" defTabSz="914400" rtl="0" eaLnBrk="1" fontAlgn="auto" latinLnBrk="0" hangingPunct="1">
+                        <a:lnSpc>
+                          <a:spcPct val="100000"/>
+                        </a:lnSpc>
+                        <a:spcBef>
+                          <a:spcPts val="0"/>
+                        </a:spcBef>
+                        <a:spcAft>
+                          <a:spcPts val="0"/>
+                        </a:spcAft>
+                        <a:buClrTx/>
+                        <a:buSzTx/>
+                        <a:buFontTx/>
+                        <a:buNone/>
+                        <a:tabLst/>
+                        <a:defRPr/>
+                      </a:pPr>
+                      <a:r>
+                        <a:rPr lang="en-US" sz="2800" b="1" kern="1200" dirty="0">
+                          <a:solidFill>
+                            <a:schemeClr val="tx1"/>
+                          </a:solidFill>
+                          <a:latin typeface="+mn-lt"/>
+                          <a:ea typeface="+mn-ea"/>
+                          <a:cs typeface="+mn-cs"/>
+                        </a:rPr>
+                        <a:t>$size</a:t>
+                      </a:r>
+                    </a:p>
+                    <a:p>
+                      <a:pPr marL="0" marR="0" indent="0" algn="ctr" defTabSz="914400" rtl="0" eaLnBrk="1" fontAlgn="auto" latinLnBrk="0" hangingPunct="1">
+                        <a:lnSpc>
+                          <a:spcPct val="100000"/>
+                        </a:lnSpc>
+                        <a:spcBef>
+                          <a:spcPts val="0"/>
+                        </a:spcBef>
+                        <a:spcAft>
+                          <a:spcPts val="0"/>
+                        </a:spcAft>
+                        <a:buClrTx/>
+                        <a:buSzTx/>
+                        <a:buFontTx/>
+                        <a:buNone/>
+                        <a:tabLst/>
+                        <a:defRPr/>
+                      </a:pPr>
+                      <a:endParaRPr lang="en-US" sz="2400" b="1" kern="1200" dirty="0">
+                        <a:solidFill>
+                          <a:schemeClr val="tx1"/>
+                        </a:solidFill>
+                        <a:latin typeface="+mn-lt"/>
+                        <a:ea typeface="+mn-ea"/>
+                        <a:cs typeface="+mn-cs"/>
+                      </a:endParaRPr>
+                    </a:p>
+                  </a:txBody>
+                  <a:tcPr/>
+                </a:tc>
+                <a:tc>
+                  <a:txBody>
+                    <a:bodyPr/>
+                    <a:lstStyle/>
+                    <a:p>
+                      <a:pPr marL="0" marR="0" indent="0" algn="l" defTabSz="914400" rtl="0" eaLnBrk="1" fontAlgn="auto" latinLnBrk="0" hangingPunct="1">
+                        <a:lnSpc>
+                          <a:spcPct val="100000"/>
+                        </a:lnSpc>
+                        <a:spcBef>
+                          <a:spcPts val="0"/>
+                        </a:spcBef>
+                        <a:spcAft>
+                          <a:spcPts val="0"/>
+                        </a:spcAft>
+                        <a:buClrTx/>
+                        <a:buSzTx/>
+                        <a:buFontTx/>
+                        <a:buNone/>
+                        <a:tabLst/>
+                        <a:defRPr/>
+                      </a:pPr>
+                      <a:r>
+                        <a:rPr lang="en-US" sz="2800" b="0" i="0" kern="1200" dirty="0">
+                          <a:solidFill>
+                            <a:schemeClr val="tx1"/>
+                          </a:solidFill>
+                          <a:latin typeface="+mn-lt"/>
+                          <a:ea typeface="+mn-ea"/>
+                          <a:cs typeface="+mn-cs"/>
+                        </a:rPr>
+                        <a:t>{ </a:t>
+                      </a:r>
+                      <a:r>
+                        <a:rPr lang="en-US" sz="2800" b="0" i="0" kern="1200" dirty="0" err="1">
+                          <a:solidFill>
+                            <a:schemeClr val="tx1"/>
+                          </a:solidFill>
+                          <a:latin typeface="+mn-lt"/>
+                          <a:ea typeface="+mn-ea"/>
+                          <a:cs typeface="+mn-cs"/>
+                        </a:rPr>
+                        <a:t>lucky_no</a:t>
+                      </a:r>
+                      <a:r>
+                        <a:rPr lang="en-US" sz="2800" b="0" i="0" kern="1200" dirty="0">
+                          <a:solidFill>
+                            <a:schemeClr val="tx1"/>
+                          </a:solidFill>
+                          <a:latin typeface="+mn-lt"/>
+                          <a:ea typeface="+mn-ea"/>
+                          <a:cs typeface="+mn-cs"/>
+                        </a:rPr>
+                        <a:t>: { </a:t>
+                      </a:r>
+                      <a:r>
+                        <a:rPr lang="en-US" sz="2800" b="1" i="0" kern="1200" dirty="0">
+                          <a:solidFill>
+                            <a:srgbClr val="2D75BC"/>
+                          </a:solidFill>
+                          <a:latin typeface="+mn-lt"/>
+                          <a:ea typeface="+mn-ea"/>
+                          <a:cs typeface="+mn-cs"/>
+                        </a:rPr>
+                        <a:t>$size</a:t>
+                      </a:r>
+                      <a:r>
+                        <a:rPr lang="en-US" sz="2800" b="0" i="0" kern="1200" dirty="0">
+                          <a:solidFill>
+                            <a:schemeClr val="tx1"/>
+                          </a:solidFill>
+                          <a:latin typeface="+mn-lt"/>
+                          <a:ea typeface="+mn-ea"/>
+                          <a:cs typeface="+mn-cs"/>
+                        </a:rPr>
+                        <a:t>: 3} }</a:t>
+                      </a:r>
+                      <a:endParaRPr lang="en-US" sz="7200" b="1" kern="1200" dirty="0">
+                        <a:solidFill>
+                          <a:schemeClr val="tx1"/>
+                        </a:solidFill>
+                        <a:latin typeface="+mn-lt"/>
+                        <a:ea typeface="+mn-ea"/>
+                        <a:cs typeface="+mn-cs"/>
+                      </a:endParaRPr>
+                    </a:p>
+                  </a:txBody>
+                  <a:tcPr/>
+                </a:tc>
+                <a:extLst>
+                  <a:ext uri="{0D108BD9-81ED-4DB2-BD59-A6C34878D82A}">
+                    <a16:rowId xmlns:a16="http://schemas.microsoft.com/office/drawing/2014/main" val="10001"/>
+                  </a:ext>
+                </a:extLst>
+              </a:tr>
+              <a:tr h="721315">
+                <a:tc>
+                  <a:txBody>
+                    <a:bodyPr/>
+                    <a:lstStyle/>
+                    <a:p>
+                      <a:pPr marL="0" marR="0" indent="0" algn="ctr" defTabSz="914400" rtl="0" eaLnBrk="1" fontAlgn="auto" latinLnBrk="0" hangingPunct="1">
+                        <a:lnSpc>
+                          <a:spcPct val="100000"/>
+                        </a:lnSpc>
+                        <a:spcBef>
+                          <a:spcPts val="0"/>
+                        </a:spcBef>
+                        <a:spcAft>
+                          <a:spcPts val="0"/>
+                        </a:spcAft>
+                        <a:buClrTx/>
+                        <a:buSzTx/>
+                        <a:buFontTx/>
+                        <a:buNone/>
+                        <a:tabLst/>
+                        <a:defRPr/>
+                      </a:pPr>
+                      <a:r>
+                        <a:rPr lang="en-US" sz="2800" b="1" kern="1200" dirty="0">
+                          <a:solidFill>
+                            <a:schemeClr val="tx1"/>
+                          </a:solidFill>
+                          <a:latin typeface="+mn-lt"/>
+                          <a:ea typeface="+mn-ea"/>
+                          <a:cs typeface="+mn-cs"/>
+                        </a:rPr>
+                        <a:t>$</a:t>
+                      </a:r>
+                      <a:r>
+                        <a:rPr lang="en-US" sz="2800" b="1" kern="1200" dirty="0" err="1">
+                          <a:solidFill>
+                            <a:schemeClr val="tx1"/>
+                          </a:solidFill>
+                          <a:latin typeface="+mn-lt"/>
+                          <a:ea typeface="+mn-ea"/>
+                          <a:cs typeface="+mn-cs"/>
+                        </a:rPr>
+                        <a:t>elemMatch</a:t>
+                      </a:r>
+                      <a:endParaRPr lang="en-US" sz="2800" b="1" kern="1200" dirty="0">
+                        <a:solidFill>
+                          <a:schemeClr val="tx1"/>
+                        </a:solidFill>
+                        <a:latin typeface="+mn-lt"/>
+                        <a:ea typeface="+mn-ea"/>
+                        <a:cs typeface="+mn-cs"/>
+                      </a:endParaRPr>
+                    </a:p>
+                  </a:txBody>
+                  <a:tcPr/>
+                </a:tc>
+                <a:tc>
+                  <a:txBody>
+                    <a:bodyPr/>
+                    <a:lstStyle/>
+                    <a:p>
+                      <a:pPr marL="0" marR="0" indent="0" algn="l" defTabSz="914400" rtl="0" eaLnBrk="1" fontAlgn="auto" latinLnBrk="0" hangingPunct="1">
+                        <a:lnSpc>
+                          <a:spcPct val="100000"/>
+                        </a:lnSpc>
+                        <a:spcBef>
+                          <a:spcPts val="0"/>
+                        </a:spcBef>
+                        <a:spcAft>
+                          <a:spcPts val="0"/>
+                        </a:spcAft>
+                        <a:buClrTx/>
+                        <a:buSzTx/>
+                        <a:buFontTx/>
+                        <a:buNone/>
+                        <a:tabLst/>
+                        <a:defRPr/>
+                      </a:pPr>
+                      <a:r>
+                        <a:rPr lang="en-US" sz="2800" b="0" kern="1200" dirty="0">
+                          <a:solidFill>
+                            <a:schemeClr val="tx1"/>
+                          </a:solidFill>
+                          <a:latin typeface="+mn-lt"/>
+                          <a:ea typeface="+mn-ea"/>
+                          <a:cs typeface="+mn-cs"/>
+                        </a:rPr>
+                        <a:t>{ </a:t>
+                      </a:r>
+                      <a:r>
+                        <a:rPr lang="en-US" sz="2800" b="0" kern="1200" dirty="0" err="1">
+                          <a:solidFill>
+                            <a:schemeClr val="tx1"/>
+                          </a:solidFill>
+                          <a:latin typeface="+mn-lt"/>
+                          <a:ea typeface="+mn-ea"/>
+                          <a:cs typeface="+mn-cs"/>
+                        </a:rPr>
+                        <a:t>lucky_no</a:t>
+                      </a:r>
+                      <a:r>
+                        <a:rPr lang="en-US" sz="2800" b="0" kern="1200" dirty="0">
+                          <a:solidFill>
+                            <a:schemeClr val="tx1"/>
+                          </a:solidFill>
+                          <a:latin typeface="+mn-lt"/>
+                          <a:ea typeface="+mn-ea"/>
+                          <a:cs typeface="+mn-cs"/>
+                        </a:rPr>
+                        <a:t>: </a:t>
+                      </a:r>
+                    </a:p>
+                    <a:p>
+                      <a:pPr marL="0" marR="0" indent="0" algn="l" defTabSz="914400" rtl="0" eaLnBrk="1" fontAlgn="auto" latinLnBrk="0" hangingPunct="1">
+                        <a:lnSpc>
+                          <a:spcPct val="100000"/>
+                        </a:lnSpc>
+                        <a:spcBef>
+                          <a:spcPts val="0"/>
+                        </a:spcBef>
+                        <a:spcAft>
+                          <a:spcPts val="0"/>
+                        </a:spcAft>
+                        <a:buClrTx/>
+                        <a:buSzTx/>
+                        <a:buFontTx/>
+                        <a:buNone/>
+                        <a:tabLst/>
+                        <a:defRPr/>
+                      </a:pPr>
+                      <a:r>
+                        <a:rPr lang="en-US" sz="2800" b="0" kern="1200" dirty="0">
+                          <a:solidFill>
+                            <a:schemeClr val="tx1"/>
+                          </a:solidFill>
+                          <a:latin typeface="+mn-lt"/>
+                          <a:ea typeface="+mn-ea"/>
+                          <a:cs typeface="+mn-cs"/>
+                        </a:rPr>
+                        <a:t>{ </a:t>
+                      </a:r>
+                      <a:r>
+                        <a:rPr lang="en-US" sz="2800" b="1" kern="1200" dirty="0">
+                          <a:solidFill>
+                            <a:srgbClr val="2D75BC"/>
+                          </a:solidFill>
+                          <a:latin typeface="+mn-lt"/>
+                          <a:ea typeface="+mn-ea"/>
+                          <a:cs typeface="+mn-cs"/>
+                        </a:rPr>
+                        <a:t>$</a:t>
+                      </a:r>
+                      <a:r>
+                        <a:rPr lang="en-US" sz="2800" b="1" kern="1200" dirty="0" err="1">
+                          <a:solidFill>
+                            <a:srgbClr val="2D75BC"/>
+                          </a:solidFill>
+                          <a:latin typeface="+mn-lt"/>
+                          <a:ea typeface="+mn-ea"/>
+                          <a:cs typeface="+mn-cs"/>
+                        </a:rPr>
+                        <a:t>elemMatch</a:t>
+                      </a:r>
+                      <a:r>
+                        <a:rPr lang="en-US" sz="2800" b="0" kern="1200" dirty="0">
+                          <a:solidFill>
+                            <a:schemeClr val="tx1"/>
+                          </a:solidFill>
+                          <a:latin typeface="+mn-lt"/>
+                          <a:ea typeface="+mn-ea"/>
+                          <a:cs typeface="+mn-cs"/>
+                        </a:rPr>
+                        <a:t>: { $</a:t>
+                      </a:r>
+                      <a:r>
+                        <a:rPr lang="en-US" sz="2800" b="0" kern="1200" dirty="0" err="1">
+                          <a:solidFill>
+                            <a:schemeClr val="tx1"/>
+                          </a:solidFill>
+                          <a:latin typeface="+mn-lt"/>
+                          <a:ea typeface="+mn-ea"/>
+                          <a:cs typeface="+mn-cs"/>
+                        </a:rPr>
+                        <a:t>gt</a:t>
+                      </a:r>
+                      <a:r>
+                        <a:rPr lang="en-US" sz="2800" b="0" kern="1200" dirty="0">
+                          <a:solidFill>
+                            <a:schemeClr val="tx1"/>
+                          </a:solidFill>
+                          <a:latin typeface="+mn-lt"/>
+                          <a:ea typeface="+mn-ea"/>
+                          <a:cs typeface="+mn-cs"/>
+                        </a:rPr>
+                        <a:t>: 1, $</a:t>
+                      </a:r>
+                      <a:r>
+                        <a:rPr lang="en-US" sz="2800" b="0" kern="1200" dirty="0" err="1">
+                          <a:solidFill>
+                            <a:schemeClr val="tx1"/>
+                          </a:solidFill>
+                          <a:latin typeface="+mn-lt"/>
+                          <a:ea typeface="+mn-ea"/>
+                          <a:cs typeface="+mn-cs"/>
+                        </a:rPr>
+                        <a:t>lt</a:t>
+                      </a:r>
+                      <a:r>
+                        <a:rPr lang="en-US" sz="2800" b="0" kern="1200" dirty="0">
+                          <a:solidFill>
+                            <a:schemeClr val="tx1"/>
+                          </a:solidFill>
+                          <a:latin typeface="+mn-lt"/>
+                          <a:ea typeface="+mn-ea"/>
+                          <a:cs typeface="+mn-cs"/>
+                        </a:rPr>
+                        <a:t>: 3 } } </a:t>
+                      </a:r>
+                    </a:p>
+                    <a:p>
+                      <a:pPr marL="0" marR="0" indent="0" algn="l" defTabSz="914400" rtl="0" eaLnBrk="1" fontAlgn="auto" latinLnBrk="0" hangingPunct="1">
+                        <a:lnSpc>
+                          <a:spcPct val="100000"/>
+                        </a:lnSpc>
+                        <a:spcBef>
+                          <a:spcPts val="0"/>
+                        </a:spcBef>
+                        <a:spcAft>
+                          <a:spcPts val="0"/>
+                        </a:spcAft>
+                        <a:buClrTx/>
+                        <a:buSzTx/>
+                        <a:buFontTx/>
+                        <a:buNone/>
+                        <a:tabLst/>
+                        <a:defRPr/>
+                      </a:pPr>
+                      <a:r>
+                        <a:rPr lang="en-US" sz="2800" b="0" kern="1200" dirty="0">
+                          <a:solidFill>
+                            <a:schemeClr val="tx1"/>
+                          </a:solidFill>
+                          <a:latin typeface="+mn-lt"/>
+                          <a:ea typeface="+mn-ea"/>
+                          <a:cs typeface="+mn-cs"/>
+                        </a:rPr>
+                        <a:t>}</a:t>
+                      </a:r>
+                    </a:p>
+                  </a:txBody>
+                  <a:tcPr/>
+                </a:tc>
+                <a:extLst>
+                  <a:ext uri="{0D108BD9-81ED-4DB2-BD59-A6C34878D82A}">
+                    <a16:rowId xmlns:a16="http://schemas.microsoft.com/office/drawing/2014/main" val="10002"/>
+                  </a:ext>
+                </a:extLst>
+              </a:tr>
+            </a:tbl>
+          </a:graphicData>
+        </a:graphic>
+      </p:graphicFrame>
+    </p:spTree>
+    <p:extLst>
+      <p:ext uri="{BB962C8B-B14F-4D97-AF65-F5344CB8AC3E}">
+        <p14:creationId xmlns:p14="http://schemas.microsoft.com/office/powerpoint/2010/main" val="2927942932"/>
+      </p:ext>
+    </p:extLst>
+  </p:cSld>
+  <p:clrMapOvr>
+    <a:masterClrMapping/>
+  </p:clrMapOvr>
+</p:sld>
+</file>
+
+<file path=ppt/slides/slide24.xml><?xml version="1.0" encoding="utf-8"?>
+<p:sld xmlns:a="http://schemas.openxmlformats.org/drawingml/2006/main" xmlns:r="http://schemas.openxmlformats.org/officeDocument/2006/relationships" xmlns:p="http://schemas.openxmlformats.org/presentationml/2006/main">
+  <p:cSld>
+    <p:spTree>
+      <p:nvGrpSpPr>
+        <p:cNvPr id="1" name=""/>
+        <p:cNvGrpSpPr/>
+        <p:nvPr/>
+      </p:nvGrpSpPr>
+      <p:grpSpPr>
+        <a:xfrm>
+          <a:off x="0" y="0"/>
+          <a:ext cx="0" cy="0"/>
+          <a:chOff x="0" y="0"/>
+          <a:chExt cx="0" cy="0"/>
+        </a:xfrm>
+      </p:grpSpPr>
+      <p:sp>
+        <p:nvSpPr>
+          <p:cNvPr id="2" name="Text Placeholder 1"/>
+          <p:cNvSpPr>
+            <a:spLocks noGrp="1"/>
+          </p:cNvSpPr>
+          <p:nvPr>
+            <p:ph type="body" sz="quarter" idx="13"/>
+          </p:nvPr>
+        </p:nvSpPr>
+        <p:spPr/>
+        <p:txBody>
+          <a:bodyPr/>
+          <a:lstStyle/>
+          <a:p>
+            <a:r>
+              <a:rPr lang="en-US" dirty="0"/>
+              <a:t>5</a:t>
+            </a:r>
+          </a:p>
+        </p:txBody>
+      </p:sp>
+      <p:sp>
+        <p:nvSpPr>
+          <p:cNvPr id="3" name="Text Placeholder 2"/>
+          <p:cNvSpPr>
+            <a:spLocks noGrp="1"/>
+          </p:cNvSpPr>
+          <p:nvPr>
+            <p:ph type="body" sz="quarter" idx="14"/>
+          </p:nvPr>
+        </p:nvSpPr>
+        <p:spPr/>
+        <p:txBody>
+          <a:bodyPr/>
+          <a:lstStyle/>
+          <a:p>
+            <a:r>
+              <a:rPr lang="en-US" dirty="0"/>
+              <a:t>Query  Operators: Array</a:t>
+            </a:r>
+            <a:endParaRPr lang="en-US" altLang="zh-CN" dirty="0"/>
+          </a:p>
+          <a:p>
+            <a:endParaRPr lang="en-US" altLang="zh-CN" dirty="0"/>
+          </a:p>
+          <a:p>
+            <a:endParaRPr lang="en-US" altLang="zh-CN" dirty="0"/>
+          </a:p>
+          <a:p>
+            <a:endParaRPr lang="en-US" dirty="0"/>
+          </a:p>
+          <a:p>
+            <a:endParaRPr lang="en-US" dirty="0"/>
+          </a:p>
+        </p:txBody>
+      </p:sp>
+      <p:sp>
+        <p:nvSpPr>
+          <p:cNvPr id="7" name="TextBox 2"/>
+          <p:cNvSpPr txBox="1">
+            <a:spLocks noChangeArrowheads="1"/>
+          </p:cNvSpPr>
+          <p:nvPr/>
+        </p:nvSpPr>
+        <p:spPr bwMode="auto">
+          <a:xfrm>
+            <a:off x="0" y="2824316"/>
+            <a:ext cx="8824913" cy="954107"/>
+          </a:xfrm>
+          <a:prstGeom prst="rect">
+            <a:avLst/>
+          </a:prstGeom>
+          <a:noFill/>
+          <a:ln w="9525">
+            <a:noFill/>
+            <a:miter lim="800000"/>
+            <a:headEnd/>
+            <a:tailEnd/>
+          </a:ln>
+        </p:spPr>
+        <p:txBody>
+          <a:bodyPr>
+            <a:spAutoFit/>
+          </a:bodyPr>
+          <a:lstStyle>
+            <a:lvl1pPr eaLnBrk="0" hangingPunct="0">
+              <a:defRPr>
+                <a:solidFill>
+                  <a:schemeClr val="tx1"/>
+                </a:solidFill>
+                <a:latin typeface="Arial" charset="0"/>
+                <a:ea typeface="宋体" pitchFamily="2" charset="-122"/>
+              </a:defRPr>
+            </a:lvl1pPr>
+            <a:lvl2pPr marL="742950" indent="-285750" eaLnBrk="0" hangingPunct="0">
+              <a:defRPr>
+                <a:solidFill>
+                  <a:schemeClr val="tx1"/>
+                </a:solidFill>
+                <a:latin typeface="Arial" charset="0"/>
+                <a:ea typeface="宋体" pitchFamily="2" charset="-122"/>
+              </a:defRPr>
+            </a:lvl2pPr>
+            <a:lvl3pPr marL="1143000" indent="-228600" eaLnBrk="0" hangingPunct="0">
+              <a:defRPr>
+                <a:solidFill>
+                  <a:schemeClr val="tx1"/>
+                </a:solidFill>
+                <a:latin typeface="Arial" charset="0"/>
+                <a:ea typeface="宋体" pitchFamily="2" charset="-122"/>
+              </a:defRPr>
+            </a:lvl3pPr>
+            <a:lvl4pPr marL="1600200" indent="-228600" eaLnBrk="0" hangingPunct="0">
+              <a:defRPr>
+                <a:solidFill>
+                  <a:schemeClr val="tx1"/>
+                </a:solidFill>
+                <a:latin typeface="Arial" charset="0"/>
+                <a:ea typeface="宋体" pitchFamily="2" charset="-122"/>
+              </a:defRPr>
+            </a:lvl4pPr>
+            <a:lvl5pPr marL="2057400" indent="-228600" eaLnBrk="0" hangingPunct="0">
+              <a:defRPr>
+                <a:solidFill>
+                  <a:schemeClr val="tx1"/>
+                </a:solidFill>
+                <a:latin typeface="Arial" charset="0"/>
+                <a:ea typeface="宋体" pitchFamily="2" charset="-122"/>
+              </a:defRPr>
+            </a:lvl5pPr>
+            <a:lvl6pPr marL="2514600" indent="-228600" eaLnBrk="0" fontAlgn="base" hangingPunct="0">
+              <a:spcBef>
+                <a:spcPct val="0"/>
+              </a:spcBef>
+              <a:spcAft>
+                <a:spcPct val="0"/>
+              </a:spcAft>
+              <a:defRPr>
+                <a:solidFill>
+                  <a:schemeClr val="tx1"/>
+                </a:solidFill>
+                <a:latin typeface="Arial" charset="0"/>
+                <a:ea typeface="宋体" pitchFamily="2" charset="-122"/>
+              </a:defRPr>
+            </a:lvl6pPr>
+            <a:lvl7pPr marL="2971800" indent="-228600" eaLnBrk="0" fontAlgn="base" hangingPunct="0">
+              <a:spcBef>
+                <a:spcPct val="0"/>
+              </a:spcBef>
+              <a:spcAft>
+                <a:spcPct val="0"/>
+              </a:spcAft>
+              <a:defRPr>
+                <a:solidFill>
+                  <a:schemeClr val="tx1"/>
+                </a:solidFill>
+                <a:latin typeface="Arial" charset="0"/>
+                <a:ea typeface="宋体" pitchFamily="2" charset="-122"/>
+              </a:defRPr>
+            </a:lvl7pPr>
+            <a:lvl8pPr marL="3429000" indent="-228600" eaLnBrk="0" fontAlgn="base" hangingPunct="0">
+              <a:spcBef>
+                <a:spcPct val="0"/>
+              </a:spcBef>
+              <a:spcAft>
+                <a:spcPct val="0"/>
+              </a:spcAft>
+              <a:defRPr>
+                <a:solidFill>
+                  <a:schemeClr val="tx1"/>
+                </a:solidFill>
+                <a:latin typeface="Arial" charset="0"/>
+                <a:ea typeface="宋体" pitchFamily="2" charset="-122"/>
+              </a:defRPr>
+            </a:lvl8pPr>
+            <a:lvl9pPr marL="3886200" indent="-228600" eaLnBrk="0" fontAlgn="base" hangingPunct="0">
+              <a:spcBef>
+                <a:spcPct val="0"/>
+              </a:spcBef>
+              <a:spcAft>
+                <a:spcPct val="0"/>
+              </a:spcAft>
+              <a:defRPr>
+                <a:solidFill>
+                  <a:schemeClr val="tx1"/>
+                </a:solidFill>
+                <a:latin typeface="Arial" charset="0"/>
+                <a:ea typeface="宋体" pitchFamily="2" charset="-122"/>
+              </a:defRPr>
+            </a:lvl9pPr>
+          </a:lstStyle>
+          <a:p>
+            <a:pPr eaLnBrk="1" hangingPunct="1"/>
+            <a:r>
+              <a:rPr lang="en-US" altLang="zh-CN" sz="2800" dirty="0">
+                <a:latin typeface="微软雅黑" panose="020B0503020204020204" pitchFamily="34" charset="-122"/>
+                <a:ea typeface="微软雅黑" panose="020B0503020204020204" pitchFamily="34" charset="-122"/>
+              </a:rPr>
+              <a:t>Query:</a:t>
+            </a:r>
+          </a:p>
+          <a:p>
+            <a:pPr eaLnBrk="1" hangingPunct="1"/>
+            <a:endParaRPr lang="en-US" altLang="zh-CN" sz="2800" dirty="0">
+              <a:solidFill>
+                <a:schemeClr val="bg1"/>
+              </a:solidFill>
+              <a:latin typeface="微软雅黑" pitchFamily="34" charset="-122"/>
+              <a:ea typeface="微软雅黑" pitchFamily="34" charset="-122"/>
+            </a:endParaRPr>
+          </a:p>
+        </p:txBody>
+      </p:sp>
+      <p:sp>
+        <p:nvSpPr>
+          <p:cNvPr id="14" name="TextBox 2"/>
+          <p:cNvSpPr txBox="1">
+            <a:spLocks noChangeArrowheads="1"/>
+          </p:cNvSpPr>
+          <p:nvPr/>
+        </p:nvSpPr>
+        <p:spPr bwMode="auto">
+          <a:xfrm>
+            <a:off x="-58994" y="4038600"/>
+            <a:ext cx="8824913" cy="954107"/>
+          </a:xfrm>
+          <a:prstGeom prst="rect">
+            <a:avLst/>
+          </a:prstGeom>
+          <a:noFill/>
+          <a:ln w="9525">
+            <a:noFill/>
+            <a:miter lim="800000"/>
+            <a:headEnd/>
+            <a:tailEnd/>
+          </a:ln>
+        </p:spPr>
+        <p:txBody>
+          <a:bodyPr>
+            <a:spAutoFit/>
+          </a:bodyPr>
+          <a:lstStyle>
+            <a:lvl1pPr eaLnBrk="0" hangingPunct="0">
+              <a:defRPr>
+                <a:solidFill>
+                  <a:schemeClr val="tx1"/>
+                </a:solidFill>
+                <a:latin typeface="Arial" charset="0"/>
+                <a:ea typeface="宋体" pitchFamily="2" charset="-122"/>
+              </a:defRPr>
+            </a:lvl1pPr>
+            <a:lvl2pPr marL="742950" indent="-285750" eaLnBrk="0" hangingPunct="0">
+              <a:defRPr>
+                <a:solidFill>
+                  <a:schemeClr val="tx1"/>
+                </a:solidFill>
+                <a:latin typeface="Arial" charset="0"/>
+                <a:ea typeface="宋体" pitchFamily="2" charset="-122"/>
+              </a:defRPr>
+            </a:lvl2pPr>
+            <a:lvl3pPr marL="1143000" indent="-228600" eaLnBrk="0" hangingPunct="0">
+              <a:defRPr>
+                <a:solidFill>
+                  <a:schemeClr val="tx1"/>
+                </a:solidFill>
+                <a:latin typeface="Arial" charset="0"/>
+                <a:ea typeface="宋体" pitchFamily="2" charset="-122"/>
+              </a:defRPr>
+            </a:lvl3pPr>
+            <a:lvl4pPr marL="1600200" indent="-228600" eaLnBrk="0" hangingPunct="0">
+              <a:defRPr>
+                <a:solidFill>
+                  <a:schemeClr val="tx1"/>
+                </a:solidFill>
+                <a:latin typeface="Arial" charset="0"/>
+                <a:ea typeface="宋体" pitchFamily="2" charset="-122"/>
+              </a:defRPr>
+            </a:lvl4pPr>
+            <a:lvl5pPr marL="2057400" indent="-228600" eaLnBrk="0" hangingPunct="0">
+              <a:defRPr>
+                <a:solidFill>
+                  <a:schemeClr val="tx1"/>
+                </a:solidFill>
+                <a:latin typeface="Arial" charset="0"/>
+                <a:ea typeface="宋体" pitchFamily="2" charset="-122"/>
+              </a:defRPr>
+            </a:lvl5pPr>
+            <a:lvl6pPr marL="2514600" indent="-228600" eaLnBrk="0" fontAlgn="base" hangingPunct="0">
+              <a:spcBef>
+                <a:spcPct val="0"/>
+              </a:spcBef>
+              <a:spcAft>
+                <a:spcPct val="0"/>
+              </a:spcAft>
+              <a:defRPr>
+                <a:solidFill>
+                  <a:schemeClr val="tx1"/>
+                </a:solidFill>
+                <a:latin typeface="Arial" charset="0"/>
+                <a:ea typeface="宋体" pitchFamily="2" charset="-122"/>
+              </a:defRPr>
+            </a:lvl6pPr>
+            <a:lvl7pPr marL="2971800" indent="-228600" eaLnBrk="0" fontAlgn="base" hangingPunct="0">
+              <a:spcBef>
+                <a:spcPct val="0"/>
+              </a:spcBef>
+              <a:spcAft>
+                <a:spcPct val="0"/>
+              </a:spcAft>
+              <a:defRPr>
+                <a:solidFill>
+                  <a:schemeClr val="tx1"/>
+                </a:solidFill>
+                <a:latin typeface="Arial" charset="0"/>
+                <a:ea typeface="宋体" pitchFamily="2" charset="-122"/>
+              </a:defRPr>
+            </a:lvl7pPr>
+            <a:lvl8pPr marL="3429000" indent="-228600" eaLnBrk="0" fontAlgn="base" hangingPunct="0">
+              <a:spcBef>
+                <a:spcPct val="0"/>
+              </a:spcBef>
+              <a:spcAft>
+                <a:spcPct val="0"/>
+              </a:spcAft>
+              <a:defRPr>
+                <a:solidFill>
+                  <a:schemeClr val="tx1"/>
+                </a:solidFill>
+                <a:latin typeface="Arial" charset="0"/>
+                <a:ea typeface="宋体" pitchFamily="2" charset="-122"/>
+              </a:defRPr>
+            </a:lvl8pPr>
+            <a:lvl9pPr marL="3886200" indent="-228600" eaLnBrk="0" fontAlgn="base" hangingPunct="0">
+              <a:spcBef>
+                <a:spcPct val="0"/>
+              </a:spcBef>
+              <a:spcAft>
+                <a:spcPct val="0"/>
+              </a:spcAft>
+              <a:defRPr>
+                <a:solidFill>
+                  <a:schemeClr val="tx1"/>
+                </a:solidFill>
+                <a:latin typeface="Arial" charset="0"/>
+                <a:ea typeface="宋体" pitchFamily="2" charset="-122"/>
+              </a:defRPr>
+            </a:lvl9pPr>
+          </a:lstStyle>
+          <a:p>
+            <a:pPr eaLnBrk="1" hangingPunct="1"/>
+            <a:r>
+              <a:rPr lang="en-US" altLang="zh-CN" sz="2800" dirty="0">
+                <a:latin typeface="微软雅黑" panose="020B0503020204020204" pitchFamily="34" charset="-122"/>
+                <a:ea typeface="微软雅黑" panose="020B0503020204020204" pitchFamily="34" charset="-122"/>
+              </a:rPr>
+              <a:t>MongoDB returns:</a:t>
+            </a:r>
+          </a:p>
+          <a:p>
+            <a:pPr eaLnBrk="1" hangingPunct="1"/>
+            <a:endParaRPr lang="en-US" altLang="zh-CN" sz="2800" dirty="0">
+              <a:solidFill>
+                <a:schemeClr val="bg1"/>
+              </a:solidFill>
+              <a:latin typeface="微软雅黑" pitchFamily="34" charset="-122"/>
+              <a:ea typeface="微软雅黑" pitchFamily="34" charset="-122"/>
+            </a:endParaRPr>
+          </a:p>
+        </p:txBody>
+      </p:sp>
+      <p:pic>
+        <p:nvPicPr>
+          <p:cNvPr id="8" name="Picture 7"/>
+          <p:cNvPicPr>
+            <a:picLocks noChangeAspect="1"/>
+          </p:cNvPicPr>
+          <p:nvPr/>
+        </p:nvPicPr>
+        <p:blipFill>
+          <a:blip r:embed="rId2"/>
+          <a:stretch>
+            <a:fillRect/>
+          </a:stretch>
+        </p:blipFill>
+        <p:spPr>
+          <a:xfrm>
+            <a:off x="36871" y="1136890"/>
+            <a:ext cx="6211529" cy="1777052"/>
+          </a:xfrm>
+          <a:prstGeom prst="rect">
+            <a:avLst/>
+          </a:prstGeom>
+        </p:spPr>
+      </p:pic>
+      <p:pic>
+        <p:nvPicPr>
+          <p:cNvPr id="10" name="Picture 9"/>
+          <p:cNvPicPr>
+            <a:picLocks noChangeAspect="1"/>
+          </p:cNvPicPr>
+          <p:nvPr/>
+        </p:nvPicPr>
+        <p:blipFill>
+          <a:blip r:embed="rId3"/>
+          <a:stretch>
+            <a:fillRect/>
+          </a:stretch>
+        </p:blipFill>
+        <p:spPr>
+          <a:xfrm>
+            <a:off x="36871" y="3316218"/>
+            <a:ext cx="9107129" cy="569982"/>
+          </a:xfrm>
+          <a:prstGeom prst="rect">
+            <a:avLst/>
+          </a:prstGeom>
+        </p:spPr>
+      </p:pic>
+      <p:pic>
+        <p:nvPicPr>
+          <p:cNvPr id="11" name="Picture 10"/>
+          <p:cNvPicPr>
+            <a:picLocks noChangeAspect="1"/>
+          </p:cNvPicPr>
+          <p:nvPr/>
+        </p:nvPicPr>
+        <p:blipFill>
+          <a:blip r:embed="rId4"/>
+          <a:stretch>
+            <a:fillRect/>
+          </a:stretch>
+        </p:blipFill>
+        <p:spPr>
+          <a:xfrm>
+            <a:off x="51619" y="4576786"/>
+            <a:ext cx="8526154" cy="1976413"/>
+          </a:xfrm>
+          <a:prstGeom prst="rect">
+            <a:avLst/>
+          </a:prstGeom>
+        </p:spPr>
+      </p:pic>
+    </p:spTree>
+    <p:extLst>
+      <p:ext uri="{BB962C8B-B14F-4D97-AF65-F5344CB8AC3E}">
+        <p14:creationId xmlns:p14="http://schemas.microsoft.com/office/powerpoint/2010/main" val="1103326058"/>
+      </p:ext>
+    </p:extLst>
+  </p:cSld>
+  <p:clrMapOvr>
+    <a:masterClrMapping/>
+  </p:clrMapOvr>
+  <p:timing>
+    <p:tnLst>
+      <p:par>
+        <p:cTn id="1" dur="indefinite" restart="never" nodeType="tmRoot">
+          <p:childTnLst>
+            <p:seq concurrent="1" nextAc="seek">
+              <p:cTn id="2" dur="indefinite" nodeType="mainSeq">
+                <p:childTnLst>
+                  <p:par>
+                    <p:cTn id="3" fill="hold">
+                      <p:stCondLst>
+                        <p:cond delay="indefinite"/>
+                      </p:stCondLst>
+                      <p:childTnLst>
+                        <p:par>
+                          <p:cTn id="4" fill="hold">
+                            <p:stCondLst>
+                              <p:cond delay="0"/>
+                            </p:stCondLst>
+                            <p:childTnLst>
+                              <p:par>
+                                <p:cTn id="5" presetID="10" presetClass="entr" presetSubtype="0" fill="hold" nodeType="clickEffect">
+                                  <p:stCondLst>
+                                    <p:cond delay="0"/>
+                                  </p:stCondLst>
+                                  <p:childTnLst>
+                                    <p:set>
+                                      <p:cBhvr>
+                                        <p:cTn id="6" dur="1" fill="hold">
+                                          <p:stCondLst>
+                                            <p:cond delay="0"/>
+                                          </p:stCondLst>
+                                        </p:cTn>
+                                        <p:tgtEl>
+                                          <p:spTgt spid="11"/>
+                                        </p:tgtEl>
+                                        <p:attrNameLst>
+                                          <p:attrName>style.visibility</p:attrName>
+                                        </p:attrNameLst>
+                                      </p:cBhvr>
+                                      <p:to>
+                                        <p:strVal val="visible"/>
+                                      </p:to>
+                                    </p:set>
+                                    <p:animEffect transition="in" filter="fade">
+                                      <p:cBhvr>
+                                        <p:cTn id="7" dur="500"/>
+                                        <p:tgtEl>
+                                          <p:spTgt spid="11"/>
+                                        </p:tgtEl>
+                                      </p:cBhvr>
+                                    </p:animEffect>
+                                  </p:childTnLst>
+                                </p:cTn>
+                              </p:par>
+                            </p:childTnLst>
+                          </p:cTn>
+                        </p:par>
+                      </p:childTnLst>
+                    </p:cTn>
+                  </p:par>
+                </p:childTnLst>
+              </p:cTn>
+              <p:prevCondLst>
+                <p:cond evt="onPrev" delay="0">
+                  <p:tgtEl>
+                    <p:sldTgt/>
+                  </p:tgtEl>
+                </p:cond>
+              </p:prevCondLst>
+              <p:nextCondLst>
+                <p:cond evt="onNext" delay="0">
+                  <p:tgtEl>
+                    <p:sldTgt/>
+                  </p:tgtEl>
+                </p:cond>
+              </p:nextCondLst>
+            </p:seq>
+          </p:childTnLst>
+        </p:cTn>
+      </p:par>
+    </p:tnLst>
+  </p:timing>
+</p:sld>
+</file>
+
+<file path=ppt/slides/slide25.xml><?xml version="1.0" encoding="utf-8"?>
+<p:sld xmlns:a="http://schemas.openxmlformats.org/drawingml/2006/main" xmlns:r="http://schemas.openxmlformats.org/officeDocument/2006/relationships" xmlns:p="http://schemas.openxmlformats.org/presentationml/2006/main">
+  <p:cSld>
+    <p:spTree>
+      <p:nvGrpSpPr>
+        <p:cNvPr id="1" name=""/>
+        <p:cNvGrpSpPr/>
+        <p:nvPr/>
+      </p:nvGrpSpPr>
+      <p:grpSpPr>
+        <a:xfrm>
+          <a:off x="0" y="0"/>
+          <a:ext cx="0" cy="0"/>
+          <a:chOff x="0" y="0"/>
+          <a:chExt cx="0" cy="0"/>
+        </a:xfrm>
+      </p:grpSpPr>
+      <p:sp>
+        <p:nvSpPr>
+          <p:cNvPr id="2" name="Text Placeholder 1"/>
+          <p:cNvSpPr>
+            <a:spLocks noGrp="1"/>
+          </p:cNvSpPr>
+          <p:nvPr>
+            <p:ph type="body" sz="quarter" idx="13"/>
+          </p:nvPr>
+        </p:nvSpPr>
+        <p:spPr/>
+        <p:txBody>
+          <a:bodyPr/>
+          <a:lstStyle/>
+          <a:p>
+            <a:r>
+              <a:rPr lang="en-US" dirty="0"/>
+              <a:t>5</a:t>
+            </a:r>
+          </a:p>
+        </p:txBody>
+      </p:sp>
+      <p:sp>
+        <p:nvSpPr>
+          <p:cNvPr id="3" name="Text Placeholder 2"/>
+          <p:cNvSpPr>
+            <a:spLocks noGrp="1"/>
+          </p:cNvSpPr>
+          <p:nvPr>
+            <p:ph type="body" sz="quarter" idx="14"/>
+          </p:nvPr>
+        </p:nvSpPr>
+        <p:spPr/>
+        <p:txBody>
+          <a:bodyPr/>
+          <a:lstStyle/>
+          <a:p>
+            <a:r>
+              <a:rPr lang="en-US" dirty="0"/>
+              <a:t>Query  Operators: Array</a:t>
+            </a:r>
+            <a:endParaRPr lang="en-US" altLang="zh-CN" dirty="0"/>
+          </a:p>
+          <a:p>
+            <a:endParaRPr lang="en-US" altLang="zh-CN" dirty="0"/>
+          </a:p>
+          <a:p>
+            <a:endParaRPr lang="en-US" altLang="zh-CN" dirty="0"/>
+          </a:p>
+          <a:p>
+            <a:endParaRPr lang="en-US" dirty="0"/>
+          </a:p>
+          <a:p>
+            <a:endParaRPr lang="en-US" dirty="0"/>
+          </a:p>
+        </p:txBody>
+      </p:sp>
+      <p:sp>
+        <p:nvSpPr>
+          <p:cNvPr id="7" name="TextBox 2"/>
+          <p:cNvSpPr txBox="1">
+            <a:spLocks noChangeArrowheads="1"/>
+          </p:cNvSpPr>
+          <p:nvPr/>
+        </p:nvSpPr>
+        <p:spPr bwMode="auto">
+          <a:xfrm>
+            <a:off x="0" y="2824316"/>
+            <a:ext cx="8824913" cy="954107"/>
+          </a:xfrm>
+          <a:prstGeom prst="rect">
+            <a:avLst/>
+          </a:prstGeom>
+          <a:noFill/>
+          <a:ln w="9525">
+            <a:noFill/>
+            <a:miter lim="800000"/>
+            <a:headEnd/>
+            <a:tailEnd/>
+          </a:ln>
+        </p:spPr>
+        <p:txBody>
+          <a:bodyPr>
+            <a:spAutoFit/>
+          </a:bodyPr>
+          <a:lstStyle>
+            <a:lvl1pPr eaLnBrk="0" hangingPunct="0">
+              <a:defRPr>
+                <a:solidFill>
+                  <a:schemeClr val="tx1"/>
+                </a:solidFill>
+                <a:latin typeface="Arial" charset="0"/>
+                <a:ea typeface="宋体" pitchFamily="2" charset="-122"/>
+              </a:defRPr>
+            </a:lvl1pPr>
+            <a:lvl2pPr marL="742950" indent="-285750" eaLnBrk="0" hangingPunct="0">
+              <a:defRPr>
+                <a:solidFill>
+                  <a:schemeClr val="tx1"/>
+                </a:solidFill>
+                <a:latin typeface="Arial" charset="0"/>
+                <a:ea typeface="宋体" pitchFamily="2" charset="-122"/>
+              </a:defRPr>
+            </a:lvl2pPr>
+            <a:lvl3pPr marL="1143000" indent="-228600" eaLnBrk="0" hangingPunct="0">
+              <a:defRPr>
+                <a:solidFill>
+                  <a:schemeClr val="tx1"/>
+                </a:solidFill>
+                <a:latin typeface="Arial" charset="0"/>
+                <a:ea typeface="宋体" pitchFamily="2" charset="-122"/>
+              </a:defRPr>
+            </a:lvl3pPr>
+            <a:lvl4pPr marL="1600200" indent="-228600" eaLnBrk="0" hangingPunct="0">
+              <a:defRPr>
+                <a:solidFill>
+                  <a:schemeClr val="tx1"/>
+                </a:solidFill>
+                <a:latin typeface="Arial" charset="0"/>
+                <a:ea typeface="宋体" pitchFamily="2" charset="-122"/>
+              </a:defRPr>
+            </a:lvl4pPr>
+            <a:lvl5pPr marL="2057400" indent="-228600" eaLnBrk="0" hangingPunct="0">
+              <a:defRPr>
+                <a:solidFill>
+                  <a:schemeClr val="tx1"/>
+                </a:solidFill>
+                <a:latin typeface="Arial" charset="0"/>
+                <a:ea typeface="宋体" pitchFamily="2" charset="-122"/>
+              </a:defRPr>
+            </a:lvl5pPr>
+            <a:lvl6pPr marL="2514600" indent="-228600" eaLnBrk="0" fontAlgn="base" hangingPunct="0">
+              <a:spcBef>
+                <a:spcPct val="0"/>
+              </a:spcBef>
+              <a:spcAft>
+                <a:spcPct val="0"/>
+              </a:spcAft>
+              <a:defRPr>
+                <a:solidFill>
+                  <a:schemeClr val="tx1"/>
+                </a:solidFill>
+                <a:latin typeface="Arial" charset="0"/>
+                <a:ea typeface="宋体" pitchFamily="2" charset="-122"/>
+              </a:defRPr>
+            </a:lvl6pPr>
+            <a:lvl7pPr marL="2971800" indent="-228600" eaLnBrk="0" fontAlgn="base" hangingPunct="0">
+              <a:spcBef>
+                <a:spcPct val="0"/>
+              </a:spcBef>
+              <a:spcAft>
+                <a:spcPct val="0"/>
+              </a:spcAft>
+              <a:defRPr>
+                <a:solidFill>
+                  <a:schemeClr val="tx1"/>
+                </a:solidFill>
+                <a:latin typeface="Arial" charset="0"/>
+                <a:ea typeface="宋体" pitchFamily="2" charset="-122"/>
+              </a:defRPr>
+            </a:lvl7pPr>
+            <a:lvl8pPr marL="3429000" indent="-228600" eaLnBrk="0" fontAlgn="base" hangingPunct="0">
+              <a:spcBef>
+                <a:spcPct val="0"/>
+              </a:spcBef>
+              <a:spcAft>
+                <a:spcPct val="0"/>
+              </a:spcAft>
+              <a:defRPr>
+                <a:solidFill>
+                  <a:schemeClr val="tx1"/>
+                </a:solidFill>
+                <a:latin typeface="Arial" charset="0"/>
+                <a:ea typeface="宋体" pitchFamily="2" charset="-122"/>
+              </a:defRPr>
+            </a:lvl8pPr>
+            <a:lvl9pPr marL="3886200" indent="-228600" eaLnBrk="0" fontAlgn="base" hangingPunct="0">
+              <a:spcBef>
+                <a:spcPct val="0"/>
+              </a:spcBef>
+              <a:spcAft>
+                <a:spcPct val="0"/>
+              </a:spcAft>
+              <a:defRPr>
+                <a:solidFill>
+                  <a:schemeClr val="tx1"/>
+                </a:solidFill>
+                <a:latin typeface="Arial" charset="0"/>
+                <a:ea typeface="宋体" pitchFamily="2" charset="-122"/>
+              </a:defRPr>
+            </a:lvl9pPr>
+          </a:lstStyle>
+          <a:p>
+            <a:pPr eaLnBrk="1" hangingPunct="1"/>
+            <a:r>
+              <a:rPr lang="en-US" altLang="zh-CN" sz="2800" dirty="0">
+                <a:latin typeface="微软雅黑" panose="020B0503020204020204" pitchFamily="34" charset="-122"/>
+                <a:ea typeface="微软雅黑" panose="020B0503020204020204" pitchFamily="34" charset="-122"/>
+              </a:rPr>
+              <a:t>Query:</a:t>
+            </a:r>
+          </a:p>
+          <a:p>
+            <a:pPr eaLnBrk="1" hangingPunct="1"/>
+            <a:endParaRPr lang="en-US" altLang="zh-CN" sz="2800" dirty="0">
+              <a:solidFill>
+                <a:schemeClr val="bg1"/>
+              </a:solidFill>
+              <a:latin typeface="微软雅黑" pitchFamily="34" charset="-122"/>
+              <a:ea typeface="微软雅黑" pitchFamily="34" charset="-122"/>
+            </a:endParaRPr>
+          </a:p>
+        </p:txBody>
+      </p:sp>
+      <p:sp>
+        <p:nvSpPr>
+          <p:cNvPr id="14" name="TextBox 2"/>
+          <p:cNvSpPr txBox="1">
+            <a:spLocks noChangeArrowheads="1"/>
+          </p:cNvSpPr>
+          <p:nvPr/>
+        </p:nvSpPr>
+        <p:spPr bwMode="auto">
+          <a:xfrm>
+            <a:off x="-58994" y="4038600"/>
+            <a:ext cx="8824913" cy="954107"/>
+          </a:xfrm>
+          <a:prstGeom prst="rect">
+            <a:avLst/>
+          </a:prstGeom>
+          <a:noFill/>
+          <a:ln w="9525">
+            <a:noFill/>
+            <a:miter lim="800000"/>
+            <a:headEnd/>
+            <a:tailEnd/>
+          </a:ln>
+        </p:spPr>
+        <p:txBody>
+          <a:bodyPr>
+            <a:spAutoFit/>
+          </a:bodyPr>
+          <a:lstStyle>
+            <a:lvl1pPr eaLnBrk="0" hangingPunct="0">
+              <a:defRPr>
+                <a:solidFill>
+                  <a:schemeClr val="tx1"/>
+                </a:solidFill>
+                <a:latin typeface="Arial" charset="0"/>
+                <a:ea typeface="宋体" pitchFamily="2" charset="-122"/>
+              </a:defRPr>
+            </a:lvl1pPr>
+            <a:lvl2pPr marL="742950" indent="-285750" eaLnBrk="0" hangingPunct="0">
+              <a:defRPr>
+                <a:solidFill>
+                  <a:schemeClr val="tx1"/>
+                </a:solidFill>
+                <a:latin typeface="Arial" charset="0"/>
+                <a:ea typeface="宋体" pitchFamily="2" charset="-122"/>
+              </a:defRPr>
+            </a:lvl2pPr>
+            <a:lvl3pPr marL="1143000" indent="-228600" eaLnBrk="0" hangingPunct="0">
+              <a:defRPr>
+                <a:solidFill>
+                  <a:schemeClr val="tx1"/>
+                </a:solidFill>
+                <a:latin typeface="Arial" charset="0"/>
+                <a:ea typeface="宋体" pitchFamily="2" charset="-122"/>
+              </a:defRPr>
+            </a:lvl3pPr>
+            <a:lvl4pPr marL="1600200" indent="-228600" eaLnBrk="0" hangingPunct="0">
+              <a:defRPr>
+                <a:solidFill>
+                  <a:schemeClr val="tx1"/>
+                </a:solidFill>
+                <a:latin typeface="Arial" charset="0"/>
+                <a:ea typeface="宋体" pitchFamily="2" charset="-122"/>
+              </a:defRPr>
+            </a:lvl4pPr>
+            <a:lvl5pPr marL="2057400" indent="-228600" eaLnBrk="0" hangingPunct="0">
+              <a:defRPr>
+                <a:solidFill>
+                  <a:schemeClr val="tx1"/>
+                </a:solidFill>
+                <a:latin typeface="Arial" charset="0"/>
+                <a:ea typeface="宋体" pitchFamily="2" charset="-122"/>
+              </a:defRPr>
+            </a:lvl5pPr>
+            <a:lvl6pPr marL="2514600" indent="-228600" eaLnBrk="0" fontAlgn="base" hangingPunct="0">
+              <a:spcBef>
+                <a:spcPct val="0"/>
+              </a:spcBef>
+              <a:spcAft>
+                <a:spcPct val="0"/>
+              </a:spcAft>
+              <a:defRPr>
+                <a:solidFill>
+                  <a:schemeClr val="tx1"/>
+                </a:solidFill>
+                <a:latin typeface="Arial" charset="0"/>
+                <a:ea typeface="宋体" pitchFamily="2" charset="-122"/>
+              </a:defRPr>
+            </a:lvl6pPr>
+            <a:lvl7pPr marL="2971800" indent="-228600" eaLnBrk="0" fontAlgn="base" hangingPunct="0">
+              <a:spcBef>
+                <a:spcPct val="0"/>
+              </a:spcBef>
+              <a:spcAft>
+                <a:spcPct val="0"/>
+              </a:spcAft>
+              <a:defRPr>
+                <a:solidFill>
+                  <a:schemeClr val="tx1"/>
+                </a:solidFill>
+                <a:latin typeface="Arial" charset="0"/>
+                <a:ea typeface="宋体" pitchFamily="2" charset="-122"/>
+              </a:defRPr>
+            </a:lvl7pPr>
+            <a:lvl8pPr marL="3429000" indent="-228600" eaLnBrk="0" fontAlgn="base" hangingPunct="0">
+              <a:spcBef>
+                <a:spcPct val="0"/>
+              </a:spcBef>
+              <a:spcAft>
+                <a:spcPct val="0"/>
+              </a:spcAft>
+              <a:defRPr>
+                <a:solidFill>
+                  <a:schemeClr val="tx1"/>
+                </a:solidFill>
+                <a:latin typeface="Arial" charset="0"/>
+                <a:ea typeface="宋体" pitchFamily="2" charset="-122"/>
+              </a:defRPr>
+            </a:lvl8pPr>
+            <a:lvl9pPr marL="3886200" indent="-228600" eaLnBrk="0" fontAlgn="base" hangingPunct="0">
+              <a:spcBef>
+                <a:spcPct val="0"/>
+              </a:spcBef>
+              <a:spcAft>
+                <a:spcPct val="0"/>
+              </a:spcAft>
+              <a:defRPr>
+                <a:solidFill>
+                  <a:schemeClr val="tx1"/>
+                </a:solidFill>
+                <a:latin typeface="Arial" charset="0"/>
+                <a:ea typeface="宋体" pitchFamily="2" charset="-122"/>
+              </a:defRPr>
+            </a:lvl9pPr>
+          </a:lstStyle>
+          <a:p>
+            <a:pPr eaLnBrk="1" hangingPunct="1"/>
+            <a:r>
+              <a:rPr lang="en-US" altLang="zh-CN" sz="2800" dirty="0">
+                <a:latin typeface="微软雅黑" panose="020B0503020204020204" pitchFamily="34" charset="-122"/>
+                <a:ea typeface="微软雅黑" panose="020B0503020204020204" pitchFamily="34" charset="-122"/>
+              </a:rPr>
+              <a:t>MongoDB returns:</a:t>
+            </a:r>
+          </a:p>
+          <a:p>
+            <a:pPr eaLnBrk="1" hangingPunct="1"/>
+            <a:endParaRPr lang="en-US" altLang="zh-CN" sz="2800" dirty="0">
+              <a:solidFill>
+                <a:schemeClr val="bg1"/>
+              </a:solidFill>
+              <a:latin typeface="微软雅黑" pitchFamily="34" charset="-122"/>
+              <a:ea typeface="微软雅黑" pitchFamily="34" charset="-122"/>
+            </a:endParaRPr>
+          </a:p>
+        </p:txBody>
+      </p:sp>
+      <p:pic>
+        <p:nvPicPr>
+          <p:cNvPr id="8" name="Picture 7"/>
+          <p:cNvPicPr>
+            <a:picLocks noChangeAspect="1"/>
+          </p:cNvPicPr>
+          <p:nvPr/>
+        </p:nvPicPr>
+        <p:blipFill>
+          <a:blip r:embed="rId2"/>
+          <a:stretch>
+            <a:fillRect/>
+          </a:stretch>
+        </p:blipFill>
+        <p:spPr>
+          <a:xfrm>
+            <a:off x="36871" y="1136890"/>
+            <a:ext cx="6211529" cy="1777052"/>
+          </a:xfrm>
+          <a:prstGeom prst="rect">
+            <a:avLst/>
+          </a:prstGeom>
+        </p:spPr>
+      </p:pic>
+      <p:pic>
+        <p:nvPicPr>
+          <p:cNvPr id="4" name="Picture 3"/>
+          <p:cNvPicPr>
+            <a:picLocks noChangeAspect="1"/>
+          </p:cNvPicPr>
+          <p:nvPr/>
+        </p:nvPicPr>
+        <p:blipFill>
+          <a:blip r:embed="rId3"/>
+          <a:stretch>
+            <a:fillRect/>
+          </a:stretch>
+        </p:blipFill>
+        <p:spPr>
+          <a:xfrm>
+            <a:off x="36871" y="3299012"/>
+            <a:ext cx="9107129" cy="587188"/>
+          </a:xfrm>
+          <a:prstGeom prst="rect">
+            <a:avLst/>
+          </a:prstGeom>
+        </p:spPr>
+      </p:pic>
+      <p:pic>
+        <p:nvPicPr>
+          <p:cNvPr id="5" name="Picture 4"/>
+          <p:cNvPicPr>
+            <a:picLocks noChangeAspect="1"/>
+          </p:cNvPicPr>
+          <p:nvPr/>
+        </p:nvPicPr>
+        <p:blipFill>
+          <a:blip r:embed="rId4"/>
+          <a:stretch>
+            <a:fillRect/>
+          </a:stretch>
+        </p:blipFill>
+        <p:spPr>
+          <a:xfrm>
+            <a:off x="36871" y="4538763"/>
+            <a:ext cx="9034501" cy="1176237"/>
+          </a:xfrm>
+          <a:prstGeom prst="rect">
+            <a:avLst/>
+          </a:prstGeom>
+        </p:spPr>
+      </p:pic>
+    </p:spTree>
+    <p:extLst>
+      <p:ext uri="{BB962C8B-B14F-4D97-AF65-F5344CB8AC3E}">
+        <p14:creationId xmlns:p14="http://schemas.microsoft.com/office/powerpoint/2010/main" val="2049795247"/>
+      </p:ext>
+    </p:extLst>
+  </p:cSld>
+  <p:clrMapOvr>
+    <a:masterClrMapping/>
+  </p:clrMapOvr>
+  <p:timing>
+    <p:tnLst>
+      <p:par>
+        <p:cTn id="1" dur="indefinite" restart="never" nodeType="tmRoot">
+          <p:childTnLst>
+            <p:seq concurrent="1" nextAc="seek">
+              <p:cTn id="2" dur="indefinite" nodeType="mainSeq">
+                <p:childTnLst>
+                  <p:par>
+                    <p:cTn id="3" fill="hold">
+                      <p:stCondLst>
+                        <p:cond delay="indefinite"/>
+                      </p:stCondLst>
+                      <p:childTnLst>
+                        <p:par>
+                          <p:cTn id="4" fill="hold">
+                            <p:stCondLst>
+                              <p:cond delay="0"/>
+                            </p:stCondLst>
+                            <p:childTnLst>
+                              <p:par>
+                                <p:cTn id="5" presetID="10" presetClass="entr" presetSubtype="0" fill="hold" nodeType="clickEffect">
+                                  <p:stCondLst>
+                                    <p:cond delay="0"/>
+                                  </p:stCondLst>
+                                  <p:childTnLst>
+                                    <p:set>
+                                      <p:cBhvr>
+                                        <p:cTn id="6" dur="1" fill="hold">
+                                          <p:stCondLst>
+                                            <p:cond delay="0"/>
+                                          </p:stCondLst>
+                                        </p:cTn>
+                                        <p:tgtEl>
+                                          <p:spTgt spid="5"/>
+                                        </p:tgtEl>
+                                        <p:attrNameLst>
+                                          <p:attrName>style.visibility</p:attrName>
+                                        </p:attrNameLst>
+                                      </p:cBhvr>
+                                      <p:to>
+                                        <p:strVal val="visible"/>
+                                      </p:to>
+                                    </p:set>
+                                    <p:animEffect transition="in" filter="fade">
+                                      <p:cBhvr>
+                                        <p:cTn id="7" dur="500"/>
+                                        <p:tgtEl>
+                                          <p:spTgt spid="5"/>
+                                        </p:tgtEl>
+                                      </p:cBhvr>
+                                    </p:animEffect>
+                                  </p:childTnLst>
+                                </p:cTn>
+                              </p:par>
+                            </p:childTnLst>
+                          </p:cTn>
+                        </p:par>
+                      </p:childTnLst>
+                    </p:cTn>
+                  </p:par>
+                </p:childTnLst>
+              </p:cTn>
+              <p:prevCondLst>
+                <p:cond evt="onPrev" delay="0">
+                  <p:tgtEl>
+                    <p:sldTgt/>
+                  </p:tgtEl>
+                </p:cond>
+              </p:prevCondLst>
+              <p:nextCondLst>
+                <p:cond evt="onNext" delay="0">
+                  <p:tgtEl>
+                    <p:sldTgt/>
+                  </p:tgtEl>
+                </p:cond>
+              </p:nextCondLst>
+            </p:seq>
+          </p:childTnLst>
+        </p:cTn>
+      </p:par>
+    </p:tnLst>
+  </p:timing>
+</p:sld>
+</file>
+
+<file path=ppt/slides/slide26.xml><?xml version="1.0" encoding="utf-8"?>
+<p:sld xmlns:a="http://schemas.openxmlformats.org/drawingml/2006/main" xmlns:r="http://schemas.openxmlformats.org/officeDocument/2006/relationships" xmlns:p="http://schemas.openxmlformats.org/presentationml/2006/main">
+  <p:cSld>
+    <p:spTree>
+      <p:nvGrpSpPr>
+        <p:cNvPr id="1" name=""/>
+        <p:cNvGrpSpPr/>
+        <p:nvPr/>
+      </p:nvGrpSpPr>
+      <p:grpSpPr>
+        <a:xfrm>
+          <a:off x="0" y="0"/>
+          <a:ext cx="0" cy="0"/>
+          <a:chOff x="0" y="0"/>
+          <a:chExt cx="0" cy="0"/>
+        </a:xfrm>
+      </p:grpSpPr>
+      <p:sp>
+        <p:nvSpPr>
+          <p:cNvPr id="2" name="Text Placeholder 1"/>
+          <p:cNvSpPr>
+            <a:spLocks noGrp="1"/>
+          </p:cNvSpPr>
+          <p:nvPr>
+            <p:ph type="body" sz="quarter" idx="13"/>
+          </p:nvPr>
+        </p:nvSpPr>
+        <p:spPr/>
+        <p:txBody>
+          <a:bodyPr/>
+          <a:lstStyle/>
+          <a:p>
+            <a:r>
+              <a:rPr lang="en-US" dirty="0"/>
+              <a:t>5</a:t>
+            </a:r>
+          </a:p>
+        </p:txBody>
+      </p:sp>
+      <p:sp>
+        <p:nvSpPr>
+          <p:cNvPr id="3" name="Text Placeholder 2"/>
+          <p:cNvSpPr>
+            <a:spLocks noGrp="1"/>
+          </p:cNvSpPr>
+          <p:nvPr>
+            <p:ph type="body" sz="quarter" idx="14"/>
+          </p:nvPr>
+        </p:nvSpPr>
+        <p:spPr/>
+        <p:txBody>
+          <a:bodyPr/>
+          <a:lstStyle/>
+          <a:p>
+            <a:r>
+              <a:rPr lang="en-US" dirty="0"/>
+              <a:t>Query  Operators: Array</a:t>
+            </a:r>
+            <a:endParaRPr lang="en-US" altLang="zh-CN" dirty="0"/>
+          </a:p>
+          <a:p>
+            <a:endParaRPr lang="en-US" altLang="zh-CN" dirty="0"/>
+          </a:p>
+          <a:p>
+            <a:endParaRPr lang="en-US" altLang="zh-CN" dirty="0"/>
+          </a:p>
+          <a:p>
+            <a:endParaRPr lang="en-US" dirty="0"/>
+          </a:p>
+          <a:p>
+            <a:endParaRPr lang="en-US" dirty="0"/>
+          </a:p>
+        </p:txBody>
+      </p:sp>
+      <p:sp>
+        <p:nvSpPr>
+          <p:cNvPr id="7" name="TextBox 2"/>
+          <p:cNvSpPr txBox="1">
+            <a:spLocks noChangeArrowheads="1"/>
+          </p:cNvSpPr>
+          <p:nvPr/>
+        </p:nvSpPr>
+        <p:spPr bwMode="auto">
+          <a:xfrm>
+            <a:off x="0" y="2824316"/>
+            <a:ext cx="8824913" cy="954107"/>
+          </a:xfrm>
+          <a:prstGeom prst="rect">
+            <a:avLst/>
+          </a:prstGeom>
+          <a:noFill/>
+          <a:ln w="9525">
+            <a:noFill/>
+            <a:miter lim="800000"/>
+            <a:headEnd/>
+            <a:tailEnd/>
+          </a:ln>
+        </p:spPr>
+        <p:txBody>
+          <a:bodyPr>
+            <a:spAutoFit/>
+          </a:bodyPr>
+          <a:lstStyle>
+            <a:lvl1pPr eaLnBrk="0" hangingPunct="0">
+              <a:defRPr>
+                <a:solidFill>
+                  <a:schemeClr val="tx1"/>
+                </a:solidFill>
+                <a:latin typeface="Arial" charset="0"/>
+                <a:ea typeface="宋体" pitchFamily="2" charset="-122"/>
+              </a:defRPr>
+            </a:lvl1pPr>
+            <a:lvl2pPr marL="742950" indent="-285750" eaLnBrk="0" hangingPunct="0">
+              <a:defRPr>
+                <a:solidFill>
+                  <a:schemeClr val="tx1"/>
+                </a:solidFill>
+                <a:latin typeface="Arial" charset="0"/>
+                <a:ea typeface="宋体" pitchFamily="2" charset="-122"/>
+              </a:defRPr>
+            </a:lvl2pPr>
+            <a:lvl3pPr marL="1143000" indent="-228600" eaLnBrk="0" hangingPunct="0">
+              <a:defRPr>
+                <a:solidFill>
+                  <a:schemeClr val="tx1"/>
+                </a:solidFill>
+                <a:latin typeface="Arial" charset="0"/>
+                <a:ea typeface="宋体" pitchFamily="2" charset="-122"/>
+              </a:defRPr>
+            </a:lvl3pPr>
+            <a:lvl4pPr marL="1600200" indent="-228600" eaLnBrk="0" hangingPunct="0">
+              <a:defRPr>
+                <a:solidFill>
+                  <a:schemeClr val="tx1"/>
+                </a:solidFill>
+                <a:latin typeface="Arial" charset="0"/>
+                <a:ea typeface="宋体" pitchFamily="2" charset="-122"/>
+              </a:defRPr>
+            </a:lvl4pPr>
+            <a:lvl5pPr marL="2057400" indent="-228600" eaLnBrk="0" hangingPunct="0">
+              <a:defRPr>
+                <a:solidFill>
+                  <a:schemeClr val="tx1"/>
+                </a:solidFill>
+                <a:latin typeface="Arial" charset="0"/>
+                <a:ea typeface="宋体" pitchFamily="2" charset="-122"/>
+              </a:defRPr>
+            </a:lvl5pPr>
+            <a:lvl6pPr marL="2514600" indent="-228600" eaLnBrk="0" fontAlgn="base" hangingPunct="0">
+              <a:spcBef>
+                <a:spcPct val="0"/>
+              </a:spcBef>
+              <a:spcAft>
+                <a:spcPct val="0"/>
+              </a:spcAft>
+              <a:defRPr>
+                <a:solidFill>
+                  <a:schemeClr val="tx1"/>
+                </a:solidFill>
+                <a:latin typeface="Arial" charset="0"/>
+                <a:ea typeface="宋体" pitchFamily="2" charset="-122"/>
+              </a:defRPr>
+            </a:lvl6pPr>
+            <a:lvl7pPr marL="2971800" indent="-228600" eaLnBrk="0" fontAlgn="base" hangingPunct="0">
+              <a:spcBef>
+                <a:spcPct val="0"/>
+              </a:spcBef>
+              <a:spcAft>
+                <a:spcPct val="0"/>
+              </a:spcAft>
+              <a:defRPr>
+                <a:solidFill>
+                  <a:schemeClr val="tx1"/>
+                </a:solidFill>
+                <a:latin typeface="Arial" charset="0"/>
+                <a:ea typeface="宋体" pitchFamily="2" charset="-122"/>
+              </a:defRPr>
+            </a:lvl7pPr>
+            <a:lvl8pPr marL="3429000" indent="-228600" eaLnBrk="0" fontAlgn="base" hangingPunct="0">
+              <a:spcBef>
+                <a:spcPct val="0"/>
+              </a:spcBef>
+              <a:spcAft>
+                <a:spcPct val="0"/>
+              </a:spcAft>
+              <a:defRPr>
+                <a:solidFill>
+                  <a:schemeClr val="tx1"/>
+                </a:solidFill>
+                <a:latin typeface="Arial" charset="0"/>
+                <a:ea typeface="宋体" pitchFamily="2" charset="-122"/>
+              </a:defRPr>
+            </a:lvl8pPr>
+            <a:lvl9pPr marL="3886200" indent="-228600" eaLnBrk="0" fontAlgn="base" hangingPunct="0">
+              <a:spcBef>
+                <a:spcPct val="0"/>
+              </a:spcBef>
+              <a:spcAft>
+                <a:spcPct val="0"/>
+              </a:spcAft>
+              <a:defRPr>
+                <a:solidFill>
+                  <a:schemeClr val="tx1"/>
+                </a:solidFill>
+                <a:latin typeface="Arial" charset="0"/>
+                <a:ea typeface="宋体" pitchFamily="2" charset="-122"/>
+              </a:defRPr>
+            </a:lvl9pPr>
+          </a:lstStyle>
+          <a:p>
+            <a:pPr eaLnBrk="1" hangingPunct="1"/>
+            <a:r>
+              <a:rPr lang="en-US" altLang="zh-CN" sz="2800" dirty="0">
+                <a:latin typeface="微软雅黑" panose="020B0503020204020204" pitchFamily="34" charset="-122"/>
+                <a:ea typeface="微软雅黑" panose="020B0503020204020204" pitchFamily="34" charset="-122"/>
+              </a:rPr>
+              <a:t>Query:</a:t>
+            </a:r>
+          </a:p>
+          <a:p>
+            <a:pPr eaLnBrk="1" hangingPunct="1"/>
+            <a:endParaRPr lang="en-US" altLang="zh-CN" sz="2800" dirty="0">
+              <a:solidFill>
+                <a:schemeClr val="bg1"/>
+              </a:solidFill>
+              <a:latin typeface="微软雅黑" pitchFamily="34" charset="-122"/>
+              <a:ea typeface="微软雅黑" pitchFamily="34" charset="-122"/>
+            </a:endParaRPr>
+          </a:p>
+        </p:txBody>
+      </p:sp>
+      <p:sp>
+        <p:nvSpPr>
+          <p:cNvPr id="14" name="TextBox 2"/>
+          <p:cNvSpPr txBox="1">
+            <a:spLocks noChangeArrowheads="1"/>
+          </p:cNvSpPr>
+          <p:nvPr/>
+        </p:nvSpPr>
+        <p:spPr bwMode="auto">
+          <a:xfrm>
+            <a:off x="-58994" y="4038600"/>
+            <a:ext cx="8824913" cy="954107"/>
+          </a:xfrm>
+          <a:prstGeom prst="rect">
+            <a:avLst/>
+          </a:prstGeom>
+          <a:noFill/>
+          <a:ln w="9525">
+            <a:noFill/>
+            <a:miter lim="800000"/>
+            <a:headEnd/>
+            <a:tailEnd/>
+          </a:ln>
+        </p:spPr>
+        <p:txBody>
+          <a:bodyPr>
+            <a:spAutoFit/>
+          </a:bodyPr>
+          <a:lstStyle>
+            <a:lvl1pPr eaLnBrk="0" hangingPunct="0">
+              <a:defRPr>
+                <a:solidFill>
+                  <a:schemeClr val="tx1"/>
+                </a:solidFill>
+                <a:latin typeface="Arial" charset="0"/>
+                <a:ea typeface="宋体" pitchFamily="2" charset="-122"/>
+              </a:defRPr>
+            </a:lvl1pPr>
+            <a:lvl2pPr marL="742950" indent="-285750" eaLnBrk="0" hangingPunct="0">
+              <a:defRPr>
+                <a:solidFill>
+                  <a:schemeClr val="tx1"/>
+                </a:solidFill>
+                <a:latin typeface="Arial" charset="0"/>
+                <a:ea typeface="宋体" pitchFamily="2" charset="-122"/>
+              </a:defRPr>
+            </a:lvl2pPr>
+            <a:lvl3pPr marL="1143000" indent="-228600" eaLnBrk="0" hangingPunct="0">
+              <a:defRPr>
+                <a:solidFill>
+                  <a:schemeClr val="tx1"/>
+                </a:solidFill>
+                <a:latin typeface="Arial" charset="0"/>
+                <a:ea typeface="宋体" pitchFamily="2" charset="-122"/>
+              </a:defRPr>
+            </a:lvl3pPr>
+            <a:lvl4pPr marL="1600200" indent="-228600" eaLnBrk="0" hangingPunct="0">
+              <a:defRPr>
+                <a:solidFill>
+                  <a:schemeClr val="tx1"/>
+                </a:solidFill>
+                <a:latin typeface="Arial" charset="0"/>
+                <a:ea typeface="宋体" pitchFamily="2" charset="-122"/>
+              </a:defRPr>
+            </a:lvl4pPr>
+            <a:lvl5pPr marL="2057400" indent="-228600" eaLnBrk="0" hangingPunct="0">
+              <a:defRPr>
+                <a:solidFill>
+                  <a:schemeClr val="tx1"/>
+                </a:solidFill>
+                <a:latin typeface="Arial" charset="0"/>
+                <a:ea typeface="宋体" pitchFamily="2" charset="-122"/>
+              </a:defRPr>
+            </a:lvl5pPr>
+            <a:lvl6pPr marL="2514600" indent="-228600" eaLnBrk="0" fontAlgn="base" hangingPunct="0">
+              <a:spcBef>
+                <a:spcPct val="0"/>
+              </a:spcBef>
+              <a:spcAft>
+                <a:spcPct val="0"/>
+              </a:spcAft>
+              <a:defRPr>
+                <a:solidFill>
+                  <a:schemeClr val="tx1"/>
+                </a:solidFill>
+                <a:latin typeface="Arial" charset="0"/>
+                <a:ea typeface="宋体" pitchFamily="2" charset="-122"/>
+              </a:defRPr>
+            </a:lvl6pPr>
+            <a:lvl7pPr marL="2971800" indent="-228600" eaLnBrk="0" fontAlgn="base" hangingPunct="0">
+              <a:spcBef>
+                <a:spcPct val="0"/>
+              </a:spcBef>
+              <a:spcAft>
+                <a:spcPct val="0"/>
+              </a:spcAft>
+              <a:defRPr>
+                <a:solidFill>
+                  <a:schemeClr val="tx1"/>
+                </a:solidFill>
+                <a:latin typeface="Arial" charset="0"/>
+                <a:ea typeface="宋体" pitchFamily="2" charset="-122"/>
+              </a:defRPr>
+            </a:lvl7pPr>
+            <a:lvl8pPr marL="3429000" indent="-228600" eaLnBrk="0" fontAlgn="base" hangingPunct="0">
+              <a:spcBef>
+                <a:spcPct val="0"/>
+              </a:spcBef>
+              <a:spcAft>
+                <a:spcPct val="0"/>
+              </a:spcAft>
+              <a:defRPr>
+                <a:solidFill>
+                  <a:schemeClr val="tx1"/>
+                </a:solidFill>
+                <a:latin typeface="Arial" charset="0"/>
+                <a:ea typeface="宋体" pitchFamily="2" charset="-122"/>
+              </a:defRPr>
+            </a:lvl8pPr>
+            <a:lvl9pPr marL="3886200" indent="-228600" eaLnBrk="0" fontAlgn="base" hangingPunct="0">
+              <a:spcBef>
+                <a:spcPct val="0"/>
+              </a:spcBef>
+              <a:spcAft>
+                <a:spcPct val="0"/>
+              </a:spcAft>
+              <a:defRPr>
+                <a:solidFill>
+                  <a:schemeClr val="tx1"/>
+                </a:solidFill>
+                <a:latin typeface="Arial" charset="0"/>
+                <a:ea typeface="宋体" pitchFamily="2" charset="-122"/>
+              </a:defRPr>
+            </a:lvl9pPr>
+          </a:lstStyle>
+          <a:p>
+            <a:pPr eaLnBrk="1" hangingPunct="1"/>
+            <a:r>
+              <a:rPr lang="en-US" altLang="zh-CN" sz="2800" dirty="0">
+                <a:latin typeface="微软雅黑" panose="020B0503020204020204" pitchFamily="34" charset="-122"/>
+                <a:ea typeface="微软雅黑" panose="020B0503020204020204" pitchFamily="34" charset="-122"/>
+              </a:rPr>
+              <a:t>MongoDB returns:</a:t>
+            </a:r>
+          </a:p>
+          <a:p>
+            <a:pPr eaLnBrk="1" hangingPunct="1"/>
+            <a:endParaRPr lang="en-US" altLang="zh-CN" sz="2800" dirty="0">
+              <a:solidFill>
+                <a:schemeClr val="bg1"/>
+              </a:solidFill>
+              <a:latin typeface="微软雅黑" pitchFamily="34" charset="-122"/>
+              <a:ea typeface="微软雅黑" pitchFamily="34" charset="-122"/>
+            </a:endParaRPr>
+          </a:p>
+        </p:txBody>
+      </p:sp>
+      <p:pic>
+        <p:nvPicPr>
+          <p:cNvPr id="8" name="Picture 7"/>
+          <p:cNvPicPr>
+            <a:picLocks noChangeAspect="1"/>
+          </p:cNvPicPr>
+          <p:nvPr/>
+        </p:nvPicPr>
+        <p:blipFill>
+          <a:blip r:embed="rId2"/>
+          <a:stretch>
+            <a:fillRect/>
+          </a:stretch>
+        </p:blipFill>
+        <p:spPr>
+          <a:xfrm>
+            <a:off x="36871" y="1136890"/>
+            <a:ext cx="6211529" cy="1777052"/>
+          </a:xfrm>
+          <a:prstGeom prst="rect">
+            <a:avLst/>
+          </a:prstGeom>
+        </p:spPr>
+      </p:pic>
+      <p:pic>
+        <p:nvPicPr>
+          <p:cNvPr id="4" name="Picture 3"/>
+          <p:cNvPicPr>
+            <a:picLocks noChangeAspect="1"/>
+          </p:cNvPicPr>
+          <p:nvPr/>
+        </p:nvPicPr>
+        <p:blipFill>
+          <a:blip r:embed="rId3"/>
+          <a:stretch>
+            <a:fillRect/>
+          </a:stretch>
+        </p:blipFill>
+        <p:spPr>
+          <a:xfrm>
+            <a:off x="0" y="3306386"/>
+            <a:ext cx="9210437" cy="656014"/>
+          </a:xfrm>
+          <a:prstGeom prst="rect">
+            <a:avLst/>
+          </a:prstGeom>
+        </p:spPr>
+      </p:pic>
+      <p:pic>
+        <p:nvPicPr>
+          <p:cNvPr id="5" name="Picture 4"/>
+          <p:cNvPicPr>
+            <a:picLocks noChangeAspect="1"/>
+          </p:cNvPicPr>
+          <p:nvPr/>
+        </p:nvPicPr>
+        <p:blipFill>
+          <a:blip r:embed="rId4"/>
+          <a:stretch>
+            <a:fillRect/>
+          </a:stretch>
+        </p:blipFill>
+        <p:spPr>
+          <a:xfrm>
+            <a:off x="-1" y="4515652"/>
+            <a:ext cx="9144001" cy="665947"/>
+          </a:xfrm>
+          <a:prstGeom prst="rect">
+            <a:avLst/>
+          </a:prstGeom>
+        </p:spPr>
+      </p:pic>
+    </p:spTree>
+    <p:extLst>
+      <p:ext uri="{BB962C8B-B14F-4D97-AF65-F5344CB8AC3E}">
+        <p14:creationId xmlns:p14="http://schemas.microsoft.com/office/powerpoint/2010/main" val="3709194252"/>
+      </p:ext>
+    </p:extLst>
+  </p:cSld>
+  <p:clrMapOvr>
+    <a:masterClrMapping/>
+  </p:clrMapOvr>
+  <p:timing>
+    <p:tnLst>
+      <p:par>
+        <p:cTn id="1" dur="indefinite" restart="never" nodeType="tmRoot">
+          <p:childTnLst>
+            <p:seq concurrent="1" nextAc="seek">
+              <p:cTn id="2" dur="indefinite" nodeType="mainSeq">
+                <p:childTnLst>
+                  <p:par>
+                    <p:cTn id="3" fill="hold">
+                      <p:stCondLst>
+                        <p:cond delay="indefinite"/>
+                      </p:stCondLst>
+                      <p:childTnLst>
+                        <p:par>
+                          <p:cTn id="4" fill="hold">
+                            <p:stCondLst>
+                              <p:cond delay="0"/>
+                            </p:stCondLst>
+                            <p:childTnLst>
+                              <p:par>
+                                <p:cTn id="5" presetID="10" presetClass="entr" presetSubtype="0" fill="hold" nodeType="clickEffect">
+                                  <p:stCondLst>
+                                    <p:cond delay="0"/>
+                                  </p:stCondLst>
+                                  <p:childTnLst>
+                                    <p:set>
+                                      <p:cBhvr>
+                                        <p:cTn id="6" dur="1" fill="hold">
+                                          <p:stCondLst>
+                                            <p:cond delay="0"/>
+                                          </p:stCondLst>
+                                        </p:cTn>
+                                        <p:tgtEl>
+                                          <p:spTgt spid="5"/>
+                                        </p:tgtEl>
+                                        <p:attrNameLst>
+                                          <p:attrName>style.visibility</p:attrName>
+                                        </p:attrNameLst>
+                                      </p:cBhvr>
+                                      <p:to>
+                                        <p:strVal val="visible"/>
+                                      </p:to>
+                                    </p:set>
+                                    <p:animEffect transition="in" filter="fade">
+                                      <p:cBhvr>
+                                        <p:cTn id="7" dur="500"/>
+                                        <p:tgtEl>
+                                          <p:spTgt spid="5"/>
+                                        </p:tgtEl>
+                                      </p:cBhvr>
+                                    </p:animEffect>
+                                  </p:childTnLst>
+                                </p:cTn>
+                              </p:par>
+                            </p:childTnLst>
+                          </p:cTn>
+                        </p:par>
+                      </p:childTnLst>
+                    </p:cTn>
+                  </p:par>
+                </p:childTnLst>
+              </p:cTn>
+              <p:prevCondLst>
+                <p:cond evt="onPrev" delay="0">
+                  <p:tgtEl>
+                    <p:sldTgt/>
+                  </p:tgtEl>
+                </p:cond>
+              </p:prevCondLst>
+              <p:nextCondLst>
+                <p:cond evt="onNext" delay="0">
+                  <p:tgtEl>
+                    <p:sldTgt/>
+                  </p:tgtEl>
+                </p:cond>
+              </p:nextCondLst>
+            </p:seq>
+          </p:childTnLst>
+        </p:cTn>
+      </p:par>
+    </p:tnLst>
+  </p:timing>
+</p:sld>
+</file>
+
+<file path=ppt/slides/slide27.xml><?xml version="1.0" encoding="utf-8"?>
+<p:sld xmlns:a="http://schemas.openxmlformats.org/drawingml/2006/main" xmlns:r="http://schemas.openxmlformats.org/officeDocument/2006/relationships" xmlns:p="http://schemas.openxmlformats.org/presentationml/2006/main">
+  <p:cSld>
+    <p:spTree>
+      <p:nvGrpSpPr>
+        <p:cNvPr id="1" name=""/>
+        <p:cNvGrpSpPr/>
+        <p:nvPr/>
+      </p:nvGrpSpPr>
+      <p:grpSpPr>
+        <a:xfrm>
+          <a:off x="0" y="0"/>
+          <a:ext cx="0" cy="0"/>
+          <a:chOff x="0" y="0"/>
+          <a:chExt cx="0" cy="0"/>
+        </a:xfrm>
+      </p:grpSpPr>
+      <p:sp>
+        <p:nvSpPr>
+          <p:cNvPr id="2" name="Text Placeholder 1"/>
+          <p:cNvSpPr>
+            <a:spLocks noGrp="1"/>
+          </p:cNvSpPr>
+          <p:nvPr>
+            <p:ph type="body" sz="quarter" idx="13"/>
+          </p:nvPr>
+        </p:nvSpPr>
+        <p:spPr/>
+        <p:txBody>
+          <a:bodyPr/>
+          <a:lstStyle/>
+          <a:p>
+            <a:r>
+              <a:rPr lang="en-US" dirty="0"/>
+              <a:t>5</a:t>
+            </a:r>
+          </a:p>
+        </p:txBody>
+      </p:sp>
+      <p:sp>
+        <p:nvSpPr>
+          <p:cNvPr id="3" name="Text Placeholder 2"/>
+          <p:cNvSpPr>
+            <a:spLocks noGrp="1"/>
+          </p:cNvSpPr>
+          <p:nvPr>
+            <p:ph type="body" sz="quarter" idx="14"/>
+          </p:nvPr>
+        </p:nvSpPr>
+        <p:spPr/>
+        <p:txBody>
+          <a:bodyPr/>
+          <a:lstStyle/>
+          <a:p>
+            <a:r>
+              <a:rPr lang="en-US" dirty="0"/>
+              <a:t>Query  Operators: Array</a:t>
+            </a:r>
+            <a:endParaRPr lang="en-US" altLang="zh-CN" dirty="0"/>
+          </a:p>
+          <a:p>
+            <a:endParaRPr lang="en-US" altLang="zh-CN" dirty="0"/>
+          </a:p>
+          <a:p>
+            <a:endParaRPr lang="en-US" altLang="zh-CN" dirty="0"/>
+          </a:p>
+          <a:p>
+            <a:endParaRPr lang="en-US" dirty="0"/>
+          </a:p>
+          <a:p>
+            <a:endParaRPr lang="en-US" dirty="0"/>
+          </a:p>
+        </p:txBody>
+      </p:sp>
+      <p:sp>
+        <p:nvSpPr>
+          <p:cNvPr id="7" name="TextBox 2"/>
+          <p:cNvSpPr txBox="1">
+            <a:spLocks noChangeArrowheads="1"/>
+          </p:cNvSpPr>
+          <p:nvPr/>
+        </p:nvSpPr>
+        <p:spPr bwMode="auto">
+          <a:xfrm>
+            <a:off x="0" y="2824316"/>
+            <a:ext cx="8824913" cy="954107"/>
+          </a:xfrm>
+          <a:prstGeom prst="rect">
+            <a:avLst/>
+          </a:prstGeom>
+          <a:noFill/>
+          <a:ln w="9525">
+            <a:noFill/>
+            <a:miter lim="800000"/>
+            <a:headEnd/>
+            <a:tailEnd/>
+          </a:ln>
+        </p:spPr>
+        <p:txBody>
+          <a:bodyPr>
+            <a:spAutoFit/>
+          </a:bodyPr>
+          <a:lstStyle>
+            <a:lvl1pPr eaLnBrk="0" hangingPunct="0">
+              <a:defRPr>
+                <a:solidFill>
+                  <a:schemeClr val="tx1"/>
+                </a:solidFill>
+                <a:latin typeface="Arial" charset="0"/>
+                <a:ea typeface="宋体" pitchFamily="2" charset="-122"/>
+              </a:defRPr>
+            </a:lvl1pPr>
+            <a:lvl2pPr marL="742950" indent="-285750" eaLnBrk="0" hangingPunct="0">
+              <a:defRPr>
+                <a:solidFill>
+                  <a:schemeClr val="tx1"/>
+                </a:solidFill>
+                <a:latin typeface="Arial" charset="0"/>
+                <a:ea typeface="宋体" pitchFamily="2" charset="-122"/>
+              </a:defRPr>
+            </a:lvl2pPr>
+            <a:lvl3pPr marL="1143000" indent="-228600" eaLnBrk="0" hangingPunct="0">
+              <a:defRPr>
+                <a:solidFill>
+                  <a:schemeClr val="tx1"/>
+                </a:solidFill>
+                <a:latin typeface="Arial" charset="0"/>
+                <a:ea typeface="宋体" pitchFamily="2" charset="-122"/>
+              </a:defRPr>
+            </a:lvl3pPr>
+            <a:lvl4pPr marL="1600200" indent="-228600" eaLnBrk="0" hangingPunct="0">
+              <a:defRPr>
+                <a:solidFill>
+                  <a:schemeClr val="tx1"/>
+                </a:solidFill>
+                <a:latin typeface="Arial" charset="0"/>
+                <a:ea typeface="宋体" pitchFamily="2" charset="-122"/>
+              </a:defRPr>
+            </a:lvl4pPr>
+            <a:lvl5pPr marL="2057400" indent="-228600" eaLnBrk="0" hangingPunct="0">
+              <a:defRPr>
+                <a:solidFill>
+                  <a:schemeClr val="tx1"/>
+                </a:solidFill>
+                <a:latin typeface="Arial" charset="0"/>
+                <a:ea typeface="宋体" pitchFamily="2" charset="-122"/>
+              </a:defRPr>
+            </a:lvl5pPr>
+            <a:lvl6pPr marL="2514600" indent="-228600" eaLnBrk="0" fontAlgn="base" hangingPunct="0">
+              <a:spcBef>
+                <a:spcPct val="0"/>
+              </a:spcBef>
+              <a:spcAft>
+                <a:spcPct val="0"/>
+              </a:spcAft>
+              <a:defRPr>
+                <a:solidFill>
+                  <a:schemeClr val="tx1"/>
+                </a:solidFill>
+                <a:latin typeface="Arial" charset="0"/>
+                <a:ea typeface="宋体" pitchFamily="2" charset="-122"/>
+              </a:defRPr>
+            </a:lvl6pPr>
+            <a:lvl7pPr marL="2971800" indent="-228600" eaLnBrk="0" fontAlgn="base" hangingPunct="0">
+              <a:spcBef>
+                <a:spcPct val="0"/>
+              </a:spcBef>
+              <a:spcAft>
+                <a:spcPct val="0"/>
+              </a:spcAft>
+              <a:defRPr>
+                <a:solidFill>
+                  <a:schemeClr val="tx1"/>
+                </a:solidFill>
+                <a:latin typeface="Arial" charset="0"/>
+                <a:ea typeface="宋体" pitchFamily="2" charset="-122"/>
+              </a:defRPr>
+            </a:lvl7pPr>
+            <a:lvl8pPr marL="3429000" indent="-228600" eaLnBrk="0" fontAlgn="base" hangingPunct="0">
+              <a:spcBef>
+                <a:spcPct val="0"/>
+              </a:spcBef>
+              <a:spcAft>
+                <a:spcPct val="0"/>
+              </a:spcAft>
+              <a:defRPr>
+                <a:solidFill>
+                  <a:schemeClr val="tx1"/>
+                </a:solidFill>
+                <a:latin typeface="Arial" charset="0"/>
+                <a:ea typeface="宋体" pitchFamily="2" charset="-122"/>
+              </a:defRPr>
+            </a:lvl8pPr>
+            <a:lvl9pPr marL="3886200" indent="-228600" eaLnBrk="0" fontAlgn="base" hangingPunct="0">
+              <a:spcBef>
+                <a:spcPct val="0"/>
+              </a:spcBef>
+              <a:spcAft>
+                <a:spcPct val="0"/>
+              </a:spcAft>
+              <a:defRPr>
+                <a:solidFill>
+                  <a:schemeClr val="tx1"/>
+                </a:solidFill>
+                <a:latin typeface="Arial" charset="0"/>
+                <a:ea typeface="宋体" pitchFamily="2" charset="-122"/>
+              </a:defRPr>
+            </a:lvl9pPr>
+          </a:lstStyle>
+          <a:p>
+            <a:pPr eaLnBrk="1" hangingPunct="1"/>
+            <a:r>
+              <a:rPr lang="en-US" altLang="zh-CN" sz="2800" dirty="0">
+                <a:latin typeface="微软雅黑" panose="020B0503020204020204" pitchFamily="34" charset="-122"/>
+                <a:ea typeface="微软雅黑" panose="020B0503020204020204" pitchFamily="34" charset="-122"/>
+              </a:rPr>
+              <a:t>Query:</a:t>
+            </a:r>
+          </a:p>
+          <a:p>
+            <a:pPr eaLnBrk="1" hangingPunct="1"/>
+            <a:endParaRPr lang="en-US" altLang="zh-CN" sz="2800" dirty="0">
+              <a:solidFill>
+                <a:schemeClr val="bg1"/>
+              </a:solidFill>
+              <a:latin typeface="微软雅黑" pitchFamily="34" charset="-122"/>
+              <a:ea typeface="微软雅黑" pitchFamily="34" charset="-122"/>
+            </a:endParaRPr>
+          </a:p>
+        </p:txBody>
+      </p:sp>
+      <p:sp>
+        <p:nvSpPr>
+          <p:cNvPr id="14" name="TextBox 2"/>
+          <p:cNvSpPr txBox="1">
+            <a:spLocks noChangeArrowheads="1"/>
+          </p:cNvSpPr>
+          <p:nvPr/>
+        </p:nvSpPr>
+        <p:spPr bwMode="auto">
+          <a:xfrm>
+            <a:off x="-1" y="4724400"/>
+            <a:ext cx="8824913" cy="954107"/>
+          </a:xfrm>
+          <a:prstGeom prst="rect">
+            <a:avLst/>
+          </a:prstGeom>
+          <a:noFill/>
+          <a:ln w="9525">
+            <a:noFill/>
+            <a:miter lim="800000"/>
+            <a:headEnd/>
+            <a:tailEnd/>
+          </a:ln>
+        </p:spPr>
+        <p:txBody>
+          <a:bodyPr>
+            <a:spAutoFit/>
+          </a:bodyPr>
+          <a:lstStyle>
+            <a:lvl1pPr eaLnBrk="0" hangingPunct="0">
+              <a:defRPr>
+                <a:solidFill>
+                  <a:schemeClr val="tx1"/>
+                </a:solidFill>
+                <a:latin typeface="Arial" charset="0"/>
+                <a:ea typeface="宋体" pitchFamily="2" charset="-122"/>
+              </a:defRPr>
+            </a:lvl1pPr>
+            <a:lvl2pPr marL="742950" indent="-285750" eaLnBrk="0" hangingPunct="0">
+              <a:defRPr>
+                <a:solidFill>
+                  <a:schemeClr val="tx1"/>
+                </a:solidFill>
+                <a:latin typeface="Arial" charset="0"/>
+                <a:ea typeface="宋体" pitchFamily="2" charset="-122"/>
+              </a:defRPr>
+            </a:lvl2pPr>
+            <a:lvl3pPr marL="1143000" indent="-228600" eaLnBrk="0" hangingPunct="0">
+              <a:defRPr>
+                <a:solidFill>
+                  <a:schemeClr val="tx1"/>
+                </a:solidFill>
+                <a:latin typeface="Arial" charset="0"/>
+                <a:ea typeface="宋体" pitchFamily="2" charset="-122"/>
+              </a:defRPr>
+            </a:lvl3pPr>
+            <a:lvl4pPr marL="1600200" indent="-228600" eaLnBrk="0" hangingPunct="0">
+              <a:defRPr>
+                <a:solidFill>
+                  <a:schemeClr val="tx1"/>
+                </a:solidFill>
+                <a:latin typeface="Arial" charset="0"/>
+                <a:ea typeface="宋体" pitchFamily="2" charset="-122"/>
+              </a:defRPr>
+            </a:lvl4pPr>
+            <a:lvl5pPr marL="2057400" indent="-228600" eaLnBrk="0" hangingPunct="0">
+              <a:defRPr>
+                <a:solidFill>
+                  <a:schemeClr val="tx1"/>
+                </a:solidFill>
+                <a:latin typeface="Arial" charset="0"/>
+                <a:ea typeface="宋体" pitchFamily="2" charset="-122"/>
+              </a:defRPr>
+            </a:lvl5pPr>
+            <a:lvl6pPr marL="2514600" indent="-228600" eaLnBrk="0" fontAlgn="base" hangingPunct="0">
+              <a:spcBef>
+                <a:spcPct val="0"/>
+              </a:spcBef>
+              <a:spcAft>
+                <a:spcPct val="0"/>
+              </a:spcAft>
+              <a:defRPr>
+                <a:solidFill>
+                  <a:schemeClr val="tx1"/>
+                </a:solidFill>
+                <a:latin typeface="Arial" charset="0"/>
+                <a:ea typeface="宋体" pitchFamily="2" charset="-122"/>
+              </a:defRPr>
+            </a:lvl6pPr>
+            <a:lvl7pPr marL="2971800" indent="-228600" eaLnBrk="0" fontAlgn="base" hangingPunct="0">
+              <a:spcBef>
+                <a:spcPct val="0"/>
+              </a:spcBef>
+              <a:spcAft>
+                <a:spcPct val="0"/>
+              </a:spcAft>
+              <a:defRPr>
+                <a:solidFill>
+                  <a:schemeClr val="tx1"/>
+                </a:solidFill>
+                <a:latin typeface="Arial" charset="0"/>
+                <a:ea typeface="宋体" pitchFamily="2" charset="-122"/>
+              </a:defRPr>
+            </a:lvl7pPr>
+            <a:lvl8pPr marL="3429000" indent="-228600" eaLnBrk="0" fontAlgn="base" hangingPunct="0">
+              <a:spcBef>
+                <a:spcPct val="0"/>
+              </a:spcBef>
+              <a:spcAft>
+                <a:spcPct val="0"/>
+              </a:spcAft>
+              <a:defRPr>
+                <a:solidFill>
+                  <a:schemeClr val="tx1"/>
+                </a:solidFill>
+                <a:latin typeface="Arial" charset="0"/>
+                <a:ea typeface="宋体" pitchFamily="2" charset="-122"/>
+              </a:defRPr>
+            </a:lvl8pPr>
+            <a:lvl9pPr marL="3886200" indent="-228600" eaLnBrk="0" fontAlgn="base" hangingPunct="0">
+              <a:spcBef>
+                <a:spcPct val="0"/>
+              </a:spcBef>
+              <a:spcAft>
+                <a:spcPct val="0"/>
+              </a:spcAft>
+              <a:defRPr>
+                <a:solidFill>
+                  <a:schemeClr val="tx1"/>
+                </a:solidFill>
+                <a:latin typeface="Arial" charset="0"/>
+                <a:ea typeface="宋体" pitchFamily="2" charset="-122"/>
+              </a:defRPr>
+            </a:lvl9pPr>
+          </a:lstStyle>
+          <a:p>
+            <a:pPr eaLnBrk="1" hangingPunct="1"/>
+            <a:r>
+              <a:rPr lang="en-US" altLang="zh-CN" sz="2800" dirty="0">
+                <a:latin typeface="微软雅黑" panose="020B0503020204020204" pitchFamily="34" charset="-122"/>
+                <a:ea typeface="微软雅黑" panose="020B0503020204020204" pitchFamily="34" charset="-122"/>
+              </a:rPr>
+              <a:t>MongoDB returns:</a:t>
+            </a:r>
+          </a:p>
+          <a:p>
+            <a:pPr eaLnBrk="1" hangingPunct="1"/>
+            <a:endParaRPr lang="en-US" altLang="zh-CN" sz="2800" dirty="0">
+              <a:solidFill>
+                <a:schemeClr val="bg1"/>
+              </a:solidFill>
+              <a:latin typeface="微软雅黑" pitchFamily="34" charset="-122"/>
+              <a:ea typeface="微软雅黑" pitchFamily="34" charset="-122"/>
+            </a:endParaRPr>
+          </a:p>
+        </p:txBody>
+      </p:sp>
+      <p:pic>
+        <p:nvPicPr>
+          <p:cNvPr id="8" name="Picture 7"/>
+          <p:cNvPicPr>
+            <a:picLocks noChangeAspect="1"/>
+          </p:cNvPicPr>
+          <p:nvPr/>
+        </p:nvPicPr>
+        <p:blipFill>
+          <a:blip r:embed="rId2"/>
+          <a:stretch>
+            <a:fillRect/>
+          </a:stretch>
+        </p:blipFill>
+        <p:spPr>
+          <a:xfrm>
+            <a:off x="36871" y="1136890"/>
+            <a:ext cx="6211529" cy="1777052"/>
+          </a:xfrm>
+          <a:prstGeom prst="rect">
+            <a:avLst/>
+          </a:prstGeom>
+        </p:spPr>
+      </p:pic>
+      <p:pic>
+        <p:nvPicPr>
+          <p:cNvPr id="4" name="Picture 3"/>
+          <p:cNvPicPr>
+            <a:picLocks noChangeAspect="1"/>
+          </p:cNvPicPr>
+          <p:nvPr/>
+        </p:nvPicPr>
+        <p:blipFill>
+          <a:blip r:embed="rId3"/>
+          <a:stretch>
+            <a:fillRect/>
+          </a:stretch>
+        </p:blipFill>
+        <p:spPr>
+          <a:xfrm>
+            <a:off x="37485" y="3299012"/>
+            <a:ext cx="6935470" cy="1425388"/>
+          </a:xfrm>
+          <a:prstGeom prst="rect">
+            <a:avLst/>
+          </a:prstGeom>
+        </p:spPr>
+      </p:pic>
+      <p:pic>
+        <p:nvPicPr>
+          <p:cNvPr id="5" name="Picture 4"/>
+          <p:cNvPicPr>
+            <a:picLocks noChangeAspect="1"/>
+          </p:cNvPicPr>
+          <p:nvPr/>
+        </p:nvPicPr>
+        <p:blipFill>
+          <a:blip r:embed="rId4"/>
+          <a:stretch>
+            <a:fillRect/>
+          </a:stretch>
+        </p:blipFill>
+        <p:spPr>
+          <a:xfrm>
+            <a:off x="36870" y="5199148"/>
+            <a:ext cx="9107130" cy="744451"/>
+          </a:xfrm>
+          <a:prstGeom prst="rect">
+            <a:avLst/>
+          </a:prstGeom>
+        </p:spPr>
+      </p:pic>
+    </p:spTree>
+    <p:extLst>
+      <p:ext uri="{BB962C8B-B14F-4D97-AF65-F5344CB8AC3E}">
+        <p14:creationId xmlns:p14="http://schemas.microsoft.com/office/powerpoint/2010/main" val="1071487161"/>
+      </p:ext>
+    </p:extLst>
+  </p:cSld>
+  <p:clrMapOvr>
+    <a:masterClrMapping/>
+  </p:clrMapOvr>
+  <p:timing>
+    <p:tnLst>
+      <p:par>
+        <p:cTn id="1" dur="indefinite" restart="never" nodeType="tmRoot">
+          <p:childTnLst>
+            <p:seq concurrent="1" nextAc="seek">
+              <p:cTn id="2" dur="indefinite" nodeType="mainSeq">
+                <p:childTnLst>
+                  <p:par>
+                    <p:cTn id="3" fill="hold">
+                      <p:stCondLst>
+                        <p:cond delay="indefinite"/>
+                      </p:stCondLst>
+                      <p:childTnLst>
+                        <p:par>
+                          <p:cTn id="4" fill="hold">
+                            <p:stCondLst>
+                              <p:cond delay="0"/>
+                            </p:stCondLst>
+                            <p:childTnLst>
+                              <p:par>
+                                <p:cTn id="5" presetID="10" presetClass="entr" presetSubtype="0" fill="hold" nodeType="clickEffect">
+                                  <p:stCondLst>
+                                    <p:cond delay="0"/>
+                                  </p:stCondLst>
+                                  <p:childTnLst>
+                                    <p:set>
+                                      <p:cBhvr>
+                                        <p:cTn id="6" dur="1" fill="hold">
+                                          <p:stCondLst>
+                                            <p:cond delay="0"/>
+                                          </p:stCondLst>
+                                        </p:cTn>
+                                        <p:tgtEl>
+                                          <p:spTgt spid="5"/>
+                                        </p:tgtEl>
+                                        <p:attrNameLst>
+                                          <p:attrName>style.visibility</p:attrName>
+                                        </p:attrNameLst>
+                                      </p:cBhvr>
+                                      <p:to>
+                                        <p:strVal val="visible"/>
+                                      </p:to>
+                                    </p:set>
+                                    <p:animEffect transition="in" filter="fade">
+                                      <p:cBhvr>
+                                        <p:cTn id="7" dur="500"/>
+                                        <p:tgtEl>
+                                          <p:spTgt spid="5"/>
+                                        </p:tgtEl>
+                                      </p:cBhvr>
+                                    </p:animEffect>
+                                  </p:childTnLst>
+                                </p:cTn>
+                              </p:par>
+                            </p:childTnLst>
+                          </p:cTn>
+                        </p:par>
+                      </p:childTnLst>
+                    </p:cTn>
+                  </p:par>
+                </p:childTnLst>
+              </p:cTn>
+              <p:prevCondLst>
+                <p:cond evt="onPrev" delay="0">
+                  <p:tgtEl>
+                    <p:sldTgt/>
+                  </p:tgtEl>
+                </p:cond>
+              </p:prevCondLst>
+              <p:nextCondLst>
+                <p:cond evt="onNext" delay="0">
+                  <p:tgtEl>
+                    <p:sldTgt/>
+                  </p:tgtEl>
+                </p:cond>
+              </p:nextCondLst>
+            </p:seq>
+          </p:childTnLst>
+        </p:cTn>
+      </p:par>
+    </p:tnLst>
+  </p:timing>
+</p:sld>
+</file>
+
+<file path=ppt/slides/slide28.xml><?xml version="1.0" encoding="utf-8"?>
+<p:sld xmlns:a="http://schemas.openxmlformats.org/drawingml/2006/main" xmlns:r="http://schemas.openxmlformats.org/officeDocument/2006/relationships" xmlns:p="http://schemas.openxmlformats.org/presentationml/2006/main">
+  <p:cSld>
+    <p:spTree>
+      <p:nvGrpSpPr>
+        <p:cNvPr id="1" name=""/>
+        <p:cNvGrpSpPr/>
+        <p:nvPr/>
+      </p:nvGrpSpPr>
+      <p:grpSpPr>
+        <a:xfrm>
+          <a:off x="0" y="0"/>
+          <a:ext cx="0" cy="0"/>
+          <a:chOff x="0" y="0"/>
+          <a:chExt cx="0" cy="0"/>
+        </a:xfrm>
+      </p:grpSpPr>
     </p:spTree>
   </p:cSld>
   <p:clrMapOvr>
@@ -13117,7 +16207,7 @@
 </p:sld>
 </file>
 
-<file path=ppt/slides/slide23.xml><?xml version="1.0" encoding="utf-8"?>
+<file path=ppt/slides/slide29.xml><?xml version="1.0" encoding="utf-8"?>
 <p:sld xmlns:a="http://schemas.openxmlformats.org/drawingml/2006/main" xmlns:r="http://schemas.openxmlformats.org/officeDocument/2006/relationships" xmlns:p="http://schemas.openxmlformats.org/presentationml/2006/main">
   <p:cSld>
     <p:spTree>
@@ -17454,12 +20544,6 @@
 </file>
 
 <file path=customXml/item1.xml><?xml version="1.0" encoding="utf-8"?>
-<p:properties xmlns:p="http://schemas.microsoft.com/office/2006/metadata/properties" xmlns:xsi="http://www.w3.org/2001/XMLSchema-instance">
-  <documentManagement/>
-</p:properties>
-</file>
-
-<file path=customXml/item2.xml><?xml version="1.0" encoding="utf-8"?>
 <ct:contentTypeSchema xmlns:ct="http://schemas.microsoft.com/office/2006/metadata/contentType" xmlns:ma="http://schemas.microsoft.com/office/2006/metadata/properties/metaAttributes" ct:_="" ma:_="" ma:contentTypeName="Document" ma:contentTypeID="0x010100EF3E94E2ACCF6D4EAE5CDD73AD546E17" ma:contentTypeVersion="0" ma:contentTypeDescription="Create a new document." ma:contentTypeScope="" ma:versionID="bb1449a0cfc4203701bc69f953314dcb">
   <xsd:schema xmlns:xsd="http://www.w3.org/2001/XMLSchema" xmlns:p="http://schemas.microsoft.com/office/2006/metadata/properties" targetNamespace="http://schemas.microsoft.com/office/2006/metadata/properties" ma:root="true" ma:fieldsID="4aeb20c0e3442673af7ee10786458764">
     <xsd:element name="properties">
@@ -17508,6 +20592,12 @@
 </ct:contentTypeSchema>
 </file>
 
+<file path=customXml/item2.xml><?xml version="1.0" encoding="utf-8"?>
+<p:properties xmlns:p="http://schemas.microsoft.com/office/2006/metadata/properties" xmlns:xsi="http://www.w3.org/2001/XMLSchema-instance">
+  <documentManagement/>
+</p:properties>
+</file>
+
 <file path=customXml/item3.xml><?xml version="1.0" encoding="utf-8"?>
 <?mso-contentType ?>
 <FormTemplates xmlns="http://schemas.microsoft.com/sharepoint/v3/contenttype/forms">
@@ -17518,20 +20608,6 @@
 </file>
 
 <file path=customXml/itemProps1.xml><?xml version="1.0" encoding="utf-8"?>
-<ds:datastoreItem xmlns:ds="http://schemas.openxmlformats.org/officeDocument/2006/customXml" ds:itemID="{BC974159-165D-43A7-BAC0-2BE7E1872CAD}">
-  <ds:schemaRefs>
-    <ds:schemaRef ds:uri="http://purl.org/dc/elements/1.1/"/>
-    <ds:schemaRef ds:uri="http://www.w3.org/XML/1998/namespace"/>
-    <ds:schemaRef ds:uri="http://schemas.microsoft.com/office/2006/documentManagement/types"/>
-    <ds:schemaRef ds:uri="http://purl.org/dc/dcmitype/"/>
-    <ds:schemaRef ds:uri="http://schemas.openxmlformats.org/package/2006/metadata/core-properties"/>
-    <ds:schemaRef ds:uri="http://schemas.microsoft.com/office/2006/metadata/properties"/>
-    <ds:schemaRef ds:uri="http://purl.org/dc/terms/"/>
-  </ds:schemaRefs>
-</ds:datastoreItem>
-</file>
-
-<file path=customXml/itemProps2.xml><?xml version="1.0" encoding="utf-8"?>
 <ds:datastoreItem xmlns:ds="http://schemas.openxmlformats.org/officeDocument/2006/customXml" ds:itemID="{1FBAA56A-8348-4CD3-A624-434B0E404A2E}">
   <ds:schemaRefs>
     <ds:schemaRef ds:uri="http://schemas.microsoft.com/office/2006/metadata/contentType"/>
@@ -17546,6 +20622,20 @@
 </ds:datastoreItem>
 </file>
 
+<file path=customXml/itemProps2.xml><?xml version="1.0" encoding="utf-8"?>
+<ds:datastoreItem xmlns:ds="http://schemas.openxmlformats.org/officeDocument/2006/customXml" ds:itemID="{BC974159-165D-43A7-BAC0-2BE7E1872CAD}">
+  <ds:schemaRefs>
+    <ds:schemaRef ds:uri="http://purl.org/dc/elements/1.1/"/>
+    <ds:schemaRef ds:uri="http://www.w3.org/XML/1998/namespace"/>
+    <ds:schemaRef ds:uri="http://schemas.microsoft.com/office/2006/documentManagement/types"/>
+    <ds:schemaRef ds:uri="http://purl.org/dc/dcmitype/"/>
+    <ds:schemaRef ds:uri="http://schemas.openxmlformats.org/package/2006/metadata/core-properties"/>
+    <ds:schemaRef ds:uri="http://schemas.microsoft.com/office/2006/metadata/properties"/>
+    <ds:schemaRef ds:uri="http://purl.org/dc/terms/"/>
+  </ds:schemaRefs>
+</ds:datastoreItem>
+</file>
+
 <file path=customXml/itemProps3.xml><?xml version="1.0" encoding="utf-8"?>
 <ds:datastoreItem xmlns:ds="http://schemas.openxmlformats.org/officeDocument/2006/customXml" ds:itemID="{AF2462E9-E3C6-4B9B-800D-1AA92DB6FEE6}">
   <ds:schemaRefs>

</xml_diff>

<commit_message>
[db] add cursor query op
</commit_message>
<xml_diff>
--- a/db/mongodb/2017/materials/MongoDB_CH2(2)_Query.pptx
+++ b/db/mongodb/2017/materials/MongoDB_CH2(2)_Query.pptx
@@ -8,7 +8,7 @@
     <p:sldMasterId id="2147483652" r:id="rId7"/>
   </p:sldMasterIdLst>
   <p:notesMasterIdLst>
-    <p:notesMasterId r:id="rId37"/>
+    <p:notesMasterId r:id="rId42"/>
   </p:notesMasterIdLst>
   <p:sldIdLst>
     <p:sldId id="281" r:id="rId8"/>
@@ -38,8 +38,13 @@
     <p:sldId id="454" r:id="rId32"/>
     <p:sldId id="455" r:id="rId33"/>
     <p:sldId id="456" r:id="rId34"/>
-    <p:sldId id="264" r:id="rId35"/>
-    <p:sldId id="265" r:id="rId36"/>
+    <p:sldId id="457" r:id="rId35"/>
+    <p:sldId id="458" r:id="rId36"/>
+    <p:sldId id="459" r:id="rId37"/>
+    <p:sldId id="460" r:id="rId38"/>
+    <p:sldId id="461" r:id="rId39"/>
+    <p:sldId id="264" r:id="rId40"/>
+    <p:sldId id="265" r:id="rId41"/>
   </p:sldIdLst>
   <p:sldSz cx="9144000" cy="6858000" type="screen4x3"/>
   <p:notesSz cx="6858000" cy="9144000"/>
@@ -16199,7 +16204,61 @@
           <a:chExt cx="0" cy="0"/>
         </a:xfrm>
       </p:grpSpPr>
+      <p:sp>
+        <p:nvSpPr>
+          <p:cNvPr id="2" name="Text Placeholder 1"/>
+          <p:cNvSpPr>
+            <a:spLocks noGrp="1"/>
+          </p:cNvSpPr>
+          <p:nvPr>
+            <p:ph type="body" sz="quarter" idx="14"/>
+          </p:nvPr>
+        </p:nvSpPr>
+        <p:spPr>
+          <a:xfrm>
+            <a:off x="1031080" y="1712742"/>
+            <a:ext cx="7122319" cy="646331"/>
+          </a:xfrm>
+        </p:spPr>
+        <p:txBody>
+          <a:bodyPr/>
+          <a:lstStyle/>
+          <a:p>
+            <a:r>
+              <a:rPr lang="en-US" dirty="0"/>
+              <a:t>Cursor</a:t>
+            </a:r>
+          </a:p>
+        </p:txBody>
+      </p:sp>
+      <p:sp>
+        <p:nvSpPr>
+          <p:cNvPr id="3" name="Text Placeholder 2"/>
+          <p:cNvSpPr>
+            <a:spLocks noGrp="1"/>
+          </p:cNvSpPr>
+          <p:nvPr>
+            <p:ph type="body" sz="quarter" idx="11"/>
+          </p:nvPr>
+        </p:nvSpPr>
+        <p:spPr/>
+        <p:txBody>
+          <a:bodyPr/>
+          <a:lstStyle/>
+          <a:p>
+            <a:r>
+              <a:rPr lang="en-US" dirty="0"/>
+              <a:t>6</a:t>
+            </a:r>
+          </a:p>
+        </p:txBody>
+      </p:sp>
     </p:spTree>
+    <p:extLst>
+      <p:ext uri="{BB962C8B-B14F-4D97-AF65-F5344CB8AC3E}">
+        <p14:creationId xmlns:p14="http://schemas.microsoft.com/office/powerpoint/2010/main" val="2314028286"/>
+      </p:ext>
+    </p:extLst>
   </p:cSld>
   <p:clrMapOvr>
     <a:masterClrMapping/>
@@ -16224,7 +16283,411 @@
           <a:chExt cx="0" cy="0"/>
         </a:xfrm>
       </p:grpSpPr>
+      <p:sp>
+        <p:nvSpPr>
+          <p:cNvPr id="2" name="Text Placeholder 1"/>
+          <p:cNvSpPr>
+            <a:spLocks noGrp="1"/>
+          </p:cNvSpPr>
+          <p:nvPr>
+            <p:ph type="body" sz="quarter" idx="13"/>
+          </p:nvPr>
+        </p:nvSpPr>
+        <p:spPr/>
+        <p:txBody>
+          <a:bodyPr/>
+          <a:lstStyle/>
+          <a:p>
+            <a:r>
+              <a:rPr lang="en-US" dirty="0"/>
+              <a:t>6</a:t>
+            </a:r>
+          </a:p>
+        </p:txBody>
+      </p:sp>
+      <p:sp>
+        <p:nvSpPr>
+          <p:cNvPr id="3" name="Text Placeholder 2"/>
+          <p:cNvSpPr>
+            <a:spLocks noGrp="1"/>
+          </p:cNvSpPr>
+          <p:nvPr>
+            <p:ph type="body" sz="quarter" idx="14"/>
+          </p:nvPr>
+        </p:nvSpPr>
+        <p:spPr/>
+        <p:txBody>
+          <a:bodyPr/>
+          <a:lstStyle/>
+          <a:p>
+            <a:r>
+              <a:rPr lang="en-US" altLang="zh-CN" dirty="0"/>
+              <a:t>Cursor</a:t>
+            </a:r>
+          </a:p>
+          <a:p>
+            <a:endParaRPr lang="en-US" dirty="0"/>
+          </a:p>
+          <a:p>
+            <a:endParaRPr lang="en-US" dirty="0"/>
+          </a:p>
+        </p:txBody>
+      </p:sp>
+      <p:graphicFrame>
+        <p:nvGraphicFramePr>
+          <p:cNvPr id="6" name="Table 5"/>
+          <p:cNvGraphicFramePr>
+            <a:graphicFrameLocks noGrp="1"/>
+          </p:cNvGraphicFramePr>
+          <p:nvPr>
+            <p:extLst>
+              <p:ext uri="{D42A27DB-BD31-4B8C-83A1-F6EECF244321}">
+                <p14:modId xmlns:p14="http://schemas.microsoft.com/office/powerpoint/2010/main" val="1503364175"/>
+              </p:ext>
+            </p:extLst>
+          </p:nvPr>
+        </p:nvGraphicFramePr>
+        <p:xfrm>
+          <a:off x="323528" y="1916832"/>
+          <a:ext cx="8280920" cy="2377499"/>
+        </p:xfrm>
+        <a:graphic>
+          <a:graphicData uri="http://schemas.openxmlformats.org/drawingml/2006/table">
+            <a:tbl>
+              <a:tblPr firstRow="1" bandRow="1">
+                <a:tableStyleId>{8799B23B-EC83-4686-B30A-512413B5E67A}</a:tableStyleId>
+              </a:tblPr>
+              <a:tblGrid>
+                <a:gridCol w="2609057">
+                  <a:extLst>
+                    <a:ext uri="{9D8B030D-6E8A-4147-A177-3AD203B41FA5}">
+                      <a16:colId xmlns:a16="http://schemas.microsoft.com/office/drawing/2014/main" val="20000"/>
+                    </a:ext>
+                  </a:extLst>
+                </a:gridCol>
+                <a:gridCol w="5671863">
+                  <a:extLst>
+                    <a:ext uri="{9D8B030D-6E8A-4147-A177-3AD203B41FA5}">
+                      <a16:colId xmlns:a16="http://schemas.microsoft.com/office/drawing/2014/main" val="20001"/>
+                    </a:ext>
+                  </a:extLst>
+                </a:gridCol>
+              </a:tblGrid>
+              <a:tr h="893710">
+                <a:tc>
+                  <a:txBody>
+                    <a:bodyPr/>
+                    <a:lstStyle/>
+                    <a:p>
+                      <a:pPr algn="ctr"/>
+                      <a:r>
+                        <a:rPr lang="en-US" sz="2800" b="1" dirty="0">
+                          <a:solidFill>
+                            <a:schemeClr val="tx1"/>
+                          </a:solidFill>
+                        </a:rPr>
+                        <a:t>sort() </a:t>
+                      </a:r>
+                      <a:endParaRPr lang="en-US" sz="2800" b="1" kern="1200" dirty="0">
+                        <a:solidFill>
+                          <a:schemeClr val="tx1"/>
+                        </a:solidFill>
+                        <a:latin typeface="+mn-lt"/>
+                        <a:ea typeface="+mn-ea"/>
+                        <a:cs typeface="+mn-cs"/>
+                      </a:endParaRPr>
+                    </a:p>
+                  </a:txBody>
+                  <a:tcPr/>
+                </a:tc>
+                <a:tc>
+                  <a:txBody>
+                    <a:bodyPr/>
+                    <a:lstStyle/>
+                    <a:p>
+                      <a:pPr algn="l"/>
+                      <a:r>
+                        <a:rPr lang="en-US" sz="2800" b="1" dirty="0">
+                          <a:solidFill>
+                            <a:schemeClr val="tx1"/>
+                          </a:solidFill>
+                        </a:rPr>
+                        <a:t>find(…) .</a:t>
+                      </a:r>
+                      <a:r>
+                        <a:rPr lang="en-US" sz="2800" b="1" dirty="0">
+                          <a:solidFill>
+                            <a:srgbClr val="2D75BC"/>
+                          </a:solidFill>
+                        </a:rPr>
+                        <a:t>sort</a:t>
+                      </a:r>
+                      <a:r>
+                        <a:rPr lang="en-US" sz="2800" b="1" dirty="0">
+                          <a:solidFill>
+                            <a:schemeClr val="tx1"/>
+                          </a:solidFill>
+                        </a:rPr>
+                        <a:t>({age:</a:t>
+                      </a:r>
+                      <a:r>
+                        <a:rPr lang="en-US" altLang="zh-CN" sz="2800" b="1" dirty="0">
+                          <a:solidFill>
+                            <a:schemeClr val="tx1"/>
+                          </a:solidFill>
+                        </a:rPr>
+                        <a:t>-</a:t>
+                      </a:r>
+                      <a:r>
+                        <a:rPr lang="en-US" sz="2800" b="1" dirty="0">
+                          <a:solidFill>
+                            <a:schemeClr val="tx1"/>
+                          </a:solidFill>
+                        </a:rPr>
+                        <a:t>1,name:1})</a:t>
+                      </a:r>
+                      <a:endParaRPr lang="en-US" sz="7200" b="1" kern="1200" dirty="0">
+                        <a:solidFill>
+                          <a:schemeClr val="tx1"/>
+                        </a:solidFill>
+                        <a:latin typeface="+mn-lt"/>
+                        <a:ea typeface="+mn-ea"/>
+                        <a:cs typeface="+mn-cs"/>
+                      </a:endParaRPr>
+                    </a:p>
+                  </a:txBody>
+                  <a:tcPr/>
+                </a:tc>
+                <a:extLst>
+                  <a:ext uri="{0D108BD9-81ED-4DB2-BD59-A6C34878D82A}">
+                    <a16:rowId xmlns:a16="http://schemas.microsoft.com/office/drawing/2014/main" val="10000"/>
+                  </a:ext>
+                </a:extLst>
+              </a:tr>
+              <a:tr h="762474">
+                <a:tc>
+                  <a:txBody>
+                    <a:bodyPr/>
+                    <a:lstStyle/>
+                    <a:p>
+                      <a:pPr marL="0" marR="0" indent="0" algn="ctr" defTabSz="914400" rtl="0" eaLnBrk="1" fontAlgn="auto" latinLnBrk="0" hangingPunct="1">
+                        <a:lnSpc>
+                          <a:spcPct val="100000"/>
+                        </a:lnSpc>
+                        <a:spcBef>
+                          <a:spcPts val="0"/>
+                        </a:spcBef>
+                        <a:spcAft>
+                          <a:spcPts val="0"/>
+                        </a:spcAft>
+                        <a:buClrTx/>
+                        <a:buSzTx/>
+                        <a:buFontTx/>
+                        <a:buNone/>
+                        <a:tabLst/>
+                        <a:defRPr/>
+                      </a:pPr>
+                      <a:r>
+                        <a:rPr lang="en-US" sz="2800" b="1" dirty="0">
+                          <a:solidFill>
+                            <a:schemeClr val="tx1"/>
+                          </a:solidFill>
+                        </a:rPr>
+                        <a:t>skip()</a:t>
+                      </a:r>
+                      <a:endParaRPr lang="en-US" sz="2400" b="1" kern="1200" dirty="0">
+                        <a:solidFill>
+                          <a:schemeClr val="tx1"/>
+                        </a:solidFill>
+                        <a:latin typeface="+mn-lt"/>
+                        <a:ea typeface="+mn-ea"/>
+                        <a:cs typeface="+mn-cs"/>
+                      </a:endParaRPr>
+                    </a:p>
+                  </a:txBody>
+                  <a:tcPr/>
+                </a:tc>
+                <a:tc>
+                  <a:txBody>
+                    <a:bodyPr/>
+                    <a:lstStyle/>
+                    <a:p>
+                      <a:pPr algn="l"/>
+                      <a:r>
+                        <a:rPr lang="en-US" sz="2800" b="1" dirty="0">
+                          <a:solidFill>
+                            <a:schemeClr val="tx1"/>
+                          </a:solidFill>
+                        </a:rPr>
+                        <a:t>find(…). </a:t>
+                      </a:r>
+                      <a:r>
+                        <a:rPr lang="en-US" sz="2800" b="1" dirty="0">
+                          <a:solidFill>
+                            <a:srgbClr val="2D75BC"/>
+                          </a:solidFill>
+                        </a:rPr>
+                        <a:t>skip</a:t>
+                      </a:r>
+                      <a:r>
+                        <a:rPr lang="en-US" sz="2800" b="1" dirty="0">
+                          <a:solidFill>
+                            <a:schemeClr val="tx1"/>
+                          </a:solidFill>
+                        </a:rPr>
+                        <a:t>(2)</a:t>
+                      </a:r>
+                      <a:endParaRPr lang="en-US" sz="7200" b="1" kern="1200" dirty="0">
+                        <a:solidFill>
+                          <a:schemeClr val="tx1"/>
+                        </a:solidFill>
+                        <a:latin typeface="+mn-lt"/>
+                        <a:ea typeface="+mn-ea"/>
+                        <a:cs typeface="+mn-cs"/>
+                      </a:endParaRPr>
+                    </a:p>
+                  </a:txBody>
+                  <a:tcPr/>
+                </a:tc>
+                <a:extLst>
+                  <a:ext uri="{0D108BD9-81ED-4DB2-BD59-A6C34878D82A}">
+                    <a16:rowId xmlns:a16="http://schemas.microsoft.com/office/drawing/2014/main" val="10001"/>
+                  </a:ext>
+                </a:extLst>
+              </a:tr>
+              <a:tr h="721315">
+                <a:tc>
+                  <a:txBody>
+                    <a:bodyPr/>
+                    <a:lstStyle/>
+                    <a:p>
+                      <a:pPr marL="0" marR="0" indent="0" algn="ctr" defTabSz="914400" rtl="0" eaLnBrk="1" fontAlgn="auto" latinLnBrk="0" hangingPunct="1">
+                        <a:lnSpc>
+                          <a:spcPct val="100000"/>
+                        </a:lnSpc>
+                        <a:spcBef>
+                          <a:spcPts val="0"/>
+                        </a:spcBef>
+                        <a:spcAft>
+                          <a:spcPts val="0"/>
+                        </a:spcAft>
+                        <a:buClrTx/>
+                        <a:buSzTx/>
+                        <a:buFontTx/>
+                        <a:buNone/>
+                        <a:tabLst/>
+                        <a:defRPr/>
+                      </a:pPr>
+                      <a:r>
+                        <a:rPr lang="en-US" sz="2800" b="1" dirty="0">
+                          <a:solidFill>
+                            <a:schemeClr val="tx1"/>
+                          </a:solidFill>
+                        </a:rPr>
+                        <a:t>lim</a:t>
+                      </a:r>
+                      <a:r>
+                        <a:rPr lang="en-US" altLang="zh-CN" sz="2800" b="1" dirty="0">
+                          <a:solidFill>
+                            <a:schemeClr val="tx1"/>
+                          </a:solidFill>
+                        </a:rPr>
+                        <a:t>i</a:t>
+                      </a:r>
+                      <a:r>
+                        <a:rPr lang="en-US" sz="2800" b="1" dirty="0">
+                          <a:solidFill>
+                            <a:schemeClr val="tx1"/>
+                          </a:solidFill>
+                        </a:rPr>
+                        <a:t>t()</a:t>
+                      </a:r>
+                      <a:endParaRPr lang="en-US" sz="2800" b="1" kern="1200" dirty="0">
+                        <a:solidFill>
+                          <a:schemeClr val="tx1"/>
+                        </a:solidFill>
+                        <a:latin typeface="+mn-lt"/>
+                        <a:ea typeface="+mn-ea"/>
+                        <a:cs typeface="+mn-cs"/>
+                      </a:endParaRPr>
+                    </a:p>
+                  </a:txBody>
+                  <a:tcPr/>
+                </a:tc>
+                <a:tc>
+                  <a:txBody>
+                    <a:bodyPr/>
+                    <a:lstStyle/>
+                    <a:p>
+                      <a:pPr algn="l"/>
+                      <a:r>
+                        <a:rPr lang="en-US" sz="2800" b="1" dirty="0">
+                          <a:solidFill>
+                            <a:schemeClr val="tx1"/>
+                          </a:solidFill>
+                        </a:rPr>
+                        <a:t>find(…). </a:t>
+                      </a:r>
+                      <a:r>
+                        <a:rPr lang="en-US" sz="2800" b="1" dirty="0">
+                          <a:solidFill>
+                            <a:srgbClr val="2D75BC"/>
+                          </a:solidFill>
+                        </a:rPr>
+                        <a:t>lim</a:t>
+                      </a:r>
+                      <a:r>
+                        <a:rPr lang="en-US" altLang="zh-CN" sz="2800" b="1" dirty="0">
+                          <a:solidFill>
+                            <a:srgbClr val="2D75BC"/>
+                          </a:solidFill>
+                        </a:rPr>
+                        <a:t>i</a:t>
+                      </a:r>
+                      <a:r>
+                        <a:rPr lang="en-US" sz="2800" b="1" dirty="0">
+                          <a:solidFill>
+                            <a:srgbClr val="2D75BC"/>
+                          </a:solidFill>
+                        </a:rPr>
+                        <a:t>t</a:t>
+                      </a:r>
+                      <a:r>
+                        <a:rPr lang="en-US" sz="2800" b="1" dirty="0">
+                          <a:solidFill>
+                            <a:schemeClr val="tx1"/>
+                          </a:solidFill>
+                        </a:rPr>
+                        <a:t>(2)</a:t>
+                      </a:r>
+                      <a:endParaRPr lang="en-US" sz="7200" b="1" kern="1200" dirty="0">
+                        <a:solidFill>
+                          <a:schemeClr val="tx1"/>
+                        </a:solidFill>
+                        <a:latin typeface="+mn-lt"/>
+                        <a:ea typeface="+mn-ea"/>
+                        <a:cs typeface="+mn-cs"/>
+                      </a:endParaRPr>
+                    </a:p>
+                  </a:txBody>
+                  <a:tcPr/>
+                </a:tc>
+                <a:extLst>
+                  <a:ext uri="{0D108BD9-81ED-4DB2-BD59-A6C34878D82A}">
+                    <a16:rowId xmlns:a16="http://schemas.microsoft.com/office/drawing/2014/main" val="10002"/>
+                  </a:ext>
+                </a:extLst>
+              </a:tr>
+            </a:tbl>
+          </a:graphicData>
+        </a:graphic>
+      </p:graphicFrame>
     </p:spTree>
+    <p:extLst>
+      <p:ext uri="{BB962C8B-B14F-4D97-AF65-F5344CB8AC3E}">
+        <p14:creationId xmlns:p14="http://schemas.microsoft.com/office/powerpoint/2010/main" val="631944383"/>
+      </p:ext>
+    </p:extLst>
   </p:cSld>
   <p:clrMapOvr>
     <a:masterClrMapping/>
@@ -16298,6 +16761,957 @@
           </a:p>
         </p:txBody>
       </p:sp>
+    </p:spTree>
+  </p:cSld>
+  <p:clrMapOvr>
+    <a:masterClrMapping/>
+  </p:clrMapOvr>
+</p:sld>
+</file>
+
+<file path=ppt/slides/slide30.xml><?xml version="1.0" encoding="utf-8"?>
+<p:sld xmlns:a="http://schemas.openxmlformats.org/drawingml/2006/main" xmlns:r="http://schemas.openxmlformats.org/officeDocument/2006/relationships" xmlns:p="http://schemas.openxmlformats.org/presentationml/2006/main">
+  <p:cSld>
+    <p:spTree>
+      <p:nvGrpSpPr>
+        <p:cNvPr id="1" name=""/>
+        <p:cNvGrpSpPr/>
+        <p:nvPr/>
+      </p:nvGrpSpPr>
+      <p:grpSpPr>
+        <a:xfrm>
+          <a:off x="0" y="0"/>
+          <a:ext cx="0" cy="0"/>
+          <a:chOff x="0" y="0"/>
+          <a:chExt cx="0" cy="0"/>
+        </a:xfrm>
+      </p:grpSpPr>
+      <p:sp>
+        <p:nvSpPr>
+          <p:cNvPr id="2" name="Text Placeholder 1"/>
+          <p:cNvSpPr>
+            <a:spLocks noGrp="1"/>
+          </p:cNvSpPr>
+          <p:nvPr>
+            <p:ph type="body" sz="quarter" idx="13"/>
+          </p:nvPr>
+        </p:nvSpPr>
+        <p:spPr/>
+        <p:txBody>
+          <a:bodyPr/>
+          <a:lstStyle/>
+          <a:p>
+            <a:r>
+              <a:rPr lang="en-US" dirty="0"/>
+              <a:t>6</a:t>
+            </a:r>
+          </a:p>
+        </p:txBody>
+      </p:sp>
+      <p:sp>
+        <p:nvSpPr>
+          <p:cNvPr id="3" name="Text Placeholder 2"/>
+          <p:cNvSpPr>
+            <a:spLocks noGrp="1"/>
+          </p:cNvSpPr>
+          <p:nvPr>
+            <p:ph type="body" sz="quarter" idx="14"/>
+          </p:nvPr>
+        </p:nvSpPr>
+        <p:spPr/>
+        <p:txBody>
+          <a:bodyPr/>
+          <a:lstStyle/>
+          <a:p>
+            <a:r>
+              <a:rPr lang="en-US" altLang="zh-CN" dirty="0"/>
+              <a:t>Cursor</a:t>
+            </a:r>
+          </a:p>
+          <a:p>
+            <a:endParaRPr lang="en-US" altLang="zh-CN" dirty="0"/>
+          </a:p>
+          <a:p>
+            <a:endParaRPr lang="en-US" altLang="zh-CN" dirty="0"/>
+          </a:p>
+          <a:p>
+            <a:endParaRPr lang="en-US" dirty="0"/>
+          </a:p>
+          <a:p>
+            <a:endParaRPr lang="en-US" dirty="0"/>
+          </a:p>
+        </p:txBody>
+      </p:sp>
+      <p:pic>
+        <p:nvPicPr>
+          <p:cNvPr id="6" name="Picture 5"/>
+          <p:cNvPicPr>
+            <a:picLocks noChangeAspect="1"/>
+          </p:cNvPicPr>
+          <p:nvPr/>
+        </p:nvPicPr>
+        <p:blipFill>
+          <a:blip r:embed="rId2"/>
+          <a:stretch>
+            <a:fillRect/>
+          </a:stretch>
+        </p:blipFill>
+        <p:spPr>
+          <a:xfrm>
+            <a:off x="2057400" y="76200"/>
+            <a:ext cx="4953000" cy="3840370"/>
+          </a:xfrm>
+          <a:prstGeom prst="rect">
+            <a:avLst/>
+          </a:prstGeom>
+        </p:spPr>
+      </p:pic>
+      <p:pic>
+        <p:nvPicPr>
+          <p:cNvPr id="9" name="Picture 8"/>
+          <p:cNvPicPr>
+            <a:picLocks noChangeAspect="1"/>
+          </p:cNvPicPr>
+          <p:nvPr/>
+        </p:nvPicPr>
+        <p:blipFill>
+          <a:blip r:embed="rId3"/>
+          <a:stretch>
+            <a:fillRect/>
+          </a:stretch>
+        </p:blipFill>
+        <p:spPr>
+          <a:xfrm>
+            <a:off x="132735" y="3962400"/>
+            <a:ext cx="8910484" cy="542814"/>
+          </a:xfrm>
+          <a:prstGeom prst="rect">
+            <a:avLst/>
+          </a:prstGeom>
+        </p:spPr>
+      </p:pic>
+      <p:pic>
+        <p:nvPicPr>
+          <p:cNvPr id="10" name="Picture 9"/>
+          <p:cNvPicPr>
+            <a:picLocks noChangeAspect="1"/>
+          </p:cNvPicPr>
+          <p:nvPr/>
+        </p:nvPicPr>
+        <p:blipFill>
+          <a:blip r:embed="rId4"/>
+          <a:stretch>
+            <a:fillRect/>
+          </a:stretch>
+        </p:blipFill>
+        <p:spPr>
+          <a:xfrm>
+            <a:off x="2590800" y="4560875"/>
+            <a:ext cx="3581400" cy="2261249"/>
+          </a:xfrm>
+          <a:prstGeom prst="rect">
+            <a:avLst/>
+          </a:prstGeom>
+        </p:spPr>
+      </p:pic>
+    </p:spTree>
+    <p:extLst>
+      <p:ext uri="{BB962C8B-B14F-4D97-AF65-F5344CB8AC3E}">
+        <p14:creationId xmlns:p14="http://schemas.microsoft.com/office/powerpoint/2010/main" val="1784741288"/>
+      </p:ext>
+    </p:extLst>
+  </p:cSld>
+  <p:clrMapOvr>
+    <a:masterClrMapping/>
+  </p:clrMapOvr>
+  <p:timing>
+    <p:tnLst>
+      <p:par>
+        <p:cTn id="1" dur="indefinite" restart="never" nodeType="tmRoot">
+          <p:childTnLst>
+            <p:seq concurrent="1" nextAc="seek">
+              <p:cTn id="2" dur="indefinite" nodeType="mainSeq">
+                <p:childTnLst>
+                  <p:par>
+                    <p:cTn id="3" fill="hold">
+                      <p:stCondLst>
+                        <p:cond delay="indefinite"/>
+                      </p:stCondLst>
+                      <p:childTnLst>
+                        <p:par>
+                          <p:cTn id="4" fill="hold">
+                            <p:stCondLst>
+                              <p:cond delay="0"/>
+                            </p:stCondLst>
+                            <p:childTnLst>
+                              <p:par>
+                                <p:cTn id="5" presetID="10" presetClass="entr" presetSubtype="0" fill="hold" nodeType="clickEffect">
+                                  <p:stCondLst>
+                                    <p:cond delay="0"/>
+                                  </p:stCondLst>
+                                  <p:childTnLst>
+                                    <p:set>
+                                      <p:cBhvr>
+                                        <p:cTn id="6" dur="1" fill="hold">
+                                          <p:stCondLst>
+                                            <p:cond delay="0"/>
+                                          </p:stCondLst>
+                                        </p:cTn>
+                                        <p:tgtEl>
+                                          <p:spTgt spid="10"/>
+                                        </p:tgtEl>
+                                        <p:attrNameLst>
+                                          <p:attrName>style.visibility</p:attrName>
+                                        </p:attrNameLst>
+                                      </p:cBhvr>
+                                      <p:to>
+                                        <p:strVal val="visible"/>
+                                      </p:to>
+                                    </p:set>
+                                    <p:animEffect transition="in" filter="fade">
+                                      <p:cBhvr>
+                                        <p:cTn id="7" dur="500"/>
+                                        <p:tgtEl>
+                                          <p:spTgt spid="10"/>
+                                        </p:tgtEl>
+                                      </p:cBhvr>
+                                    </p:animEffect>
+                                  </p:childTnLst>
+                                </p:cTn>
+                              </p:par>
+                            </p:childTnLst>
+                          </p:cTn>
+                        </p:par>
+                      </p:childTnLst>
+                    </p:cTn>
+                  </p:par>
+                </p:childTnLst>
+              </p:cTn>
+              <p:prevCondLst>
+                <p:cond evt="onPrev" delay="0">
+                  <p:tgtEl>
+                    <p:sldTgt/>
+                  </p:tgtEl>
+                </p:cond>
+              </p:prevCondLst>
+              <p:nextCondLst>
+                <p:cond evt="onNext" delay="0">
+                  <p:tgtEl>
+                    <p:sldTgt/>
+                  </p:tgtEl>
+                </p:cond>
+              </p:nextCondLst>
+            </p:seq>
+          </p:childTnLst>
+        </p:cTn>
+      </p:par>
+    </p:tnLst>
+  </p:timing>
+</p:sld>
+</file>
+
+<file path=ppt/slides/slide31.xml><?xml version="1.0" encoding="utf-8"?>
+<p:sld xmlns:a="http://schemas.openxmlformats.org/drawingml/2006/main" xmlns:r="http://schemas.openxmlformats.org/officeDocument/2006/relationships" xmlns:p="http://schemas.openxmlformats.org/presentationml/2006/main">
+  <p:cSld>
+    <p:spTree>
+      <p:nvGrpSpPr>
+        <p:cNvPr id="1" name=""/>
+        <p:cNvGrpSpPr/>
+        <p:nvPr/>
+      </p:nvGrpSpPr>
+      <p:grpSpPr>
+        <a:xfrm>
+          <a:off x="0" y="0"/>
+          <a:ext cx="0" cy="0"/>
+          <a:chOff x="0" y="0"/>
+          <a:chExt cx="0" cy="0"/>
+        </a:xfrm>
+      </p:grpSpPr>
+      <p:sp>
+        <p:nvSpPr>
+          <p:cNvPr id="2" name="Text Placeholder 1"/>
+          <p:cNvSpPr>
+            <a:spLocks noGrp="1"/>
+          </p:cNvSpPr>
+          <p:nvPr>
+            <p:ph type="body" sz="quarter" idx="13"/>
+          </p:nvPr>
+        </p:nvSpPr>
+        <p:spPr/>
+        <p:txBody>
+          <a:bodyPr/>
+          <a:lstStyle/>
+          <a:p>
+            <a:r>
+              <a:rPr lang="en-US" dirty="0"/>
+              <a:t>6</a:t>
+            </a:r>
+          </a:p>
+        </p:txBody>
+      </p:sp>
+      <p:sp>
+        <p:nvSpPr>
+          <p:cNvPr id="3" name="Text Placeholder 2"/>
+          <p:cNvSpPr>
+            <a:spLocks noGrp="1"/>
+          </p:cNvSpPr>
+          <p:nvPr>
+            <p:ph type="body" sz="quarter" idx="14"/>
+          </p:nvPr>
+        </p:nvSpPr>
+        <p:spPr/>
+        <p:txBody>
+          <a:bodyPr/>
+          <a:lstStyle/>
+          <a:p>
+            <a:r>
+              <a:rPr lang="en-US" altLang="zh-CN" dirty="0"/>
+              <a:t>Cursor</a:t>
+            </a:r>
+          </a:p>
+          <a:p>
+            <a:endParaRPr lang="en-US" altLang="zh-CN" dirty="0"/>
+          </a:p>
+          <a:p>
+            <a:endParaRPr lang="en-US" altLang="zh-CN" dirty="0"/>
+          </a:p>
+          <a:p>
+            <a:endParaRPr lang="en-US" dirty="0"/>
+          </a:p>
+          <a:p>
+            <a:endParaRPr lang="en-US" dirty="0"/>
+          </a:p>
+        </p:txBody>
+      </p:sp>
+      <p:pic>
+        <p:nvPicPr>
+          <p:cNvPr id="6" name="Picture 5"/>
+          <p:cNvPicPr>
+            <a:picLocks noChangeAspect="1"/>
+          </p:cNvPicPr>
+          <p:nvPr/>
+        </p:nvPicPr>
+        <p:blipFill>
+          <a:blip r:embed="rId2"/>
+          <a:stretch>
+            <a:fillRect/>
+          </a:stretch>
+        </p:blipFill>
+        <p:spPr>
+          <a:xfrm>
+            <a:off x="2057400" y="76199"/>
+            <a:ext cx="5105400" cy="3958535"/>
+          </a:xfrm>
+          <a:prstGeom prst="rect">
+            <a:avLst/>
+          </a:prstGeom>
+        </p:spPr>
+      </p:pic>
+      <p:pic>
+        <p:nvPicPr>
+          <p:cNvPr id="4" name="Picture 3"/>
+          <p:cNvPicPr>
+            <a:picLocks noChangeAspect="1"/>
+          </p:cNvPicPr>
+          <p:nvPr/>
+        </p:nvPicPr>
+        <p:blipFill>
+          <a:blip r:embed="rId3"/>
+          <a:stretch>
+            <a:fillRect/>
+          </a:stretch>
+        </p:blipFill>
+        <p:spPr>
+          <a:xfrm>
+            <a:off x="174523" y="4114800"/>
+            <a:ext cx="8817078" cy="603633"/>
+          </a:xfrm>
+          <a:prstGeom prst="rect">
+            <a:avLst/>
+          </a:prstGeom>
+        </p:spPr>
+      </p:pic>
+      <p:pic>
+        <p:nvPicPr>
+          <p:cNvPr id="5" name="Picture 4"/>
+          <p:cNvPicPr>
+            <a:picLocks noChangeAspect="1"/>
+          </p:cNvPicPr>
+          <p:nvPr/>
+        </p:nvPicPr>
+        <p:blipFill>
+          <a:blip r:embed="rId4"/>
+          <a:stretch>
+            <a:fillRect/>
+          </a:stretch>
+        </p:blipFill>
+        <p:spPr>
+          <a:xfrm>
+            <a:off x="1447800" y="4820622"/>
+            <a:ext cx="5982269" cy="1524000"/>
+          </a:xfrm>
+          <a:prstGeom prst="rect">
+            <a:avLst/>
+          </a:prstGeom>
+        </p:spPr>
+      </p:pic>
+    </p:spTree>
+    <p:extLst>
+      <p:ext uri="{BB962C8B-B14F-4D97-AF65-F5344CB8AC3E}">
+        <p14:creationId xmlns:p14="http://schemas.microsoft.com/office/powerpoint/2010/main" val="1148026232"/>
+      </p:ext>
+    </p:extLst>
+  </p:cSld>
+  <p:clrMapOvr>
+    <a:masterClrMapping/>
+  </p:clrMapOvr>
+  <p:timing>
+    <p:tnLst>
+      <p:par>
+        <p:cTn id="1" dur="indefinite" restart="never" nodeType="tmRoot">
+          <p:childTnLst>
+            <p:seq concurrent="1" nextAc="seek">
+              <p:cTn id="2" dur="indefinite" nodeType="mainSeq">
+                <p:childTnLst>
+                  <p:par>
+                    <p:cTn id="3" fill="hold">
+                      <p:stCondLst>
+                        <p:cond delay="indefinite"/>
+                      </p:stCondLst>
+                      <p:childTnLst>
+                        <p:par>
+                          <p:cTn id="4" fill="hold">
+                            <p:stCondLst>
+                              <p:cond delay="0"/>
+                            </p:stCondLst>
+                            <p:childTnLst>
+                              <p:par>
+                                <p:cTn id="5" presetID="10" presetClass="entr" presetSubtype="0" fill="hold" nodeType="clickEffect">
+                                  <p:stCondLst>
+                                    <p:cond delay="0"/>
+                                  </p:stCondLst>
+                                  <p:childTnLst>
+                                    <p:set>
+                                      <p:cBhvr>
+                                        <p:cTn id="6" dur="1" fill="hold">
+                                          <p:stCondLst>
+                                            <p:cond delay="0"/>
+                                          </p:stCondLst>
+                                        </p:cTn>
+                                        <p:tgtEl>
+                                          <p:spTgt spid="5"/>
+                                        </p:tgtEl>
+                                        <p:attrNameLst>
+                                          <p:attrName>style.visibility</p:attrName>
+                                        </p:attrNameLst>
+                                      </p:cBhvr>
+                                      <p:to>
+                                        <p:strVal val="visible"/>
+                                      </p:to>
+                                    </p:set>
+                                    <p:animEffect transition="in" filter="fade">
+                                      <p:cBhvr>
+                                        <p:cTn id="7" dur="500"/>
+                                        <p:tgtEl>
+                                          <p:spTgt spid="5"/>
+                                        </p:tgtEl>
+                                      </p:cBhvr>
+                                    </p:animEffect>
+                                  </p:childTnLst>
+                                </p:cTn>
+                              </p:par>
+                            </p:childTnLst>
+                          </p:cTn>
+                        </p:par>
+                      </p:childTnLst>
+                    </p:cTn>
+                  </p:par>
+                </p:childTnLst>
+              </p:cTn>
+              <p:prevCondLst>
+                <p:cond evt="onPrev" delay="0">
+                  <p:tgtEl>
+                    <p:sldTgt/>
+                  </p:tgtEl>
+                </p:cond>
+              </p:prevCondLst>
+              <p:nextCondLst>
+                <p:cond evt="onNext" delay="0">
+                  <p:tgtEl>
+                    <p:sldTgt/>
+                  </p:tgtEl>
+                </p:cond>
+              </p:nextCondLst>
+            </p:seq>
+          </p:childTnLst>
+        </p:cTn>
+      </p:par>
+    </p:tnLst>
+  </p:timing>
+</p:sld>
+</file>
+
+<file path=ppt/slides/slide32.xml><?xml version="1.0" encoding="utf-8"?>
+<p:sld xmlns:a="http://schemas.openxmlformats.org/drawingml/2006/main" xmlns:r="http://schemas.openxmlformats.org/officeDocument/2006/relationships" xmlns:p="http://schemas.openxmlformats.org/presentationml/2006/main">
+  <p:cSld>
+    <p:spTree>
+      <p:nvGrpSpPr>
+        <p:cNvPr id="1" name=""/>
+        <p:cNvGrpSpPr/>
+        <p:nvPr/>
+      </p:nvGrpSpPr>
+      <p:grpSpPr>
+        <a:xfrm>
+          <a:off x="0" y="0"/>
+          <a:ext cx="0" cy="0"/>
+          <a:chOff x="0" y="0"/>
+          <a:chExt cx="0" cy="0"/>
+        </a:xfrm>
+      </p:grpSpPr>
+      <p:sp>
+        <p:nvSpPr>
+          <p:cNvPr id="2" name="Text Placeholder 1"/>
+          <p:cNvSpPr>
+            <a:spLocks noGrp="1"/>
+          </p:cNvSpPr>
+          <p:nvPr>
+            <p:ph type="body" sz="quarter" idx="13"/>
+          </p:nvPr>
+        </p:nvSpPr>
+        <p:spPr/>
+        <p:txBody>
+          <a:bodyPr/>
+          <a:lstStyle/>
+          <a:p>
+            <a:r>
+              <a:rPr lang="en-US" dirty="0"/>
+              <a:t>6</a:t>
+            </a:r>
+          </a:p>
+        </p:txBody>
+      </p:sp>
+      <p:sp>
+        <p:nvSpPr>
+          <p:cNvPr id="3" name="Text Placeholder 2"/>
+          <p:cNvSpPr>
+            <a:spLocks noGrp="1"/>
+          </p:cNvSpPr>
+          <p:nvPr>
+            <p:ph type="body" sz="quarter" idx="14"/>
+          </p:nvPr>
+        </p:nvSpPr>
+        <p:spPr/>
+        <p:txBody>
+          <a:bodyPr/>
+          <a:lstStyle/>
+          <a:p>
+            <a:r>
+              <a:rPr lang="en-US" altLang="zh-CN" dirty="0"/>
+              <a:t>Cursor</a:t>
+            </a:r>
+          </a:p>
+          <a:p>
+            <a:endParaRPr lang="en-US" altLang="zh-CN" dirty="0"/>
+          </a:p>
+          <a:p>
+            <a:endParaRPr lang="en-US" altLang="zh-CN" dirty="0"/>
+          </a:p>
+          <a:p>
+            <a:endParaRPr lang="en-US" dirty="0"/>
+          </a:p>
+          <a:p>
+            <a:endParaRPr lang="en-US" dirty="0"/>
+          </a:p>
+        </p:txBody>
+      </p:sp>
+      <p:pic>
+        <p:nvPicPr>
+          <p:cNvPr id="5" name="Picture 4"/>
+          <p:cNvPicPr>
+            <a:picLocks noChangeAspect="1"/>
+          </p:cNvPicPr>
+          <p:nvPr/>
+        </p:nvPicPr>
+        <p:blipFill>
+          <a:blip r:embed="rId2"/>
+          <a:stretch>
+            <a:fillRect/>
+          </a:stretch>
+        </p:blipFill>
+        <p:spPr>
+          <a:xfrm>
+            <a:off x="125361" y="1143000"/>
+            <a:ext cx="8942439" cy="457200"/>
+          </a:xfrm>
+          <a:prstGeom prst="rect">
+            <a:avLst/>
+          </a:prstGeom>
+        </p:spPr>
+      </p:pic>
+      <p:pic>
+        <p:nvPicPr>
+          <p:cNvPr id="7" name="Picture 6"/>
+          <p:cNvPicPr>
+            <a:picLocks noChangeAspect="1"/>
+          </p:cNvPicPr>
+          <p:nvPr/>
+        </p:nvPicPr>
+        <p:blipFill>
+          <a:blip r:embed="rId3"/>
+          <a:stretch>
+            <a:fillRect/>
+          </a:stretch>
+        </p:blipFill>
+        <p:spPr>
+          <a:xfrm>
+            <a:off x="117987" y="3048000"/>
+            <a:ext cx="8949813" cy="457200"/>
+          </a:xfrm>
+          <a:prstGeom prst="rect">
+            <a:avLst/>
+          </a:prstGeom>
+        </p:spPr>
+      </p:pic>
+      <p:pic>
+        <p:nvPicPr>
+          <p:cNvPr id="8" name="Picture 7"/>
+          <p:cNvPicPr>
+            <a:picLocks noChangeAspect="1"/>
+          </p:cNvPicPr>
+          <p:nvPr/>
+        </p:nvPicPr>
+        <p:blipFill>
+          <a:blip r:embed="rId4"/>
+          <a:stretch>
+            <a:fillRect/>
+          </a:stretch>
+        </p:blipFill>
+        <p:spPr>
+          <a:xfrm>
+            <a:off x="135193" y="4833938"/>
+            <a:ext cx="8932607" cy="480706"/>
+          </a:xfrm>
+          <a:prstGeom prst="rect">
+            <a:avLst/>
+          </a:prstGeom>
+        </p:spPr>
+      </p:pic>
+      <p:pic>
+        <p:nvPicPr>
+          <p:cNvPr id="9" name="Picture 8"/>
+          <p:cNvPicPr>
+            <a:picLocks noChangeAspect="1"/>
+          </p:cNvPicPr>
+          <p:nvPr/>
+        </p:nvPicPr>
+        <p:blipFill>
+          <a:blip r:embed="rId5"/>
+          <a:stretch>
+            <a:fillRect/>
+          </a:stretch>
+        </p:blipFill>
+        <p:spPr>
+          <a:xfrm>
+            <a:off x="533400" y="1627239"/>
+            <a:ext cx="5562600" cy="1355252"/>
+          </a:xfrm>
+          <a:prstGeom prst="rect">
+            <a:avLst/>
+          </a:prstGeom>
+        </p:spPr>
+      </p:pic>
+      <p:pic>
+        <p:nvPicPr>
+          <p:cNvPr id="10" name="Picture 9"/>
+          <p:cNvPicPr>
+            <a:picLocks noChangeAspect="1"/>
+          </p:cNvPicPr>
+          <p:nvPr/>
+        </p:nvPicPr>
+        <p:blipFill>
+          <a:blip r:embed="rId5"/>
+          <a:stretch>
+            <a:fillRect/>
+          </a:stretch>
+        </p:blipFill>
+        <p:spPr>
+          <a:xfrm>
+            <a:off x="533400" y="3559277"/>
+            <a:ext cx="5105400" cy="1243861"/>
+          </a:xfrm>
+          <a:prstGeom prst="rect">
+            <a:avLst/>
+          </a:prstGeom>
+        </p:spPr>
+      </p:pic>
+      <p:pic>
+        <p:nvPicPr>
+          <p:cNvPr id="11" name="Picture 10"/>
+          <p:cNvPicPr>
+            <a:picLocks noChangeAspect="1"/>
+          </p:cNvPicPr>
+          <p:nvPr/>
+        </p:nvPicPr>
+        <p:blipFill>
+          <a:blip r:embed="rId5"/>
+          <a:stretch>
+            <a:fillRect/>
+          </a:stretch>
+        </p:blipFill>
+        <p:spPr>
+          <a:xfrm>
+            <a:off x="530942" y="5313340"/>
+            <a:ext cx="5565058" cy="1355850"/>
+          </a:xfrm>
+          <a:prstGeom prst="rect">
+            <a:avLst/>
+          </a:prstGeom>
+        </p:spPr>
+      </p:pic>
+    </p:spTree>
+    <p:extLst>
+      <p:ext uri="{BB962C8B-B14F-4D97-AF65-F5344CB8AC3E}">
+        <p14:creationId xmlns:p14="http://schemas.microsoft.com/office/powerpoint/2010/main" val="2948374549"/>
+      </p:ext>
+    </p:extLst>
+  </p:cSld>
+  <p:clrMapOvr>
+    <a:masterClrMapping/>
+  </p:clrMapOvr>
+  <p:timing>
+    <p:tnLst>
+      <p:par>
+        <p:cTn id="1" dur="indefinite" restart="never" nodeType="tmRoot">
+          <p:childTnLst>
+            <p:seq concurrent="1" nextAc="seek">
+              <p:cTn id="2" dur="indefinite" nodeType="mainSeq">
+                <p:childTnLst>
+                  <p:par>
+                    <p:cTn id="3" fill="hold">
+                      <p:stCondLst>
+                        <p:cond delay="indefinite"/>
+                      </p:stCondLst>
+                      <p:childTnLst>
+                        <p:par>
+                          <p:cTn id="4" fill="hold">
+                            <p:stCondLst>
+                              <p:cond delay="0"/>
+                            </p:stCondLst>
+                            <p:childTnLst>
+                              <p:par>
+                                <p:cTn id="5" presetID="10" presetClass="entr" presetSubtype="0" fill="hold" nodeType="clickEffect">
+                                  <p:stCondLst>
+                                    <p:cond delay="0"/>
+                                  </p:stCondLst>
+                                  <p:childTnLst>
+                                    <p:set>
+                                      <p:cBhvr>
+                                        <p:cTn id="6" dur="1" fill="hold">
+                                          <p:stCondLst>
+                                            <p:cond delay="0"/>
+                                          </p:stCondLst>
+                                        </p:cTn>
+                                        <p:tgtEl>
+                                          <p:spTgt spid="9"/>
+                                        </p:tgtEl>
+                                        <p:attrNameLst>
+                                          <p:attrName>style.visibility</p:attrName>
+                                        </p:attrNameLst>
+                                      </p:cBhvr>
+                                      <p:to>
+                                        <p:strVal val="visible"/>
+                                      </p:to>
+                                    </p:set>
+                                    <p:animEffect transition="in" filter="fade">
+                                      <p:cBhvr>
+                                        <p:cTn id="7" dur="500"/>
+                                        <p:tgtEl>
+                                          <p:spTgt spid="9"/>
+                                        </p:tgtEl>
+                                      </p:cBhvr>
+                                    </p:animEffect>
+                                  </p:childTnLst>
+                                </p:cTn>
+                              </p:par>
+                            </p:childTnLst>
+                          </p:cTn>
+                        </p:par>
+                      </p:childTnLst>
+                    </p:cTn>
+                  </p:par>
+                  <p:par>
+                    <p:cTn id="8" fill="hold">
+                      <p:stCondLst>
+                        <p:cond delay="indefinite"/>
+                      </p:stCondLst>
+                      <p:childTnLst>
+                        <p:par>
+                          <p:cTn id="9" fill="hold">
+                            <p:stCondLst>
+                              <p:cond delay="0"/>
+                            </p:stCondLst>
+                            <p:childTnLst>
+                              <p:par>
+                                <p:cTn id="10" presetID="10" presetClass="entr" presetSubtype="0" fill="hold" nodeType="clickEffect">
+                                  <p:stCondLst>
+                                    <p:cond delay="0"/>
+                                  </p:stCondLst>
+                                  <p:childTnLst>
+                                    <p:set>
+                                      <p:cBhvr>
+                                        <p:cTn id="11" dur="1" fill="hold">
+                                          <p:stCondLst>
+                                            <p:cond delay="0"/>
+                                          </p:stCondLst>
+                                        </p:cTn>
+                                        <p:tgtEl>
+                                          <p:spTgt spid="10"/>
+                                        </p:tgtEl>
+                                        <p:attrNameLst>
+                                          <p:attrName>style.visibility</p:attrName>
+                                        </p:attrNameLst>
+                                      </p:cBhvr>
+                                      <p:to>
+                                        <p:strVal val="visible"/>
+                                      </p:to>
+                                    </p:set>
+                                    <p:animEffect transition="in" filter="fade">
+                                      <p:cBhvr>
+                                        <p:cTn id="12" dur="500"/>
+                                        <p:tgtEl>
+                                          <p:spTgt spid="10"/>
+                                        </p:tgtEl>
+                                      </p:cBhvr>
+                                    </p:animEffect>
+                                  </p:childTnLst>
+                                </p:cTn>
+                              </p:par>
+                            </p:childTnLst>
+                          </p:cTn>
+                        </p:par>
+                      </p:childTnLst>
+                    </p:cTn>
+                  </p:par>
+                  <p:par>
+                    <p:cTn id="13" fill="hold">
+                      <p:stCondLst>
+                        <p:cond delay="indefinite"/>
+                      </p:stCondLst>
+                      <p:childTnLst>
+                        <p:par>
+                          <p:cTn id="14" fill="hold">
+                            <p:stCondLst>
+                              <p:cond delay="0"/>
+                            </p:stCondLst>
+                            <p:childTnLst>
+                              <p:par>
+                                <p:cTn id="15" presetID="10" presetClass="entr" presetSubtype="0" fill="hold" nodeType="clickEffect">
+                                  <p:stCondLst>
+                                    <p:cond delay="0"/>
+                                  </p:stCondLst>
+                                  <p:childTnLst>
+                                    <p:set>
+                                      <p:cBhvr>
+                                        <p:cTn id="16" dur="1" fill="hold">
+                                          <p:stCondLst>
+                                            <p:cond delay="0"/>
+                                          </p:stCondLst>
+                                        </p:cTn>
+                                        <p:tgtEl>
+                                          <p:spTgt spid="11"/>
+                                        </p:tgtEl>
+                                        <p:attrNameLst>
+                                          <p:attrName>style.visibility</p:attrName>
+                                        </p:attrNameLst>
+                                      </p:cBhvr>
+                                      <p:to>
+                                        <p:strVal val="visible"/>
+                                      </p:to>
+                                    </p:set>
+                                    <p:animEffect transition="in" filter="fade">
+                                      <p:cBhvr>
+                                        <p:cTn id="17" dur="500"/>
+                                        <p:tgtEl>
+                                          <p:spTgt spid="11"/>
+                                        </p:tgtEl>
+                                      </p:cBhvr>
+                                    </p:animEffect>
+                                  </p:childTnLst>
+                                </p:cTn>
+                              </p:par>
+                            </p:childTnLst>
+                          </p:cTn>
+                        </p:par>
+                      </p:childTnLst>
+                    </p:cTn>
+                  </p:par>
+                </p:childTnLst>
+              </p:cTn>
+              <p:prevCondLst>
+                <p:cond evt="onPrev" delay="0">
+                  <p:tgtEl>
+                    <p:sldTgt/>
+                  </p:tgtEl>
+                </p:cond>
+              </p:prevCondLst>
+              <p:nextCondLst>
+                <p:cond evt="onNext" delay="0">
+                  <p:tgtEl>
+                    <p:sldTgt/>
+                  </p:tgtEl>
+                </p:cond>
+              </p:nextCondLst>
+            </p:seq>
+          </p:childTnLst>
+        </p:cTn>
+      </p:par>
+    </p:tnLst>
+  </p:timing>
+</p:sld>
+</file>
+
+<file path=ppt/slides/slide33.xml><?xml version="1.0" encoding="utf-8"?>
+<p:sld xmlns:a="http://schemas.openxmlformats.org/drawingml/2006/main" xmlns:r="http://schemas.openxmlformats.org/officeDocument/2006/relationships" xmlns:p="http://schemas.openxmlformats.org/presentationml/2006/main">
+  <p:cSld>
+    <p:spTree>
+      <p:nvGrpSpPr>
+        <p:cNvPr id="1" name=""/>
+        <p:cNvGrpSpPr/>
+        <p:nvPr/>
+      </p:nvGrpSpPr>
+      <p:grpSpPr>
+        <a:xfrm>
+          <a:off x="0" y="0"/>
+          <a:ext cx="0" cy="0"/>
+          <a:chOff x="0" y="0"/>
+          <a:chExt cx="0" cy="0"/>
+        </a:xfrm>
+      </p:grpSpPr>
+    </p:spTree>
+  </p:cSld>
+  <p:clrMapOvr>
+    <a:masterClrMapping/>
+  </p:clrMapOvr>
+</p:sld>
+</file>
+
+<file path=ppt/slides/slide34.xml><?xml version="1.0" encoding="utf-8"?>
+<p:sld xmlns:a="http://schemas.openxmlformats.org/drawingml/2006/main" xmlns:r="http://schemas.openxmlformats.org/officeDocument/2006/relationships" xmlns:p="http://schemas.openxmlformats.org/presentationml/2006/main">
+  <p:cSld>
+    <p:spTree>
+      <p:nvGrpSpPr>
+        <p:cNvPr id="1" name=""/>
+        <p:cNvGrpSpPr/>
+        <p:nvPr/>
+      </p:nvGrpSpPr>
+      <p:grpSpPr>
+        <a:xfrm>
+          <a:off x="0" y="0"/>
+          <a:ext cx="0" cy="0"/>
+          <a:chOff x="0" y="0"/>
+          <a:chExt cx="0" cy="0"/>
+        </a:xfrm>
+      </p:grpSpPr>
     </p:spTree>
   </p:cSld>
   <p:clrMapOvr>
@@ -20625,13 +22039,13 @@
 <file path=customXml/itemProps2.xml><?xml version="1.0" encoding="utf-8"?>
 <ds:datastoreItem xmlns:ds="http://schemas.openxmlformats.org/officeDocument/2006/customXml" ds:itemID="{BC974159-165D-43A7-BAC0-2BE7E1872CAD}">
   <ds:schemaRefs>
+    <ds:schemaRef ds:uri="http://www.w3.org/XML/1998/namespace"/>
+    <ds:schemaRef ds:uri="http://schemas.microsoft.com/office/2006/metadata/properties"/>
     <ds:schemaRef ds:uri="http://purl.org/dc/elements/1.1/"/>
-    <ds:schemaRef ds:uri="http://www.w3.org/XML/1998/namespace"/>
     <ds:schemaRef ds:uri="http://schemas.microsoft.com/office/2006/documentManagement/types"/>
+    <ds:schemaRef ds:uri="http://purl.org/dc/terms/"/>
     <ds:schemaRef ds:uri="http://purl.org/dc/dcmitype/"/>
     <ds:schemaRef ds:uri="http://schemas.openxmlformats.org/package/2006/metadata/core-properties"/>
-    <ds:schemaRef ds:uri="http://schemas.microsoft.com/office/2006/metadata/properties"/>
-    <ds:schemaRef ds:uri="http://purl.org/dc/terms/"/>
   </ds:schemaRefs>
 </ds:datastoreItem>
 </file>

</xml_diff>

<commit_message>
[db] add exercise for CRUD
</commit_message>
<xml_diff>
--- a/db/mongodb/2017/materials/MongoDB_CH2(2)_Query.pptx
+++ b/db/mongodb/2017/materials/MongoDB_CH2(2)_Query.pptx
@@ -8,7 +8,7 @@
     <p:sldMasterId id="2147483652" r:id="rId7"/>
   </p:sldMasterIdLst>
   <p:notesMasterIdLst>
-    <p:notesMasterId r:id="rId42"/>
+    <p:notesMasterId r:id="rId43"/>
   </p:notesMasterIdLst>
   <p:sldIdLst>
     <p:sldId id="281" r:id="rId8"/>
@@ -43,8 +43,9 @@
     <p:sldId id="459" r:id="rId37"/>
     <p:sldId id="460" r:id="rId38"/>
     <p:sldId id="461" r:id="rId39"/>
-    <p:sldId id="264" r:id="rId40"/>
-    <p:sldId id="265" r:id="rId41"/>
+    <p:sldId id="462" r:id="rId40"/>
+    <p:sldId id="264" r:id="rId41"/>
+    <p:sldId id="265" r:id="rId42"/>
   </p:sldIdLst>
   <p:sldSz cx="9144000" cy="6858000" type="screen4x3"/>
   <p:notesSz cx="6858000" cy="9144000"/>
@@ -17687,6 +17688,299 @@
           <a:chExt cx="0" cy="0"/>
         </a:xfrm>
       </p:grpSpPr>
+      <p:sp>
+        <p:nvSpPr>
+          <p:cNvPr id="2" name="Text Placeholder 1"/>
+          <p:cNvSpPr>
+            <a:spLocks noGrp="1"/>
+          </p:cNvSpPr>
+          <p:nvPr>
+            <p:ph type="body" sz="quarter" idx="14"/>
+          </p:nvPr>
+        </p:nvSpPr>
+        <p:spPr>
+          <a:xfrm>
+            <a:off x="1031080" y="1712742"/>
+            <a:ext cx="7122319" cy="1754326"/>
+          </a:xfrm>
+        </p:spPr>
+        <p:txBody>
+          <a:bodyPr/>
+          <a:lstStyle/>
+          <a:p>
+            <a:r>
+              <a:rPr lang="en-US" dirty="0">
+                <a:hlinkClick r:id="rId2"/>
+              </a:rPr>
+              <a:t>https://docs.mongodb.com/manual/crud/</a:t>
+            </a:r>
+            <a:endParaRPr lang="en-US" dirty="0"/>
+          </a:p>
+          <a:p>
+            <a:endParaRPr lang="en-US" dirty="0"/>
+          </a:p>
+        </p:txBody>
+      </p:sp>
+      <p:sp>
+        <p:nvSpPr>
+          <p:cNvPr id="3" name="Text Placeholder 2"/>
+          <p:cNvSpPr>
+            <a:spLocks noGrp="1"/>
+          </p:cNvSpPr>
+          <p:nvPr>
+            <p:ph type="body" sz="quarter" idx="11"/>
+          </p:nvPr>
+        </p:nvSpPr>
+        <p:spPr/>
+        <p:txBody>
+          <a:bodyPr/>
+          <a:lstStyle/>
+          <a:p>
+            <a:r>
+              <a:rPr lang="en-US" dirty="0"/>
+              <a:t>@</a:t>
+            </a:r>
+          </a:p>
+        </p:txBody>
+      </p:sp>
+      <p:sp>
+        <p:nvSpPr>
+          <p:cNvPr id="4" name="Text Placeholder 1"/>
+          <p:cNvSpPr txBox="1">
+            <a:spLocks/>
+          </p:cNvSpPr>
+          <p:nvPr/>
+        </p:nvSpPr>
+        <p:spPr>
+          <a:xfrm>
+            <a:off x="304801" y="3733800"/>
+            <a:ext cx="8382000" cy="2308324"/>
+          </a:xfrm>
+          <a:prstGeom prst="rect">
+            <a:avLst/>
+          </a:prstGeom>
+        </p:spPr>
+        <p:txBody>
+          <a:bodyPr wrap="square">
+            <a:spAutoFit/>
+          </a:bodyPr>
+          <a:lstStyle>
+            <a:lvl1pPr marL="0" indent="0" algn="l" defTabSz="914400" rtl="0" eaLnBrk="1" latinLnBrk="0" hangingPunct="1">
+              <a:spcBef>
+                <a:spcPts val="0"/>
+              </a:spcBef>
+              <a:buFont typeface="Arial" pitchFamily="34" charset="0"/>
+              <a:buNone/>
+              <a:defRPr sz="3600" b="1" kern="1200" cap="none" baseline="0">
+                <a:solidFill>
+                  <a:srgbClr val="2E2E2E"/>
+                </a:solidFill>
+                <a:latin typeface="Arial" pitchFamily="34" charset="0"/>
+                <a:ea typeface="+mn-ea"/>
+                <a:cs typeface="Arial" pitchFamily="34" charset="0"/>
+              </a:defRPr>
+            </a:lvl1pPr>
+            <a:lvl2pPr marL="742950" indent="-285750" algn="l" defTabSz="914400" rtl="0" eaLnBrk="1" latinLnBrk="0" hangingPunct="1">
+              <a:spcBef>
+                <a:spcPct val="20000"/>
+              </a:spcBef>
+              <a:buFont typeface="Arial" pitchFamily="34" charset="0"/>
+              <a:buChar char="–"/>
+              <a:defRPr sz="2800" kern="1200">
+                <a:solidFill>
+                  <a:schemeClr val="tx1"/>
+                </a:solidFill>
+                <a:latin typeface="+mn-lt"/>
+                <a:ea typeface="+mn-ea"/>
+                <a:cs typeface="+mn-cs"/>
+              </a:defRPr>
+            </a:lvl2pPr>
+            <a:lvl3pPr marL="1143000" indent="-228600" algn="l" defTabSz="914400" rtl="0" eaLnBrk="1" latinLnBrk="0" hangingPunct="1">
+              <a:spcBef>
+                <a:spcPct val="20000"/>
+              </a:spcBef>
+              <a:buFont typeface="Arial" pitchFamily="34" charset="0"/>
+              <a:buChar char="•"/>
+              <a:defRPr sz="2400" kern="1200">
+                <a:solidFill>
+                  <a:schemeClr val="tx1"/>
+                </a:solidFill>
+                <a:latin typeface="+mn-lt"/>
+                <a:ea typeface="+mn-ea"/>
+                <a:cs typeface="+mn-cs"/>
+              </a:defRPr>
+            </a:lvl3pPr>
+            <a:lvl4pPr marL="1600200" indent="-228600" algn="l" defTabSz="914400" rtl="0" eaLnBrk="1" latinLnBrk="0" hangingPunct="1">
+              <a:spcBef>
+                <a:spcPct val="20000"/>
+              </a:spcBef>
+              <a:buFont typeface="Arial" pitchFamily="34" charset="0"/>
+              <a:buChar char="–"/>
+              <a:defRPr sz="2000" kern="1200">
+                <a:solidFill>
+                  <a:schemeClr val="tx1"/>
+                </a:solidFill>
+                <a:latin typeface="+mn-lt"/>
+                <a:ea typeface="+mn-ea"/>
+                <a:cs typeface="+mn-cs"/>
+              </a:defRPr>
+            </a:lvl4pPr>
+            <a:lvl5pPr marL="2057400" indent="-228600" algn="l" defTabSz="914400" rtl="0" eaLnBrk="1" latinLnBrk="0" hangingPunct="1">
+              <a:spcBef>
+                <a:spcPct val="20000"/>
+              </a:spcBef>
+              <a:buFont typeface="Arial" pitchFamily="34" charset="0"/>
+              <a:buChar char="»"/>
+              <a:defRPr sz="2000" kern="1200">
+                <a:solidFill>
+                  <a:schemeClr val="tx1"/>
+                </a:solidFill>
+                <a:latin typeface="+mn-lt"/>
+                <a:ea typeface="+mn-ea"/>
+                <a:cs typeface="+mn-cs"/>
+              </a:defRPr>
+            </a:lvl5pPr>
+            <a:lvl6pPr marL="2514600" indent="-228600" algn="l" defTabSz="914400" rtl="0" eaLnBrk="1" latinLnBrk="0" hangingPunct="1">
+              <a:spcBef>
+                <a:spcPct val="20000"/>
+              </a:spcBef>
+              <a:buFont typeface="Arial" pitchFamily="34" charset="0"/>
+              <a:buChar char="•"/>
+              <a:defRPr sz="2000" kern="1200">
+                <a:solidFill>
+                  <a:schemeClr val="tx1"/>
+                </a:solidFill>
+                <a:latin typeface="+mn-lt"/>
+                <a:ea typeface="+mn-ea"/>
+                <a:cs typeface="+mn-cs"/>
+              </a:defRPr>
+            </a:lvl6pPr>
+            <a:lvl7pPr marL="2971800" indent="-228600" algn="l" defTabSz="914400" rtl="0" eaLnBrk="1" latinLnBrk="0" hangingPunct="1">
+              <a:spcBef>
+                <a:spcPct val="20000"/>
+              </a:spcBef>
+              <a:buFont typeface="Arial" pitchFamily="34" charset="0"/>
+              <a:buChar char="•"/>
+              <a:defRPr sz="2000" kern="1200">
+                <a:solidFill>
+                  <a:schemeClr val="tx1"/>
+                </a:solidFill>
+                <a:latin typeface="+mn-lt"/>
+                <a:ea typeface="+mn-ea"/>
+                <a:cs typeface="+mn-cs"/>
+              </a:defRPr>
+            </a:lvl7pPr>
+            <a:lvl8pPr marL="3429000" indent="-228600" algn="l" defTabSz="914400" rtl="0" eaLnBrk="1" latinLnBrk="0" hangingPunct="1">
+              <a:spcBef>
+                <a:spcPct val="20000"/>
+              </a:spcBef>
+              <a:buFont typeface="Arial" pitchFamily="34" charset="0"/>
+              <a:buChar char="•"/>
+              <a:defRPr sz="2000" kern="1200">
+                <a:solidFill>
+                  <a:schemeClr val="tx1"/>
+                </a:solidFill>
+                <a:latin typeface="+mn-lt"/>
+                <a:ea typeface="+mn-ea"/>
+                <a:cs typeface="+mn-cs"/>
+              </a:defRPr>
+            </a:lvl8pPr>
+            <a:lvl9pPr marL="3886200" indent="-228600" algn="l" defTabSz="914400" rtl="0" eaLnBrk="1" latinLnBrk="0" hangingPunct="1">
+              <a:spcBef>
+                <a:spcPct val="20000"/>
+              </a:spcBef>
+              <a:buFont typeface="Arial" pitchFamily="34" charset="0"/>
+              <a:buChar char="•"/>
+              <a:defRPr sz="2000" kern="1200">
+                <a:solidFill>
+                  <a:schemeClr val="tx1"/>
+                </a:solidFill>
+                <a:latin typeface="+mn-lt"/>
+                <a:ea typeface="+mn-ea"/>
+                <a:cs typeface="+mn-cs"/>
+              </a:defRPr>
+            </a:lvl9pPr>
+          </a:lstStyle>
+          <a:p>
+            <a:r>
+              <a:rPr lang="en-US" dirty="0"/>
+              <a:t>Exercise:</a:t>
+            </a:r>
+          </a:p>
+          <a:p>
+            <a:r>
+              <a:rPr lang="en-US" dirty="0">
+                <a:solidFill>
+                  <a:srgbClr val="2D75BC"/>
+                </a:solidFill>
+              </a:rPr>
+              <a:t>\full-stack-web-course\</a:t>
+            </a:r>
+            <a:r>
+              <a:rPr lang="en-US" dirty="0" err="1">
+                <a:solidFill>
+                  <a:srgbClr val="2D75BC"/>
+                </a:solidFill>
+              </a:rPr>
+              <a:t>db</a:t>
+            </a:r>
+            <a:r>
+              <a:rPr lang="en-US" dirty="0">
+                <a:solidFill>
+                  <a:srgbClr val="2D75BC"/>
+                </a:solidFill>
+              </a:rPr>
+              <a:t>\</a:t>
+            </a:r>
+            <a:r>
+              <a:rPr lang="en-US" dirty="0" err="1">
+                <a:solidFill>
+                  <a:srgbClr val="2D75BC"/>
+                </a:solidFill>
+              </a:rPr>
+              <a:t>mongodb</a:t>
+            </a:r>
+            <a:r>
+              <a:rPr lang="en-US" dirty="0">
+                <a:solidFill>
+                  <a:srgbClr val="2D75BC"/>
+                </a:solidFill>
+              </a:rPr>
+              <a:t>\2017\materials\exercise\CH2_exercise</a:t>
+            </a:r>
+          </a:p>
+        </p:txBody>
+      </p:sp>
+    </p:spTree>
+    <p:extLst>
+      <p:ext uri="{BB962C8B-B14F-4D97-AF65-F5344CB8AC3E}">
+        <p14:creationId xmlns:p14="http://schemas.microsoft.com/office/powerpoint/2010/main" val="425277737"/>
+      </p:ext>
+    </p:extLst>
+  </p:cSld>
+  <p:clrMapOvr>
+    <a:masterClrMapping/>
+  </p:clrMapOvr>
+</p:sld>
+</file>
+
+<file path=ppt/slides/slide34.xml><?xml version="1.0" encoding="utf-8"?>
+<p:sld xmlns:a="http://schemas.openxmlformats.org/drawingml/2006/main" xmlns:r="http://schemas.openxmlformats.org/officeDocument/2006/relationships" xmlns:p="http://schemas.openxmlformats.org/presentationml/2006/main">
+  <p:cSld>
+    <p:spTree>
+      <p:nvGrpSpPr>
+        <p:cNvPr id="1" name=""/>
+        <p:cNvGrpSpPr/>
+        <p:nvPr/>
+      </p:nvGrpSpPr>
+      <p:grpSpPr>
+        <a:xfrm>
+          <a:off x="0" y="0"/>
+          <a:ext cx="0" cy="0"/>
+          <a:chOff x="0" y="0"/>
+          <a:chExt cx="0" cy="0"/>
+        </a:xfrm>
+      </p:grpSpPr>
     </p:spTree>
   </p:cSld>
   <p:clrMapOvr>
@@ -17695,7 +17989,7 @@
 </p:sld>
 </file>
 
-<file path=ppt/slides/slide34.xml><?xml version="1.0" encoding="utf-8"?>
+<file path=ppt/slides/slide35.xml><?xml version="1.0" encoding="utf-8"?>
 <p:sld xmlns:a="http://schemas.openxmlformats.org/drawingml/2006/main" xmlns:r="http://schemas.openxmlformats.org/officeDocument/2006/relationships" xmlns:p="http://schemas.openxmlformats.org/presentationml/2006/main">
   <p:cSld>
     <p:spTree>
@@ -21958,6 +22252,12 @@
 </file>
 
 <file path=customXml/item1.xml><?xml version="1.0" encoding="utf-8"?>
+<p:properties xmlns:p="http://schemas.microsoft.com/office/2006/metadata/properties" xmlns:xsi="http://www.w3.org/2001/XMLSchema-instance">
+  <documentManagement/>
+</p:properties>
+</file>
+
+<file path=customXml/item2.xml><?xml version="1.0" encoding="utf-8"?>
 <ct:contentTypeSchema xmlns:ct="http://schemas.microsoft.com/office/2006/metadata/contentType" xmlns:ma="http://schemas.microsoft.com/office/2006/metadata/properties/metaAttributes" ct:_="" ma:_="" ma:contentTypeName="Document" ma:contentTypeID="0x010100EF3E94E2ACCF6D4EAE5CDD73AD546E17" ma:contentTypeVersion="0" ma:contentTypeDescription="Create a new document." ma:contentTypeScope="" ma:versionID="bb1449a0cfc4203701bc69f953314dcb">
   <xsd:schema xmlns:xsd="http://www.w3.org/2001/XMLSchema" xmlns:p="http://schemas.microsoft.com/office/2006/metadata/properties" targetNamespace="http://schemas.microsoft.com/office/2006/metadata/properties" ma:root="true" ma:fieldsID="4aeb20c0e3442673af7ee10786458764">
     <xsd:element name="properties">
@@ -22006,12 +22306,6 @@
 </ct:contentTypeSchema>
 </file>
 
-<file path=customXml/item2.xml><?xml version="1.0" encoding="utf-8"?>
-<p:properties xmlns:p="http://schemas.microsoft.com/office/2006/metadata/properties" xmlns:xsi="http://www.w3.org/2001/XMLSchema-instance">
-  <documentManagement/>
-</p:properties>
-</file>
-
 <file path=customXml/item3.xml><?xml version="1.0" encoding="utf-8"?>
 <?mso-contentType ?>
 <FormTemplates xmlns="http://schemas.microsoft.com/sharepoint/v3/contenttype/forms">
@@ -22022,6 +22316,20 @@
 </file>
 
 <file path=customXml/itemProps1.xml><?xml version="1.0" encoding="utf-8"?>
+<ds:datastoreItem xmlns:ds="http://schemas.openxmlformats.org/officeDocument/2006/customXml" ds:itemID="{BC974159-165D-43A7-BAC0-2BE7E1872CAD}">
+  <ds:schemaRefs>
+    <ds:schemaRef ds:uri="http://www.w3.org/XML/1998/namespace"/>
+    <ds:schemaRef ds:uri="http://schemas.microsoft.com/office/2006/metadata/properties"/>
+    <ds:schemaRef ds:uri="http://purl.org/dc/elements/1.1/"/>
+    <ds:schemaRef ds:uri="http://schemas.microsoft.com/office/2006/documentManagement/types"/>
+    <ds:schemaRef ds:uri="http://purl.org/dc/terms/"/>
+    <ds:schemaRef ds:uri="http://purl.org/dc/dcmitype/"/>
+    <ds:schemaRef ds:uri="http://schemas.openxmlformats.org/package/2006/metadata/core-properties"/>
+  </ds:schemaRefs>
+</ds:datastoreItem>
+</file>
+
+<file path=customXml/itemProps2.xml><?xml version="1.0" encoding="utf-8"?>
 <ds:datastoreItem xmlns:ds="http://schemas.openxmlformats.org/officeDocument/2006/customXml" ds:itemID="{1FBAA56A-8348-4CD3-A624-434B0E404A2E}">
   <ds:schemaRefs>
     <ds:schemaRef ds:uri="http://schemas.microsoft.com/office/2006/metadata/contentType"/>
@@ -22036,20 +22344,6 @@
 </ds:datastoreItem>
 </file>
 
-<file path=customXml/itemProps2.xml><?xml version="1.0" encoding="utf-8"?>
-<ds:datastoreItem xmlns:ds="http://schemas.openxmlformats.org/officeDocument/2006/customXml" ds:itemID="{BC974159-165D-43A7-BAC0-2BE7E1872CAD}">
-  <ds:schemaRefs>
-    <ds:schemaRef ds:uri="http://www.w3.org/XML/1998/namespace"/>
-    <ds:schemaRef ds:uri="http://schemas.microsoft.com/office/2006/metadata/properties"/>
-    <ds:schemaRef ds:uri="http://purl.org/dc/elements/1.1/"/>
-    <ds:schemaRef ds:uri="http://schemas.microsoft.com/office/2006/documentManagement/types"/>
-    <ds:schemaRef ds:uri="http://purl.org/dc/terms/"/>
-    <ds:schemaRef ds:uri="http://purl.org/dc/dcmitype/"/>
-    <ds:schemaRef ds:uri="http://schemas.openxmlformats.org/package/2006/metadata/core-properties"/>
-  </ds:schemaRefs>
-</ds:datastoreItem>
-</file>
-
 <file path=customXml/itemProps3.xml><?xml version="1.0" encoding="utf-8"?>
 <ds:datastoreItem xmlns:ds="http://schemas.openxmlformats.org/officeDocument/2006/customXml" ds:itemID="{AF2462E9-E3C6-4B9B-800D-1AA92DB6FEE6}">
   <ds:schemaRefs>

</xml_diff>

<commit_message>
[db] complete CH5 ppt & sample code
</commit_message>
<xml_diff>
--- a/db/mongodb/2017/materials/MongoDB_CH2(2)_Query.pptx
+++ b/db/mongodb/2017/materials/MongoDB_CH2(2)_Query.pptx
@@ -146,7 +146,7 @@
   </p:defaultTextStyle>
   <p:extLst>
     <p:ext uri="{EFAFB233-063F-42B5-8137-9DF3F51BA10A}">
-      <p15:sldGuideLst xmlns:p15="http://schemas.microsoft.com/office/powerpoint/2012/main">
+      <p15:sldGuideLst xmlns:p15="http://schemas.microsoft.com/office/powerpoint/2012/main" xmlns="">
         <p15:guide id="1" orient="horz" pos="2160">
           <p15:clr>
             <a:srgbClr val="A4A3A4"/>
@@ -246,7 +246,7 @@
             <a:fld id="{97373330-0875-4F54-B846-34A9C5D83194}" type="datetimeFigureOut">
               <a:rPr lang="en-US" smtClean="0"/>
               <a:pPr/>
-              <a:t>7/27/2017</a:t>
+              <a:t>8/2/2017</a:t>
             </a:fld>
             <a:endParaRPr lang="en-US"/>
           </a:p>
@@ -414,6 +414,11 @@
         </p:txBody>
       </p:sp>
     </p:spTree>
+    <p:extLst>
+      <p:ext uri="{BB962C8B-B14F-4D97-AF65-F5344CB8AC3E}">
+        <p14:creationId xmlns:p14="http://schemas.microsoft.com/office/powerpoint/2010/main" val="2964533642"/>
+      </p:ext>
+    </p:extLst>
   </p:cSld>
   <p:clrMap bg1="lt1" tx1="dk1" bg2="lt2" tx2="dk2" accent1="accent1" accent2="accent2" accent3="accent3" accent4="accent4" accent5="accent5" accent6="accent6" hlink="hlink" folHlink="folHlink"/>
   <p:notesStyle>
@@ -7531,21 +7536,21 @@
                 <a:gridCol w="1368152">
                   <a:extLst>
                     <a:ext uri="{9D8B030D-6E8A-4147-A177-3AD203B41FA5}">
-                      <a16:colId xmlns:a16="http://schemas.microsoft.com/office/drawing/2014/main" val="20000"/>
+                      <a16:colId xmlns:a16="http://schemas.microsoft.com/office/drawing/2014/main" xmlns="" val="20000"/>
                     </a:ext>
                   </a:extLst>
                 </a:gridCol>
                 <a:gridCol w="2880320">
                   <a:extLst>
                     <a:ext uri="{9D8B030D-6E8A-4147-A177-3AD203B41FA5}">
-                      <a16:colId xmlns:a16="http://schemas.microsoft.com/office/drawing/2014/main" val="20001"/>
+                      <a16:colId xmlns:a16="http://schemas.microsoft.com/office/drawing/2014/main" xmlns="" val="20001"/>
                     </a:ext>
                   </a:extLst>
                 </a:gridCol>
                 <a:gridCol w="4716016">
                   <a:extLst>
                     <a:ext uri="{9D8B030D-6E8A-4147-A177-3AD203B41FA5}">
-                      <a16:colId xmlns:a16="http://schemas.microsoft.com/office/drawing/2014/main" val="20002"/>
+                      <a16:colId xmlns:a16="http://schemas.microsoft.com/office/drawing/2014/main" xmlns="" val="20002"/>
                     </a:ext>
                   </a:extLst>
                 </a:gridCol>
@@ -7867,7 +7872,7 @@
                 </a:tc>
                 <a:extLst>
                   <a:ext uri="{0D108BD9-81ED-4DB2-BD59-A6C34878D82A}">
-                    <a16:rowId xmlns:a16="http://schemas.microsoft.com/office/drawing/2014/main" val="10000"/>
+                    <a16:rowId xmlns:a16="http://schemas.microsoft.com/office/drawing/2014/main" xmlns="" val="10000"/>
                   </a:ext>
                 </a:extLst>
               </a:tr>
@@ -8234,7 +8239,7 @@
                 </a:tc>
                 <a:extLst>
                   <a:ext uri="{0D108BD9-81ED-4DB2-BD59-A6C34878D82A}">
-                    <a16:rowId xmlns:a16="http://schemas.microsoft.com/office/drawing/2014/main" val="10001"/>
+                    <a16:rowId xmlns:a16="http://schemas.microsoft.com/office/drawing/2014/main" xmlns="" val="10001"/>
                   </a:ext>
                 </a:extLst>
               </a:tr>
@@ -8489,7 +8494,7 @@
                 </a:tc>
                 <a:extLst>
                   <a:ext uri="{0D108BD9-81ED-4DB2-BD59-A6C34878D82A}">
-                    <a16:rowId xmlns:a16="http://schemas.microsoft.com/office/drawing/2014/main" val="10002"/>
+                    <a16:rowId xmlns:a16="http://schemas.microsoft.com/office/drawing/2014/main" xmlns="" val="10002"/>
                   </a:ext>
                 </a:extLst>
               </a:tr>
@@ -8857,7 +8862,7 @@
                 </a:tc>
                 <a:extLst>
                   <a:ext uri="{0D108BD9-81ED-4DB2-BD59-A6C34878D82A}">
-                    <a16:rowId xmlns:a16="http://schemas.microsoft.com/office/drawing/2014/main" val="10003"/>
+                    <a16:rowId xmlns:a16="http://schemas.microsoft.com/office/drawing/2014/main" xmlns="" val="10003"/>
                   </a:ext>
                 </a:extLst>
               </a:tr>
@@ -13282,14 +13287,14 @@
                 <a:gridCol w="2609057">
                   <a:extLst>
                     <a:ext uri="{9D8B030D-6E8A-4147-A177-3AD203B41FA5}">
-                      <a16:colId xmlns:a16="http://schemas.microsoft.com/office/drawing/2014/main" val="20000"/>
+                      <a16:colId xmlns:a16="http://schemas.microsoft.com/office/drawing/2014/main" xmlns="" val="20000"/>
                     </a:ext>
                   </a:extLst>
                 </a:gridCol>
                 <a:gridCol w="5671863">
                   <a:extLst>
                     <a:ext uri="{9D8B030D-6E8A-4147-A177-3AD203B41FA5}">
-                      <a16:colId xmlns:a16="http://schemas.microsoft.com/office/drawing/2014/main" val="20001"/>
+                      <a16:colId xmlns:a16="http://schemas.microsoft.com/office/drawing/2014/main" xmlns="" val="20001"/>
                     </a:ext>
                   </a:extLst>
                 </a:gridCol>
@@ -13423,7 +13428,7 @@
                 </a:tc>
                 <a:extLst>
                   <a:ext uri="{0D108BD9-81ED-4DB2-BD59-A6C34878D82A}">
-                    <a16:rowId xmlns:a16="http://schemas.microsoft.com/office/drawing/2014/main" val="1210319110"/>
+                    <a16:rowId xmlns:a16="http://schemas.microsoft.com/office/drawing/2014/main" xmlns="" val="1210319110"/>
                   </a:ext>
                 </a:extLst>
               </a:tr>
@@ -13524,7 +13529,7 @@
                 </a:tc>
                 <a:extLst>
                   <a:ext uri="{0D108BD9-81ED-4DB2-BD59-A6C34878D82A}">
-                    <a16:rowId xmlns:a16="http://schemas.microsoft.com/office/drawing/2014/main" val="10000"/>
+                    <a16:rowId xmlns:a16="http://schemas.microsoft.com/office/drawing/2014/main" xmlns="" val="10000"/>
                   </a:ext>
                 </a:extLst>
               </a:tr>
@@ -13684,7 +13689,7 @@
                 </a:tc>
                 <a:extLst>
                   <a:ext uri="{0D108BD9-81ED-4DB2-BD59-A6C34878D82A}">
-                    <a16:rowId xmlns:a16="http://schemas.microsoft.com/office/drawing/2014/main" val="10001"/>
+                    <a16:rowId xmlns:a16="http://schemas.microsoft.com/office/drawing/2014/main" xmlns="" val="10001"/>
                   </a:ext>
                 </a:extLst>
               </a:tr>
@@ -13943,7 +13948,7 @@
                 </a:tc>
                 <a:extLst>
                   <a:ext uri="{0D108BD9-81ED-4DB2-BD59-A6C34878D82A}">
-                    <a16:rowId xmlns:a16="http://schemas.microsoft.com/office/drawing/2014/main" val="10002"/>
+                    <a16:rowId xmlns:a16="http://schemas.microsoft.com/office/drawing/2014/main" xmlns="" val="10002"/>
                   </a:ext>
                 </a:extLst>
               </a:tr>
@@ -16362,14 +16367,14 @@
                 <a:gridCol w="2609057">
                   <a:extLst>
                     <a:ext uri="{9D8B030D-6E8A-4147-A177-3AD203B41FA5}">
-                      <a16:colId xmlns:a16="http://schemas.microsoft.com/office/drawing/2014/main" val="20000"/>
+                      <a16:colId xmlns:a16="http://schemas.microsoft.com/office/drawing/2014/main" xmlns="" val="20000"/>
                     </a:ext>
                   </a:extLst>
                 </a:gridCol>
                 <a:gridCol w="5671863">
                   <a:extLst>
                     <a:ext uri="{9D8B030D-6E8A-4147-A177-3AD203B41FA5}">
-                      <a16:colId xmlns:a16="http://schemas.microsoft.com/office/drawing/2014/main" val="20001"/>
+                      <a16:colId xmlns:a16="http://schemas.microsoft.com/office/drawing/2014/main" xmlns="" val="20001"/>
                     </a:ext>
                   </a:extLst>
                 </a:gridCol>
@@ -16461,7 +16466,7 @@
                 </a:tc>
                 <a:extLst>
                   <a:ext uri="{0D108BD9-81ED-4DB2-BD59-A6C34878D82A}">
-                    <a16:rowId xmlns:a16="http://schemas.microsoft.com/office/drawing/2014/main" val="10000"/>
+                    <a16:rowId xmlns:a16="http://schemas.microsoft.com/office/drawing/2014/main" xmlns="" val="10000"/>
                   </a:ext>
                 </a:extLst>
               </a:tr>
@@ -16552,7 +16557,7 @@
                 </a:tc>
                 <a:extLst>
                   <a:ext uri="{0D108BD9-81ED-4DB2-BD59-A6C34878D82A}">
-                    <a16:rowId xmlns:a16="http://schemas.microsoft.com/office/drawing/2014/main" val="10001"/>
+                    <a16:rowId xmlns:a16="http://schemas.microsoft.com/office/drawing/2014/main" xmlns="" val="10001"/>
                   </a:ext>
                 </a:extLst>
               </a:tr>
@@ -16675,7 +16680,7 @@
                 </a:tc>
                 <a:extLst>
                   <a:ext uri="{0D108BD9-81ED-4DB2-BD59-A6C34878D82A}">
-                    <a16:rowId xmlns:a16="http://schemas.microsoft.com/office/drawing/2014/main" val="10002"/>
+                    <a16:rowId xmlns:a16="http://schemas.microsoft.com/office/drawing/2014/main" xmlns="" val="10002"/>
                   </a:ext>
                 </a:extLst>
               </a:tr>
@@ -17700,7 +17705,7 @@
         </p:nvSpPr>
         <p:spPr>
           <a:xfrm>
-            <a:off x="1031080" y="1712742"/>
+            <a:off x="934641" y="1219200"/>
             <a:ext cx="7122319" cy="1754326"/>
           </a:xfrm>
         </p:spPr>
@@ -17731,7 +17736,12 @@
             <p:ph type="body" sz="quarter" idx="11"/>
           </p:nvPr>
         </p:nvSpPr>
-        <p:spPr/>
+        <p:spPr>
+          <a:xfrm>
+            <a:off x="208361" y="1219200"/>
+            <a:ext cx="650081" cy="649458"/>
+          </a:xfrm>
+        </p:spPr>
         <p:txBody>
           <a:bodyPr/>
           <a:lstStyle/>
@@ -17753,8 +17763,8 @@
         </p:nvSpPr>
         <p:spPr>
           <a:xfrm>
-            <a:off x="304801" y="3733800"/>
-            <a:ext cx="8382000" cy="2308324"/>
+            <a:off x="152400" y="2514600"/>
+            <a:ext cx="8382000" cy="3970318"/>
           </a:xfrm>
           <a:prstGeom prst="rect">
             <a:avLst/>
@@ -17914,10 +17924,18 @@
                   <a:srgbClr val="2D75BC"/>
                 </a:solidFill>
               </a:rPr>
-              <a:t>\full-stack-web-course\</a:t>
-            </a:r>
-            <a:r>
-              <a:rPr lang="en-US" dirty="0" err="1">
+              <a:t>\</a:t>
+            </a:r>
+            <a:r>
+              <a:rPr lang="en-US" dirty="0" smtClean="0">
+                <a:solidFill>
+                  <a:srgbClr val="2D75BC"/>
+                </a:solidFill>
+              </a:rPr>
+              <a:t>full-stack-web-course\</a:t>
+            </a:r>
+            <a:r>
+              <a:rPr lang="en-US" dirty="0" err="1" smtClean="0">
                 <a:solidFill>
                   <a:srgbClr val="2D75BC"/>
                 </a:solidFill>
@@ -17925,7 +17943,7 @@
               <a:t>db</a:t>
             </a:r>
             <a:r>
-              <a:rPr lang="en-US" dirty="0">
+              <a:rPr lang="en-US" dirty="0" smtClean="0">
                 <a:solidFill>
                   <a:srgbClr val="2D75BC"/>
                 </a:solidFill>
@@ -17933,7 +17951,7 @@
               <a:t>\</a:t>
             </a:r>
             <a:r>
-              <a:rPr lang="en-US" dirty="0" err="1">
+              <a:rPr lang="en-US" dirty="0" err="1" smtClean="0">
                 <a:solidFill>
                   <a:srgbClr val="2D75BC"/>
                 </a:solidFill>
@@ -17941,13 +17959,78 @@
               <a:t>mongodb</a:t>
             </a:r>
             <a:r>
-              <a:rPr lang="en-US" dirty="0">
+              <a:rPr lang="en-US" dirty="0" smtClean="0">
                 <a:solidFill>
                   <a:srgbClr val="2D75BC"/>
                 </a:solidFill>
               </a:rPr>
               <a:t>\2017\materials\exercise\CH2_exercise</a:t>
             </a:r>
+          </a:p>
+          <a:p>
+            <a:r>
+              <a:rPr lang="en-US" dirty="0" smtClean="0">
+                <a:solidFill>
+                  <a:schemeClr val="tx1"/>
+                </a:solidFill>
+              </a:rPr>
+              <a:t>Sample Code:</a:t>
+            </a:r>
+          </a:p>
+          <a:p>
+            <a:r>
+              <a:rPr lang="en-US" b="0" dirty="0" smtClean="0">
+                <a:solidFill>
+                  <a:srgbClr val="2D75BC"/>
+                </a:solidFill>
+              </a:rPr>
+              <a:t>\</a:t>
+            </a:r>
+            <a:r>
+              <a:rPr lang="en-US" b="0" dirty="0" err="1" smtClean="0">
+                <a:solidFill>
+                  <a:srgbClr val="2D75BC"/>
+                </a:solidFill>
+              </a:rPr>
+              <a:t>db</a:t>
+            </a:r>
+            <a:r>
+              <a:rPr lang="en-US" b="0" dirty="0" smtClean="0">
+                <a:solidFill>
+                  <a:srgbClr val="2D75BC"/>
+                </a:solidFill>
+              </a:rPr>
+              <a:t>\</a:t>
+            </a:r>
+            <a:r>
+              <a:rPr lang="en-US" b="0" dirty="0" err="1" smtClean="0">
+                <a:solidFill>
+                  <a:srgbClr val="2D75BC"/>
+                </a:solidFill>
+              </a:rPr>
+              <a:t>mongodb</a:t>
+            </a:r>
+            <a:r>
+              <a:rPr lang="en-US" b="0" dirty="0" smtClean="0">
+                <a:solidFill>
+                  <a:srgbClr val="2D75BC"/>
+                </a:solidFill>
+              </a:rPr>
+              <a:t>\2017\materials\</a:t>
+            </a:r>
+            <a:r>
+              <a:rPr lang="en-US" b="0" dirty="0" err="1" smtClean="0">
+                <a:solidFill>
+                  <a:srgbClr val="2D75BC"/>
+                </a:solidFill>
+              </a:rPr>
+              <a:t>sample_code</a:t>
+            </a:r>
+            <a:endParaRPr lang="en-US" b="0" dirty="0">
+              <a:solidFill>
+                <a:srgbClr val="2D75BC"/>
+              </a:solidFill>
+            </a:endParaRPr>
           </a:p>
         </p:txBody>
       </p:sp>
@@ -18287,14 +18370,14 @@
                 <a:gridCol w="4104456">
                   <a:extLst>
                     <a:ext uri="{9D8B030D-6E8A-4147-A177-3AD203B41FA5}">
-                      <a16:colId xmlns:a16="http://schemas.microsoft.com/office/drawing/2014/main" val="20000"/>
+                      <a16:colId xmlns:a16="http://schemas.microsoft.com/office/drawing/2014/main" xmlns="" val="20000"/>
                     </a:ext>
                   </a:extLst>
                 </a:gridCol>
                 <a:gridCol w="4536504">
                   <a:extLst>
                     <a:ext uri="{9D8B030D-6E8A-4147-A177-3AD203B41FA5}">
-                      <a16:colId xmlns:a16="http://schemas.microsoft.com/office/drawing/2014/main" val="20001"/>
+                      <a16:colId xmlns:a16="http://schemas.microsoft.com/office/drawing/2014/main" xmlns="" val="20001"/>
                     </a:ext>
                   </a:extLst>
                 </a:gridCol>
@@ -18429,7 +18512,7 @@
                 </a:tc>
                 <a:extLst>
                   <a:ext uri="{0D108BD9-81ED-4DB2-BD59-A6C34878D82A}">
-                    <a16:rowId xmlns:a16="http://schemas.microsoft.com/office/drawing/2014/main" val="10000"/>
+                    <a16:rowId xmlns:a16="http://schemas.microsoft.com/office/drawing/2014/main" xmlns="" val="10000"/>
                   </a:ext>
                 </a:extLst>
               </a:tr>
@@ -18602,7 +18685,7 @@
                 </a:tc>
                 <a:extLst>
                   <a:ext uri="{0D108BD9-81ED-4DB2-BD59-A6C34878D82A}">
-                    <a16:rowId xmlns:a16="http://schemas.microsoft.com/office/drawing/2014/main" val="10001"/>
+                    <a16:rowId xmlns:a16="http://schemas.microsoft.com/office/drawing/2014/main" xmlns="" val="10001"/>
                   </a:ext>
                 </a:extLst>
               </a:tr>
@@ -18792,7 +18875,7 @@
                 </a:tc>
                 <a:extLst>
                   <a:ext uri="{0D108BD9-81ED-4DB2-BD59-A6C34878D82A}">
-                    <a16:rowId xmlns:a16="http://schemas.microsoft.com/office/drawing/2014/main" val="10002"/>
+                    <a16:rowId xmlns:a16="http://schemas.microsoft.com/office/drawing/2014/main" xmlns="" val="10002"/>
                   </a:ext>
                 </a:extLst>
               </a:tr>
@@ -18927,7 +19010,7 @@
                 </a:tc>
                 <a:extLst>
                   <a:ext uri="{0D108BD9-81ED-4DB2-BD59-A6C34878D82A}">
-                    <a16:rowId xmlns:a16="http://schemas.microsoft.com/office/drawing/2014/main" val="10003"/>
+                    <a16:rowId xmlns:a16="http://schemas.microsoft.com/office/drawing/2014/main" xmlns="" val="10003"/>
                   </a:ext>
                 </a:extLst>
               </a:tr>
@@ -19251,21 +19334,21 @@
                 <a:gridCol w="1872208">
                   <a:extLst>
                     <a:ext uri="{9D8B030D-6E8A-4147-A177-3AD203B41FA5}">
-                      <a16:colId xmlns:a16="http://schemas.microsoft.com/office/drawing/2014/main" val="20000"/>
+                      <a16:colId xmlns:a16="http://schemas.microsoft.com/office/drawing/2014/main" xmlns="" val="20000"/>
                     </a:ext>
                   </a:extLst>
                 </a:gridCol>
                 <a:gridCol w="2921318">
                   <a:extLst>
                     <a:ext uri="{9D8B030D-6E8A-4147-A177-3AD203B41FA5}">
-                      <a16:colId xmlns:a16="http://schemas.microsoft.com/office/drawing/2014/main" val="20001"/>
+                      <a16:colId xmlns:a16="http://schemas.microsoft.com/office/drawing/2014/main" xmlns="" val="20001"/>
                     </a:ext>
                   </a:extLst>
                 </a:gridCol>
                 <a:gridCol w="4104455">
                   <a:extLst>
                     <a:ext uri="{9D8B030D-6E8A-4147-A177-3AD203B41FA5}">
-                      <a16:colId xmlns:a16="http://schemas.microsoft.com/office/drawing/2014/main" val="20002"/>
+                      <a16:colId xmlns:a16="http://schemas.microsoft.com/office/drawing/2014/main" xmlns="" val="20002"/>
                     </a:ext>
                   </a:extLst>
                 </a:gridCol>
@@ -19422,7 +19505,7 @@
                 </a:tc>
                 <a:extLst>
                   <a:ext uri="{0D108BD9-81ED-4DB2-BD59-A6C34878D82A}">
-                    <a16:rowId xmlns:a16="http://schemas.microsoft.com/office/drawing/2014/main" val="10000"/>
+                    <a16:rowId xmlns:a16="http://schemas.microsoft.com/office/drawing/2014/main" xmlns="" val="10000"/>
                   </a:ext>
                 </a:extLst>
               </a:tr>
@@ -19559,7 +19642,7 @@
                 </a:tc>
                 <a:extLst>
                   <a:ext uri="{0D108BD9-81ED-4DB2-BD59-A6C34878D82A}">
-                    <a16:rowId xmlns:a16="http://schemas.microsoft.com/office/drawing/2014/main" val="10001"/>
+                    <a16:rowId xmlns:a16="http://schemas.microsoft.com/office/drawing/2014/main" xmlns="" val="10001"/>
                   </a:ext>
                 </a:extLst>
               </a:tr>
@@ -19680,7 +19763,7 @@
                 </a:tc>
                 <a:extLst>
                   <a:ext uri="{0D108BD9-81ED-4DB2-BD59-A6C34878D82A}">
-                    <a16:rowId xmlns:a16="http://schemas.microsoft.com/office/drawing/2014/main" val="10002"/>
+                    <a16:rowId xmlns:a16="http://schemas.microsoft.com/office/drawing/2014/main" xmlns="" val="10002"/>
                   </a:ext>
                 </a:extLst>
               </a:tr>
@@ -19801,7 +19884,7 @@
                 </a:tc>
                 <a:extLst>
                   <a:ext uri="{0D108BD9-81ED-4DB2-BD59-A6C34878D82A}">
-                    <a16:rowId xmlns:a16="http://schemas.microsoft.com/office/drawing/2014/main" val="10003"/>
+                    <a16:rowId xmlns:a16="http://schemas.microsoft.com/office/drawing/2014/main" xmlns="" val="10003"/>
                   </a:ext>
                 </a:extLst>
               </a:tr>
@@ -19922,7 +20005,7 @@
                 </a:tc>
                 <a:extLst>
                   <a:ext uri="{0D108BD9-81ED-4DB2-BD59-A6C34878D82A}">
-                    <a16:rowId xmlns:a16="http://schemas.microsoft.com/office/drawing/2014/main" val="10004"/>
+                    <a16:rowId xmlns:a16="http://schemas.microsoft.com/office/drawing/2014/main" xmlns="" val="10004"/>
                   </a:ext>
                 </a:extLst>
               </a:tr>
@@ -20024,7 +20107,7 @@
                 </a:tc>
                 <a:extLst>
                   <a:ext uri="{0D108BD9-81ED-4DB2-BD59-A6C34878D82A}">
-                    <a16:rowId xmlns:a16="http://schemas.microsoft.com/office/drawing/2014/main" val="10005"/>
+                    <a16:rowId xmlns:a16="http://schemas.microsoft.com/office/drawing/2014/main" xmlns="" val="10005"/>
                   </a:ext>
                 </a:extLst>
               </a:tr>
@@ -20116,7 +20199,7 @@
                 </a:tc>
                 <a:extLst>
                   <a:ext uri="{0D108BD9-81ED-4DB2-BD59-A6C34878D82A}">
-                    <a16:rowId xmlns:a16="http://schemas.microsoft.com/office/drawing/2014/main" val="10006"/>
+                    <a16:rowId xmlns:a16="http://schemas.microsoft.com/office/drawing/2014/main" xmlns="" val="10006"/>
                   </a:ext>
                 </a:extLst>
               </a:tr>
@@ -20265,7 +20348,7 @@
                 </a:tc>
                 <a:extLst>
                   <a:ext uri="{0D108BD9-81ED-4DB2-BD59-A6C34878D82A}">
-                    <a16:rowId xmlns:a16="http://schemas.microsoft.com/office/drawing/2014/main" val="10007"/>
+                    <a16:rowId xmlns:a16="http://schemas.microsoft.com/office/drawing/2014/main" xmlns="" val="10007"/>
                   </a:ext>
                 </a:extLst>
               </a:tr>
@@ -22252,12 +22335,6 @@
 </file>
 
 <file path=customXml/item1.xml><?xml version="1.0" encoding="utf-8"?>
-<p:properties xmlns:p="http://schemas.microsoft.com/office/2006/metadata/properties" xmlns:xsi="http://www.w3.org/2001/XMLSchema-instance">
-  <documentManagement/>
-</p:properties>
-</file>
-
-<file path=customXml/item2.xml><?xml version="1.0" encoding="utf-8"?>
 <ct:contentTypeSchema xmlns:ct="http://schemas.microsoft.com/office/2006/metadata/contentType" xmlns:ma="http://schemas.microsoft.com/office/2006/metadata/properties/metaAttributes" ct:_="" ma:_="" ma:contentTypeName="Document" ma:contentTypeID="0x010100EF3E94E2ACCF6D4EAE5CDD73AD546E17" ma:contentTypeVersion="0" ma:contentTypeDescription="Create a new document." ma:contentTypeScope="" ma:versionID="bb1449a0cfc4203701bc69f953314dcb">
   <xsd:schema xmlns:xsd="http://www.w3.org/2001/XMLSchema" xmlns:p="http://schemas.microsoft.com/office/2006/metadata/properties" targetNamespace="http://schemas.microsoft.com/office/2006/metadata/properties" ma:root="true" ma:fieldsID="4aeb20c0e3442673af7ee10786458764">
     <xsd:element name="properties">
@@ -22306,6 +22383,12 @@
 </ct:contentTypeSchema>
 </file>
 
+<file path=customXml/item2.xml><?xml version="1.0" encoding="utf-8"?>
+<p:properties xmlns:p="http://schemas.microsoft.com/office/2006/metadata/properties" xmlns:xsi="http://www.w3.org/2001/XMLSchema-instance">
+  <documentManagement/>
+</p:properties>
+</file>
+
 <file path=customXml/item3.xml><?xml version="1.0" encoding="utf-8"?>
 <?mso-contentType ?>
 <FormTemplates xmlns="http://schemas.microsoft.com/sharepoint/v3/contenttype/forms">
@@ -22316,20 +22399,6 @@
 </file>
 
 <file path=customXml/itemProps1.xml><?xml version="1.0" encoding="utf-8"?>
-<ds:datastoreItem xmlns:ds="http://schemas.openxmlformats.org/officeDocument/2006/customXml" ds:itemID="{BC974159-165D-43A7-BAC0-2BE7E1872CAD}">
-  <ds:schemaRefs>
-    <ds:schemaRef ds:uri="http://www.w3.org/XML/1998/namespace"/>
-    <ds:schemaRef ds:uri="http://schemas.microsoft.com/office/2006/metadata/properties"/>
-    <ds:schemaRef ds:uri="http://purl.org/dc/elements/1.1/"/>
-    <ds:schemaRef ds:uri="http://schemas.microsoft.com/office/2006/documentManagement/types"/>
-    <ds:schemaRef ds:uri="http://purl.org/dc/terms/"/>
-    <ds:schemaRef ds:uri="http://purl.org/dc/dcmitype/"/>
-    <ds:schemaRef ds:uri="http://schemas.openxmlformats.org/package/2006/metadata/core-properties"/>
-  </ds:schemaRefs>
-</ds:datastoreItem>
-</file>
-
-<file path=customXml/itemProps2.xml><?xml version="1.0" encoding="utf-8"?>
 <ds:datastoreItem xmlns:ds="http://schemas.openxmlformats.org/officeDocument/2006/customXml" ds:itemID="{1FBAA56A-8348-4CD3-A624-434B0E404A2E}">
   <ds:schemaRefs>
     <ds:schemaRef ds:uri="http://schemas.microsoft.com/office/2006/metadata/contentType"/>
@@ -22344,6 +22413,20 @@
 </ds:datastoreItem>
 </file>
 
+<file path=customXml/itemProps2.xml><?xml version="1.0" encoding="utf-8"?>
+<ds:datastoreItem xmlns:ds="http://schemas.openxmlformats.org/officeDocument/2006/customXml" ds:itemID="{BC974159-165D-43A7-BAC0-2BE7E1872CAD}">
+  <ds:schemaRefs>
+    <ds:schemaRef ds:uri="http://www.w3.org/XML/1998/namespace"/>
+    <ds:schemaRef ds:uri="http://schemas.microsoft.com/office/2006/metadata/properties"/>
+    <ds:schemaRef ds:uri="http://purl.org/dc/elements/1.1/"/>
+    <ds:schemaRef ds:uri="http://schemas.microsoft.com/office/2006/documentManagement/types"/>
+    <ds:schemaRef ds:uri="http://purl.org/dc/terms/"/>
+    <ds:schemaRef ds:uri="http://purl.org/dc/dcmitype/"/>
+    <ds:schemaRef ds:uri="http://schemas.openxmlformats.org/package/2006/metadata/core-properties"/>
+  </ds:schemaRefs>
+</ds:datastoreItem>
+</file>
+
 <file path=customXml/itemProps3.xml><?xml version="1.0" encoding="utf-8"?>
 <ds:datastoreItem xmlns:ds="http://schemas.openxmlformats.org/officeDocument/2006/customXml" ds:itemID="{AF2462E9-E3C6-4B9B-800D-1AA92DB6FEE6}">
   <ds:schemaRefs>

</xml_diff>